<commit_message>
Basic recommendations from 9420 this afternoon.
</commit_message>
<xml_diff>
--- a/presentation.pptx
+++ b/presentation.pptx
@@ -10,9 +10,9 @@
   <p:sldIdLst>
     <p:sldId id="256" r:id="rId2"/>
     <p:sldId id="257" r:id="rId3"/>
-    <p:sldId id="283" r:id="rId4"/>
-    <p:sldId id="297" r:id="rId5"/>
-    <p:sldId id="284" r:id="rId6"/>
+    <p:sldId id="299" r:id="rId4"/>
+    <p:sldId id="283" r:id="rId5"/>
+    <p:sldId id="297" r:id="rId6"/>
     <p:sldId id="268" r:id="rId7"/>
     <p:sldId id="287" r:id="rId8"/>
     <p:sldId id="298" r:id="rId9"/>
@@ -132,9 +132,9 @@
           <p14:sldIdLst>
             <p14:sldId id="256"/>
             <p14:sldId id="257"/>
+            <p14:sldId id="299"/>
             <p14:sldId id="283"/>
             <p14:sldId id="297"/>
-            <p14:sldId id="284"/>
           </p14:sldIdLst>
         </p14:section>
         <p14:section name="Phase One" id="{73FBD3E8-E2EB-433B-9092-57E19CD3915A}">
@@ -172,6 +172,9 @@
     <p:ext uri="{EFAFB233-063F-42B5-8137-9DF3F51BA10A}">
       <p15:sldGuideLst xmlns:p15="http://schemas.microsoft.com/office/powerpoint/2012/main"/>
     </p:ext>
+    <p:ext uri="{2D200454-40CA-4A62-9FC3-DE9A4176ACB9}">
+      <p15:notesGuideLst xmlns:p15="http://schemas.microsoft.com/office/powerpoint/2012/main"/>
+    </p:ext>
   </p:extLst>
 </p:presentation>
 </file>
@@ -216,7 +219,6 @@
           </a:p>
         </c:rich>
       </c:tx>
-      <c:layout/>
       <c:overlay val="0"/>
       <c:spPr>
         <a:noFill/>
@@ -596,7 +598,6 @@
     </c:plotArea>
     <c:legend>
       <c:legendPos val="b"/>
-      <c:layout/>
       <c:overlay val="0"/>
       <c:spPr>
         <a:noFill/>
@@ -628,7 +629,6 @@
     </c:legend>
     <c:plotVisOnly val="1"/>
     <c:dispBlanksAs val="gap"/>
-    <c:showDLblsOverMax val="0"/>
     <c:extLst>
       <c:ext xmlns:c16r3="http://schemas.microsoft.com/office/drawing/2017/03/chart" uri="{56B9EC1D-385E-4148-901F-78D8002777C0}">
         <c16r3:dataDisplayOptions16>
@@ -636,6 +636,7 @@
         </c16r3:dataDisplayOptions16>
       </c:ext>
     </c:extLst>
+    <c:showDLblsOverMax val="0"/>
   </c:chart>
   <c:spPr>
     <a:noFill/>
@@ -2151,13 +2152,6 @@
         </dgm:presLayoutVars>
       </dgm:prSet>
       <dgm:spPr/>
-      <dgm:t>
-        <a:bodyPr/>
-        <a:lstStyle/>
-        <a:p>
-          <a:endParaRPr lang="en-US"/>
-        </a:p>
-      </dgm:t>
     </dgm:pt>
     <dgm:pt modelId="{5E965E1B-8117-417A-AF2C-EE3F901C2B1D}" type="pres">
       <dgm:prSet presAssocID="{77573696-C6EB-461E-A870-6B1BC7BB5CD0}" presName="node" presStyleLbl="node1" presStyleIdx="0" presStyleCnt="4">
@@ -2166,35 +2160,14 @@
         </dgm:presLayoutVars>
       </dgm:prSet>
       <dgm:spPr/>
-      <dgm:t>
-        <a:bodyPr/>
-        <a:lstStyle/>
-        <a:p>
-          <a:endParaRPr lang="en-US"/>
-        </a:p>
-      </dgm:t>
     </dgm:pt>
     <dgm:pt modelId="{0EB7CA57-BE36-4B74-B166-DB62B0C2EF0D}" type="pres">
       <dgm:prSet presAssocID="{680A9B4A-9CA0-40AB-B4C2-BF29A3AD51C9}" presName="sibTrans" presStyleLbl="sibTrans2D1" presStyleIdx="0" presStyleCnt="4"/>
       <dgm:spPr/>
-      <dgm:t>
-        <a:bodyPr/>
-        <a:lstStyle/>
-        <a:p>
-          <a:endParaRPr lang="en-US"/>
-        </a:p>
-      </dgm:t>
     </dgm:pt>
     <dgm:pt modelId="{7B54B8A5-6606-4C3C-9500-31A30500CCD7}" type="pres">
       <dgm:prSet presAssocID="{680A9B4A-9CA0-40AB-B4C2-BF29A3AD51C9}" presName="connectorText" presStyleLbl="sibTrans2D1" presStyleIdx="0" presStyleCnt="4"/>
       <dgm:spPr/>
-      <dgm:t>
-        <a:bodyPr/>
-        <a:lstStyle/>
-        <a:p>
-          <a:endParaRPr lang="en-US"/>
-        </a:p>
-      </dgm:t>
     </dgm:pt>
     <dgm:pt modelId="{24EFD81F-AA69-44F2-83C2-806B40FDD526}" type="pres">
       <dgm:prSet presAssocID="{70001328-16F6-40B8-B034-8B63C6347611}" presName="node" presStyleLbl="node1" presStyleIdx="1" presStyleCnt="4">
@@ -2203,35 +2176,14 @@
         </dgm:presLayoutVars>
       </dgm:prSet>
       <dgm:spPr/>
-      <dgm:t>
-        <a:bodyPr/>
-        <a:lstStyle/>
-        <a:p>
-          <a:endParaRPr lang="en-US"/>
-        </a:p>
-      </dgm:t>
     </dgm:pt>
     <dgm:pt modelId="{7CC276FD-6F19-4E05-B00B-85069AD9148E}" type="pres">
       <dgm:prSet presAssocID="{C53E6838-5DA5-4754-B4E2-86D13141604E}" presName="sibTrans" presStyleLbl="sibTrans2D1" presStyleIdx="1" presStyleCnt="4"/>
       <dgm:spPr/>
-      <dgm:t>
-        <a:bodyPr/>
-        <a:lstStyle/>
-        <a:p>
-          <a:endParaRPr lang="en-US"/>
-        </a:p>
-      </dgm:t>
     </dgm:pt>
     <dgm:pt modelId="{A167945A-F89D-4397-9D92-7EC3CFCB3A03}" type="pres">
       <dgm:prSet presAssocID="{C53E6838-5DA5-4754-B4E2-86D13141604E}" presName="connectorText" presStyleLbl="sibTrans2D1" presStyleIdx="1" presStyleCnt="4"/>
       <dgm:spPr/>
-      <dgm:t>
-        <a:bodyPr/>
-        <a:lstStyle/>
-        <a:p>
-          <a:endParaRPr lang="en-US"/>
-        </a:p>
-      </dgm:t>
     </dgm:pt>
     <dgm:pt modelId="{6CB6C22C-45D1-4921-B019-37E18F399A24}" type="pres">
       <dgm:prSet presAssocID="{AD3E5398-E9E0-4E42-BCC9-D8820B90B1FB}" presName="node" presStyleLbl="node1" presStyleIdx="2" presStyleCnt="4">
@@ -2240,35 +2192,14 @@
         </dgm:presLayoutVars>
       </dgm:prSet>
       <dgm:spPr/>
-      <dgm:t>
-        <a:bodyPr/>
-        <a:lstStyle/>
-        <a:p>
-          <a:endParaRPr lang="en-US"/>
-        </a:p>
-      </dgm:t>
     </dgm:pt>
     <dgm:pt modelId="{E74D0B9F-AA38-4716-BB64-90BE35523337}" type="pres">
       <dgm:prSet presAssocID="{5C5FCAE7-DD4A-440A-A309-08B507BDBE4D}" presName="sibTrans" presStyleLbl="sibTrans2D1" presStyleIdx="2" presStyleCnt="4"/>
       <dgm:spPr/>
-      <dgm:t>
-        <a:bodyPr/>
-        <a:lstStyle/>
-        <a:p>
-          <a:endParaRPr lang="en-US"/>
-        </a:p>
-      </dgm:t>
     </dgm:pt>
     <dgm:pt modelId="{1284F3CF-717B-486C-9098-5C0FB28AEF94}" type="pres">
       <dgm:prSet presAssocID="{5C5FCAE7-DD4A-440A-A309-08B507BDBE4D}" presName="connectorText" presStyleLbl="sibTrans2D1" presStyleIdx="2" presStyleCnt="4"/>
       <dgm:spPr/>
-      <dgm:t>
-        <a:bodyPr/>
-        <a:lstStyle/>
-        <a:p>
-          <a:endParaRPr lang="en-US"/>
-        </a:p>
-      </dgm:t>
     </dgm:pt>
     <dgm:pt modelId="{015190AF-6814-4124-9780-D1FE7582EDA2}" type="pres">
       <dgm:prSet presAssocID="{39F2B261-B7E6-41C9-9A03-BF7A18D5AE07}" presName="node" presStyleLbl="node1" presStyleIdx="3" presStyleCnt="4">
@@ -2277,54 +2208,33 @@
         </dgm:presLayoutVars>
       </dgm:prSet>
       <dgm:spPr/>
-      <dgm:t>
-        <a:bodyPr/>
-        <a:lstStyle/>
-        <a:p>
-          <a:endParaRPr lang="en-US"/>
-        </a:p>
-      </dgm:t>
     </dgm:pt>
     <dgm:pt modelId="{2E4547E8-5A26-4145-B8D5-9870E6925ED4}" type="pres">
       <dgm:prSet presAssocID="{F758DE4A-AF8F-4642-9F20-0910D51B3749}" presName="sibTrans" presStyleLbl="sibTrans2D1" presStyleIdx="3" presStyleCnt="4"/>
       <dgm:spPr/>
-      <dgm:t>
-        <a:bodyPr/>
-        <a:lstStyle/>
-        <a:p>
-          <a:endParaRPr lang="en-US"/>
-        </a:p>
-      </dgm:t>
     </dgm:pt>
     <dgm:pt modelId="{CD52FBA2-DB57-457F-BF9C-C215954791D2}" type="pres">
       <dgm:prSet presAssocID="{F758DE4A-AF8F-4642-9F20-0910D51B3749}" presName="connectorText" presStyleLbl="sibTrans2D1" presStyleIdx="3" presStyleCnt="4"/>
       <dgm:spPr/>
-      <dgm:t>
-        <a:bodyPr/>
-        <a:lstStyle/>
-        <a:p>
-          <a:endParaRPr lang="en-US"/>
-        </a:p>
-      </dgm:t>
     </dgm:pt>
   </dgm:ptLst>
   <dgm:cxnLst>
-    <dgm:cxn modelId="{523E40C3-BAAE-4BDB-B0A6-5B8F9CB17151}" type="presOf" srcId="{9C0E2CA4-744F-44C1-AF8D-32951179B3EC}" destId="{1CAC3338-C130-4861-AE7B-A69033E92718}" srcOrd="0" destOrd="0" presId="urn:microsoft.com/office/officeart/2005/8/layout/cycle2"/>
+    <dgm:cxn modelId="{65127703-01AA-4425-BB14-B3CD3DFD3651}" type="presOf" srcId="{39F2B261-B7E6-41C9-9A03-BF7A18D5AE07}" destId="{015190AF-6814-4124-9780-D1FE7582EDA2}" srcOrd="0" destOrd="0" presId="urn:microsoft.com/office/officeart/2005/8/layout/cycle2"/>
+    <dgm:cxn modelId="{AF635921-B396-40F9-BFC8-CA2383B28137}" srcId="{9C0E2CA4-744F-44C1-AF8D-32951179B3EC}" destId="{39F2B261-B7E6-41C9-9A03-BF7A18D5AE07}" srcOrd="3" destOrd="0" parTransId="{B54D6B98-B7EB-4771-8027-B788EBDD1E43}" sibTransId="{F758DE4A-AF8F-4642-9F20-0910D51B3749}"/>
+    <dgm:cxn modelId="{EC471369-68E0-44A4-85EC-EBB9CB2DE6D6}" srcId="{9C0E2CA4-744F-44C1-AF8D-32951179B3EC}" destId="{AD3E5398-E9E0-4E42-BCC9-D8820B90B1FB}" srcOrd="2" destOrd="0" parTransId="{91E26694-5280-4F38-A99D-2323B823A62E}" sibTransId="{5C5FCAE7-DD4A-440A-A309-08B507BDBE4D}"/>
     <dgm:cxn modelId="{FDE76C4B-05A4-4779-8429-1169B103A25D}" type="presOf" srcId="{AD3E5398-E9E0-4E42-BCC9-D8820B90B1FB}" destId="{6CB6C22C-45D1-4921-B019-37E18F399A24}" srcOrd="0" destOrd="0" presId="urn:microsoft.com/office/officeart/2005/8/layout/cycle2"/>
-    <dgm:cxn modelId="{34F07AE0-2D54-4FFB-8A83-0071D8CC6E3D}" type="presOf" srcId="{C53E6838-5DA5-4754-B4E2-86D13141604E}" destId="{A167945A-F89D-4397-9D92-7EC3CFCB3A03}" srcOrd="1" destOrd="0" presId="urn:microsoft.com/office/officeart/2005/8/layout/cycle2"/>
-    <dgm:cxn modelId="{EC471369-68E0-44A4-85EC-EBB9CB2DE6D6}" srcId="{9C0E2CA4-744F-44C1-AF8D-32951179B3EC}" destId="{AD3E5398-E9E0-4E42-BCC9-D8820B90B1FB}" srcOrd="2" destOrd="0" parTransId="{91E26694-5280-4F38-A99D-2323B823A62E}" sibTransId="{5C5FCAE7-DD4A-440A-A309-08B507BDBE4D}"/>
+    <dgm:cxn modelId="{29BF8D4E-F746-4F70-A459-EAD46BBF6E06}" type="presOf" srcId="{680A9B4A-9CA0-40AB-B4C2-BF29A3AD51C9}" destId="{7B54B8A5-6606-4C3C-9500-31A30500CCD7}" srcOrd="1" destOrd="0" presId="urn:microsoft.com/office/officeart/2005/8/layout/cycle2"/>
     <dgm:cxn modelId="{B8801F57-4A9F-407D-B9B6-276DC81CBB39}" srcId="{9C0E2CA4-744F-44C1-AF8D-32951179B3EC}" destId="{70001328-16F6-40B8-B034-8B63C6347611}" srcOrd="1" destOrd="0" parTransId="{E8C021ED-2D82-4837-8049-A14D44901631}" sibTransId="{C53E6838-5DA5-4754-B4E2-86D13141604E}"/>
-    <dgm:cxn modelId="{AF635921-B396-40F9-BFC8-CA2383B28137}" srcId="{9C0E2CA4-744F-44C1-AF8D-32951179B3EC}" destId="{39F2B261-B7E6-41C9-9A03-BF7A18D5AE07}" srcOrd="3" destOrd="0" parTransId="{B54D6B98-B7EB-4771-8027-B788EBDD1E43}" sibTransId="{F758DE4A-AF8F-4642-9F20-0910D51B3749}"/>
-    <dgm:cxn modelId="{588A68F6-CB04-4965-95A6-752E31735CBB}" type="presOf" srcId="{77573696-C6EB-461E-A870-6B1BC7BB5CD0}" destId="{5E965E1B-8117-417A-AF2C-EE3F901C2B1D}" srcOrd="0" destOrd="0" presId="urn:microsoft.com/office/officeart/2005/8/layout/cycle2"/>
-    <dgm:cxn modelId="{8F9ACBDB-8860-49E3-A094-6E2301D68EC6}" srcId="{9C0E2CA4-744F-44C1-AF8D-32951179B3EC}" destId="{77573696-C6EB-461E-A870-6B1BC7BB5CD0}" srcOrd="0" destOrd="0" parTransId="{A49FEBBF-9866-45F4-B78C-0731FB3BDF07}" sibTransId="{680A9B4A-9CA0-40AB-B4C2-BF29A3AD51C9}"/>
-    <dgm:cxn modelId="{444F7BE8-7D19-4331-9506-8E2843F7D5C0}" type="presOf" srcId="{70001328-16F6-40B8-B034-8B63C6347611}" destId="{24EFD81F-AA69-44F2-83C2-806B40FDD526}" srcOrd="0" destOrd="0" presId="urn:microsoft.com/office/officeart/2005/8/layout/cycle2"/>
-    <dgm:cxn modelId="{29BF8D4E-F746-4F70-A459-EAD46BBF6E06}" type="presOf" srcId="{680A9B4A-9CA0-40AB-B4C2-BF29A3AD51C9}" destId="{7B54B8A5-6606-4C3C-9500-31A30500CCD7}" srcOrd="1" destOrd="0" presId="urn:microsoft.com/office/officeart/2005/8/layout/cycle2"/>
-    <dgm:cxn modelId="{65127703-01AA-4425-BB14-B3CD3DFD3651}" type="presOf" srcId="{39F2B261-B7E6-41C9-9A03-BF7A18D5AE07}" destId="{015190AF-6814-4124-9780-D1FE7582EDA2}" srcOrd="0" destOrd="0" presId="urn:microsoft.com/office/officeart/2005/8/layout/cycle2"/>
-    <dgm:cxn modelId="{414FB5C9-CBC4-422C-BE77-631634FBFB4E}" type="presOf" srcId="{F758DE4A-AF8F-4642-9F20-0910D51B3749}" destId="{CD52FBA2-DB57-457F-BF9C-C215954791D2}" srcOrd="1" destOrd="0" presId="urn:microsoft.com/office/officeart/2005/8/layout/cycle2"/>
-    <dgm:cxn modelId="{42DE5CC3-82F8-4081-92C7-ABF2A64ED109}" type="presOf" srcId="{680A9B4A-9CA0-40AB-B4C2-BF29A3AD51C9}" destId="{0EB7CA57-BE36-4B74-B166-DB62B0C2EF0D}" srcOrd="0" destOrd="0" presId="urn:microsoft.com/office/officeart/2005/8/layout/cycle2"/>
     <dgm:cxn modelId="{3E4F0A96-C334-477C-B52C-F2C8445FDAE7}" type="presOf" srcId="{C53E6838-5DA5-4754-B4E2-86D13141604E}" destId="{7CC276FD-6F19-4E05-B00B-85069AD9148E}" srcOrd="0" destOrd="0" presId="urn:microsoft.com/office/officeart/2005/8/layout/cycle2"/>
     <dgm:cxn modelId="{8A104C9B-B492-4325-90FC-E66B0AAAC20A}" type="presOf" srcId="{5C5FCAE7-DD4A-440A-A309-08B507BDBE4D}" destId="{E74D0B9F-AA38-4716-BB64-90BE35523337}" srcOrd="0" destOrd="0" presId="urn:microsoft.com/office/officeart/2005/8/layout/cycle2"/>
+    <dgm:cxn modelId="{523E40C3-BAAE-4BDB-B0A6-5B8F9CB17151}" type="presOf" srcId="{9C0E2CA4-744F-44C1-AF8D-32951179B3EC}" destId="{1CAC3338-C130-4861-AE7B-A69033E92718}" srcOrd="0" destOrd="0" presId="urn:microsoft.com/office/officeart/2005/8/layout/cycle2"/>
+    <dgm:cxn modelId="{42DE5CC3-82F8-4081-92C7-ABF2A64ED109}" type="presOf" srcId="{680A9B4A-9CA0-40AB-B4C2-BF29A3AD51C9}" destId="{0EB7CA57-BE36-4B74-B166-DB62B0C2EF0D}" srcOrd="0" destOrd="0" presId="urn:microsoft.com/office/officeart/2005/8/layout/cycle2"/>
+    <dgm:cxn modelId="{414FB5C9-CBC4-422C-BE77-631634FBFB4E}" type="presOf" srcId="{F758DE4A-AF8F-4642-9F20-0910D51B3749}" destId="{CD52FBA2-DB57-457F-BF9C-C215954791D2}" srcOrd="1" destOrd="0" presId="urn:microsoft.com/office/officeart/2005/8/layout/cycle2"/>
+    <dgm:cxn modelId="{8F9ACBDB-8860-49E3-A094-6E2301D68EC6}" srcId="{9C0E2CA4-744F-44C1-AF8D-32951179B3EC}" destId="{77573696-C6EB-461E-A870-6B1BC7BB5CD0}" srcOrd="0" destOrd="0" parTransId="{A49FEBBF-9866-45F4-B78C-0731FB3BDF07}" sibTransId="{680A9B4A-9CA0-40AB-B4C2-BF29A3AD51C9}"/>
+    <dgm:cxn modelId="{34F07AE0-2D54-4FFB-8A83-0071D8CC6E3D}" type="presOf" srcId="{C53E6838-5DA5-4754-B4E2-86D13141604E}" destId="{A167945A-F89D-4397-9D92-7EC3CFCB3A03}" srcOrd="1" destOrd="0" presId="urn:microsoft.com/office/officeart/2005/8/layout/cycle2"/>
     <dgm:cxn modelId="{0CD136E1-7BE0-464C-BB7E-5C35997A1A28}" type="presOf" srcId="{5C5FCAE7-DD4A-440A-A309-08B507BDBE4D}" destId="{1284F3CF-717B-486C-9098-5C0FB28AEF94}" srcOrd="1" destOrd="0" presId="urn:microsoft.com/office/officeart/2005/8/layout/cycle2"/>
+    <dgm:cxn modelId="{444F7BE8-7D19-4331-9506-8E2843F7D5C0}" type="presOf" srcId="{70001328-16F6-40B8-B034-8B63C6347611}" destId="{24EFD81F-AA69-44F2-83C2-806B40FDD526}" srcOrd="0" destOrd="0" presId="urn:microsoft.com/office/officeart/2005/8/layout/cycle2"/>
+    <dgm:cxn modelId="{588A68F6-CB04-4965-95A6-752E31735CBB}" type="presOf" srcId="{77573696-C6EB-461E-A870-6B1BC7BB5CD0}" destId="{5E965E1B-8117-417A-AF2C-EE3F901C2B1D}" srcOrd="0" destOrd="0" presId="urn:microsoft.com/office/officeart/2005/8/layout/cycle2"/>
     <dgm:cxn modelId="{56D189FD-2BFC-4AAC-9330-81727944FDD1}" type="presOf" srcId="{F758DE4A-AF8F-4642-9F20-0910D51B3749}" destId="{2E4547E8-5A26-4145-B8D5-9870E6925ED4}" srcOrd="0" destOrd="0" presId="urn:microsoft.com/office/officeart/2005/8/layout/cycle2"/>
     <dgm:cxn modelId="{0B6EC18C-823B-4AF0-AD3F-31F3F9993358}" type="presParOf" srcId="{1CAC3338-C130-4861-AE7B-A69033E92718}" destId="{5E965E1B-8117-417A-AF2C-EE3F901C2B1D}" srcOrd="0" destOrd="0" presId="urn:microsoft.com/office/officeart/2005/8/layout/cycle2"/>
     <dgm:cxn modelId="{54C2C981-0B3B-4BB6-BFC8-28D571303A4B}" type="presParOf" srcId="{1CAC3338-C130-4861-AE7B-A69033E92718}" destId="{0EB7CA57-BE36-4B74-B166-DB62B0C2EF0D}" srcOrd="1" destOrd="0" presId="urn:microsoft.com/office/officeart/2005/8/layout/cycle2"/>
@@ -2411,7 +2321,7 @@
         </a:bodyPr>
         <a:lstStyle/>
         <a:p>
-          <a:pPr lvl="0" algn="ctr" defTabSz="222250">
+          <a:pPr marL="0" lvl="0" indent="0" algn="ctr" defTabSz="222250">
             <a:lnSpc>
               <a:spcPct val="90000"/>
             </a:lnSpc>
@@ -2421,6 +2331,7 @@
             <a:spcAft>
               <a:spcPct val="35000"/>
             </a:spcAft>
+            <a:buNone/>
           </a:pPr>
           <a:r>
             <a:rPr lang="en-US" sz="500" kern="1200" dirty="0"/>
@@ -2482,7 +2393,7 @@
         </a:bodyPr>
         <a:lstStyle/>
         <a:p>
-          <a:pPr lvl="0" algn="ctr" defTabSz="177800">
+          <a:pPr marL="0" lvl="0" indent="0" algn="ctr" defTabSz="177800">
             <a:lnSpc>
               <a:spcPct val="90000"/>
             </a:lnSpc>
@@ -2492,6 +2403,7 @@
             <a:spcAft>
               <a:spcPct val="35000"/>
             </a:spcAft>
+            <a:buNone/>
           </a:pPr>
           <a:endParaRPr lang="en-US" sz="400" kern="1200"/>
         </a:p>
@@ -2555,7 +2467,7 @@
         </a:bodyPr>
         <a:lstStyle/>
         <a:p>
-          <a:pPr lvl="0" algn="ctr" defTabSz="222250">
+          <a:pPr marL="0" lvl="0" indent="0" algn="ctr" defTabSz="222250">
             <a:lnSpc>
               <a:spcPct val="90000"/>
             </a:lnSpc>
@@ -2565,6 +2477,7 @@
             <a:spcAft>
               <a:spcPct val="35000"/>
             </a:spcAft>
+            <a:buNone/>
           </a:pPr>
           <a:r>
             <a:rPr lang="en-US" sz="500" kern="1200" dirty="0"/>
@@ -2626,7 +2539,7 @@
         </a:bodyPr>
         <a:lstStyle/>
         <a:p>
-          <a:pPr lvl="0" algn="ctr" defTabSz="177800">
+          <a:pPr marL="0" lvl="0" indent="0" algn="ctr" defTabSz="177800">
             <a:lnSpc>
               <a:spcPct val="90000"/>
             </a:lnSpc>
@@ -2636,6 +2549,7 @@
             <a:spcAft>
               <a:spcPct val="35000"/>
             </a:spcAft>
+            <a:buNone/>
           </a:pPr>
           <a:endParaRPr lang="en-US" sz="400" kern="1200"/>
         </a:p>
@@ -2699,7 +2613,7 @@
         </a:bodyPr>
         <a:lstStyle/>
         <a:p>
-          <a:pPr lvl="0" algn="ctr" defTabSz="222250">
+          <a:pPr marL="0" lvl="0" indent="0" algn="ctr" defTabSz="222250">
             <a:lnSpc>
               <a:spcPct val="90000"/>
             </a:lnSpc>
@@ -2709,6 +2623,7 @@
             <a:spcAft>
               <a:spcPct val="35000"/>
             </a:spcAft>
+            <a:buNone/>
           </a:pPr>
           <a:r>
             <a:rPr lang="en-US" sz="500" kern="1200" dirty="0"/>
@@ -2770,7 +2685,7 @@
         </a:bodyPr>
         <a:lstStyle/>
         <a:p>
-          <a:pPr lvl="0" algn="ctr" defTabSz="177800">
+          <a:pPr marL="0" lvl="0" indent="0" algn="ctr" defTabSz="177800">
             <a:lnSpc>
               <a:spcPct val="90000"/>
             </a:lnSpc>
@@ -2780,6 +2695,7 @@
             <a:spcAft>
               <a:spcPct val="35000"/>
             </a:spcAft>
+            <a:buNone/>
           </a:pPr>
           <a:endParaRPr lang="en-US" sz="400" kern="1200"/>
         </a:p>
@@ -2843,7 +2759,7 @@
         </a:bodyPr>
         <a:lstStyle/>
         <a:p>
-          <a:pPr lvl="0" algn="ctr" defTabSz="222250">
+          <a:pPr marL="0" lvl="0" indent="0" algn="ctr" defTabSz="222250">
             <a:lnSpc>
               <a:spcPct val="90000"/>
             </a:lnSpc>
@@ -2853,6 +2769,7 @@
             <a:spcAft>
               <a:spcPct val="35000"/>
             </a:spcAft>
+            <a:buNone/>
           </a:pPr>
           <a:r>
             <a:rPr lang="en-US" sz="500" kern="1200" dirty="0"/>
@@ -2914,7 +2831,7 @@
         </a:bodyPr>
         <a:lstStyle/>
         <a:p>
-          <a:pPr lvl="0" algn="ctr" defTabSz="177800">
+          <a:pPr marL="0" lvl="0" indent="0" algn="ctr" defTabSz="177800">
             <a:lnSpc>
               <a:spcPct val="90000"/>
             </a:lnSpc>
@@ -2924,6 +2841,7 @@
             <a:spcAft>
               <a:spcPct val="35000"/>
             </a:spcAft>
+            <a:buNone/>
           </a:pPr>
           <a:endParaRPr lang="en-US" sz="400" kern="1200"/>
         </a:p>
@@ -4264,7 +4182,7 @@
           <a:p>
             <a:fld id="{A07C3DAA-E1DE-49B6-8079-627AB3F6E0E1}" type="datetimeFigureOut">
               <a:rPr lang="en-US" smtClean="0"/>
-              <a:t>4/17/2019</a:t>
+              <a:t>4/22/2019</a:t>
             </a:fld>
             <a:endParaRPr lang="en-US"/>
           </a:p>
@@ -4328,38 +4246,37 @@
           <a:p>
             <a:pPr lvl="0"/>
             <a:r>
-              <a:rPr lang="en-US" smtClean="0"/>
+              <a:rPr lang="en-US"/>
               <a:t>Edit Master text styles</a:t>
             </a:r>
           </a:p>
           <a:p>
             <a:pPr lvl="1"/>
             <a:r>
-              <a:rPr lang="en-US" smtClean="0"/>
+              <a:rPr lang="en-US"/>
               <a:t>Second level</a:t>
             </a:r>
           </a:p>
           <a:p>
             <a:pPr lvl="2"/>
             <a:r>
-              <a:rPr lang="en-US" smtClean="0"/>
+              <a:rPr lang="en-US"/>
               <a:t>Third level</a:t>
             </a:r>
           </a:p>
           <a:p>
             <a:pPr lvl="3"/>
             <a:r>
-              <a:rPr lang="en-US" smtClean="0"/>
+              <a:rPr lang="en-US"/>
               <a:t>Fourth level</a:t>
             </a:r>
           </a:p>
           <a:p>
             <a:pPr lvl="4"/>
             <a:r>
-              <a:rPr lang="en-US" smtClean="0"/>
+              <a:rPr lang="en-US"/>
               <a:t>Fifth level</a:t>
             </a:r>
-            <a:endParaRPr lang="en-US"/>
           </a:p>
         </p:txBody>
       </p:sp>
@@ -4530,111 +4447,6 @@
     </a:lvl9pPr>
   </p:notesStyle>
 </p:notesMaster>
-</file>
-
-<file path=ppt/notesSlides/notesSlide1.xml><?xml version="1.0" encoding="utf-8"?>
-<p:notes xmlns:a="http://schemas.openxmlformats.org/drawingml/2006/main" xmlns:r="http://schemas.openxmlformats.org/officeDocument/2006/relationships" xmlns:p="http://schemas.openxmlformats.org/presentationml/2006/main">
-  <p:cSld>
-    <p:spTree>
-      <p:nvGrpSpPr>
-        <p:cNvPr id="1" name=""/>
-        <p:cNvGrpSpPr/>
-        <p:nvPr/>
-      </p:nvGrpSpPr>
-      <p:grpSpPr>
-        <a:xfrm>
-          <a:off x="0" y="0"/>
-          <a:ext cx="0" cy="0"/>
-          <a:chOff x="0" y="0"/>
-          <a:chExt cx="0" cy="0"/>
-        </a:xfrm>
-      </p:grpSpPr>
-      <p:sp>
-        <p:nvSpPr>
-          <p:cNvPr id="2" name="Slide Image Placeholder 1"/>
-          <p:cNvSpPr>
-            <a:spLocks noGrp="1" noRot="1" noChangeAspect="1"/>
-          </p:cNvSpPr>
-          <p:nvPr>
-            <p:ph type="sldImg"/>
-          </p:nvPr>
-        </p:nvSpPr>
-        <p:spPr/>
-      </p:sp>
-      <p:sp>
-        <p:nvSpPr>
-          <p:cNvPr id="3" name="Notes Placeholder 2"/>
-          <p:cNvSpPr>
-            <a:spLocks noGrp="1"/>
-          </p:cNvSpPr>
-          <p:nvPr>
-            <p:ph type="body" idx="1"/>
-          </p:nvPr>
-        </p:nvSpPr>
-        <p:spPr/>
-        <p:txBody>
-          <a:bodyPr/>
-          <a:lstStyle/>
-          <a:p>
-            <a:r>
-              <a:rPr lang="en-US" dirty="0" smtClean="0"/>
-              <a:t>Clarify </a:t>
-            </a:r>
-            <a:r>
-              <a:rPr lang="en-US" b="1" dirty="0" smtClean="0"/>
-              <a:t>whose</a:t>
-            </a:r>
-            <a:r>
-              <a:rPr lang="en-US" dirty="0" smtClean="0"/>
-              <a:t> effort we are talking about.</a:t>
-            </a:r>
-          </a:p>
-          <a:p>
-            <a:endParaRPr lang="en-US" dirty="0"/>
-          </a:p>
-          <a:p>
-            <a:r>
-              <a:rPr lang="en-US" dirty="0" smtClean="0"/>
-              <a:t>Clarify this is calendar time.</a:t>
-            </a:r>
-            <a:endParaRPr lang="en-US" dirty="0"/>
-          </a:p>
-        </p:txBody>
-      </p:sp>
-      <p:sp>
-        <p:nvSpPr>
-          <p:cNvPr id="4" name="Slide Number Placeholder 3"/>
-          <p:cNvSpPr>
-            <a:spLocks noGrp="1"/>
-          </p:cNvSpPr>
-          <p:nvPr>
-            <p:ph type="sldNum" sz="quarter" idx="10"/>
-          </p:nvPr>
-        </p:nvSpPr>
-        <p:spPr/>
-        <p:txBody>
-          <a:bodyPr/>
-          <a:lstStyle/>
-          <a:p>
-            <a:fld id="{7C432B12-1722-4EDC-9BBA-25A0F0A334AF}" type="slidenum">
-              <a:rPr lang="en-US" smtClean="0"/>
-              <a:t>5</a:t>
-            </a:fld>
-            <a:endParaRPr lang="en-US"/>
-          </a:p>
-        </p:txBody>
-      </p:sp>
-    </p:spTree>
-    <p:extLst>
-      <p:ext uri="{BB962C8B-B14F-4D97-AF65-F5344CB8AC3E}">
-        <p14:creationId xmlns:p14="http://schemas.microsoft.com/office/powerpoint/2010/main" val="1770964721"/>
-      </p:ext>
-    </p:extLst>
-  </p:cSld>
-  <p:clrMapOvr>
-    <a:masterClrMapping/>
-  </p:clrMapOvr>
-</p:notes>
 </file>
 
 <file path=ppt/slideLayouts/slideLayout1.xml><?xml version="1.0" encoding="utf-8"?>
@@ -5359,7 +5171,7 @@
           <a:p>
             <a:fld id="{594BF61B-F633-497E-89E6-831EB66A6863}" type="datetimeFigureOut">
               <a:rPr lang="en-US" smtClean="0"/>
-              <a:t>4/17/2019</a:t>
+              <a:t>4/22/2019</a:t>
             </a:fld>
             <a:endParaRPr lang="en-US"/>
           </a:p>
@@ -5610,7 +5422,7 @@
           <a:p>
             <a:fld id="{594BF61B-F633-497E-89E6-831EB66A6863}" type="datetimeFigureOut">
               <a:rPr lang="en-US" smtClean="0"/>
-              <a:t>4/17/2019</a:t>
+              <a:t>4/22/2019</a:t>
             </a:fld>
             <a:endParaRPr lang="en-US"/>
           </a:p>
@@ -5924,7 +5736,7 @@
           <a:p>
             <a:fld id="{594BF61B-F633-497E-89E6-831EB66A6863}" type="datetimeFigureOut">
               <a:rPr lang="en-US" smtClean="0"/>
-              <a:t>4/17/2019</a:t>
+              <a:t>4/22/2019</a:t>
             </a:fld>
             <a:endParaRPr lang="en-US"/>
           </a:p>
@@ -6265,7 +6077,7 @@
           <a:p>
             <a:fld id="{594BF61B-F633-497E-89E6-831EB66A6863}" type="datetimeFigureOut">
               <a:rPr lang="en-US" smtClean="0"/>
-              <a:t>4/17/2019</a:t>
+              <a:t>4/22/2019</a:t>
             </a:fld>
             <a:endParaRPr lang="en-US"/>
           </a:p>
@@ -6579,7 +6391,7 @@
           <a:p>
             <a:fld id="{594BF61B-F633-497E-89E6-831EB66A6863}" type="datetimeFigureOut">
               <a:rPr lang="en-US" smtClean="0"/>
-              <a:t>4/17/2019</a:t>
+              <a:t>4/22/2019</a:t>
             </a:fld>
             <a:endParaRPr lang="en-US"/>
           </a:p>
@@ -6972,7 +6784,7 @@
           <a:p>
             <a:fld id="{594BF61B-F633-497E-89E6-831EB66A6863}" type="datetimeFigureOut">
               <a:rPr lang="en-US" smtClean="0"/>
-              <a:t>4/17/2019</a:t>
+              <a:t>4/22/2019</a:t>
             </a:fld>
             <a:endParaRPr lang="en-US"/>
           </a:p>
@@ -7142,7 +6954,7 @@
           <a:p>
             <a:fld id="{594BF61B-F633-497E-89E6-831EB66A6863}" type="datetimeFigureOut">
               <a:rPr lang="en-US" smtClean="0"/>
-              <a:t>4/17/2019</a:t>
+              <a:t>4/22/2019</a:t>
             </a:fld>
             <a:endParaRPr lang="en-US"/>
           </a:p>
@@ -7322,7 +7134,7 @@
           <a:p>
             <a:fld id="{594BF61B-F633-497E-89E6-831EB66A6863}" type="datetimeFigureOut">
               <a:rPr lang="en-US" smtClean="0"/>
-              <a:t>4/17/2019</a:t>
+              <a:t>4/22/2019</a:t>
             </a:fld>
             <a:endParaRPr lang="en-US"/>
           </a:p>
@@ -7498,7 +7310,7 @@
           <a:p>
             <a:fld id="{594BF61B-F633-497E-89E6-831EB66A6863}" type="datetimeFigureOut">
               <a:rPr lang="en-US" smtClean="0"/>
-              <a:t>4/17/2019</a:t>
+              <a:t>4/22/2019</a:t>
             </a:fld>
             <a:endParaRPr lang="en-US"/>
           </a:p>
@@ -7745,7 +7557,7 @@
           <a:p>
             <a:fld id="{594BF61B-F633-497E-89E6-831EB66A6863}" type="datetimeFigureOut">
               <a:rPr lang="en-US" smtClean="0"/>
-              <a:t>4/17/2019</a:t>
+              <a:t>4/22/2019</a:t>
             </a:fld>
             <a:endParaRPr lang="en-US"/>
           </a:p>
@@ -7977,7 +7789,7 @@
           <a:p>
             <a:fld id="{594BF61B-F633-497E-89E6-831EB66A6863}" type="datetimeFigureOut">
               <a:rPr lang="en-US" smtClean="0"/>
-              <a:t>4/17/2019</a:t>
+              <a:t>4/22/2019</a:t>
             </a:fld>
             <a:endParaRPr lang="en-US"/>
           </a:p>
@@ -8351,7 +8163,7 @@
           <a:p>
             <a:fld id="{594BF61B-F633-497E-89E6-831EB66A6863}" type="datetimeFigureOut">
               <a:rPr lang="en-US" smtClean="0"/>
-              <a:t>4/17/2019</a:t>
+              <a:t>4/22/2019</a:t>
             </a:fld>
             <a:endParaRPr lang="en-US"/>
           </a:p>
@@ -8474,7 +8286,7 @@
           <a:p>
             <a:fld id="{594BF61B-F633-497E-89E6-831EB66A6863}" type="datetimeFigureOut">
               <a:rPr lang="en-US" smtClean="0"/>
-              <a:t>4/17/2019</a:t>
+              <a:t>4/22/2019</a:t>
             </a:fld>
             <a:endParaRPr lang="en-US"/>
           </a:p>
@@ -8569,7 +8381,7 @@
           <a:p>
             <a:fld id="{594BF61B-F633-497E-89E6-831EB66A6863}" type="datetimeFigureOut">
               <a:rPr lang="en-US" smtClean="0"/>
-              <a:t>4/17/2019</a:t>
+              <a:t>4/22/2019</a:t>
             </a:fld>
             <a:endParaRPr lang="en-US"/>
           </a:p>
@@ -8824,7 +8636,7 @@
           <a:p>
             <a:fld id="{594BF61B-F633-497E-89E6-831EB66A6863}" type="datetimeFigureOut">
               <a:rPr lang="en-US" smtClean="0"/>
-              <a:t>4/17/2019</a:t>
+              <a:t>4/22/2019</a:t>
             </a:fld>
             <a:endParaRPr lang="en-US"/>
           </a:p>
@@ -9087,7 +8899,7 @@
           <a:p>
             <a:fld id="{594BF61B-F633-497E-89E6-831EB66A6863}" type="datetimeFigureOut">
               <a:rPr lang="en-US" smtClean="0"/>
-              <a:t>4/17/2019</a:t>
+              <a:t>4/22/2019</a:t>
             </a:fld>
             <a:endParaRPr lang="en-US"/>
           </a:p>
@@ -9830,7 +9642,7 @@
           <a:p>
             <a:fld id="{594BF61B-F633-497E-89E6-831EB66A6863}" type="datetimeFigureOut">
               <a:rPr lang="en-US" smtClean="0"/>
-              <a:t>4/17/2019</a:t>
+              <a:t>4/22/2019</a:t>
             </a:fld>
             <a:endParaRPr lang="en-US"/>
           </a:p>
@@ -10613,7 +10425,7 @@
                 <a16:creationId xmlns:a16="http://schemas.microsoft.com/office/drawing/2014/main" id="{A57C1A16-B8AB-4D99-A195-A38F556A6486}"/>
               </a:ext>
               <a:ext uri="{C183D7F6-B498-43B3-948B-1728B52AA6E4}">
-                <adec:decorative xmlns:adec="http://schemas.microsoft.com/office/drawing/2017/decorative" xmlns="" val="1"/>
+                <adec:decorative xmlns:adec="http://schemas.microsoft.com/office/drawing/2017/decorative" val="1"/>
               </a:ext>
             </a:extLst>
           </p:cNvPr>
@@ -10667,7 +10479,7 @@
                 <a16:creationId xmlns:a16="http://schemas.microsoft.com/office/drawing/2014/main" id="{F8A9B20B-D1DD-4573-B5EC-558029519236}"/>
               </a:ext>
               <a:ext uri="{C183D7F6-B498-43B3-948B-1728B52AA6E4}">
-                <adec:decorative xmlns:adec="http://schemas.microsoft.com/office/drawing/2017/decorative" xmlns="" val="1"/>
+                <adec:decorative xmlns:adec="http://schemas.microsoft.com/office/drawing/2017/decorative" val="1"/>
               </a:ext>
             </a:extLst>
           </p:cNvPr>
@@ -10721,7 +10533,7 @@
                 <a16:creationId xmlns:a16="http://schemas.microsoft.com/office/drawing/2014/main" id="{66D61E08-70C3-48D8-BEA0-787111DC30DA}"/>
               </a:ext>
               <a:ext uri="{C183D7F6-B498-43B3-948B-1728B52AA6E4}">
-                <adec:decorative xmlns:adec="http://schemas.microsoft.com/office/drawing/2017/decorative" xmlns="" val="1"/>
+                <adec:decorative xmlns:adec="http://schemas.microsoft.com/office/drawing/2017/decorative" val="1"/>
               </a:ext>
             </a:extLst>
           </p:cNvPr>
@@ -10801,7 +10613,7 @@
                 <a16:creationId xmlns:a16="http://schemas.microsoft.com/office/drawing/2014/main" id="{FC55298F-0AE5-478E-AD2B-03C2614C5833}"/>
               </a:ext>
               <a:ext uri="{C183D7F6-B498-43B3-948B-1728B52AA6E4}">
-                <adec:decorative xmlns:adec="http://schemas.microsoft.com/office/drawing/2017/decorative" xmlns="" val="1"/>
+                <adec:decorative xmlns:adec="http://schemas.microsoft.com/office/drawing/2017/decorative" val="1"/>
               </a:ext>
             </a:extLst>
           </p:cNvPr>
@@ -10881,7 +10693,7 @@
                 <a16:creationId xmlns:a16="http://schemas.microsoft.com/office/drawing/2014/main" id="{C180E4EA-0B63-4779-A895-7E90E71088F3}"/>
               </a:ext>
               <a:ext uri="{C183D7F6-B498-43B3-948B-1728B52AA6E4}">
-                <adec:decorative xmlns:adec="http://schemas.microsoft.com/office/drawing/2017/decorative" xmlns="" val="1"/>
+                <adec:decorative xmlns:adec="http://schemas.microsoft.com/office/drawing/2017/decorative" val="1"/>
               </a:ext>
             </a:extLst>
           </p:cNvPr>
@@ -10939,7 +10751,7 @@
                 <a16:creationId xmlns:a16="http://schemas.microsoft.com/office/drawing/2014/main" id="{CEE01D9D-3DE8-4EED-B0D3-8F3C79CC7673}"/>
               </a:ext>
               <a:ext uri="{C183D7F6-B498-43B3-948B-1728B52AA6E4}">
-                <adec:decorative xmlns:adec="http://schemas.microsoft.com/office/drawing/2017/decorative" xmlns="" val="1"/>
+                <adec:decorative xmlns:adec="http://schemas.microsoft.com/office/drawing/2017/decorative" val="1"/>
               </a:ext>
             </a:extLst>
           </p:cNvPr>
@@ -11020,7 +10832,7 @@
                 <a16:creationId xmlns:a16="http://schemas.microsoft.com/office/drawing/2014/main" id="{89AF5CE9-607F-43F4-8983-DCD6DA4051FD}"/>
               </a:ext>
               <a:ext uri="{C183D7F6-B498-43B3-948B-1728B52AA6E4}">
-                <adec:decorative xmlns:adec="http://schemas.microsoft.com/office/drawing/2017/decorative" xmlns="" val="1"/>
+                <adec:decorative xmlns:adec="http://schemas.microsoft.com/office/drawing/2017/decorative" val="1"/>
               </a:ext>
             </a:extLst>
           </p:cNvPr>
@@ -11102,7 +10914,7 @@
                 <a16:creationId xmlns:a16="http://schemas.microsoft.com/office/drawing/2014/main" id="{6EEA2DBD-9E1E-4521-8C01-F32AD18A89E3}"/>
               </a:ext>
               <a:ext uri="{C183D7F6-B498-43B3-948B-1728B52AA6E4}">
-                <adec:decorative xmlns:adec="http://schemas.microsoft.com/office/drawing/2017/decorative" xmlns="" val="1"/>
+                <adec:decorative xmlns:adec="http://schemas.microsoft.com/office/drawing/2017/decorative" val="1"/>
               </a:ext>
             </a:extLst>
           </p:cNvPr>
@@ -11182,7 +10994,7 @@
                 <a16:creationId xmlns:a16="http://schemas.microsoft.com/office/drawing/2014/main" id="{15BBD2C1-BA9B-46A9-A27A-33498B169272}"/>
               </a:ext>
               <a:ext uri="{C183D7F6-B498-43B3-948B-1728B52AA6E4}">
-                <adec:decorative xmlns:adec="http://schemas.microsoft.com/office/drawing/2017/decorative" xmlns="" val="1"/>
+                <adec:decorative xmlns:adec="http://schemas.microsoft.com/office/drawing/2017/decorative" val="1"/>
               </a:ext>
             </a:extLst>
           </p:cNvPr>
@@ -11278,10 +11090,9 @@
           <a:lstStyle/>
           <a:p>
             <a:r>
-              <a:rPr lang="en-US" dirty="0" smtClean="0"/>
+              <a:rPr lang="en-US" dirty="0"/>
               <a:t>Demo Requirements:  The Application</a:t>
             </a:r>
-            <a:endParaRPr lang="en-US" dirty="0"/>
           </a:p>
         </p:txBody>
       </p:sp>
@@ -11303,27 +11114,27 @@
           <a:lstStyle/>
           <a:p>
             <a:r>
-              <a:rPr lang="en-US" dirty="0" smtClean="0"/>
+              <a:rPr lang="en-US" dirty="0"/>
               <a:t>We will provide a simple app to Containerize</a:t>
             </a:r>
           </a:p>
           <a:p>
             <a:r>
-              <a:rPr lang="en-US" dirty="0" smtClean="0"/>
+              <a:rPr lang="en-US" dirty="0"/>
               <a:t>The app will have two dependencies</a:t>
             </a:r>
           </a:p>
           <a:p>
             <a:pPr lvl="1"/>
             <a:r>
-              <a:rPr lang="en-US" dirty="0" smtClean="0"/>
+              <a:rPr lang="en-US" dirty="0"/>
               <a:t>Database</a:t>
             </a:r>
           </a:p>
           <a:p>
             <a:pPr lvl="1"/>
             <a:r>
-              <a:rPr lang="en-US" dirty="0" smtClean="0"/>
+              <a:rPr lang="en-US" dirty="0"/>
               <a:t>Messaging</a:t>
             </a:r>
           </a:p>
@@ -11375,10 +11186,9 @@
           <a:lstStyle/>
           <a:p>
             <a:r>
-              <a:rPr lang="en-US" dirty="0" smtClean="0"/>
+              <a:rPr lang="en-US" dirty="0"/>
               <a:t>Demo Requirements:  The Deployment</a:t>
             </a:r>
-            <a:endParaRPr lang="en-US" dirty="0"/>
           </a:p>
         </p:txBody>
       </p:sp>
@@ -11400,66 +11210,65 @@
           <a:lstStyle/>
           <a:p>
             <a:r>
-              <a:rPr lang="en-US" dirty="0" smtClean="0"/>
+              <a:rPr lang="en-US" dirty="0"/>
               <a:t>The vendor will run the application on </a:t>
             </a:r>
             <a:r>
-              <a:rPr lang="en-US" smtClean="0"/>
+              <a:rPr lang="en-US"/>
               <a:t>a desktop</a:t>
             </a:r>
           </a:p>
           <a:p>
             <a:r>
-              <a:rPr lang="en-US" dirty="0" smtClean="0"/>
+              <a:rPr lang="en-US" dirty="0"/>
               <a:t>The vendor will demonstrate solutions to our named concerns</a:t>
             </a:r>
           </a:p>
           <a:p>
             <a:r>
-              <a:rPr lang="en-US" dirty="0" smtClean="0"/>
+              <a:rPr lang="en-US" dirty="0"/>
               <a:t>The vendor will give us infrastructure requirements</a:t>
             </a:r>
           </a:p>
           <a:p>
             <a:r>
-              <a:rPr lang="en-US" dirty="0" smtClean="0"/>
+              <a:rPr lang="en-US" dirty="0"/>
               <a:t>We will provide the infrastructure</a:t>
             </a:r>
           </a:p>
           <a:p>
             <a:r>
-              <a:rPr lang="en-US" dirty="0" smtClean="0"/>
+              <a:rPr lang="en-US" dirty="0"/>
               <a:t>The vendor will install, configure, and demonstrate their solution</a:t>
             </a:r>
           </a:p>
           <a:p>
             <a:pPr lvl="1"/>
             <a:r>
-              <a:rPr lang="en-US" dirty="0" smtClean="0"/>
+              <a:rPr lang="en-US" dirty="0"/>
               <a:t>The application will must be deployed</a:t>
             </a:r>
           </a:p>
           <a:p>
             <a:pPr lvl="1"/>
             <a:r>
-              <a:rPr lang="en-US" dirty="0" smtClean="0"/>
+              <a:rPr lang="en-US" dirty="0"/>
               <a:t>The application must be reachable on our network</a:t>
             </a:r>
           </a:p>
           <a:p>
             <a:pPr lvl="1"/>
             <a:r>
-              <a:rPr lang="en-US" dirty="0" smtClean="0"/>
+              <a:rPr lang="en-US" dirty="0"/>
               <a:t>We want them to show us “the standard way” to do this, step by step</a:t>
             </a:r>
           </a:p>
           <a:p>
             <a:pPr lvl="1"/>
             <a:r>
-              <a:rPr lang="en-US" dirty="0" smtClean="0"/>
+              <a:rPr lang="en-US" dirty="0"/>
               <a:t>Auto-scale running containers as needed</a:t>
             </a:r>
-            <a:endParaRPr lang="en-US" dirty="0"/>
           </a:p>
         </p:txBody>
       </p:sp>
@@ -11509,10 +11318,9 @@
           <a:lstStyle/>
           <a:p>
             <a:r>
-              <a:rPr lang="en-US" dirty="0" smtClean="0"/>
+              <a:rPr lang="en-US" dirty="0"/>
               <a:t>Demo Requirements:  NOC Operations</a:t>
             </a:r>
-            <a:endParaRPr lang="en-US" dirty="0"/>
           </a:p>
         </p:txBody>
       </p:sp>
@@ -11534,41 +11342,41 @@
           <a:lstStyle/>
           <a:p>
             <a:r>
-              <a:rPr lang="en-US" dirty="0" smtClean="0"/>
+              <a:rPr lang="en-US" dirty="0"/>
               <a:t>Demonstrate Monitoring</a:t>
             </a:r>
           </a:p>
           <a:p>
             <a:pPr lvl="1"/>
             <a:r>
-              <a:rPr lang="en-US" dirty="0" smtClean="0"/>
+              <a:rPr lang="en-US" dirty="0"/>
               <a:t>At the cluster level</a:t>
             </a:r>
           </a:p>
           <a:p>
             <a:pPr lvl="1"/>
             <a:r>
-              <a:rPr lang="en-US" dirty="0" smtClean="0"/>
+              <a:rPr lang="en-US" dirty="0"/>
               <a:t>At the host level</a:t>
             </a:r>
           </a:p>
           <a:p>
             <a:pPr lvl="1"/>
             <a:r>
-              <a:rPr lang="en-US" dirty="0" smtClean="0"/>
+              <a:rPr lang="en-US" dirty="0"/>
               <a:t>At the container level</a:t>
             </a:r>
           </a:p>
           <a:p>
             <a:pPr lvl="1"/>
             <a:r>
-              <a:rPr lang="en-US" dirty="0" smtClean="0"/>
+              <a:rPr lang="en-US" dirty="0"/>
               <a:t>* We prefer to integrate with our current NOC products</a:t>
             </a:r>
           </a:p>
           <a:p>
             <a:r>
-              <a:rPr lang="en-US" dirty="0" smtClean="0"/>
+              <a:rPr lang="en-US" dirty="0"/>
               <a:t>Demonstrate Escalation Plans</a:t>
             </a:r>
           </a:p>
@@ -11582,26 +11390,26 @@
           <a:p>
             <a:pPr lvl="1"/>
             <a:r>
-              <a:rPr lang="en-US" dirty="0" smtClean="0"/>
+              <a:rPr lang="en-US" dirty="0"/>
               <a:t>Scarce resources</a:t>
             </a:r>
           </a:p>
           <a:p>
             <a:r>
-              <a:rPr lang="en-US" dirty="0" smtClean="0"/>
+              <a:rPr lang="en-US" dirty="0"/>
               <a:t>Demonstrate Rolling Updates</a:t>
             </a:r>
           </a:p>
           <a:p>
             <a:pPr lvl="1"/>
             <a:r>
-              <a:rPr lang="en-US" dirty="0" smtClean="0"/>
+              <a:rPr lang="en-US" dirty="0"/>
               <a:t>Update running containers from an old base OS image to a current one</a:t>
             </a:r>
           </a:p>
           <a:p>
             <a:pPr lvl="1"/>
-            <a:endParaRPr lang="en-US" dirty="0" smtClean="0"/>
+            <a:endParaRPr lang="en-US" dirty="0"/>
           </a:p>
         </p:txBody>
       </p:sp>
@@ -11651,10 +11459,9 @@
           <a:lstStyle/>
           <a:p>
             <a:r>
-              <a:rPr lang="en-US" dirty="0" smtClean="0"/>
+              <a:rPr lang="en-US" dirty="0"/>
               <a:t>Demo Requirements:  The Proposal</a:t>
             </a:r>
-            <a:endParaRPr lang="en-US" dirty="0"/>
           </a:p>
         </p:txBody>
       </p:sp>
@@ -11677,73 +11484,68 @@
           <a:p>
             <a:r>
               <a:rPr lang="en-US" dirty="0"/>
-              <a:t>Basic explanation of </a:t>
-            </a:r>
-            <a:r>
-              <a:rPr lang="en-US" dirty="0" smtClean="0"/>
-              <a:t>licensing</a:t>
-            </a:r>
-          </a:p>
-          <a:p>
-            <a:r>
-              <a:rPr lang="en-US" dirty="0" smtClean="0"/>
+              <a:t>Basic explanation of licensing</a:t>
+            </a:r>
+          </a:p>
+          <a:p>
+            <a:r>
+              <a:rPr lang="en-US" dirty="0"/>
               <a:t>Formal pricing offers</a:t>
             </a:r>
           </a:p>
           <a:p>
             <a:r>
-              <a:rPr lang="en-US" dirty="0" smtClean="0"/>
+              <a:rPr lang="en-US" dirty="0"/>
               <a:t>Support details</a:t>
             </a:r>
           </a:p>
           <a:p>
             <a:pPr lvl="1"/>
             <a:r>
-              <a:rPr lang="en-US" dirty="0" smtClean="0"/>
+              <a:rPr lang="en-US" dirty="0"/>
               <a:t>What parts of the stack are supported</a:t>
             </a:r>
           </a:p>
           <a:p>
             <a:pPr lvl="1"/>
             <a:r>
-              <a:rPr lang="en-US" dirty="0" smtClean="0"/>
+              <a:rPr lang="en-US" dirty="0"/>
               <a:t>SLA</a:t>
             </a:r>
           </a:p>
           <a:p>
             <a:pPr lvl="1"/>
             <a:r>
-              <a:rPr lang="en-US" dirty="0" smtClean="0"/>
+              <a:rPr lang="en-US" dirty="0"/>
               <a:t>Pricing</a:t>
             </a:r>
           </a:p>
           <a:p>
             <a:r>
-              <a:rPr lang="en-US" dirty="0" smtClean="0"/>
+              <a:rPr lang="en-US" dirty="0"/>
               <a:t>Consulting services</a:t>
             </a:r>
           </a:p>
           <a:p>
             <a:pPr lvl="1"/>
             <a:r>
-              <a:rPr lang="en-US" dirty="0" smtClean="0"/>
+              <a:rPr lang="en-US" dirty="0"/>
               <a:t>Their consulting model</a:t>
             </a:r>
           </a:p>
           <a:p>
             <a:pPr lvl="1"/>
             <a:r>
-              <a:rPr lang="en-US" dirty="0" smtClean="0"/>
+              <a:rPr lang="en-US" dirty="0"/>
               <a:t>Availability</a:t>
             </a:r>
           </a:p>
           <a:p>
             <a:pPr lvl="1"/>
             <a:r>
-              <a:rPr lang="en-US" dirty="0" smtClean="0"/>
+              <a:rPr lang="en-US" dirty="0"/>
               <a:t>Costs</a:t>
             </a:r>
-            <a:endParaRPr lang="en-US" dirty="0"/>
           </a:p>
         </p:txBody>
       </p:sp>
@@ -11794,13 +11596,8 @@
           <a:p>
             <a:r>
               <a:rPr lang="en-US" dirty="0"/>
-              <a:t>Phase </a:t>
-            </a:r>
-            <a:r>
-              <a:rPr lang="en-US" dirty="0" smtClean="0"/>
-              <a:t>Two (Medium)</a:t>
-            </a:r>
-            <a:endParaRPr lang="en-US" dirty="0"/>
+              <a:t>Phase Two (Medium)</a:t>
+            </a:r>
           </a:p>
         </p:txBody>
       </p:sp>
@@ -11820,10 +11617,9 @@
           <a:lstStyle/>
           <a:p>
             <a:r>
-              <a:rPr lang="en-US" dirty="0" smtClean="0"/>
+              <a:rPr lang="en-US" dirty="0"/>
               <a:t>Support of Vendor Applications</a:t>
             </a:r>
-            <a:endParaRPr lang="en-US" dirty="0"/>
           </a:p>
         </p:txBody>
       </p:sp>
@@ -11873,10 +11669,9 @@
           <a:lstStyle/>
           <a:p>
             <a:r>
-              <a:rPr lang="en-US" dirty="0" smtClean="0"/>
+              <a:rPr lang="en-US" dirty="0"/>
               <a:t>Vendor Applications</a:t>
             </a:r>
-            <a:endParaRPr lang="en-US" dirty="0"/>
           </a:p>
         </p:txBody>
       </p:sp>
@@ -11897,37 +11692,48 @@
           <a:p>
             <a:r>
               <a:rPr lang="en-US" dirty="0"/>
-              <a:t>This is really just a new way of deploying applications we buy</a:t>
-            </a:r>
-          </a:p>
-          <a:p>
-            <a:r>
-              <a:rPr lang="en-US" dirty="0" smtClean="0"/>
+              <a:t>This is really just a new way of deploying the applications we buy</a:t>
+            </a:r>
+          </a:p>
+          <a:p>
+            <a:r>
+              <a:rPr lang="en-US" dirty="0"/>
               <a:t>Requires planning and training</a:t>
             </a:r>
           </a:p>
           <a:p>
             <a:r>
-              <a:rPr lang="en-US" dirty="0" smtClean="0"/>
+              <a:rPr lang="en-US" dirty="0"/>
+              <a:t>Requires an understanding of how to budget usage</a:t>
+            </a:r>
+          </a:p>
+          <a:p>
+            <a:r>
+              <a:rPr lang="en-US" dirty="0"/>
               <a:t>Requires licensing and support agreements</a:t>
             </a:r>
-            <a:endParaRPr lang="en-US" dirty="0"/>
-          </a:p>
-          <a:p>
-            <a:r>
-              <a:rPr lang="en-US" dirty="0" smtClean="0"/>
+          </a:p>
+          <a:p>
+            <a:r>
+              <a:rPr lang="en-US" dirty="0"/>
               <a:t>Requires physical infrastructure</a:t>
             </a:r>
           </a:p>
           <a:p>
             <a:r>
-              <a:rPr lang="en-US" dirty="0" smtClean="0"/>
+              <a:rPr lang="en-US" dirty="0"/>
               <a:t>Requires installation / configuration of container solution</a:t>
             </a:r>
           </a:p>
           <a:p>
             <a:r>
-              <a:rPr lang="en-US" dirty="0" smtClean="0"/>
+              <a:rPr lang="en-US" dirty="0"/>
+              <a:t>Requires security and compliance review</a:t>
+            </a:r>
+          </a:p>
+          <a:p>
+            <a:r>
+              <a:rPr lang="en-US" dirty="0"/>
               <a:t>Requires NOC integration</a:t>
             </a:r>
           </a:p>
@@ -11980,13 +11786,8 @@
           <a:p>
             <a:r>
               <a:rPr lang="en-US" dirty="0"/>
-              <a:t>Phase </a:t>
-            </a:r>
-            <a:r>
-              <a:rPr lang="en-US" dirty="0" smtClean="0"/>
-              <a:t>Three (Large)</a:t>
-            </a:r>
-            <a:endParaRPr lang="en-US" dirty="0"/>
+              <a:t>Phase Three (Large)</a:t>
+            </a:r>
           </a:p>
         </p:txBody>
       </p:sp>
@@ -12006,10 +11807,9 @@
           <a:lstStyle/>
           <a:p>
             <a:r>
-              <a:rPr lang="en-US" dirty="0" smtClean="0"/>
+              <a:rPr lang="en-US" dirty="0"/>
               <a:t>Development Operations:  Containers as a Service</a:t>
             </a:r>
-            <a:endParaRPr lang="en-US" dirty="0"/>
           </a:p>
         </p:txBody>
       </p:sp>
@@ -12065,10 +11865,9 @@
           <a:lstStyle/>
           <a:p>
             <a:r>
-              <a:rPr lang="en-US" dirty="0" smtClean="0"/>
+              <a:rPr lang="en-US" dirty="0"/>
               <a:t>Containers as a Service</a:t>
             </a:r>
-            <a:endParaRPr lang="en-US" dirty="0"/>
           </a:p>
         </p:txBody>
       </p:sp>
@@ -13888,28 +13687,27 @@
           <a:lstStyle/>
           <a:p>
             <a:r>
-              <a:rPr lang="en-US" dirty="0" smtClean="0"/>
+              <a:rPr lang="en-US" dirty="0"/>
               <a:t>Finalize our team</a:t>
             </a:r>
           </a:p>
           <a:p>
             <a:r>
-              <a:rPr lang="en-US" dirty="0" smtClean="0"/>
+              <a:rPr lang="en-US" dirty="0"/>
               <a:t>Write our RFP document</a:t>
             </a:r>
           </a:p>
           <a:p>
             <a:r>
-              <a:rPr lang="en-US" dirty="0" smtClean="0"/>
+              <a:rPr lang="en-US" dirty="0"/>
               <a:t>Submit RFP to vendors</a:t>
             </a:r>
           </a:p>
           <a:p>
             <a:r>
-              <a:rPr lang="en-US" dirty="0" smtClean="0"/>
+              <a:rPr lang="en-US" dirty="0"/>
               <a:t>Coordinate vendor presentations</a:t>
             </a:r>
-            <a:endParaRPr lang="en-US" dirty="0"/>
           </a:p>
         </p:txBody>
       </p:sp>
@@ -14033,10 +13831,9 @@
           <a:lstStyle/>
           <a:p>
             <a:r>
-              <a:rPr lang="en-US" dirty="0" smtClean="0"/>
-              <a:t>Three Phases</a:t>
-            </a:r>
-            <a:endParaRPr lang="en-US" dirty="0"/>
+              <a:rPr lang="en-US" dirty="0"/>
+              <a:t>Why Containers?</a:t>
+            </a:r>
           </a:p>
         </p:txBody>
       </p:sp>
@@ -14056,20 +13853,47 @@
           <a:lstStyle/>
           <a:p>
             <a:r>
-              <a:rPr lang="en-US" dirty="0" smtClean="0"/>
-              <a:t>Phase One:  Proofs of concept (This talk).</a:t>
-            </a:r>
-          </a:p>
-          <a:p>
-            <a:r>
-              <a:rPr lang="en-US" dirty="0" smtClean="0"/>
-              <a:t>Phase Two:  Support of vendor applications.</a:t>
-            </a:r>
-          </a:p>
-          <a:p>
-            <a:r>
-              <a:rPr lang="en-US" dirty="0" smtClean="0"/>
-              <a:t>Phase Three:  DevOps for our applications.</a:t>
+              <a:rPr lang="en-US" dirty="0"/>
+              <a:t>We know containers are coming</a:t>
+            </a:r>
+          </a:p>
+          <a:p>
+            <a:r>
+              <a:rPr lang="en-US" dirty="0"/>
+              <a:t>People are already using them:</a:t>
+            </a:r>
+          </a:p>
+          <a:p>
+            <a:pPr lvl="1"/>
+            <a:r>
+              <a:rPr lang="en-US" dirty="0"/>
+              <a:t>Big Data</a:t>
+            </a:r>
+          </a:p>
+          <a:p>
+            <a:pPr lvl="1"/>
+            <a:r>
+              <a:rPr lang="en-US" dirty="0"/>
+              <a:t>Oracle</a:t>
+            </a:r>
+          </a:p>
+          <a:p>
+            <a:pPr lvl="1"/>
+            <a:r>
+              <a:rPr lang="en-US" dirty="0"/>
+              <a:t>?</a:t>
+            </a:r>
+          </a:p>
+          <a:p>
+            <a:r>
+              <a:rPr lang="en-US" dirty="0"/>
+              <a:t>We want to manage one consistent platform</a:t>
+            </a:r>
+          </a:p>
+          <a:p>
+            <a:r>
+              <a:rPr lang="en-US" dirty="0"/>
+              <a:t>We want a consistent answer for “how do I run a container?”</a:t>
             </a:r>
           </a:p>
         </p:txBody>
@@ -14077,7 +13901,7 @@
     </p:spTree>
     <p:extLst>
       <p:ext uri="{BB962C8B-B14F-4D97-AF65-F5344CB8AC3E}">
-        <p14:creationId xmlns:p14="http://schemas.microsoft.com/office/powerpoint/2010/main" val="3595156515"/>
+        <p14:creationId xmlns:p14="http://schemas.microsoft.com/office/powerpoint/2010/main" val="2911040714"/>
       </p:ext>
     </p:extLst>
   </p:cSld>
@@ -14106,13 +13930,7 @@
       </p:grpSpPr>
       <p:sp>
         <p:nvSpPr>
-          <p:cNvPr id="2" name="Title 1">
-            <a:extLst>
-              <a:ext uri="{FF2B5EF4-FFF2-40B4-BE49-F238E27FC236}">
-                <a16:creationId xmlns:a16="http://schemas.microsoft.com/office/drawing/2014/main" id="{F98DCCC2-901E-4BA8-8F13-695B7613B71C}"/>
-              </a:ext>
-            </a:extLst>
-          </p:cNvPr>
+          <p:cNvPr id="2" name="Title 1"/>
           <p:cNvSpPr>
             <a:spLocks noGrp="1"/>
           </p:cNvSpPr>
@@ -14126,22 +13944,15 @@
           <a:lstStyle/>
           <a:p>
             <a:r>
-              <a:rPr lang="en-US" dirty="0" smtClean="0"/>
-              <a:t>The Players</a:t>
-            </a:r>
-            <a:endParaRPr lang="en-US" dirty="0"/>
+              <a:rPr lang="en-US" dirty="0"/>
+              <a:t>Three Phases</a:t>
+            </a:r>
           </a:p>
         </p:txBody>
       </p:sp>
       <p:sp>
         <p:nvSpPr>
-          <p:cNvPr id="3" name="Content Placeholder 2">
-            <a:extLst>
-              <a:ext uri="{FF2B5EF4-FFF2-40B4-BE49-F238E27FC236}">
-                <a16:creationId xmlns:a16="http://schemas.microsoft.com/office/drawing/2014/main" id="{65972851-E12F-4953-BC40-498F40127880}"/>
-              </a:ext>
-            </a:extLst>
-          </p:cNvPr>
+          <p:cNvPr id="3" name="Content Placeholder 2"/>
           <p:cNvSpPr>
             <a:spLocks noGrp="1"/>
           </p:cNvSpPr>
@@ -14151,140 +13962,32 @@
         </p:nvSpPr>
         <p:spPr/>
         <p:txBody>
-          <a:bodyPr>
-            <a:normAutofit fontScale="85000" lnSpcReduction="10000"/>
-          </a:bodyPr>
+          <a:bodyPr/>
           <a:lstStyle/>
           <a:p>
-            <a:pPr marL="0" indent="0">
-              <a:buNone/>
-            </a:pPr>
-            <a:r>
-              <a:rPr lang="en-US" b="1" dirty="0"/>
-              <a:t>Owner</a:t>
-            </a:r>
             <a:r>
               <a:rPr lang="en-US" dirty="0"/>
-              <a:t>:  Technical Architecture Group</a:t>
-            </a:r>
-          </a:p>
-          <a:p>
-            <a:pPr marL="0" indent="0">
-              <a:buNone/>
-            </a:pPr>
-            <a:endParaRPr lang="en-US" b="1" dirty="0"/>
-          </a:p>
-          <a:p>
-            <a:pPr marL="0" indent="0">
-              <a:buNone/>
-            </a:pPr>
-            <a:r>
-              <a:rPr lang="en-US" b="1" dirty="0"/>
-              <a:t>Driver</a:t>
-            </a:r>
+              <a:t>Phase One:  Proofs of concept (This talk).</a:t>
+            </a:r>
+          </a:p>
+          <a:p>
             <a:r>
               <a:rPr lang="en-US" dirty="0"/>
-              <a:t>:  Eric Burcham</a:t>
-            </a:r>
-          </a:p>
-          <a:p>
-            <a:pPr marL="0" indent="0">
-              <a:buNone/>
-            </a:pPr>
-            <a:endParaRPr lang="en-US" dirty="0"/>
-          </a:p>
-          <a:p>
-            <a:pPr marL="0" indent="0">
-              <a:buNone/>
-            </a:pPr>
-            <a:r>
-              <a:rPr lang="en-US" b="1" dirty="0"/>
-              <a:t>Core Team</a:t>
-            </a:r>
-            <a:r>
-              <a:rPr lang="en-US" dirty="0" smtClean="0"/>
-              <a:t>:  Eric Burcham, Dylan Clark, Mike Bollman, Lowell Roberts, Mayme Kittman</a:t>
-            </a:r>
-            <a:endParaRPr lang="en-US" dirty="0"/>
-          </a:p>
-          <a:p>
-            <a:pPr marL="0" indent="0">
-              <a:buNone/>
-            </a:pPr>
-            <a:endParaRPr lang="en-US" b="1" dirty="0"/>
-          </a:p>
-          <a:p>
-            <a:pPr marL="0" indent="0">
-              <a:buNone/>
-            </a:pPr>
-            <a:r>
-              <a:rPr lang="en-US" b="1" dirty="0"/>
-              <a:t>Project Manager</a:t>
-            </a:r>
+              <a:t>Phase Two:  Support of vendor applications.</a:t>
+            </a:r>
+          </a:p>
+          <a:p>
             <a:r>
               <a:rPr lang="en-US" dirty="0"/>
-              <a:t>:  </a:t>
-            </a:r>
-            <a:r>
-              <a:rPr lang="en-US" dirty="0" smtClean="0"/>
-              <a:t>TBD.  Not needed for Phase One.</a:t>
-            </a:r>
-            <a:br>
-              <a:rPr lang="en-US" dirty="0" smtClean="0"/>
-            </a:br>
-            <a:endParaRPr lang="en-US" b="1" dirty="0"/>
-          </a:p>
-          <a:p>
-            <a:pPr marL="0" indent="0">
-              <a:buNone/>
-            </a:pPr>
-            <a:r>
-              <a:rPr lang="en-US" b="1" dirty="0"/>
-              <a:t>Stakeholders</a:t>
-            </a:r>
-            <a:r>
-              <a:rPr lang="en-US" dirty="0"/>
-              <a:t>:  Big Data, Desktop Support, Development Managers, eBusiness, Engineering, </a:t>
-            </a:r>
-            <a:r>
-              <a:rPr lang="en-US" dirty="0" smtClean="0"/>
-              <a:t>NOC, Oracle </a:t>
-            </a:r>
-            <a:r>
-              <a:rPr lang="en-US" dirty="0"/>
-              <a:t>Team, SCADA, Server Team</a:t>
-            </a:r>
-          </a:p>
-          <a:p>
-            <a:pPr marL="0" indent="0">
-              <a:buNone/>
-            </a:pPr>
-            <a:endParaRPr lang="en-US" b="1" dirty="0"/>
-          </a:p>
-          <a:p>
-            <a:pPr marL="0" indent="0">
-              <a:buNone/>
-            </a:pPr>
-            <a:r>
-              <a:rPr lang="en-US" b="1" dirty="0"/>
-              <a:t>Vendors</a:t>
-            </a:r>
-            <a:r>
-              <a:rPr lang="en-US" dirty="0"/>
-              <a:t>:  Docker Enterprise, Red Hat OpenShift, </a:t>
-            </a:r>
-            <a:r>
-              <a:rPr lang="en-US" dirty="0" smtClean="0"/>
-              <a:t>Rancher</a:t>
-            </a:r>
-            <a:endParaRPr lang="en-US" dirty="0"/>
+              <a:t>Phase Three:  DevOps for our applications.</a:t>
+            </a:r>
           </a:p>
         </p:txBody>
       </p:sp>
     </p:spTree>
     <p:extLst>
       <p:ext uri="{BB962C8B-B14F-4D97-AF65-F5344CB8AC3E}">
-        <p14:creationId xmlns:p14="http://schemas.microsoft.com/office/powerpoint/2010/main" val="2747266861"/>
+        <p14:creationId xmlns:p14="http://schemas.microsoft.com/office/powerpoint/2010/main" val="3595156515"/>
       </p:ext>
     </p:extLst>
   </p:cSld>
@@ -14313,7 +14016,13 @@
       </p:grpSpPr>
       <p:sp>
         <p:nvSpPr>
-          <p:cNvPr id="2" name="Title 1"/>
+          <p:cNvPr id="2" name="Title 1">
+            <a:extLst>
+              <a:ext uri="{FF2B5EF4-FFF2-40B4-BE49-F238E27FC236}">
+                <a16:creationId xmlns:a16="http://schemas.microsoft.com/office/drawing/2014/main" id="{F98DCCC2-901E-4BA8-8F13-695B7613B71C}"/>
+              </a:ext>
+            </a:extLst>
+          </p:cNvPr>
           <p:cNvSpPr>
             <a:spLocks noGrp="1"/>
           </p:cNvSpPr>
@@ -14327,20 +14036,21 @@
           <a:lstStyle/>
           <a:p>
             <a:r>
-              <a:rPr lang="en-US" dirty="0" smtClean="0"/>
-              <a:t>T-Shirt </a:t>
-            </a:r>
-            <a:r>
-              <a:rPr lang="en-US" dirty="0" smtClean="0"/>
-              <a:t>Sizes</a:t>
-            </a:r>
-            <a:endParaRPr lang="en-US" dirty="0"/>
+              <a:rPr lang="en-US" dirty="0"/>
+              <a:t>The Players</a:t>
+            </a:r>
           </a:p>
         </p:txBody>
       </p:sp>
       <p:sp>
         <p:nvSpPr>
-          <p:cNvPr id="3" name="Content Placeholder 2"/>
+          <p:cNvPr id="3" name="Content Placeholder 2">
+            <a:extLst>
+              <a:ext uri="{FF2B5EF4-FFF2-40B4-BE49-F238E27FC236}">
+                <a16:creationId xmlns:a16="http://schemas.microsoft.com/office/drawing/2014/main" id="{65972851-E12F-4953-BC40-498F40127880}"/>
+              </a:ext>
+            </a:extLst>
+          </p:cNvPr>
           <p:cNvSpPr>
             <a:spLocks noGrp="1"/>
           </p:cNvSpPr>
@@ -14350,39 +14060,122 @@
         </p:nvSpPr>
         <p:spPr/>
         <p:txBody>
-          <a:bodyPr/>
+          <a:bodyPr>
+            <a:normAutofit fontScale="85000" lnSpcReduction="10000"/>
+          </a:bodyPr>
           <a:lstStyle/>
           <a:p>
-            <a:r>
-              <a:rPr lang="en-US" dirty="0" smtClean="0"/>
-              <a:t>Small:  0-2 Weeks</a:t>
-            </a:r>
-          </a:p>
-          <a:p>
-            <a:r>
-              <a:rPr lang="en-US" dirty="0" smtClean="0"/>
-              <a:t>Medium:  2 Weeks – 2 Months</a:t>
-            </a:r>
-          </a:p>
-          <a:p>
-            <a:r>
-              <a:rPr lang="en-US" dirty="0" smtClean="0"/>
-              <a:t>Large:  2 – 6 Months</a:t>
-            </a:r>
-          </a:p>
-          <a:p>
-            <a:r>
-              <a:rPr lang="en-US" dirty="0" smtClean="0"/>
-              <a:t>Extra Large:  More than 6 Months</a:t>
-            </a:r>
+            <a:pPr marL="0" indent="0">
+              <a:buNone/>
+            </a:pPr>
+            <a:r>
+              <a:rPr lang="en-US" b="1" dirty="0"/>
+              <a:t>Owner</a:t>
+            </a:r>
+            <a:r>
+              <a:rPr lang="en-US" dirty="0"/>
+              <a:t>:  Technical Architecture Group</a:t>
+            </a:r>
+          </a:p>
+          <a:p>
+            <a:pPr marL="0" indent="0">
+              <a:buNone/>
+            </a:pPr>
+            <a:endParaRPr lang="en-US" b="1" dirty="0"/>
+          </a:p>
+          <a:p>
+            <a:pPr marL="0" indent="0">
+              <a:buNone/>
+            </a:pPr>
+            <a:r>
+              <a:rPr lang="en-US" b="1" dirty="0"/>
+              <a:t>Driver</a:t>
+            </a:r>
+            <a:r>
+              <a:rPr lang="en-US" dirty="0"/>
+              <a:t>:  Eric Burcham</a:t>
+            </a:r>
+          </a:p>
+          <a:p>
+            <a:pPr marL="0" indent="0">
+              <a:buNone/>
+            </a:pPr>
             <a:endParaRPr lang="en-US" dirty="0"/>
+          </a:p>
+          <a:p>
+            <a:pPr marL="0" indent="0">
+              <a:buNone/>
+            </a:pPr>
+            <a:r>
+              <a:rPr lang="en-US" b="1" dirty="0"/>
+              <a:t>Core Team</a:t>
+            </a:r>
+            <a:r>
+              <a:rPr lang="en-US" dirty="0"/>
+              <a:t>:  Eric Burcham, Dylan Clark, Mike Bollman, Lowell Roberts, Mayme Kittman</a:t>
+            </a:r>
+          </a:p>
+          <a:p>
+            <a:pPr marL="0" indent="0">
+              <a:buNone/>
+            </a:pPr>
+            <a:endParaRPr lang="en-US" b="1" dirty="0"/>
+          </a:p>
+          <a:p>
+            <a:pPr marL="0" indent="0">
+              <a:buNone/>
+            </a:pPr>
+            <a:r>
+              <a:rPr lang="en-US" b="1" dirty="0"/>
+              <a:t>Project Manager</a:t>
+            </a:r>
+            <a:r>
+              <a:rPr lang="en-US" dirty="0"/>
+              <a:t>:  TBD.  Not needed for Phase One.</a:t>
+            </a:r>
+            <a:br>
+              <a:rPr lang="en-US" dirty="0"/>
+            </a:br>
+            <a:endParaRPr lang="en-US" b="1" dirty="0"/>
+          </a:p>
+          <a:p>
+            <a:pPr marL="0" indent="0">
+              <a:buNone/>
+            </a:pPr>
+            <a:r>
+              <a:rPr lang="en-US" b="1" dirty="0"/>
+              <a:t>Stakeholders</a:t>
+            </a:r>
+            <a:r>
+              <a:rPr lang="en-US" dirty="0"/>
+              <a:t>:  Big Data, Desktop Support, Development Managers, eBusiness, Engineering, Network Team, NOC, Oracle Team, SCADA, Security and Compliance Server Team</a:t>
+            </a:r>
+          </a:p>
+          <a:p>
+            <a:pPr marL="0" indent="0">
+              <a:buNone/>
+            </a:pPr>
+            <a:endParaRPr lang="en-US" b="1" dirty="0"/>
+          </a:p>
+          <a:p>
+            <a:pPr marL="0" indent="0">
+              <a:buNone/>
+            </a:pPr>
+            <a:r>
+              <a:rPr lang="en-US" b="1" dirty="0"/>
+              <a:t>Vendors</a:t>
+            </a:r>
+            <a:r>
+              <a:rPr lang="en-US" dirty="0"/>
+              <a:t>:  Docker Enterprise, Red Hat OpenShift, Rancher</a:t>
+            </a:r>
           </a:p>
         </p:txBody>
       </p:sp>
     </p:spTree>
     <p:extLst>
       <p:ext uri="{BB962C8B-B14F-4D97-AF65-F5344CB8AC3E}">
-        <p14:creationId xmlns:p14="http://schemas.microsoft.com/office/powerpoint/2010/main" val="3694622776"/>
+        <p14:creationId xmlns:p14="http://schemas.microsoft.com/office/powerpoint/2010/main" val="2747266861"/>
       </p:ext>
     </p:extLst>
   </p:cSld>
@@ -14426,13 +14219,8 @@
           <a:p>
             <a:r>
               <a:rPr lang="en-US" dirty="0"/>
-              <a:t>Phase </a:t>
-            </a:r>
-            <a:r>
-              <a:rPr lang="en-US" dirty="0" smtClean="0"/>
-              <a:t>One (Medium)</a:t>
-            </a:r>
-            <a:endParaRPr lang="en-US" dirty="0"/>
+              <a:t>Phase One (2 Months)</a:t>
+            </a:r>
           </a:p>
         </p:txBody>
       </p:sp>
@@ -14453,15 +14241,7 @@
           <a:p>
             <a:r>
               <a:rPr lang="en-US" dirty="0"/>
-              <a:t>Proofs of </a:t>
-            </a:r>
-            <a:r>
-              <a:rPr lang="en-US" dirty="0" smtClean="0"/>
-              <a:t>Concept, Cost Analysis, </a:t>
-            </a:r>
-            <a:r>
-              <a:rPr lang="en-US" dirty="0"/>
-              <a:t>and Vendor Selection</a:t>
+              <a:t>Proofs of Concept, Cost Analysis, and Vendor Selection</a:t>
             </a:r>
           </a:p>
         </p:txBody>
@@ -14512,10 +14292,9 @@
           <a:lstStyle/>
           <a:p>
             <a:r>
-              <a:rPr lang="en-US" dirty="0" smtClean="0"/>
+              <a:rPr lang="en-US" dirty="0"/>
               <a:t>Requests for Proposals with Demo POC</a:t>
             </a:r>
-            <a:endParaRPr lang="en-US" dirty="0"/>
           </a:p>
         </p:txBody>
       </p:sp>
@@ -14535,26 +14314,26 @@
           <a:lstStyle/>
           <a:p>
             <a:r>
-              <a:rPr lang="en-US" dirty="0" smtClean="0"/>
+              <a:rPr lang="en-US" dirty="0"/>
               <a:t>We’ll present identical requirements to each vendor</a:t>
             </a:r>
           </a:p>
           <a:p>
             <a:r>
-              <a:rPr lang="en-US" dirty="0" smtClean="0"/>
+              <a:rPr lang="en-US" dirty="0"/>
+              <a:t>We want them to do the demo on our infrastructure</a:t>
+            </a:r>
+          </a:p>
+          <a:p>
+            <a:r>
+              <a:rPr lang="en-US" dirty="0"/>
+              <a:t>We want to keep the environments around for awhile</a:t>
+            </a:r>
+          </a:p>
+          <a:p>
+            <a:r>
+              <a:rPr lang="en-US" dirty="0"/>
               <a:t>We’ll try to get this done for free</a:t>
-            </a:r>
-          </a:p>
-          <a:p>
-            <a:r>
-              <a:rPr lang="en-US" dirty="0" smtClean="0"/>
-              <a:t>We want them to do the demo on our infrastructure</a:t>
-            </a:r>
-          </a:p>
-          <a:p>
-            <a:r>
-              <a:rPr lang="en-US" dirty="0" smtClean="0"/>
-              <a:t>We want to keep the environments around for awhile</a:t>
             </a:r>
           </a:p>
         </p:txBody>
@@ -14605,10 +14384,9 @@
           <a:lstStyle/>
           <a:p>
             <a:r>
-              <a:rPr lang="en-US" dirty="0" smtClean="0"/>
+              <a:rPr lang="en-US" dirty="0"/>
               <a:t>Functional Concerns</a:t>
             </a:r>
-            <a:endParaRPr lang="en-US" dirty="0"/>
           </a:p>
         </p:txBody>
       </p:sp>
@@ -14636,41 +14414,41 @@
           </a:p>
           <a:p>
             <a:r>
-              <a:rPr lang="en-US" dirty="0" smtClean="0"/>
+              <a:rPr lang="en-US" dirty="0"/>
               <a:t>Clustering</a:t>
             </a:r>
-            <a:endParaRPr lang="en-US" dirty="0"/>
-          </a:p>
-          <a:p>
-            <a:r>
-              <a:rPr lang="en-US" dirty="0" smtClean="0"/>
+          </a:p>
+          <a:p>
+            <a:r>
+              <a:rPr lang="en-US" dirty="0"/>
               <a:t>Copy Control</a:t>
             </a:r>
           </a:p>
           <a:p>
             <a:r>
-              <a:rPr lang="en-US" dirty="0" smtClean="0"/>
+              <a:rPr lang="en-US" dirty="0"/>
               <a:t>Deployment</a:t>
             </a:r>
           </a:p>
           <a:p>
             <a:r>
-              <a:rPr lang="en-US" dirty="0" smtClean="0"/>
+              <a:rPr lang="en-US" dirty="0"/>
               <a:t>Health Monitoring</a:t>
             </a:r>
           </a:p>
           <a:p>
             <a:r>
-              <a:rPr lang="en-US" dirty="0" smtClean="0"/>
+              <a:rPr lang="en-US" dirty="0"/>
               <a:t>High Availability</a:t>
             </a:r>
-            <a:endParaRPr lang="en-US" dirty="0"/>
-          </a:p>
-          <a:p>
-            <a:r>
-              <a:rPr lang="en-US" dirty="0" smtClean="0"/>
-              <a:t>Log </a:t>
-            </a:r>
+          </a:p>
+          <a:p>
+            <a:r>
+              <a:rPr lang="en-US" dirty="0"/>
+              <a:t>Log Management</a:t>
+            </a:r>
+          </a:p>
+          <a:p>
             <a:r>
               <a:rPr lang="en-US" dirty="0"/>
               <a:t>Management</a:t>
@@ -14678,34 +14456,27 @@
           </a:p>
           <a:p>
             <a:r>
-              <a:rPr lang="en-US" dirty="0" smtClean="0"/>
-              <a:t>Management</a:t>
-            </a:r>
-          </a:p>
-          <a:p>
-            <a:r>
-              <a:rPr lang="en-US" dirty="0" smtClean="0"/>
+              <a:rPr lang="en-US" dirty="0"/>
               <a:t>Network Isolation for Testing</a:t>
             </a:r>
           </a:p>
           <a:p>
             <a:r>
-              <a:rPr lang="en-US" dirty="0" smtClean="0"/>
+              <a:rPr lang="en-US" dirty="0"/>
               <a:t>Orchestration</a:t>
             </a:r>
           </a:p>
           <a:p>
             <a:r>
-              <a:rPr lang="en-US" dirty="0" smtClean="0"/>
+              <a:rPr lang="en-US" dirty="0"/>
               <a:t>Resource Allocation</a:t>
             </a:r>
           </a:p>
           <a:p>
             <a:r>
-              <a:rPr lang="en-US" dirty="0" smtClean="0"/>
+              <a:rPr lang="en-US" dirty="0"/>
               <a:t>Security</a:t>
             </a:r>
-            <a:endParaRPr lang="en-US" dirty="0"/>
           </a:p>
         </p:txBody>
       </p:sp>
@@ -14755,10 +14526,9 @@
           <a:lstStyle/>
           <a:p>
             <a:r>
-              <a:rPr lang="en-US" dirty="0" smtClean="0"/>
+              <a:rPr lang="en-US" dirty="0"/>
               <a:t>Other Concerns</a:t>
             </a:r>
-            <a:endParaRPr lang="en-US" dirty="0"/>
           </a:p>
         </p:txBody>
       </p:sp>
@@ -14778,56 +14548,56 @@
           <a:lstStyle/>
           <a:p>
             <a:r>
-              <a:rPr lang="en-US" dirty="0" smtClean="0"/>
+              <a:rPr lang="en-US" dirty="0"/>
               <a:t>Authentication / Authorization</a:t>
             </a:r>
           </a:p>
           <a:p>
             <a:r>
-              <a:rPr lang="en-US" dirty="0" smtClean="0"/>
+              <a:rPr lang="en-US" dirty="0"/>
               <a:t>Budgeting</a:t>
             </a:r>
-            <a:endParaRPr lang="en-US" dirty="0"/>
-          </a:p>
-          <a:p>
-            <a:r>
-              <a:rPr lang="en-US" dirty="0" smtClean="0"/>
+          </a:p>
+          <a:p>
+            <a:r>
+              <a:rPr lang="en-US" dirty="0"/>
               <a:t>Change Management</a:t>
             </a:r>
           </a:p>
           <a:p>
             <a:r>
-              <a:rPr lang="en-US" dirty="0" smtClean="0"/>
+              <a:rPr lang="en-US" dirty="0"/>
               <a:t>Desktop Host Management</a:t>
             </a:r>
-            <a:endParaRPr lang="en-US" dirty="0"/>
-          </a:p>
-          <a:p>
-            <a:r>
-              <a:rPr lang="en-US" dirty="0" smtClean="0"/>
+          </a:p>
+          <a:p>
+            <a:r>
+              <a:rPr lang="en-US" dirty="0"/>
               <a:t>Image Approval and Management</a:t>
             </a:r>
           </a:p>
           <a:p>
             <a:r>
-              <a:rPr lang="en-US" dirty="0" smtClean="0"/>
+              <a:rPr lang="en-US" dirty="0"/>
               <a:t>Licensing and Compliance</a:t>
             </a:r>
           </a:p>
           <a:p>
             <a:r>
-              <a:rPr lang="en-US" dirty="0" smtClean="0"/>
-              <a:t>Resource </a:t>
-            </a:r>
-            <a:r>
               <a:rPr lang="en-US" dirty="0"/>
-              <a:t>Planning</a:t>
-            </a:r>
-          </a:p>
-          <a:p>
-            <a:r>
-              <a:rPr lang="en-US" dirty="0" smtClean="0"/>
+              <a:t>Resource Planning</a:t>
+            </a:r>
+          </a:p>
+          <a:p>
+            <a:r>
+              <a:rPr lang="en-US" dirty="0"/>
               <a:t>Security Audits</a:t>
+            </a:r>
+          </a:p>
+          <a:p>
+            <a:r>
+              <a:rPr lang="en-US" dirty="0"/>
+              <a:t>Technical Support Quality and Availability</a:t>
             </a:r>
           </a:p>
         </p:txBody>

</xml_diff>

<commit_message>
Integrated final suggestions from Mike and Mark.
</commit_message>
<xml_diff>
--- a/presentation.pptx
+++ b/presentation.pptx
@@ -5,7 +5,7 @@
     <p:sldMasterId id="2147483660" r:id="rId1"/>
   </p:sldMasterIdLst>
   <p:notesMasterIdLst>
-    <p:notesMasterId r:id="rId21"/>
+    <p:notesMasterId r:id="rId22"/>
   </p:notesMasterIdLst>
   <p:sldIdLst>
     <p:sldId id="256" r:id="rId2"/>
@@ -15,18 +15,19 @@
     <p:sldId id="297" r:id="rId6"/>
     <p:sldId id="268" r:id="rId7"/>
     <p:sldId id="287" r:id="rId8"/>
-    <p:sldId id="298" r:id="rId9"/>
-    <p:sldId id="293" r:id="rId10"/>
-    <p:sldId id="288" r:id="rId11"/>
-    <p:sldId id="289" r:id="rId12"/>
-    <p:sldId id="290" r:id="rId13"/>
-    <p:sldId id="291" r:id="rId14"/>
-    <p:sldId id="270" r:id="rId15"/>
-    <p:sldId id="292" r:id="rId16"/>
-    <p:sldId id="285" r:id="rId17"/>
-    <p:sldId id="294" r:id="rId18"/>
-    <p:sldId id="295" r:id="rId19"/>
-    <p:sldId id="296" r:id="rId20"/>
+    <p:sldId id="300" r:id="rId9"/>
+    <p:sldId id="298" r:id="rId10"/>
+    <p:sldId id="293" r:id="rId11"/>
+    <p:sldId id="304" r:id="rId12"/>
+    <p:sldId id="288" r:id="rId13"/>
+    <p:sldId id="301" r:id="rId14"/>
+    <p:sldId id="302" r:id="rId15"/>
+    <p:sldId id="303" r:id="rId16"/>
+    <p:sldId id="270" r:id="rId17"/>
+    <p:sldId id="292" r:id="rId18"/>
+    <p:sldId id="285" r:id="rId19"/>
+    <p:sldId id="294" r:id="rId20"/>
+    <p:sldId id="296" r:id="rId21"/>
   </p:sldIdLst>
   <p:sldSz cx="12192000" cy="6858000"/>
   <p:notesSz cx="7010400" cy="9296400"/>
@@ -141,12 +142,14 @@
           <p14:sldIdLst>
             <p14:sldId id="268"/>
             <p14:sldId id="287"/>
+            <p14:sldId id="300"/>
             <p14:sldId id="298"/>
             <p14:sldId id="293"/>
+            <p14:sldId id="304"/>
             <p14:sldId id="288"/>
-            <p14:sldId id="289"/>
-            <p14:sldId id="290"/>
-            <p14:sldId id="291"/>
+            <p14:sldId id="301"/>
+            <p14:sldId id="302"/>
+            <p14:sldId id="303"/>
           </p14:sldIdLst>
         </p14:section>
         <p14:section name="Phase Two" id="{0D8F3455-BA77-4F26-9B5E-DFEE74F49937}">
@@ -163,7 +166,6 @@
         </p14:section>
         <p14:section name="Next Steps" id="{FE611F16-C7B8-4C53-B1F6-FEDA790D3372}">
           <p14:sldIdLst>
-            <p14:sldId id="295"/>
             <p14:sldId id="296"/>
           </p14:sldIdLst>
         </p14:section>
@@ -177,1031 +179,6 @@
     </p:ext>
   </p:extLst>
 </p:presentation>
-</file>
-
-<file path=ppt/charts/chart1.xml><?xml version="1.0" encoding="utf-8"?>
-<c:chartSpace xmlns:c="http://schemas.openxmlformats.org/drawingml/2006/chart" xmlns:a="http://schemas.openxmlformats.org/drawingml/2006/main" xmlns:r="http://schemas.openxmlformats.org/officeDocument/2006/relationships" xmlns:c16r2="http://schemas.microsoft.com/office/drawing/2015/06/chart">
-  <c:date1904 val="0"/>
-  <c:lang val="en-US"/>
-  <c:roundedCorners val="0"/>
-  <mc:AlternateContent xmlns:mc="http://schemas.openxmlformats.org/markup-compatibility/2006">
-    <mc:Choice xmlns:c14="http://schemas.microsoft.com/office/drawing/2007/8/2/chart" Requires="c14">
-      <c14:style val="102"/>
-    </mc:Choice>
-    <mc:Fallback>
-      <c:style val="2"/>
-    </mc:Fallback>
-  </mc:AlternateContent>
-  <c:chart>
-    <c:title>
-      <c:tx>
-        <c:rich>
-          <a:bodyPr rot="0" spcFirstLastPara="1" vertOverflow="ellipsis" vert="horz" wrap="square" anchor="ctr" anchorCtr="1"/>
-          <a:lstStyle/>
-          <a:p>
-            <a:pPr>
-              <a:defRPr sz="1862" b="0" i="0" u="none" strike="noStrike" kern="1200" spc="0" baseline="0">
-                <a:solidFill>
-                  <a:schemeClr val="tx1">
-                    <a:lumMod val="65000"/>
-                    <a:lumOff val="35000"/>
-                  </a:schemeClr>
-                </a:solidFill>
-                <a:latin typeface="+mn-lt"/>
-                <a:ea typeface="+mn-ea"/>
-                <a:cs typeface="+mn-cs"/>
-              </a:defRPr>
-            </a:pPr>
-            <a:r>
-              <a:rPr lang="en-US" dirty="0"/>
-              <a:t>Monitor</a:t>
-            </a:r>
-          </a:p>
-        </c:rich>
-      </c:tx>
-      <c:overlay val="0"/>
-      <c:spPr>
-        <a:noFill/>
-        <a:ln>
-          <a:noFill/>
-        </a:ln>
-        <a:effectLst/>
-      </c:spPr>
-      <c:txPr>
-        <a:bodyPr rot="0" spcFirstLastPara="1" vertOverflow="ellipsis" vert="horz" wrap="square" anchor="ctr" anchorCtr="1"/>
-        <a:lstStyle/>
-        <a:p>
-          <a:pPr>
-            <a:defRPr sz="1862" b="0" i="0" u="none" strike="noStrike" kern="1200" spc="0" baseline="0">
-              <a:solidFill>
-                <a:schemeClr val="tx1">
-                  <a:lumMod val="65000"/>
-                  <a:lumOff val="35000"/>
-                </a:schemeClr>
-              </a:solidFill>
-              <a:latin typeface="+mn-lt"/>
-              <a:ea typeface="+mn-ea"/>
-              <a:cs typeface="+mn-cs"/>
-            </a:defRPr>
-          </a:pPr>
-          <a:endParaRPr lang="en-US"/>
-        </a:p>
-      </c:txPr>
-    </c:title>
-    <c:autoTitleDeleted val="0"/>
-    <c:plotArea>
-      <c:layout/>
-      <c:barChart>
-        <c:barDir val="col"/>
-        <c:grouping val="clustered"/>
-        <c:varyColors val="0"/>
-        <c:ser>
-          <c:idx val="0"/>
-          <c:order val="0"/>
-          <c:tx>
-            <c:strRef>
-              <c:f>Sheet1!$B$1</c:f>
-              <c:strCache>
-                <c:ptCount val="1"/>
-                <c:pt idx="0">
-                  <c:v>CPU</c:v>
-                </c:pt>
-              </c:strCache>
-            </c:strRef>
-          </c:tx>
-          <c:spPr>
-            <a:solidFill>
-              <a:schemeClr val="accent1"/>
-            </a:solidFill>
-            <a:ln>
-              <a:noFill/>
-            </a:ln>
-            <a:effectLst/>
-          </c:spPr>
-          <c:invertIfNegative val="0"/>
-          <c:cat>
-            <c:strRef>
-              <c:f>Sheet1!$A$2:$A$5</c:f>
-              <c:strCache>
-                <c:ptCount val="4"/>
-                <c:pt idx="0">
-                  <c:v>Category 1</c:v>
-                </c:pt>
-                <c:pt idx="1">
-                  <c:v>Category 2</c:v>
-                </c:pt>
-                <c:pt idx="2">
-                  <c:v>Category 3</c:v>
-                </c:pt>
-                <c:pt idx="3">
-                  <c:v>Category 4</c:v>
-                </c:pt>
-              </c:strCache>
-            </c:strRef>
-          </c:cat>
-          <c:val>
-            <c:numRef>
-              <c:f>Sheet1!$B$2:$B$5</c:f>
-              <c:numCache>
-                <c:formatCode>General</c:formatCode>
-                <c:ptCount val="4"/>
-                <c:pt idx="0">
-                  <c:v>4.3</c:v>
-                </c:pt>
-                <c:pt idx="1">
-                  <c:v>2.5</c:v>
-                </c:pt>
-                <c:pt idx="2">
-                  <c:v>3.5</c:v>
-                </c:pt>
-                <c:pt idx="3">
-                  <c:v>4.5</c:v>
-                </c:pt>
-              </c:numCache>
-            </c:numRef>
-          </c:val>
-          <c:extLst>
-            <c:ext xmlns:c16="http://schemas.microsoft.com/office/drawing/2014/chart" uri="{C3380CC4-5D6E-409C-BE32-E72D297353CC}">
-              <c16:uniqueId val="{00000000-42B0-4710-84FE-B2C114097CC4}"/>
-            </c:ext>
-          </c:extLst>
-        </c:ser>
-        <c:ser>
-          <c:idx val="1"/>
-          <c:order val="1"/>
-          <c:tx>
-            <c:strRef>
-              <c:f>Sheet1!$C$1</c:f>
-              <c:strCache>
-                <c:ptCount val="1"/>
-                <c:pt idx="0">
-                  <c:v>Memory</c:v>
-                </c:pt>
-              </c:strCache>
-            </c:strRef>
-          </c:tx>
-          <c:spPr>
-            <a:solidFill>
-              <a:schemeClr val="accent2"/>
-            </a:solidFill>
-            <a:ln>
-              <a:noFill/>
-            </a:ln>
-            <a:effectLst/>
-          </c:spPr>
-          <c:invertIfNegative val="0"/>
-          <c:cat>
-            <c:strRef>
-              <c:f>Sheet1!$A$2:$A$5</c:f>
-              <c:strCache>
-                <c:ptCount val="4"/>
-                <c:pt idx="0">
-                  <c:v>Category 1</c:v>
-                </c:pt>
-                <c:pt idx="1">
-                  <c:v>Category 2</c:v>
-                </c:pt>
-                <c:pt idx="2">
-                  <c:v>Category 3</c:v>
-                </c:pt>
-                <c:pt idx="3">
-                  <c:v>Category 4</c:v>
-                </c:pt>
-              </c:strCache>
-            </c:strRef>
-          </c:cat>
-          <c:val>
-            <c:numRef>
-              <c:f>Sheet1!$C$2:$C$5</c:f>
-              <c:numCache>
-                <c:formatCode>General</c:formatCode>
-                <c:ptCount val="4"/>
-                <c:pt idx="0">
-                  <c:v>2.4</c:v>
-                </c:pt>
-                <c:pt idx="1">
-                  <c:v>4.4000000000000004</c:v>
-                </c:pt>
-                <c:pt idx="2">
-                  <c:v>1.8</c:v>
-                </c:pt>
-                <c:pt idx="3">
-                  <c:v>2.8</c:v>
-                </c:pt>
-              </c:numCache>
-            </c:numRef>
-          </c:val>
-          <c:extLst>
-            <c:ext xmlns:c16="http://schemas.microsoft.com/office/drawing/2014/chart" uri="{C3380CC4-5D6E-409C-BE32-E72D297353CC}">
-              <c16:uniqueId val="{00000001-42B0-4710-84FE-B2C114097CC4}"/>
-            </c:ext>
-          </c:extLst>
-        </c:ser>
-        <c:ser>
-          <c:idx val="2"/>
-          <c:order val="2"/>
-          <c:tx>
-            <c:strRef>
-              <c:f>Sheet1!$D$1</c:f>
-              <c:strCache>
-                <c:ptCount val="1"/>
-                <c:pt idx="0">
-                  <c:v>Disk</c:v>
-                </c:pt>
-              </c:strCache>
-            </c:strRef>
-          </c:tx>
-          <c:spPr>
-            <a:solidFill>
-              <a:schemeClr val="accent3"/>
-            </a:solidFill>
-            <a:ln>
-              <a:noFill/>
-            </a:ln>
-            <a:effectLst/>
-          </c:spPr>
-          <c:invertIfNegative val="0"/>
-          <c:cat>
-            <c:strRef>
-              <c:f>Sheet1!$A$2:$A$5</c:f>
-              <c:strCache>
-                <c:ptCount val="4"/>
-                <c:pt idx="0">
-                  <c:v>Category 1</c:v>
-                </c:pt>
-                <c:pt idx="1">
-                  <c:v>Category 2</c:v>
-                </c:pt>
-                <c:pt idx="2">
-                  <c:v>Category 3</c:v>
-                </c:pt>
-                <c:pt idx="3">
-                  <c:v>Category 4</c:v>
-                </c:pt>
-              </c:strCache>
-            </c:strRef>
-          </c:cat>
-          <c:val>
-            <c:numRef>
-              <c:f>Sheet1!$D$2:$D$5</c:f>
-              <c:numCache>
-                <c:formatCode>General</c:formatCode>
-                <c:ptCount val="4"/>
-                <c:pt idx="0">
-                  <c:v>2</c:v>
-                </c:pt>
-                <c:pt idx="1">
-                  <c:v>2</c:v>
-                </c:pt>
-                <c:pt idx="2">
-                  <c:v>3</c:v>
-                </c:pt>
-                <c:pt idx="3">
-                  <c:v>5</c:v>
-                </c:pt>
-              </c:numCache>
-            </c:numRef>
-          </c:val>
-          <c:extLst>
-            <c:ext xmlns:c16="http://schemas.microsoft.com/office/drawing/2014/chart" uri="{C3380CC4-5D6E-409C-BE32-E72D297353CC}">
-              <c16:uniqueId val="{00000002-42B0-4710-84FE-B2C114097CC4}"/>
-            </c:ext>
-          </c:extLst>
-        </c:ser>
-        <c:dLbls>
-          <c:showLegendKey val="0"/>
-          <c:showVal val="0"/>
-          <c:showCatName val="0"/>
-          <c:showSerName val="0"/>
-          <c:showPercent val="0"/>
-          <c:showBubbleSize val="0"/>
-        </c:dLbls>
-        <c:gapWidth val="219"/>
-        <c:overlap val="-27"/>
-        <c:axId val="1176702800"/>
-        <c:axId val="1176699192"/>
-      </c:barChart>
-      <c:catAx>
-        <c:axId val="1176702800"/>
-        <c:scaling>
-          <c:orientation val="minMax"/>
-        </c:scaling>
-        <c:delete val="0"/>
-        <c:axPos val="b"/>
-        <c:numFmt formatCode="General" sourceLinked="1"/>
-        <c:majorTickMark val="none"/>
-        <c:minorTickMark val="none"/>
-        <c:tickLblPos val="nextTo"/>
-        <c:spPr>
-          <a:noFill/>
-          <a:ln w="9525" cap="flat" cmpd="sng" algn="ctr">
-            <a:solidFill>
-              <a:schemeClr val="tx1">
-                <a:lumMod val="15000"/>
-                <a:lumOff val="85000"/>
-              </a:schemeClr>
-            </a:solidFill>
-            <a:round/>
-          </a:ln>
-          <a:effectLst/>
-        </c:spPr>
-        <c:txPr>
-          <a:bodyPr rot="-60000000" spcFirstLastPara="1" vertOverflow="ellipsis" vert="horz" wrap="square" anchor="ctr" anchorCtr="1"/>
-          <a:lstStyle/>
-          <a:p>
-            <a:pPr>
-              <a:defRPr sz="1197" b="0" i="0" u="none" strike="noStrike" kern="1200" baseline="0">
-                <a:solidFill>
-                  <a:schemeClr val="tx1">
-                    <a:lumMod val="65000"/>
-                    <a:lumOff val="35000"/>
-                  </a:schemeClr>
-                </a:solidFill>
-                <a:latin typeface="+mn-lt"/>
-                <a:ea typeface="+mn-ea"/>
-                <a:cs typeface="+mn-cs"/>
-              </a:defRPr>
-            </a:pPr>
-            <a:endParaRPr lang="en-US"/>
-          </a:p>
-        </c:txPr>
-        <c:crossAx val="1176699192"/>
-        <c:crosses val="autoZero"/>
-        <c:auto val="1"/>
-        <c:lblAlgn val="ctr"/>
-        <c:lblOffset val="100"/>
-        <c:noMultiLvlLbl val="0"/>
-      </c:catAx>
-      <c:valAx>
-        <c:axId val="1176699192"/>
-        <c:scaling>
-          <c:orientation val="minMax"/>
-        </c:scaling>
-        <c:delete val="0"/>
-        <c:axPos val="l"/>
-        <c:majorGridlines>
-          <c:spPr>
-            <a:ln w="9525" cap="flat" cmpd="sng" algn="ctr">
-              <a:solidFill>
-                <a:schemeClr val="tx1">
-                  <a:lumMod val="15000"/>
-                  <a:lumOff val="85000"/>
-                </a:schemeClr>
-              </a:solidFill>
-              <a:round/>
-            </a:ln>
-            <a:effectLst/>
-          </c:spPr>
-        </c:majorGridlines>
-        <c:numFmt formatCode="General" sourceLinked="1"/>
-        <c:majorTickMark val="none"/>
-        <c:minorTickMark val="none"/>
-        <c:tickLblPos val="nextTo"/>
-        <c:spPr>
-          <a:noFill/>
-          <a:ln>
-            <a:noFill/>
-          </a:ln>
-          <a:effectLst/>
-        </c:spPr>
-        <c:txPr>
-          <a:bodyPr rot="-60000000" spcFirstLastPara="1" vertOverflow="ellipsis" vert="horz" wrap="square" anchor="ctr" anchorCtr="1"/>
-          <a:lstStyle/>
-          <a:p>
-            <a:pPr>
-              <a:defRPr sz="1197" b="0" i="0" u="none" strike="noStrike" kern="1200" baseline="0">
-                <a:solidFill>
-                  <a:schemeClr val="tx1">
-                    <a:lumMod val="65000"/>
-                    <a:lumOff val="35000"/>
-                  </a:schemeClr>
-                </a:solidFill>
-                <a:latin typeface="+mn-lt"/>
-                <a:ea typeface="+mn-ea"/>
-                <a:cs typeface="+mn-cs"/>
-              </a:defRPr>
-            </a:pPr>
-            <a:endParaRPr lang="en-US"/>
-          </a:p>
-        </c:txPr>
-        <c:crossAx val="1176702800"/>
-        <c:crosses val="autoZero"/>
-        <c:crossBetween val="between"/>
-      </c:valAx>
-      <c:spPr>
-        <a:noFill/>
-        <a:ln>
-          <a:noFill/>
-        </a:ln>
-        <a:effectLst/>
-      </c:spPr>
-    </c:plotArea>
-    <c:legend>
-      <c:legendPos val="b"/>
-      <c:overlay val="0"/>
-      <c:spPr>
-        <a:noFill/>
-        <a:ln>
-          <a:noFill/>
-        </a:ln>
-        <a:effectLst/>
-      </c:spPr>
-      <c:txPr>
-        <a:bodyPr rot="0" spcFirstLastPara="1" vertOverflow="ellipsis" vert="horz" wrap="square" anchor="ctr" anchorCtr="1"/>
-        <a:lstStyle/>
-        <a:p>
-          <a:pPr>
-            <a:defRPr sz="1197" b="0" i="0" u="none" strike="noStrike" kern="1200" baseline="0">
-              <a:solidFill>
-                <a:schemeClr val="tx1">
-                  <a:lumMod val="65000"/>
-                  <a:lumOff val="35000"/>
-                </a:schemeClr>
-              </a:solidFill>
-              <a:latin typeface="+mn-lt"/>
-              <a:ea typeface="+mn-ea"/>
-              <a:cs typeface="+mn-cs"/>
-            </a:defRPr>
-          </a:pPr>
-          <a:endParaRPr lang="en-US"/>
-        </a:p>
-      </c:txPr>
-    </c:legend>
-    <c:plotVisOnly val="1"/>
-    <c:dispBlanksAs val="gap"/>
-    <c:extLst>
-      <c:ext xmlns:c16r3="http://schemas.microsoft.com/office/drawing/2017/03/chart" uri="{56B9EC1D-385E-4148-901F-78D8002777C0}">
-        <c16r3:dataDisplayOptions16>
-          <c16r3:dispNaAsBlank val="1"/>
-        </c16r3:dataDisplayOptions16>
-      </c:ext>
-    </c:extLst>
-    <c:showDLblsOverMax val="0"/>
-  </c:chart>
-  <c:spPr>
-    <a:noFill/>
-    <a:ln>
-      <a:noFill/>
-    </a:ln>
-    <a:effectLst/>
-  </c:spPr>
-  <c:txPr>
-    <a:bodyPr/>
-    <a:lstStyle/>
-    <a:p>
-      <a:pPr>
-        <a:defRPr/>
-      </a:pPr>
-      <a:endParaRPr lang="en-US"/>
-    </a:p>
-  </c:txPr>
-  <c:externalData r:id="rId3">
-    <c:autoUpdate val="0"/>
-  </c:externalData>
-</c:chartSpace>
-</file>
-
-<file path=ppt/charts/colors1.xml><?xml version="1.0" encoding="utf-8"?>
-<cs:colorStyle xmlns:cs="http://schemas.microsoft.com/office/drawing/2012/chartStyle" xmlns:a="http://schemas.openxmlformats.org/drawingml/2006/main" meth="cycle" id="10">
-  <a:schemeClr val="accent1"/>
-  <a:schemeClr val="accent2"/>
-  <a:schemeClr val="accent3"/>
-  <a:schemeClr val="accent4"/>
-  <a:schemeClr val="accent5"/>
-  <a:schemeClr val="accent6"/>
-  <cs:variation/>
-  <cs:variation>
-    <a:lumMod val="60000"/>
-  </cs:variation>
-  <cs:variation>
-    <a:lumMod val="80000"/>
-    <a:lumOff val="20000"/>
-  </cs:variation>
-  <cs:variation>
-    <a:lumMod val="80000"/>
-  </cs:variation>
-  <cs:variation>
-    <a:lumMod val="60000"/>
-    <a:lumOff val="40000"/>
-  </cs:variation>
-  <cs:variation>
-    <a:lumMod val="50000"/>
-  </cs:variation>
-  <cs:variation>
-    <a:lumMod val="70000"/>
-    <a:lumOff val="30000"/>
-  </cs:variation>
-  <cs:variation>
-    <a:lumMod val="70000"/>
-  </cs:variation>
-  <cs:variation>
-    <a:lumMod val="50000"/>
-    <a:lumOff val="50000"/>
-  </cs:variation>
-</cs:colorStyle>
-</file>
-
-<file path=ppt/charts/style1.xml><?xml version="1.0" encoding="utf-8"?>
-<cs:chartStyle xmlns:cs="http://schemas.microsoft.com/office/drawing/2012/chartStyle" xmlns:a="http://schemas.openxmlformats.org/drawingml/2006/main" id="201">
-  <cs:axisTitle>
-    <cs:lnRef idx="0"/>
-    <cs:fillRef idx="0"/>
-    <cs:effectRef idx="0"/>
-    <cs:fontRef idx="minor">
-      <a:schemeClr val="tx1">
-        <a:lumMod val="65000"/>
-        <a:lumOff val="35000"/>
-      </a:schemeClr>
-    </cs:fontRef>
-    <cs:defRPr sz="1330" kern="1200"/>
-  </cs:axisTitle>
-  <cs:categoryAxis>
-    <cs:lnRef idx="0"/>
-    <cs:fillRef idx="0"/>
-    <cs:effectRef idx="0"/>
-    <cs:fontRef idx="minor">
-      <a:schemeClr val="tx1">
-        <a:lumMod val="65000"/>
-        <a:lumOff val="35000"/>
-      </a:schemeClr>
-    </cs:fontRef>
-    <cs:spPr>
-      <a:ln w="9525" cap="flat" cmpd="sng" algn="ctr">
-        <a:solidFill>
-          <a:schemeClr val="tx1">
-            <a:lumMod val="15000"/>
-            <a:lumOff val="85000"/>
-          </a:schemeClr>
-        </a:solidFill>
-        <a:round/>
-      </a:ln>
-    </cs:spPr>
-    <cs:defRPr sz="1197" kern="1200"/>
-  </cs:categoryAxis>
-  <cs:chartArea mods="allowNoFillOverride allowNoLineOverride">
-    <cs:lnRef idx="0"/>
-    <cs:fillRef idx="0"/>
-    <cs:effectRef idx="0"/>
-    <cs:fontRef idx="minor">
-      <a:schemeClr val="tx1"/>
-    </cs:fontRef>
-    <cs:spPr>
-      <a:solidFill>
-        <a:schemeClr val="bg1"/>
-      </a:solidFill>
-      <a:ln w="9525" cap="flat" cmpd="sng" algn="ctr">
-        <a:solidFill>
-          <a:schemeClr val="tx1">
-            <a:lumMod val="15000"/>
-            <a:lumOff val="85000"/>
-          </a:schemeClr>
-        </a:solidFill>
-        <a:round/>
-      </a:ln>
-    </cs:spPr>
-    <cs:defRPr sz="1330" kern="1200"/>
-  </cs:chartArea>
-  <cs:dataLabel>
-    <cs:lnRef idx="0"/>
-    <cs:fillRef idx="0"/>
-    <cs:effectRef idx="0"/>
-    <cs:fontRef idx="minor">
-      <a:schemeClr val="tx1">
-        <a:lumMod val="75000"/>
-        <a:lumOff val="25000"/>
-      </a:schemeClr>
-    </cs:fontRef>
-    <cs:defRPr sz="1197" kern="1200"/>
-  </cs:dataLabel>
-  <cs:dataLabelCallout>
-    <cs:lnRef idx="0"/>
-    <cs:fillRef idx="0"/>
-    <cs:effectRef idx="0"/>
-    <cs:fontRef idx="minor">
-      <a:schemeClr val="dk1">
-        <a:lumMod val="65000"/>
-        <a:lumOff val="35000"/>
-      </a:schemeClr>
-    </cs:fontRef>
-    <cs:spPr>
-      <a:solidFill>
-        <a:schemeClr val="lt1"/>
-      </a:solidFill>
-      <a:ln>
-        <a:solidFill>
-          <a:schemeClr val="dk1">
-            <a:lumMod val="25000"/>
-            <a:lumOff val="75000"/>
-          </a:schemeClr>
-        </a:solidFill>
-      </a:ln>
-    </cs:spPr>
-    <cs:defRPr sz="1197" kern="1200"/>
-    <cs:bodyPr rot="0" spcFirstLastPara="1" vertOverflow="clip" horzOverflow="clip" vert="horz" wrap="square" lIns="36576" tIns="18288" rIns="36576" bIns="18288" anchor="ctr" anchorCtr="1">
-      <a:spAutoFit/>
-    </cs:bodyPr>
-  </cs:dataLabelCallout>
-  <cs:dataPoint>
-    <cs:lnRef idx="0"/>
-    <cs:fillRef idx="1">
-      <cs:styleClr val="auto"/>
-    </cs:fillRef>
-    <cs:effectRef idx="0"/>
-    <cs:fontRef idx="minor">
-      <a:schemeClr val="tx1"/>
-    </cs:fontRef>
-  </cs:dataPoint>
-  <cs:dataPoint3D>
-    <cs:lnRef idx="0"/>
-    <cs:fillRef idx="1">
-      <cs:styleClr val="auto"/>
-    </cs:fillRef>
-    <cs:effectRef idx="0"/>
-    <cs:fontRef idx="minor">
-      <a:schemeClr val="tx1"/>
-    </cs:fontRef>
-  </cs:dataPoint3D>
-  <cs:dataPointLine>
-    <cs:lnRef idx="0">
-      <cs:styleClr val="auto"/>
-    </cs:lnRef>
-    <cs:fillRef idx="1"/>
-    <cs:effectRef idx="0"/>
-    <cs:fontRef idx="minor">
-      <a:schemeClr val="tx1"/>
-    </cs:fontRef>
-    <cs:spPr>
-      <a:ln w="28575" cap="rnd">
-        <a:solidFill>
-          <a:schemeClr val="phClr"/>
-        </a:solidFill>
-        <a:round/>
-      </a:ln>
-    </cs:spPr>
-  </cs:dataPointLine>
-  <cs:dataPointMarker>
-    <cs:lnRef idx="0">
-      <cs:styleClr val="auto"/>
-    </cs:lnRef>
-    <cs:fillRef idx="1">
-      <cs:styleClr val="auto"/>
-    </cs:fillRef>
-    <cs:effectRef idx="0"/>
-    <cs:fontRef idx="minor">
-      <a:schemeClr val="tx1"/>
-    </cs:fontRef>
-    <cs:spPr>
-      <a:ln w="9525">
-        <a:solidFill>
-          <a:schemeClr val="phClr"/>
-        </a:solidFill>
-      </a:ln>
-    </cs:spPr>
-  </cs:dataPointMarker>
-  <cs:dataPointMarkerLayout symbol="circle" size="5"/>
-  <cs:dataPointWireframe>
-    <cs:lnRef idx="0">
-      <cs:styleClr val="auto"/>
-    </cs:lnRef>
-    <cs:fillRef idx="1"/>
-    <cs:effectRef idx="0"/>
-    <cs:fontRef idx="minor">
-      <a:schemeClr val="tx1"/>
-    </cs:fontRef>
-    <cs:spPr>
-      <a:ln w="9525" cap="rnd">
-        <a:solidFill>
-          <a:schemeClr val="phClr"/>
-        </a:solidFill>
-        <a:round/>
-      </a:ln>
-    </cs:spPr>
-  </cs:dataPointWireframe>
-  <cs:dataTable>
-    <cs:lnRef idx="0"/>
-    <cs:fillRef idx="0"/>
-    <cs:effectRef idx="0"/>
-    <cs:fontRef idx="minor">
-      <a:schemeClr val="tx1">
-        <a:lumMod val="65000"/>
-        <a:lumOff val="35000"/>
-      </a:schemeClr>
-    </cs:fontRef>
-    <cs:spPr>
-      <a:noFill/>
-      <a:ln w="9525" cap="flat" cmpd="sng" algn="ctr">
-        <a:solidFill>
-          <a:schemeClr val="tx1">
-            <a:lumMod val="15000"/>
-            <a:lumOff val="85000"/>
-          </a:schemeClr>
-        </a:solidFill>
-        <a:round/>
-      </a:ln>
-    </cs:spPr>
-    <cs:defRPr sz="1197" kern="1200"/>
-  </cs:dataTable>
-  <cs:downBar>
-    <cs:lnRef idx="0"/>
-    <cs:fillRef idx="0"/>
-    <cs:effectRef idx="0"/>
-    <cs:fontRef idx="minor">
-      <a:schemeClr val="dk1"/>
-    </cs:fontRef>
-    <cs:spPr>
-      <a:solidFill>
-        <a:schemeClr val="dk1">
-          <a:lumMod val="65000"/>
-          <a:lumOff val="35000"/>
-        </a:schemeClr>
-      </a:solidFill>
-      <a:ln w="9525">
-        <a:solidFill>
-          <a:schemeClr val="tx1">
-            <a:lumMod val="65000"/>
-            <a:lumOff val="35000"/>
-          </a:schemeClr>
-        </a:solidFill>
-      </a:ln>
-    </cs:spPr>
-  </cs:downBar>
-  <cs:dropLine>
-    <cs:lnRef idx="0"/>
-    <cs:fillRef idx="0"/>
-    <cs:effectRef idx="0"/>
-    <cs:fontRef idx="minor">
-      <a:schemeClr val="tx1"/>
-    </cs:fontRef>
-    <cs:spPr>
-      <a:ln w="9525" cap="flat" cmpd="sng" algn="ctr">
-        <a:solidFill>
-          <a:schemeClr val="tx1">
-            <a:lumMod val="35000"/>
-            <a:lumOff val="65000"/>
-          </a:schemeClr>
-        </a:solidFill>
-        <a:round/>
-      </a:ln>
-    </cs:spPr>
-  </cs:dropLine>
-  <cs:errorBar>
-    <cs:lnRef idx="0"/>
-    <cs:fillRef idx="0"/>
-    <cs:effectRef idx="0"/>
-    <cs:fontRef idx="minor">
-      <a:schemeClr val="tx1"/>
-    </cs:fontRef>
-    <cs:spPr>
-      <a:ln w="9525" cap="flat" cmpd="sng" algn="ctr">
-        <a:solidFill>
-          <a:schemeClr val="tx1">
-            <a:lumMod val="65000"/>
-            <a:lumOff val="35000"/>
-          </a:schemeClr>
-        </a:solidFill>
-        <a:round/>
-      </a:ln>
-    </cs:spPr>
-  </cs:errorBar>
-  <cs:floor>
-    <cs:lnRef idx="0"/>
-    <cs:fillRef idx="0"/>
-    <cs:effectRef idx="0"/>
-    <cs:fontRef idx="minor">
-      <a:schemeClr val="tx1"/>
-    </cs:fontRef>
-    <cs:spPr>
-      <a:noFill/>
-      <a:ln>
-        <a:noFill/>
-      </a:ln>
-    </cs:spPr>
-  </cs:floor>
-  <cs:gridlineMajor>
-    <cs:lnRef idx="0"/>
-    <cs:fillRef idx="0"/>
-    <cs:effectRef idx="0"/>
-    <cs:fontRef idx="minor">
-      <a:schemeClr val="tx1"/>
-    </cs:fontRef>
-    <cs:spPr>
-      <a:ln w="9525" cap="flat" cmpd="sng" algn="ctr">
-        <a:solidFill>
-          <a:schemeClr val="tx1">
-            <a:lumMod val="15000"/>
-            <a:lumOff val="85000"/>
-          </a:schemeClr>
-        </a:solidFill>
-        <a:round/>
-      </a:ln>
-    </cs:spPr>
-  </cs:gridlineMajor>
-  <cs:gridlineMinor>
-    <cs:lnRef idx="0"/>
-    <cs:fillRef idx="0"/>
-    <cs:effectRef idx="0"/>
-    <cs:fontRef idx="minor">
-      <a:schemeClr val="tx1"/>
-    </cs:fontRef>
-    <cs:spPr>
-      <a:ln w="9525" cap="flat" cmpd="sng" algn="ctr">
-        <a:solidFill>
-          <a:schemeClr val="tx1">
-            <a:lumMod val="5000"/>
-            <a:lumOff val="95000"/>
-          </a:schemeClr>
-        </a:solidFill>
-        <a:round/>
-      </a:ln>
-    </cs:spPr>
-  </cs:gridlineMinor>
-  <cs:hiLoLine>
-    <cs:lnRef idx="0"/>
-    <cs:fillRef idx="0"/>
-    <cs:effectRef idx="0"/>
-    <cs:fontRef idx="minor">
-      <a:schemeClr val="tx1"/>
-    </cs:fontRef>
-    <cs:spPr>
-      <a:ln w="9525" cap="flat" cmpd="sng" algn="ctr">
-        <a:solidFill>
-          <a:schemeClr val="tx1">
-            <a:lumMod val="75000"/>
-            <a:lumOff val="25000"/>
-          </a:schemeClr>
-        </a:solidFill>
-        <a:round/>
-      </a:ln>
-    </cs:spPr>
-  </cs:hiLoLine>
-  <cs:leaderLine>
-    <cs:lnRef idx="0"/>
-    <cs:fillRef idx="0"/>
-    <cs:effectRef idx="0"/>
-    <cs:fontRef idx="minor">
-      <a:schemeClr val="tx1"/>
-    </cs:fontRef>
-    <cs:spPr>
-      <a:ln w="9525" cap="flat" cmpd="sng" algn="ctr">
-        <a:solidFill>
-          <a:schemeClr val="tx1">
-            <a:lumMod val="35000"/>
-            <a:lumOff val="65000"/>
-          </a:schemeClr>
-        </a:solidFill>
-        <a:round/>
-      </a:ln>
-    </cs:spPr>
-  </cs:leaderLine>
-  <cs:legend>
-    <cs:lnRef idx="0"/>
-    <cs:fillRef idx="0"/>
-    <cs:effectRef idx="0"/>
-    <cs:fontRef idx="minor">
-      <a:schemeClr val="tx1">
-        <a:lumMod val="65000"/>
-        <a:lumOff val="35000"/>
-      </a:schemeClr>
-    </cs:fontRef>
-    <cs:defRPr sz="1197" kern="1200"/>
-  </cs:legend>
-  <cs:plotArea mods="allowNoFillOverride allowNoLineOverride">
-    <cs:lnRef idx="0"/>
-    <cs:fillRef idx="0"/>
-    <cs:effectRef idx="0"/>
-    <cs:fontRef idx="minor">
-      <a:schemeClr val="tx1"/>
-    </cs:fontRef>
-  </cs:plotArea>
-  <cs:plotArea3D mods="allowNoFillOverride allowNoLineOverride">
-    <cs:lnRef idx="0"/>
-    <cs:fillRef idx="0"/>
-    <cs:effectRef idx="0"/>
-    <cs:fontRef idx="minor">
-      <a:schemeClr val="tx1"/>
-    </cs:fontRef>
-  </cs:plotArea3D>
-  <cs:seriesAxis>
-    <cs:lnRef idx="0"/>
-    <cs:fillRef idx="0"/>
-    <cs:effectRef idx="0"/>
-    <cs:fontRef idx="minor">
-      <a:schemeClr val="tx1">
-        <a:lumMod val="65000"/>
-        <a:lumOff val="35000"/>
-      </a:schemeClr>
-    </cs:fontRef>
-    <cs:defRPr sz="1197" kern="1200"/>
-  </cs:seriesAxis>
-  <cs:seriesLine>
-    <cs:lnRef idx="0"/>
-    <cs:fillRef idx="0"/>
-    <cs:effectRef idx="0"/>
-    <cs:fontRef idx="minor">
-      <a:schemeClr val="tx1"/>
-    </cs:fontRef>
-    <cs:spPr>
-      <a:ln w="9525" cap="flat" cmpd="sng" algn="ctr">
-        <a:solidFill>
-          <a:schemeClr val="tx1">
-            <a:lumMod val="35000"/>
-            <a:lumOff val="65000"/>
-          </a:schemeClr>
-        </a:solidFill>
-        <a:round/>
-      </a:ln>
-    </cs:spPr>
-  </cs:seriesLine>
-  <cs:title>
-    <cs:lnRef idx="0"/>
-    <cs:fillRef idx="0"/>
-    <cs:effectRef idx="0"/>
-    <cs:fontRef idx="minor">
-      <a:schemeClr val="tx1">
-        <a:lumMod val="65000"/>
-        <a:lumOff val="35000"/>
-      </a:schemeClr>
-    </cs:fontRef>
-    <cs:defRPr sz="1862" b="0" kern="1200" spc="0" baseline="0"/>
-  </cs:title>
-  <cs:trendline>
-    <cs:lnRef idx="0">
-      <cs:styleClr val="auto"/>
-    </cs:lnRef>
-    <cs:fillRef idx="0"/>
-    <cs:effectRef idx="0"/>
-    <cs:fontRef idx="minor">
-      <a:schemeClr val="tx1"/>
-    </cs:fontRef>
-    <cs:spPr>
-      <a:ln w="19050" cap="rnd">
-        <a:solidFill>
-          <a:schemeClr val="phClr"/>
-        </a:solidFill>
-        <a:prstDash val="sysDot"/>
-      </a:ln>
-    </cs:spPr>
-  </cs:trendline>
-  <cs:trendlineLabel>
-    <cs:lnRef idx="0"/>
-    <cs:fillRef idx="0"/>
-    <cs:effectRef idx="0"/>
-    <cs:fontRef idx="minor">
-      <a:schemeClr val="tx1">
-        <a:lumMod val="65000"/>
-        <a:lumOff val="35000"/>
-      </a:schemeClr>
-    </cs:fontRef>
-    <cs:defRPr sz="1197" kern="1200"/>
-  </cs:trendlineLabel>
-  <cs:upBar>
-    <cs:lnRef idx="0"/>
-    <cs:fillRef idx="0"/>
-    <cs:effectRef idx="0"/>
-    <cs:fontRef idx="minor">
-      <a:schemeClr val="dk1"/>
-    </cs:fontRef>
-    <cs:spPr>
-      <a:solidFill>
-        <a:schemeClr val="lt1"/>
-      </a:solidFill>
-      <a:ln w="9525">
-        <a:solidFill>
-          <a:schemeClr val="tx1">
-            <a:lumMod val="15000"/>
-            <a:lumOff val="85000"/>
-          </a:schemeClr>
-        </a:solidFill>
-      </a:ln>
-    </cs:spPr>
-  </cs:upBar>
-  <cs:valueAxis>
-    <cs:lnRef idx="0"/>
-    <cs:fillRef idx="0"/>
-    <cs:effectRef idx="0"/>
-    <cs:fontRef idx="minor">
-      <a:schemeClr val="tx1">
-        <a:lumMod val="65000"/>
-        <a:lumOff val="35000"/>
-      </a:schemeClr>
-    </cs:fontRef>
-    <cs:defRPr sz="1197" kern="1200"/>
-  </cs:valueAxis>
-  <cs:wall>
-    <cs:lnRef idx="0"/>
-    <cs:fillRef idx="0"/>
-    <cs:effectRef idx="0"/>
-    <cs:fontRef idx="minor">
-      <a:schemeClr val="tx1"/>
-    </cs:fontRef>
-    <cs:spPr>
-      <a:noFill/>
-      <a:ln>
-        <a:noFill/>
-      </a:ln>
-    </cs:spPr>
-  </cs:wall>
-</cs:chartStyle>
 </file>
 
 <file path=ppt/diagrams/colors1.xml><?xml version="1.0" encoding="utf-8"?>
@@ -11058,7 +10035,7 @@
 </file>
 
 <file path=ppt/slides/slide10.xml><?xml version="1.0" encoding="utf-8"?>
-<p:sld xmlns:a="http://schemas.openxmlformats.org/drawingml/2006/main" xmlns:r="http://schemas.openxmlformats.org/officeDocument/2006/relationships" xmlns:p="http://schemas.openxmlformats.org/presentationml/2006/main">
+<p:sld xmlns:a="http://schemas.openxmlformats.org/drawingml/2006/main" xmlns:r="http://schemas.openxmlformats.org/officeDocument/2006/relationships" xmlns:p="http://schemas.openxmlformats.org/presentationml/2006/main" show="0">
   <p:cSld>
     <p:spTree>
       <p:nvGrpSpPr>
@@ -11091,7 +10068,7 @@
           <a:p>
             <a:r>
               <a:rPr lang="en-US" dirty="0"/>
-              <a:t>Demo Requirements:  The Application</a:t>
+              <a:t>Other Concerns</a:t>
             </a:r>
           </a:p>
         </p:txBody>
@@ -11108,34 +10085,61 @@
         </p:nvSpPr>
         <p:spPr/>
         <p:txBody>
-          <a:bodyPr>
-            <a:normAutofit/>
-          </a:bodyPr>
+          <a:bodyPr/>
           <a:lstStyle/>
           <a:p>
             <a:r>
               <a:rPr lang="en-US" dirty="0"/>
-              <a:t>We will provide a simple app to Containerize</a:t>
+              <a:t>Budgeting</a:t>
             </a:r>
           </a:p>
           <a:p>
             <a:r>
               <a:rPr lang="en-US" dirty="0"/>
-              <a:t>The app will have two dependencies</a:t>
-            </a:r>
-          </a:p>
-          <a:p>
-            <a:pPr lvl="1"/>
+              <a:t>Change Management</a:t>
+            </a:r>
+          </a:p>
+          <a:p>
             <a:r>
               <a:rPr lang="en-US" dirty="0"/>
-              <a:t>Database</a:t>
-            </a:r>
-          </a:p>
-          <a:p>
-            <a:pPr lvl="1"/>
+              <a:t>Desktop Host Management</a:t>
+            </a:r>
+          </a:p>
+          <a:p>
             <a:r>
               <a:rPr lang="en-US" dirty="0"/>
-              <a:t>Messaging</a:t>
+              <a:t>Image Approval and Management</a:t>
+            </a:r>
+          </a:p>
+          <a:p>
+            <a:r>
+              <a:rPr lang="en-US" dirty="0"/>
+              <a:t>Licensing and Compliance</a:t>
+            </a:r>
+          </a:p>
+          <a:p>
+            <a:r>
+              <a:rPr lang="en-US"/>
+              <a:t>Long-term viability</a:t>
+            </a:r>
+            <a:endParaRPr lang="en-US" dirty="0"/>
+          </a:p>
+          <a:p>
+            <a:r>
+              <a:rPr lang="en-US" dirty="0"/>
+              <a:t>Resource Planning</a:t>
+            </a:r>
+          </a:p>
+          <a:p>
+            <a:r>
+              <a:rPr lang="en-US" dirty="0"/>
+              <a:t>Security Audits</a:t>
+            </a:r>
+          </a:p>
+          <a:p>
+            <a:r>
+              <a:rPr lang="en-US" dirty="0"/>
+              <a:t>Technical Support Quality and Availability</a:t>
             </a:r>
           </a:p>
         </p:txBody>
@@ -11143,7 +10147,7 @@
     </p:spTree>
     <p:extLst>
       <p:ext uri="{BB962C8B-B14F-4D97-AF65-F5344CB8AC3E}">
-        <p14:creationId xmlns:p14="http://schemas.microsoft.com/office/powerpoint/2010/main" val="1204616855"/>
+        <p14:creationId xmlns:p14="http://schemas.microsoft.com/office/powerpoint/2010/main" val="647872659"/>
       </p:ext>
     </p:extLst>
   </p:cSld>
@@ -11172,7 +10176,13 @@
       </p:grpSpPr>
       <p:sp>
         <p:nvSpPr>
-          <p:cNvPr id="2" name="Title 1"/>
+          <p:cNvPr id="2" name="Title 1">
+            <a:extLst>
+              <a:ext uri="{FF2B5EF4-FFF2-40B4-BE49-F238E27FC236}">
+                <a16:creationId xmlns:a16="http://schemas.microsoft.com/office/drawing/2014/main" id="{02C69A9D-11E3-42B6-A78A-D426038F43C5}"/>
+              </a:ext>
+            </a:extLst>
+          </p:cNvPr>
           <p:cNvSpPr>
             <a:spLocks noGrp="1"/>
           </p:cNvSpPr>
@@ -11187,14 +10197,20 @@
           <a:p>
             <a:r>
               <a:rPr lang="en-US" dirty="0"/>
-              <a:t>Demo Requirements:  The Deployment</a:t>
-            </a:r>
-          </a:p>
-        </p:txBody>
-      </p:sp>
-      <p:sp>
-        <p:nvSpPr>
-          <p:cNvPr id="3" name="Content Placeholder 2"/>
+              <a:t>Demo Requirements</a:t>
+            </a:r>
+          </a:p>
+        </p:txBody>
+      </p:sp>
+      <p:sp>
+        <p:nvSpPr>
+          <p:cNvPr id="3" name="Content Placeholder 2">
+            <a:extLst>
+              <a:ext uri="{FF2B5EF4-FFF2-40B4-BE49-F238E27FC236}">
+                <a16:creationId xmlns:a16="http://schemas.microsoft.com/office/drawing/2014/main" id="{0341BF6B-1DD5-4499-A7F3-A34FCF6500EB}"/>
+              </a:ext>
+            </a:extLst>
+          </p:cNvPr>
           <p:cNvSpPr>
             <a:spLocks noGrp="1"/>
           </p:cNvSpPr>
@@ -11204,70 +10220,30 @@
         </p:nvSpPr>
         <p:spPr/>
         <p:txBody>
-          <a:bodyPr>
-            <a:normAutofit/>
-          </a:bodyPr>
+          <a:bodyPr/>
           <a:lstStyle/>
           <a:p>
             <a:r>
               <a:rPr lang="en-US" dirty="0"/>
-              <a:t>The vendor will run the application on </a:t>
-            </a:r>
-            <a:r>
-              <a:rPr lang="en-US"/>
-              <a:t>a desktop</a:t>
+              <a:t>We’ll provide the application</a:t>
             </a:r>
           </a:p>
           <a:p>
             <a:r>
               <a:rPr lang="en-US" dirty="0"/>
-              <a:t>The vendor will demonstrate solutions to our named concerns</a:t>
+              <a:t>Deployment</a:t>
             </a:r>
           </a:p>
           <a:p>
             <a:r>
               <a:rPr lang="en-US" dirty="0"/>
-              <a:t>The vendor will give us infrastructure requirements</a:t>
+              <a:t>NOC Integration</a:t>
             </a:r>
           </a:p>
           <a:p>
             <a:r>
               <a:rPr lang="en-US" dirty="0"/>
-              <a:t>We will provide the infrastructure</a:t>
-            </a:r>
-          </a:p>
-          <a:p>
-            <a:r>
-              <a:rPr lang="en-US" dirty="0"/>
-              <a:t>The vendor will install, configure, and demonstrate their solution</a:t>
-            </a:r>
-          </a:p>
-          <a:p>
-            <a:pPr lvl="1"/>
-            <a:r>
-              <a:rPr lang="en-US" dirty="0"/>
-              <a:t>The application will must be deployed</a:t>
-            </a:r>
-          </a:p>
-          <a:p>
-            <a:pPr lvl="1"/>
-            <a:r>
-              <a:rPr lang="en-US" dirty="0"/>
-              <a:t>The application must be reachable on our network</a:t>
-            </a:r>
-          </a:p>
-          <a:p>
-            <a:pPr lvl="1"/>
-            <a:r>
-              <a:rPr lang="en-US" dirty="0"/>
-              <a:t>We want them to show us “the standard way” to do this, step by step</a:t>
-            </a:r>
-          </a:p>
-          <a:p>
-            <a:pPr lvl="1"/>
-            <a:r>
-              <a:rPr lang="en-US" dirty="0"/>
-              <a:t>Auto-scale running containers as needed</a:t>
+              <a:t>Proposals</a:t>
             </a:r>
           </a:p>
         </p:txBody>
@@ -11275,7 +10251,7 @@
     </p:spTree>
     <p:extLst>
       <p:ext uri="{BB962C8B-B14F-4D97-AF65-F5344CB8AC3E}">
-        <p14:creationId xmlns:p14="http://schemas.microsoft.com/office/powerpoint/2010/main" val="2071101954"/>
+        <p14:creationId xmlns:p14="http://schemas.microsoft.com/office/powerpoint/2010/main" val="3976924198"/>
       </p:ext>
     </p:extLst>
   </p:cSld>
@@ -11286,7 +10262,7 @@
 </file>
 
 <file path=ppt/slides/slide12.xml><?xml version="1.0" encoding="utf-8"?>
-<p:sld xmlns:a="http://schemas.openxmlformats.org/drawingml/2006/main" xmlns:r="http://schemas.openxmlformats.org/officeDocument/2006/relationships" xmlns:p="http://schemas.openxmlformats.org/presentationml/2006/main">
+<p:sld xmlns:a="http://schemas.openxmlformats.org/drawingml/2006/main" xmlns:r="http://schemas.openxmlformats.org/officeDocument/2006/relationships" xmlns:p="http://schemas.openxmlformats.org/presentationml/2006/main" show="0">
   <p:cSld>
     <p:spTree>
       <p:nvGrpSpPr>
@@ -11319,7 +10295,7 @@
           <a:p>
             <a:r>
               <a:rPr lang="en-US" dirty="0"/>
-              <a:t>Demo Requirements:  NOC Operations</a:t>
+              <a:t>Demo Requirements:  The Application</a:t>
             </a:r>
           </a:p>
         </p:txBody>
@@ -11343,80 +10319,35 @@
           <a:p>
             <a:r>
               <a:rPr lang="en-US" dirty="0"/>
-              <a:t>Demonstrate Monitoring</a:t>
+              <a:t>We will provide a simple app to Containerize</a:t>
+            </a:r>
+          </a:p>
+          <a:p>
+            <a:r>
+              <a:rPr lang="en-US" dirty="0"/>
+              <a:t>The app will have two dependencies</a:t>
             </a:r>
           </a:p>
           <a:p>
             <a:pPr lvl="1"/>
             <a:r>
               <a:rPr lang="en-US" dirty="0"/>
-              <a:t>At the cluster level</a:t>
+              <a:t>Database</a:t>
             </a:r>
           </a:p>
           <a:p>
             <a:pPr lvl="1"/>
             <a:r>
               <a:rPr lang="en-US" dirty="0"/>
-              <a:t>At the host level</a:t>
-            </a:r>
-          </a:p>
-          <a:p>
-            <a:pPr lvl="1"/>
-            <a:r>
-              <a:rPr lang="en-US" dirty="0"/>
-              <a:t>At the container level</a:t>
-            </a:r>
-          </a:p>
-          <a:p>
-            <a:pPr lvl="1"/>
-            <a:r>
-              <a:rPr lang="en-US" dirty="0"/>
-              <a:t>* We prefer to integrate with our current NOC products</a:t>
-            </a:r>
-          </a:p>
-          <a:p>
-            <a:r>
-              <a:rPr lang="en-US" dirty="0"/>
-              <a:t>Demonstrate Escalation Plans</a:t>
-            </a:r>
-          </a:p>
-          <a:p>
-            <a:pPr lvl="1"/>
-            <a:r>
-              <a:rPr lang="en-US" dirty="0"/>
-              <a:t>An application is down</a:t>
-            </a:r>
-          </a:p>
-          <a:p>
-            <a:pPr lvl="1"/>
-            <a:r>
-              <a:rPr lang="en-US" dirty="0"/>
-              <a:t>Scarce resources</a:t>
-            </a:r>
-          </a:p>
-          <a:p>
-            <a:r>
-              <a:rPr lang="en-US" dirty="0"/>
-              <a:t>Demonstrate Rolling Updates</a:t>
-            </a:r>
-          </a:p>
-          <a:p>
-            <a:pPr lvl="1"/>
-            <a:r>
-              <a:rPr lang="en-US" dirty="0"/>
-              <a:t>Update running containers from an old base OS image to a current one</a:t>
-            </a:r>
-          </a:p>
-          <a:p>
-            <a:pPr lvl="1"/>
-            <a:endParaRPr lang="en-US" dirty="0"/>
+              <a:t>Messaging</a:t>
+            </a:r>
           </a:p>
         </p:txBody>
       </p:sp>
     </p:spTree>
     <p:extLst>
       <p:ext uri="{BB962C8B-B14F-4D97-AF65-F5344CB8AC3E}">
-        <p14:creationId xmlns:p14="http://schemas.microsoft.com/office/powerpoint/2010/main" val="1119920568"/>
+        <p14:creationId xmlns:p14="http://schemas.microsoft.com/office/powerpoint/2010/main" val="1204616855"/>
       </p:ext>
     </p:extLst>
   </p:cSld>
@@ -11427,7 +10358,7 @@
 </file>
 
 <file path=ppt/slides/slide13.xml><?xml version="1.0" encoding="utf-8"?>
-<p:sld xmlns:a="http://schemas.openxmlformats.org/drawingml/2006/main" xmlns:r="http://schemas.openxmlformats.org/officeDocument/2006/relationships" xmlns:p="http://schemas.openxmlformats.org/presentationml/2006/main">
+<p:sld xmlns:a="http://schemas.openxmlformats.org/drawingml/2006/main" xmlns:r="http://schemas.openxmlformats.org/officeDocument/2006/relationships" xmlns:p="http://schemas.openxmlformats.org/presentationml/2006/main" show="0">
   <p:cSld>
     <p:spTree>
       <p:nvGrpSpPr>
@@ -11460,7 +10391,7 @@
           <a:p>
             <a:r>
               <a:rPr lang="en-US" dirty="0"/>
-              <a:t>Demo Requirements:  The Proposal</a:t>
+              <a:t>Demo Requirements:  The Deployment</a:t>
             </a:r>
           </a:p>
         </p:txBody>
@@ -11484,67 +10415,65 @@
           <a:p>
             <a:r>
               <a:rPr lang="en-US" dirty="0"/>
-              <a:t>Basic explanation of licensing</a:t>
+              <a:t>The vendor will run the application on a desktop</a:t>
             </a:r>
           </a:p>
           <a:p>
             <a:r>
               <a:rPr lang="en-US" dirty="0"/>
-              <a:t>Formal pricing offers</a:t>
+              <a:t>The vendor will demonstrate solutions to our named concerns</a:t>
             </a:r>
           </a:p>
           <a:p>
             <a:r>
               <a:rPr lang="en-US" dirty="0"/>
-              <a:t>Support details</a:t>
+              <a:t>The vendor will give us infrastructure requirements</a:t>
+            </a:r>
+          </a:p>
+          <a:p>
+            <a:r>
+              <a:rPr lang="en-US" dirty="0"/>
+              <a:t>We will provide the infrastructure</a:t>
+            </a:r>
+          </a:p>
+          <a:p>
+            <a:r>
+              <a:rPr lang="en-US" dirty="0"/>
+              <a:t>The vendor will install, configure, and demonstrate their solution</a:t>
             </a:r>
           </a:p>
           <a:p>
             <a:pPr lvl="1"/>
             <a:r>
               <a:rPr lang="en-US" dirty="0"/>
-              <a:t>What parts of the stack are supported</a:t>
+              <a:t>The application will must be deployed</a:t>
             </a:r>
           </a:p>
           <a:p>
             <a:pPr lvl="1"/>
             <a:r>
               <a:rPr lang="en-US" dirty="0"/>
-              <a:t>SLA</a:t>
+              <a:t>The application must be reachable on our network</a:t>
             </a:r>
           </a:p>
           <a:p>
             <a:pPr lvl="1"/>
             <a:r>
               <a:rPr lang="en-US" dirty="0"/>
-              <a:t>Pricing</a:t>
-            </a:r>
-          </a:p>
-          <a:p>
+              <a:t>We want them to show us “the standard way” to do this, step by step</a:t>
+            </a:r>
+          </a:p>
+          <a:p>
+            <a:pPr lvl="1"/>
             <a:r>
               <a:rPr lang="en-US" dirty="0"/>
-              <a:t>Consulting services</a:t>
-            </a:r>
-          </a:p>
-          <a:p>
-            <a:pPr lvl="1"/>
+              <a:t>Auto-scale running containers as needed</a:t>
+            </a:r>
+          </a:p>
+          <a:p>
             <a:r>
               <a:rPr lang="en-US" dirty="0"/>
-              <a:t>Their consulting model</a:t>
-            </a:r>
-          </a:p>
-          <a:p>
-            <a:pPr lvl="1"/>
-            <a:r>
-              <a:rPr lang="en-US" dirty="0"/>
-              <a:t>Availability</a:t>
-            </a:r>
-          </a:p>
-          <a:p>
-            <a:pPr lvl="1"/>
-            <a:r>
-              <a:rPr lang="en-US" dirty="0"/>
-              <a:t>Costs</a:t>
+              <a:t>The vendor will demonstrate rolling updates</a:t>
             </a:r>
           </a:p>
         </p:txBody>
@@ -11552,7 +10481,7 @@
     </p:spTree>
     <p:extLst>
       <p:ext uri="{BB962C8B-B14F-4D97-AF65-F5344CB8AC3E}">
-        <p14:creationId xmlns:p14="http://schemas.microsoft.com/office/powerpoint/2010/main" val="485781510"/>
+        <p14:creationId xmlns:p14="http://schemas.microsoft.com/office/powerpoint/2010/main" val="551168300"/>
       </p:ext>
     </p:extLst>
   </p:cSld>
@@ -11563,7 +10492,7 @@
 </file>
 
 <file path=ppt/slides/slide14.xml><?xml version="1.0" encoding="utf-8"?>
-<p:sld xmlns:a="http://schemas.openxmlformats.org/drawingml/2006/main" xmlns:r="http://schemas.openxmlformats.org/officeDocument/2006/relationships" xmlns:p="http://schemas.openxmlformats.org/presentationml/2006/main">
+<p:sld xmlns:a="http://schemas.openxmlformats.org/drawingml/2006/main" xmlns:r="http://schemas.openxmlformats.org/officeDocument/2006/relationships" xmlns:p="http://schemas.openxmlformats.org/presentationml/2006/main" show="0">
   <p:cSld>
     <p:spTree>
       <p:nvGrpSpPr>
@@ -11596,37 +10525,104 @@
           <a:p>
             <a:r>
               <a:rPr lang="en-US" dirty="0"/>
-              <a:t>Phase Two (Medium)</a:t>
-            </a:r>
-          </a:p>
-        </p:txBody>
-      </p:sp>
-      <p:sp>
-        <p:nvSpPr>
-          <p:cNvPr id="3" name="Text Placeholder 2"/>
+              <a:t>Demo Requirements:  NOC Operations</a:t>
+            </a:r>
+          </a:p>
+        </p:txBody>
+      </p:sp>
+      <p:sp>
+        <p:nvSpPr>
+          <p:cNvPr id="3" name="Content Placeholder 2"/>
           <p:cNvSpPr>
             <a:spLocks noGrp="1"/>
           </p:cNvSpPr>
           <p:nvPr>
-            <p:ph type="body" idx="1"/>
+            <p:ph idx="1"/>
           </p:nvPr>
         </p:nvSpPr>
         <p:spPr/>
         <p:txBody>
-          <a:bodyPr/>
+          <a:bodyPr>
+            <a:normAutofit/>
+          </a:bodyPr>
           <a:lstStyle/>
           <a:p>
             <a:r>
               <a:rPr lang="en-US" dirty="0"/>
-              <a:t>Support of Vendor Applications</a:t>
-            </a:r>
+              <a:t>Demonstrate Monitoring</a:t>
+            </a:r>
+          </a:p>
+          <a:p>
+            <a:pPr lvl="1"/>
+            <a:r>
+              <a:rPr lang="en-US" dirty="0"/>
+              <a:t>At the cluster level</a:t>
+            </a:r>
+          </a:p>
+          <a:p>
+            <a:pPr lvl="1"/>
+            <a:r>
+              <a:rPr lang="en-US" dirty="0"/>
+              <a:t>At the host level</a:t>
+            </a:r>
+          </a:p>
+          <a:p>
+            <a:pPr lvl="1"/>
+            <a:r>
+              <a:rPr lang="en-US" dirty="0"/>
+              <a:t>At the container level</a:t>
+            </a:r>
+          </a:p>
+          <a:p>
+            <a:pPr lvl="1"/>
+            <a:r>
+              <a:rPr lang="en-US" dirty="0"/>
+              <a:t>* We prefer to integrate with our current NOC products</a:t>
+            </a:r>
+          </a:p>
+          <a:p>
+            <a:r>
+              <a:rPr lang="en-US" dirty="0"/>
+              <a:t>Demonstrate Escalation Plans</a:t>
+            </a:r>
+          </a:p>
+          <a:p>
+            <a:pPr lvl="1"/>
+            <a:r>
+              <a:rPr lang="en-US" dirty="0"/>
+              <a:t>An application is down</a:t>
+            </a:r>
+          </a:p>
+          <a:p>
+            <a:pPr lvl="1"/>
+            <a:r>
+              <a:rPr lang="en-US" dirty="0"/>
+              <a:t>Scarce resources</a:t>
+            </a:r>
+          </a:p>
+          <a:p>
+            <a:r>
+              <a:rPr lang="en-US" dirty="0"/>
+              <a:t>Demonstrate Rolling Updates</a:t>
+            </a:r>
+          </a:p>
+          <a:p>
+            <a:pPr lvl="1"/>
+            <a:r>
+              <a:rPr lang="en-US" dirty="0"/>
+              <a:t>Update running containers from an old base OS image to a current one</a:t>
+            </a:r>
+          </a:p>
+          <a:p>
+            <a:pPr lvl="1"/>
+            <a:endParaRPr lang="en-US" dirty="0"/>
           </a:p>
         </p:txBody>
       </p:sp>
     </p:spTree>
     <p:extLst>
       <p:ext uri="{BB962C8B-B14F-4D97-AF65-F5344CB8AC3E}">
-        <p14:creationId xmlns:p14="http://schemas.microsoft.com/office/powerpoint/2010/main" val="1907812105"/>
+        <p14:creationId xmlns:p14="http://schemas.microsoft.com/office/powerpoint/2010/main" val="3864910711"/>
       </p:ext>
     </p:extLst>
   </p:cSld>
@@ -11637,7 +10633,7 @@
 </file>
 
 <file path=ppt/slides/slide15.xml><?xml version="1.0" encoding="utf-8"?>
-<p:sld xmlns:a="http://schemas.openxmlformats.org/drawingml/2006/main" xmlns:r="http://schemas.openxmlformats.org/officeDocument/2006/relationships" xmlns:p="http://schemas.openxmlformats.org/presentationml/2006/main">
+<p:sld xmlns:a="http://schemas.openxmlformats.org/drawingml/2006/main" xmlns:r="http://schemas.openxmlformats.org/officeDocument/2006/relationships" xmlns:p="http://schemas.openxmlformats.org/presentationml/2006/main" show="0">
   <p:cSld>
     <p:spTree>
       <p:nvGrpSpPr>
@@ -11670,7 +10666,7 @@
           <a:p>
             <a:r>
               <a:rPr lang="en-US" dirty="0"/>
-              <a:t>Vendor Applications</a:t>
+              <a:t>Demo Requirements:  The Proposal</a:t>
             </a:r>
           </a:p>
         </p:txBody>
@@ -11687,54 +10683,74 @@
         </p:nvSpPr>
         <p:spPr/>
         <p:txBody>
-          <a:bodyPr/>
+          <a:bodyPr>
+            <a:normAutofit/>
+          </a:bodyPr>
           <a:lstStyle/>
           <a:p>
             <a:r>
               <a:rPr lang="en-US" dirty="0"/>
-              <a:t>This is really just a new way of deploying the applications we buy</a:t>
+              <a:t>Basic explanation of licensing</a:t>
             </a:r>
           </a:p>
           <a:p>
             <a:r>
               <a:rPr lang="en-US" dirty="0"/>
-              <a:t>Requires planning and training</a:t>
+              <a:t>Formal pricing offers</a:t>
             </a:r>
           </a:p>
           <a:p>
             <a:r>
               <a:rPr lang="en-US" dirty="0"/>
-              <a:t>Requires an understanding of how to budget usage</a:t>
-            </a:r>
-          </a:p>
-          <a:p>
+              <a:t>Support details</a:t>
+            </a:r>
+          </a:p>
+          <a:p>
+            <a:pPr lvl="1"/>
             <a:r>
               <a:rPr lang="en-US" dirty="0"/>
-              <a:t>Requires licensing and support agreements</a:t>
-            </a:r>
-          </a:p>
-          <a:p>
+              <a:t>What parts of the stack are supported</a:t>
+            </a:r>
+          </a:p>
+          <a:p>
+            <a:pPr lvl="1"/>
             <a:r>
               <a:rPr lang="en-US" dirty="0"/>
-              <a:t>Requires physical infrastructure</a:t>
-            </a:r>
-          </a:p>
-          <a:p>
+              <a:t>SLA</a:t>
+            </a:r>
+          </a:p>
+          <a:p>
+            <a:pPr lvl="1"/>
             <a:r>
               <a:rPr lang="en-US" dirty="0"/>
-              <a:t>Requires installation / configuration of container solution</a:t>
+              <a:t>Pricing</a:t>
             </a:r>
           </a:p>
           <a:p>
             <a:r>
               <a:rPr lang="en-US" dirty="0"/>
-              <a:t>Requires security and compliance review</a:t>
-            </a:r>
-          </a:p>
-          <a:p>
+              <a:t>Consulting services</a:t>
+            </a:r>
+          </a:p>
+          <a:p>
+            <a:pPr lvl="1"/>
             <a:r>
               <a:rPr lang="en-US" dirty="0"/>
-              <a:t>Requires NOC integration</a:t>
+              <a:t>Their consulting model</a:t>
+            </a:r>
+          </a:p>
+          <a:p>
+            <a:pPr lvl="1"/>
+            <a:r>
+              <a:rPr lang="en-US" dirty="0"/>
+              <a:t>Availability</a:t>
+            </a:r>
+          </a:p>
+          <a:p>
+            <a:pPr lvl="1"/>
+            <a:r>
+              <a:rPr lang="en-US" dirty="0"/>
+              <a:t>Costs</a:t>
             </a:r>
           </a:p>
         </p:txBody>
@@ -11742,7 +10758,7 @@
     </p:spTree>
     <p:extLst>
       <p:ext uri="{BB962C8B-B14F-4D97-AF65-F5344CB8AC3E}">
-        <p14:creationId xmlns:p14="http://schemas.microsoft.com/office/powerpoint/2010/main" val="908170637"/>
+        <p14:creationId xmlns:p14="http://schemas.microsoft.com/office/powerpoint/2010/main" val="282798005"/>
       </p:ext>
     </p:extLst>
   </p:cSld>
@@ -11786,6 +10802,190 @@
           <a:p>
             <a:r>
               <a:rPr lang="en-US" dirty="0"/>
+              <a:t>Phase Two (Medium)</a:t>
+            </a:r>
+          </a:p>
+        </p:txBody>
+      </p:sp>
+      <p:sp>
+        <p:nvSpPr>
+          <p:cNvPr id="3" name="Text Placeholder 2"/>
+          <p:cNvSpPr>
+            <a:spLocks noGrp="1"/>
+          </p:cNvSpPr>
+          <p:nvPr>
+            <p:ph type="body" idx="1"/>
+          </p:nvPr>
+        </p:nvSpPr>
+        <p:spPr/>
+        <p:txBody>
+          <a:bodyPr/>
+          <a:lstStyle/>
+          <a:p>
+            <a:r>
+              <a:rPr lang="en-US" dirty="0"/>
+              <a:t>Off-The-Shelf Container Support</a:t>
+            </a:r>
+          </a:p>
+        </p:txBody>
+      </p:sp>
+    </p:spTree>
+    <p:extLst>
+      <p:ext uri="{BB962C8B-B14F-4D97-AF65-F5344CB8AC3E}">
+        <p14:creationId xmlns:p14="http://schemas.microsoft.com/office/powerpoint/2010/main" val="1907812105"/>
+      </p:ext>
+    </p:extLst>
+  </p:cSld>
+  <p:clrMapOvr>
+    <a:masterClrMapping/>
+  </p:clrMapOvr>
+</p:sld>
+</file>
+
+<file path=ppt/slides/slide17.xml><?xml version="1.0" encoding="utf-8"?>
+<p:sld xmlns:a="http://schemas.openxmlformats.org/drawingml/2006/main" xmlns:r="http://schemas.openxmlformats.org/officeDocument/2006/relationships" xmlns:p="http://schemas.openxmlformats.org/presentationml/2006/main">
+  <p:cSld>
+    <p:spTree>
+      <p:nvGrpSpPr>
+        <p:cNvPr id="1" name=""/>
+        <p:cNvGrpSpPr/>
+        <p:nvPr/>
+      </p:nvGrpSpPr>
+      <p:grpSpPr>
+        <a:xfrm>
+          <a:off x="0" y="0"/>
+          <a:ext cx="0" cy="0"/>
+          <a:chOff x="0" y="0"/>
+          <a:chExt cx="0" cy="0"/>
+        </a:xfrm>
+      </p:grpSpPr>
+      <p:sp>
+        <p:nvSpPr>
+          <p:cNvPr id="2" name="Title 1"/>
+          <p:cNvSpPr>
+            <a:spLocks noGrp="1"/>
+          </p:cNvSpPr>
+          <p:nvPr>
+            <p:ph type="title"/>
+          </p:nvPr>
+        </p:nvSpPr>
+        <p:spPr/>
+        <p:txBody>
+          <a:bodyPr/>
+          <a:lstStyle/>
+          <a:p>
+            <a:r>
+              <a:rPr lang="en-US" dirty="0"/>
+              <a:t>Requirements</a:t>
+            </a:r>
+          </a:p>
+        </p:txBody>
+      </p:sp>
+      <p:sp>
+        <p:nvSpPr>
+          <p:cNvPr id="3" name="Content Placeholder 2"/>
+          <p:cNvSpPr>
+            <a:spLocks noGrp="1"/>
+          </p:cNvSpPr>
+          <p:nvPr>
+            <p:ph idx="1"/>
+          </p:nvPr>
+        </p:nvSpPr>
+        <p:spPr/>
+        <p:txBody>
+          <a:bodyPr/>
+          <a:lstStyle/>
+          <a:p>
+            <a:r>
+              <a:rPr lang="en-US" dirty="0"/>
+              <a:t>Pilot use case</a:t>
+            </a:r>
+          </a:p>
+          <a:p>
+            <a:r>
+              <a:rPr lang="en-US" dirty="0"/>
+              <a:t>Licensing and support agreements</a:t>
+            </a:r>
+          </a:p>
+          <a:p>
+            <a:r>
+              <a:rPr lang="en-US" dirty="0"/>
+              <a:t>Budget considerations</a:t>
+            </a:r>
+          </a:p>
+          <a:p>
+            <a:r>
+              <a:rPr lang="en-US" dirty="0"/>
+              <a:t>Planning and training</a:t>
+            </a:r>
+          </a:p>
+          <a:p>
+            <a:r>
+              <a:rPr lang="en-US" dirty="0"/>
+              <a:t>Security and compliance review</a:t>
+            </a:r>
+          </a:p>
+          <a:p>
+            <a:r>
+              <a:rPr lang="en-US" dirty="0"/>
+              <a:t>Physical infrastructure</a:t>
+            </a:r>
+          </a:p>
+          <a:p>
+            <a:r>
+              <a:rPr lang="en-US" dirty="0"/>
+              <a:t>NOC integration</a:t>
+            </a:r>
+          </a:p>
+        </p:txBody>
+      </p:sp>
+    </p:spTree>
+    <p:extLst>
+      <p:ext uri="{BB962C8B-B14F-4D97-AF65-F5344CB8AC3E}">
+        <p14:creationId xmlns:p14="http://schemas.microsoft.com/office/powerpoint/2010/main" val="908170637"/>
+      </p:ext>
+    </p:extLst>
+  </p:cSld>
+  <p:clrMapOvr>
+    <a:masterClrMapping/>
+  </p:clrMapOvr>
+</p:sld>
+</file>
+
+<file path=ppt/slides/slide18.xml><?xml version="1.0" encoding="utf-8"?>
+<p:sld xmlns:a="http://schemas.openxmlformats.org/drawingml/2006/main" xmlns:r="http://schemas.openxmlformats.org/officeDocument/2006/relationships" xmlns:p="http://schemas.openxmlformats.org/presentationml/2006/main">
+  <p:cSld>
+    <p:spTree>
+      <p:nvGrpSpPr>
+        <p:cNvPr id="1" name=""/>
+        <p:cNvGrpSpPr/>
+        <p:nvPr/>
+      </p:nvGrpSpPr>
+      <p:grpSpPr>
+        <a:xfrm>
+          <a:off x="0" y="0"/>
+          <a:ext cx="0" cy="0"/>
+          <a:chOff x="0" y="0"/>
+          <a:chExt cx="0" cy="0"/>
+        </a:xfrm>
+      </p:grpSpPr>
+      <p:sp>
+        <p:nvSpPr>
+          <p:cNvPr id="2" name="Title 1"/>
+          <p:cNvSpPr>
+            <a:spLocks noGrp="1"/>
+          </p:cNvSpPr>
+          <p:nvPr>
+            <p:ph type="title"/>
+          </p:nvPr>
+        </p:nvSpPr>
+        <p:spPr/>
+        <p:txBody>
+          <a:bodyPr/>
+          <a:lstStyle/>
+          <a:p>
+            <a:r>
+              <a:rPr lang="en-US" dirty="0"/>
               <a:t>Phase Three (Large)</a:t>
             </a:r>
           </a:p>
@@ -11826,7 +11026,7 @@
 </p:sld>
 </file>
 
-<file path=ppt/slides/slide17.xml><?xml version="1.0" encoding="utf-8"?>
+<file path=ppt/slides/slide19.xml><?xml version="1.0" encoding="utf-8"?>
 <p:sld xmlns:a="http://schemas.openxmlformats.org/drawingml/2006/main" xmlns:r="http://schemas.openxmlformats.org/officeDocument/2006/relationships" xmlns:p="http://schemas.openxmlformats.org/presentationml/2006/main">
   <p:cSld>
     <p:spTree>
@@ -12399,7 +11599,7 @@
         </p:nvGrpSpPr>
         <p:grpSpPr>
           <a:xfrm>
-            <a:off x="9407397" y="1973126"/>
+            <a:off x="8111707" y="2089951"/>
             <a:ext cx="2324590" cy="4178711"/>
             <a:chOff x="9594360" y="2247900"/>
             <a:chExt cx="2324590" cy="3600450"/>
@@ -12721,30 +11921,6 @@
           </p:txBody>
         </p:sp>
       </p:grpSp>
-      <p:graphicFrame>
-        <p:nvGraphicFramePr>
-          <p:cNvPr id="41" name="Chart 40">
-            <a:extLst>
-              <a:ext uri="{FF2B5EF4-FFF2-40B4-BE49-F238E27FC236}">
-                <a16:creationId xmlns:a16="http://schemas.microsoft.com/office/drawing/2014/main" id="{EA701DB9-837F-4B0E-9F99-ABD6EDA35C80}"/>
-              </a:ext>
-            </a:extLst>
-          </p:cNvPr>
-          <p:cNvGraphicFramePr/>
-          <p:nvPr>
-            <p:extLst/>
-          </p:nvPr>
-        </p:nvGraphicFramePr>
-        <p:xfrm>
-          <a:off x="6658374" y="4486796"/>
-          <a:ext cx="2628900" cy="1761604"/>
-        </p:xfrm>
-        <a:graphic>
-          <a:graphicData uri="http://schemas.openxmlformats.org/drawingml/2006/chart">
-            <c:chart xmlns:c="http://schemas.openxmlformats.org/drawingml/2006/chart" xmlns:r="http://schemas.openxmlformats.org/officeDocument/2006/relationships" r:id="rId7"/>
-          </a:graphicData>
-        </a:graphic>
-      </p:graphicFrame>
       <p:sp>
         <p:nvSpPr>
           <p:cNvPr id="32" name="Arrow: Right 31">
@@ -12875,8 +12051,8 @@
         </p:nvSpPr>
         <p:spPr>
           <a:xfrm rot="20735756">
-            <a:off x="4383545" y="3924574"/>
-            <a:ext cx="5001716" cy="160003"/>
+            <a:off x="4402884" y="4096989"/>
+            <a:ext cx="3617960" cy="140628"/>
           </a:xfrm>
           <a:prstGeom prst="rightArrow">
             <a:avLst/>
@@ -13446,51 +12622,6 @@
                       </p:childTnLst>
                     </p:cTn>
                   </p:par>
-                  <p:par>
-                    <p:cTn id="48" fill="hold">
-                      <p:stCondLst>
-                        <p:cond delay="indefinite"/>
-                      </p:stCondLst>
-                      <p:childTnLst>
-                        <p:par>
-                          <p:cTn id="49" fill="hold">
-                            <p:stCondLst>
-                              <p:cond delay="0"/>
-                            </p:stCondLst>
-                            <p:childTnLst>
-                              <p:par>
-                                <p:cTn id="50" presetID="1" presetClass="entr" presetSubtype="0" fill="hold" grpId="0" nodeType="clickEffect">
-                                  <p:stCondLst>
-                                    <p:cond delay="0"/>
-                                  </p:stCondLst>
-                                  <p:childTnLst>
-                                    <p:set>
-                                      <p:cBhvr>
-                                        <p:cTn id="51" dur="1" fill="hold">
-                                          <p:stCondLst>
-                                            <p:cond delay="0"/>
-                                          </p:stCondLst>
-                                        </p:cTn>
-                                        <p:tgtEl>
-                                          <p:spTgt spid="41"/>
-                                        </p:tgtEl>
-                                        <p:attrNameLst>
-                                          <p:attrName>style.visibility</p:attrName>
-                                        </p:attrNameLst>
-                                      </p:cBhvr>
-                                      <p:to>
-                                        <p:strVal val="visible"/>
-                                      </p:to>
-                                    </p:set>
-                                  </p:childTnLst>
-                                </p:cTn>
-                              </p:par>
-                            </p:childTnLst>
-                          </p:cTn>
-                        </p:par>
-                      </p:childTnLst>
-                    </p:cTn>
-                  </p:par>
                 </p:childTnLst>
               </p:cTn>
               <p:prevCondLst>
@@ -13521,206 +12652,11 @@
       <p:bldP spid="19" grpId="0" animBg="1"/>
       <p:bldP spid="26" grpId="0" animBg="1"/>
       <p:bldP spid="27" grpId="0" animBg="1"/>
-      <p:bldGraphic spid="41" grpId="0">
-        <p:bldAsOne/>
-      </p:bldGraphic>
       <p:bldP spid="32" grpId="0" animBg="1"/>
       <p:bldP spid="7" grpId="0" animBg="1"/>
       <p:bldP spid="40" grpId="0" animBg="1"/>
     </p:bldLst>
   </p:timing>
-</p:sld>
-</file>
-
-<file path=ppt/slides/slide18.xml><?xml version="1.0" encoding="utf-8"?>
-<p:sld xmlns:a="http://schemas.openxmlformats.org/drawingml/2006/main" xmlns:r="http://schemas.openxmlformats.org/officeDocument/2006/relationships" xmlns:p="http://schemas.openxmlformats.org/presentationml/2006/main">
-  <p:cSld>
-    <p:spTree>
-      <p:nvGrpSpPr>
-        <p:cNvPr id="1" name=""/>
-        <p:cNvGrpSpPr/>
-        <p:nvPr/>
-      </p:nvGrpSpPr>
-      <p:grpSpPr>
-        <a:xfrm>
-          <a:off x="0" y="0"/>
-          <a:ext cx="0" cy="0"/>
-          <a:chOff x="0" y="0"/>
-          <a:chExt cx="0" cy="0"/>
-        </a:xfrm>
-      </p:grpSpPr>
-      <p:sp>
-        <p:nvSpPr>
-          <p:cNvPr id="2" name="Title 1">
-            <a:extLst>
-              <a:ext uri="{FF2B5EF4-FFF2-40B4-BE49-F238E27FC236}">
-                <a16:creationId xmlns:a16="http://schemas.microsoft.com/office/drawing/2014/main" id="{BB79D0DB-53C6-4764-B2E3-91877326BC12}"/>
-              </a:ext>
-            </a:extLst>
-          </p:cNvPr>
-          <p:cNvSpPr>
-            <a:spLocks noGrp="1"/>
-          </p:cNvSpPr>
-          <p:nvPr>
-            <p:ph type="title"/>
-          </p:nvPr>
-        </p:nvSpPr>
-        <p:spPr/>
-        <p:txBody>
-          <a:bodyPr/>
-          <a:lstStyle/>
-          <a:p>
-            <a:r>
-              <a:rPr lang="en-US" dirty="0"/>
-              <a:t>Next Steps</a:t>
-            </a:r>
-          </a:p>
-        </p:txBody>
-      </p:sp>
-      <p:sp>
-        <p:nvSpPr>
-          <p:cNvPr id="3" name="Text Placeholder 2">
-            <a:extLst>
-              <a:ext uri="{FF2B5EF4-FFF2-40B4-BE49-F238E27FC236}">
-                <a16:creationId xmlns:a16="http://schemas.microsoft.com/office/drawing/2014/main" id="{FCF4704B-B8D3-4826-AE87-70DC1916E3C5}"/>
-              </a:ext>
-            </a:extLst>
-          </p:cNvPr>
-          <p:cNvSpPr>
-            <a:spLocks noGrp="1"/>
-          </p:cNvSpPr>
-          <p:nvPr>
-            <p:ph type="body" idx="1"/>
-          </p:nvPr>
-        </p:nvSpPr>
-        <p:spPr/>
-        <p:txBody>
-          <a:bodyPr/>
-          <a:lstStyle/>
-          <a:p>
-            <a:r>
-              <a:rPr lang="en-US" dirty="0"/>
-              <a:t>Hint:  We have a project on our hands…</a:t>
-            </a:r>
-          </a:p>
-        </p:txBody>
-      </p:sp>
-    </p:spTree>
-    <p:extLst>
-      <p:ext uri="{BB962C8B-B14F-4D97-AF65-F5344CB8AC3E}">
-        <p14:creationId xmlns:p14="http://schemas.microsoft.com/office/powerpoint/2010/main" val="3072953202"/>
-      </p:ext>
-    </p:extLst>
-  </p:cSld>
-  <p:clrMapOvr>
-    <a:masterClrMapping/>
-  </p:clrMapOvr>
-</p:sld>
-</file>
-
-<file path=ppt/slides/slide19.xml><?xml version="1.0" encoding="utf-8"?>
-<p:sld xmlns:a="http://schemas.openxmlformats.org/drawingml/2006/main" xmlns:r="http://schemas.openxmlformats.org/officeDocument/2006/relationships" xmlns:p="http://schemas.openxmlformats.org/presentationml/2006/main">
-  <p:cSld>
-    <p:spTree>
-      <p:nvGrpSpPr>
-        <p:cNvPr id="1" name=""/>
-        <p:cNvGrpSpPr/>
-        <p:nvPr/>
-      </p:nvGrpSpPr>
-      <p:grpSpPr>
-        <a:xfrm>
-          <a:off x="0" y="0"/>
-          <a:ext cx="0" cy="0"/>
-          <a:chOff x="0" y="0"/>
-          <a:chExt cx="0" cy="0"/>
-        </a:xfrm>
-      </p:grpSpPr>
-      <p:sp>
-        <p:nvSpPr>
-          <p:cNvPr id="2" name="Title 1">
-            <a:extLst>
-              <a:ext uri="{FF2B5EF4-FFF2-40B4-BE49-F238E27FC236}">
-                <a16:creationId xmlns:a16="http://schemas.microsoft.com/office/drawing/2014/main" id="{F98DCCC2-901E-4BA8-8F13-695B7613B71C}"/>
-              </a:ext>
-            </a:extLst>
-          </p:cNvPr>
-          <p:cNvSpPr>
-            <a:spLocks noGrp="1"/>
-          </p:cNvSpPr>
-          <p:nvPr>
-            <p:ph type="title"/>
-          </p:nvPr>
-        </p:nvSpPr>
-        <p:spPr/>
-        <p:txBody>
-          <a:bodyPr/>
-          <a:lstStyle/>
-          <a:p>
-            <a:r>
-              <a:rPr lang="en-US" dirty="0"/>
-              <a:t>Let’s Get Moving!</a:t>
-            </a:r>
-          </a:p>
-        </p:txBody>
-      </p:sp>
-      <p:sp>
-        <p:nvSpPr>
-          <p:cNvPr id="3" name="Content Placeholder 2">
-            <a:extLst>
-              <a:ext uri="{FF2B5EF4-FFF2-40B4-BE49-F238E27FC236}">
-                <a16:creationId xmlns:a16="http://schemas.microsoft.com/office/drawing/2014/main" id="{65972851-E12F-4953-BC40-498F40127880}"/>
-              </a:ext>
-            </a:extLst>
-          </p:cNvPr>
-          <p:cNvSpPr>
-            <a:spLocks noGrp="1"/>
-          </p:cNvSpPr>
-          <p:nvPr>
-            <p:ph idx="1"/>
-          </p:nvPr>
-        </p:nvSpPr>
-        <p:spPr/>
-        <p:txBody>
-          <a:bodyPr>
-            <a:normAutofit/>
-          </a:bodyPr>
-          <a:lstStyle/>
-          <a:p>
-            <a:r>
-              <a:rPr lang="en-US" dirty="0"/>
-              <a:t>Finalize our team</a:t>
-            </a:r>
-          </a:p>
-          <a:p>
-            <a:r>
-              <a:rPr lang="en-US" dirty="0"/>
-              <a:t>Write our RFP document</a:t>
-            </a:r>
-          </a:p>
-          <a:p>
-            <a:r>
-              <a:rPr lang="en-US" dirty="0"/>
-              <a:t>Submit RFP to vendors</a:t>
-            </a:r>
-          </a:p>
-          <a:p>
-            <a:r>
-              <a:rPr lang="en-US" dirty="0"/>
-              <a:t>Coordinate vendor presentations</a:t>
-            </a:r>
-          </a:p>
-        </p:txBody>
-      </p:sp>
-    </p:spTree>
-    <p:extLst>
-      <p:ext uri="{BB962C8B-B14F-4D97-AF65-F5344CB8AC3E}">
-        <p14:creationId xmlns:p14="http://schemas.microsoft.com/office/powerpoint/2010/main" val="781785288"/>
-      </p:ext>
-    </p:extLst>
-  </p:cSld>
-  <p:clrMapOvr>
-    <a:masterClrMapping/>
-  </p:clrMapOvr>
 </p:sld>
 </file>
 
@@ -13789,6 +12725,118 @@
     <p:extLst>
       <p:ext uri="{BB962C8B-B14F-4D97-AF65-F5344CB8AC3E}">
         <p14:creationId xmlns:p14="http://schemas.microsoft.com/office/powerpoint/2010/main" val="3292354453"/>
+      </p:ext>
+    </p:extLst>
+  </p:cSld>
+  <p:clrMapOvr>
+    <a:masterClrMapping/>
+  </p:clrMapOvr>
+</p:sld>
+</file>
+
+<file path=ppt/slides/slide20.xml><?xml version="1.0" encoding="utf-8"?>
+<p:sld xmlns:a="http://schemas.openxmlformats.org/drawingml/2006/main" xmlns:r="http://schemas.openxmlformats.org/officeDocument/2006/relationships" xmlns:p="http://schemas.openxmlformats.org/presentationml/2006/main">
+  <p:cSld>
+    <p:spTree>
+      <p:nvGrpSpPr>
+        <p:cNvPr id="1" name=""/>
+        <p:cNvGrpSpPr/>
+        <p:nvPr/>
+      </p:nvGrpSpPr>
+      <p:grpSpPr>
+        <a:xfrm>
+          <a:off x="0" y="0"/>
+          <a:ext cx="0" cy="0"/>
+          <a:chOff x="0" y="0"/>
+          <a:chExt cx="0" cy="0"/>
+        </a:xfrm>
+      </p:grpSpPr>
+      <p:sp>
+        <p:nvSpPr>
+          <p:cNvPr id="2" name="Title 1">
+            <a:extLst>
+              <a:ext uri="{FF2B5EF4-FFF2-40B4-BE49-F238E27FC236}">
+                <a16:creationId xmlns:a16="http://schemas.microsoft.com/office/drawing/2014/main" id="{F98DCCC2-901E-4BA8-8F13-695B7613B71C}"/>
+              </a:ext>
+            </a:extLst>
+          </p:cNvPr>
+          <p:cNvSpPr>
+            <a:spLocks noGrp="1"/>
+          </p:cNvSpPr>
+          <p:nvPr>
+            <p:ph type="title"/>
+          </p:nvPr>
+        </p:nvSpPr>
+        <p:spPr/>
+        <p:txBody>
+          <a:bodyPr/>
+          <a:lstStyle/>
+          <a:p>
+            <a:r>
+              <a:rPr lang="en-US" dirty="0"/>
+              <a:t>Next Steps</a:t>
+            </a:r>
+          </a:p>
+        </p:txBody>
+      </p:sp>
+      <p:sp>
+        <p:nvSpPr>
+          <p:cNvPr id="3" name="Content Placeholder 2">
+            <a:extLst>
+              <a:ext uri="{FF2B5EF4-FFF2-40B4-BE49-F238E27FC236}">
+                <a16:creationId xmlns:a16="http://schemas.microsoft.com/office/drawing/2014/main" id="{65972851-E12F-4953-BC40-498F40127880}"/>
+              </a:ext>
+            </a:extLst>
+          </p:cNvPr>
+          <p:cNvSpPr>
+            <a:spLocks noGrp="1"/>
+          </p:cNvSpPr>
+          <p:nvPr>
+            <p:ph idx="1"/>
+          </p:nvPr>
+        </p:nvSpPr>
+        <p:spPr/>
+        <p:txBody>
+          <a:bodyPr>
+            <a:normAutofit/>
+          </a:bodyPr>
+          <a:lstStyle/>
+          <a:p>
+            <a:r>
+              <a:rPr lang="en-US" dirty="0"/>
+              <a:t>Finalize our team</a:t>
+            </a:r>
+          </a:p>
+          <a:p>
+            <a:r>
+              <a:rPr lang="en-US" dirty="0"/>
+              <a:t>Write our RFP document</a:t>
+            </a:r>
+          </a:p>
+          <a:p>
+            <a:r>
+              <a:rPr lang="en-US" dirty="0"/>
+              <a:t>Submit RFP to vendors</a:t>
+            </a:r>
+          </a:p>
+          <a:p>
+            <a:r>
+              <a:rPr lang="en-US" dirty="0"/>
+              <a:t>Coordinate vendor presentations</a:t>
+            </a:r>
+          </a:p>
+          <a:p>
+            <a:r>
+              <a:rPr lang="en-US" dirty="0"/>
+              <a:t>Nail down estimate for phase 2</a:t>
+            </a:r>
+          </a:p>
+        </p:txBody>
+      </p:sp>
+    </p:spTree>
+    <p:extLst>
+      <p:ext uri="{BB962C8B-B14F-4D97-AF65-F5344CB8AC3E}">
+        <p14:creationId xmlns:p14="http://schemas.microsoft.com/office/powerpoint/2010/main" val="781785288"/>
       </p:ext>
     </p:extLst>
   </p:cSld>
@@ -13967,19 +13015,19 @@
           <a:p>
             <a:r>
               <a:rPr lang="en-US" dirty="0"/>
-              <a:t>Phase One:  Proofs of concept (This talk).</a:t>
+              <a:t>Phase One:  Proofs of concept (This talk)</a:t>
             </a:r>
           </a:p>
           <a:p>
             <a:r>
               <a:rPr lang="en-US" dirty="0"/>
-              <a:t>Phase Two:  Support of vendor applications.</a:t>
+              <a:t>Phase Two:  Support of vendor applications</a:t>
             </a:r>
           </a:p>
           <a:p>
             <a:r>
               <a:rPr lang="en-US" dirty="0"/>
-              <a:t>Phase Three:  DevOps for our applications.</a:t>
+              <a:t>Phase Three:  DevOps for our applications</a:t>
             </a:r>
           </a:p>
         </p:txBody>
@@ -14061,7 +13109,7 @@
         <p:spPr/>
         <p:txBody>
           <a:bodyPr>
-            <a:normAutofit fontScale="85000" lnSpcReduction="10000"/>
+            <a:normAutofit fontScale="85000" lnSpcReduction="20000"/>
           </a:bodyPr>
           <a:lstStyle/>
           <a:p>
@@ -14112,7 +13160,7 @@
             </a:r>
             <a:r>
               <a:rPr lang="en-US" dirty="0"/>
-              <a:t>:  Eric Burcham, Dylan Clark, Mike Bollman, Lowell Roberts, Mayme Kittman</a:t>
+              <a:t>:  Eric Burcham, Dylan Clark, Mike Bollman, Lowell Roberts, Mayme Kittman, Stuart Wagner</a:t>
             </a:r>
           </a:p>
           <a:p>
@@ -14370,7 +13418,13 @@
       </p:grpSpPr>
       <p:sp>
         <p:nvSpPr>
-          <p:cNvPr id="2" name="Title 1"/>
+          <p:cNvPr id="2" name="Title 1">
+            <a:extLst>
+              <a:ext uri="{FF2B5EF4-FFF2-40B4-BE49-F238E27FC236}">
+                <a16:creationId xmlns:a16="http://schemas.microsoft.com/office/drawing/2014/main" id="{05D1E734-7289-434A-BAB5-8B27CC4D98E9}"/>
+              </a:ext>
+            </a:extLst>
+          </p:cNvPr>
           <p:cNvSpPr>
             <a:spLocks noGrp="1"/>
           </p:cNvSpPr>
@@ -14385,105 +13439,65 @@
           <a:p>
             <a:r>
               <a:rPr lang="en-US" dirty="0"/>
-              <a:t>Functional Concerns</a:t>
-            </a:r>
-          </a:p>
-        </p:txBody>
-      </p:sp>
-      <p:sp>
-        <p:nvSpPr>
-          <p:cNvPr id="3" name="Content Placeholder 2"/>
+              <a:t>POC Concerns</a:t>
+            </a:r>
+          </a:p>
+        </p:txBody>
+      </p:sp>
+      <p:sp>
+        <p:nvSpPr>
+          <p:cNvPr id="3" name="Content Placeholder 2">
+            <a:extLst>
+              <a:ext uri="{FF2B5EF4-FFF2-40B4-BE49-F238E27FC236}">
+                <a16:creationId xmlns:a16="http://schemas.microsoft.com/office/drawing/2014/main" id="{69D78B72-CFD0-4AE3-8CBE-2226A85F6A23}"/>
+              </a:ext>
+            </a:extLst>
+          </p:cNvPr>
           <p:cNvSpPr>
             <a:spLocks noGrp="1"/>
           </p:cNvSpPr>
           <p:nvPr>
-            <p:ph idx="1"/>
+            <p:ph sz="half" idx="1"/>
           </p:nvPr>
         </p:nvSpPr>
         <p:spPr/>
         <p:txBody>
-          <a:bodyPr>
-            <a:normAutofit fontScale="85000" lnSpcReduction="20000"/>
-          </a:bodyPr>
+          <a:bodyPr/>
           <a:lstStyle/>
           <a:p>
-            <a:r>
-              <a:rPr lang="en-US" dirty="0"/>
-              <a:t>Automatic Scaling</a:t>
-            </a:r>
-          </a:p>
-          <a:p>
-            <a:r>
-              <a:rPr lang="en-US" dirty="0"/>
-              <a:t>Clustering</a:t>
-            </a:r>
-          </a:p>
-          <a:p>
-            <a:r>
-              <a:rPr lang="en-US" dirty="0"/>
-              <a:t>Copy Control</a:t>
-            </a:r>
-          </a:p>
-          <a:p>
-            <a:r>
-              <a:rPr lang="en-US" dirty="0"/>
-              <a:t>Deployment</a:t>
-            </a:r>
-          </a:p>
-          <a:p>
-            <a:r>
-              <a:rPr lang="en-US" dirty="0"/>
-              <a:t>Health Monitoring</a:t>
-            </a:r>
-          </a:p>
-          <a:p>
-            <a:r>
-              <a:rPr lang="en-US" dirty="0"/>
-              <a:t>High Availability</a:t>
-            </a:r>
-          </a:p>
-          <a:p>
-            <a:r>
-              <a:rPr lang="en-US" dirty="0"/>
-              <a:t>Log Management</a:t>
-            </a:r>
-          </a:p>
-          <a:p>
-            <a:r>
-              <a:rPr lang="en-US" dirty="0"/>
-              <a:t>Management</a:t>
-            </a:r>
-          </a:p>
-          <a:p>
-            <a:r>
-              <a:rPr lang="en-US" dirty="0"/>
-              <a:t>Network Isolation for Testing</a:t>
-            </a:r>
-          </a:p>
-          <a:p>
-            <a:r>
-              <a:rPr lang="en-US" dirty="0"/>
-              <a:t>Orchestration</a:t>
-            </a:r>
-          </a:p>
-          <a:p>
-            <a:r>
-              <a:rPr lang="en-US" dirty="0"/>
-              <a:t>Resource Allocation</a:t>
-            </a:r>
-          </a:p>
-          <a:p>
-            <a:r>
-              <a:rPr lang="en-US" dirty="0"/>
-              <a:t>Security</a:t>
-            </a:r>
+            <a:endParaRPr lang="en-US"/>
+          </a:p>
+        </p:txBody>
+      </p:sp>
+      <p:sp>
+        <p:nvSpPr>
+          <p:cNvPr id="4" name="Content Placeholder 3">
+            <a:extLst>
+              <a:ext uri="{FF2B5EF4-FFF2-40B4-BE49-F238E27FC236}">
+                <a16:creationId xmlns:a16="http://schemas.microsoft.com/office/drawing/2014/main" id="{E733743C-EAF7-4DE6-8B8F-A916C4D2A728}"/>
+              </a:ext>
+            </a:extLst>
+          </p:cNvPr>
+          <p:cNvSpPr>
+            <a:spLocks noGrp="1"/>
+          </p:cNvSpPr>
+          <p:nvPr>
+            <p:ph sz="half" idx="2"/>
+          </p:nvPr>
+        </p:nvSpPr>
+        <p:spPr/>
+        <p:txBody>
+          <a:bodyPr/>
+          <a:lstStyle/>
+          <a:p>
+            <a:endParaRPr lang="en-US"/>
           </a:p>
         </p:txBody>
       </p:sp>
     </p:spTree>
     <p:extLst>
       <p:ext uri="{BB962C8B-B14F-4D97-AF65-F5344CB8AC3E}">
-        <p14:creationId xmlns:p14="http://schemas.microsoft.com/office/powerpoint/2010/main" val="2896554746"/>
+        <p14:creationId xmlns:p14="http://schemas.microsoft.com/office/powerpoint/2010/main" val="3732569273"/>
       </p:ext>
     </p:extLst>
   </p:cSld>
@@ -14494,7 +13508,7 @@
 </file>
 
 <file path=ppt/slides/slide9.xml><?xml version="1.0" encoding="utf-8"?>
-<p:sld xmlns:a="http://schemas.openxmlformats.org/drawingml/2006/main" xmlns:r="http://schemas.openxmlformats.org/officeDocument/2006/relationships" xmlns:p="http://schemas.openxmlformats.org/presentationml/2006/main">
+<p:sld xmlns:a="http://schemas.openxmlformats.org/drawingml/2006/main" xmlns:r="http://schemas.openxmlformats.org/officeDocument/2006/relationships" xmlns:p="http://schemas.openxmlformats.org/presentationml/2006/main" show="0">
   <p:cSld>
     <p:spTree>
       <p:nvGrpSpPr>
@@ -14527,7 +13541,7 @@
           <a:p>
             <a:r>
               <a:rPr lang="en-US" dirty="0"/>
-              <a:t>Other Concerns</a:t>
+              <a:t>Functional Concerns</a:t>
             </a:r>
           </a:p>
         </p:txBody>
@@ -14544,8 +13558,16 @@
         </p:nvSpPr>
         <p:spPr/>
         <p:txBody>
-          <a:bodyPr/>
+          <a:bodyPr>
+            <a:normAutofit fontScale="62500" lnSpcReduction="20000"/>
+          </a:bodyPr>
           <a:lstStyle/>
+          <a:p>
+            <a:r>
+              <a:rPr lang="en-US" dirty="0"/>
+              <a:t>Automatic Scaling</a:t>
+            </a:r>
+          </a:p>
           <a:p>
             <a:r>
               <a:rPr lang="en-US" dirty="0"/>
@@ -14555,49 +13577,73 @@
           <a:p>
             <a:r>
               <a:rPr lang="en-US" dirty="0"/>
-              <a:t>Budgeting</a:t>
+              <a:t>Clustering</a:t>
             </a:r>
           </a:p>
           <a:p>
             <a:r>
               <a:rPr lang="en-US" dirty="0"/>
-              <a:t>Change Management</a:t>
+              <a:t>Copy Control</a:t>
             </a:r>
           </a:p>
           <a:p>
             <a:r>
               <a:rPr lang="en-US" dirty="0"/>
-              <a:t>Desktop Host Management</a:t>
+              <a:t>Deployment</a:t>
             </a:r>
           </a:p>
           <a:p>
             <a:r>
               <a:rPr lang="en-US" dirty="0"/>
-              <a:t>Image Approval and Management</a:t>
+              <a:t>Desktop Support</a:t>
             </a:r>
           </a:p>
           <a:p>
             <a:r>
               <a:rPr lang="en-US" dirty="0"/>
-              <a:t>Licensing and Compliance</a:t>
+              <a:t>Health Monitoring</a:t>
             </a:r>
           </a:p>
           <a:p>
             <a:r>
               <a:rPr lang="en-US" dirty="0"/>
-              <a:t>Resource Planning</a:t>
+              <a:t>High Availability</a:t>
             </a:r>
           </a:p>
           <a:p>
             <a:r>
               <a:rPr lang="en-US" dirty="0"/>
-              <a:t>Security Audits</a:t>
+              <a:t>Log Management</a:t>
             </a:r>
           </a:p>
           <a:p>
             <a:r>
               <a:rPr lang="en-US" dirty="0"/>
-              <a:t>Technical Support Quality and Availability</a:t>
+              <a:t>Management</a:t>
+            </a:r>
+          </a:p>
+          <a:p>
+            <a:r>
+              <a:rPr lang="en-US" dirty="0"/>
+              <a:t>Network Isolation for Testing</a:t>
+            </a:r>
+          </a:p>
+          <a:p>
+            <a:r>
+              <a:rPr lang="en-US" dirty="0"/>
+              <a:t>Orchestration</a:t>
+            </a:r>
+          </a:p>
+          <a:p>
+            <a:r>
+              <a:rPr lang="en-US" dirty="0"/>
+              <a:t>Resource Allocation</a:t>
+            </a:r>
+          </a:p>
+          <a:p>
+            <a:r>
+              <a:rPr lang="en-US" dirty="0"/>
+              <a:t>Security</a:t>
             </a:r>
           </a:p>
         </p:txBody>
@@ -14605,7 +13651,7 @@
     </p:spTree>
     <p:extLst>
       <p:ext uri="{BB962C8B-B14F-4D97-AF65-F5344CB8AC3E}">
-        <p14:creationId xmlns:p14="http://schemas.microsoft.com/office/powerpoint/2010/main" val="647872659"/>
+        <p14:creationId xmlns:p14="http://schemas.microsoft.com/office/powerpoint/2010/main" val="2896554746"/>
       </p:ext>
     </p:extLst>
   </p:cSld>

</xml_diff>

<commit_message>
Started adding feedback from presentation this morning.
</commit_message>
<xml_diff>
--- a/presentation.pptx
+++ b/presentation.pptx
@@ -5,29 +5,26 @@
     <p:sldMasterId id="2147483660" r:id="rId1"/>
   </p:sldMasterIdLst>
   <p:notesMasterIdLst>
-    <p:notesMasterId r:id="rId22"/>
+    <p:notesMasterId r:id="rId19"/>
   </p:notesMasterIdLst>
   <p:sldIdLst>
     <p:sldId id="256" r:id="rId2"/>
-    <p:sldId id="257" r:id="rId3"/>
-    <p:sldId id="299" r:id="rId4"/>
-    <p:sldId id="283" r:id="rId5"/>
-    <p:sldId id="297" r:id="rId6"/>
-    <p:sldId id="268" r:id="rId7"/>
-    <p:sldId id="287" r:id="rId8"/>
-    <p:sldId id="300" r:id="rId9"/>
-    <p:sldId id="298" r:id="rId10"/>
-    <p:sldId id="293" r:id="rId11"/>
-    <p:sldId id="304" r:id="rId12"/>
-    <p:sldId id="288" r:id="rId13"/>
-    <p:sldId id="301" r:id="rId14"/>
-    <p:sldId id="302" r:id="rId15"/>
-    <p:sldId id="303" r:id="rId16"/>
-    <p:sldId id="270" r:id="rId17"/>
-    <p:sldId id="292" r:id="rId18"/>
-    <p:sldId id="285" r:id="rId19"/>
-    <p:sldId id="294" r:id="rId20"/>
-    <p:sldId id="296" r:id="rId21"/>
+    <p:sldId id="299" r:id="rId3"/>
+    <p:sldId id="283" r:id="rId4"/>
+    <p:sldId id="297" r:id="rId5"/>
+    <p:sldId id="268" r:id="rId6"/>
+    <p:sldId id="287" r:id="rId7"/>
+    <p:sldId id="300" r:id="rId8"/>
+    <p:sldId id="304" r:id="rId9"/>
+    <p:sldId id="288" r:id="rId10"/>
+    <p:sldId id="301" r:id="rId11"/>
+    <p:sldId id="302" r:id="rId12"/>
+    <p:sldId id="303" r:id="rId13"/>
+    <p:sldId id="270" r:id="rId14"/>
+    <p:sldId id="292" r:id="rId15"/>
+    <p:sldId id="285" r:id="rId16"/>
+    <p:sldId id="294" r:id="rId17"/>
+    <p:sldId id="296" r:id="rId18"/>
   </p:sldIdLst>
   <p:sldSz cx="12192000" cy="6858000"/>
   <p:notesSz cx="7010400" cy="9296400"/>
@@ -132,7 +129,6 @@
         <p14:section name="Introduction" id="{A4A0009D-2884-49C7-B877-44806784A7E8}">
           <p14:sldIdLst>
             <p14:sldId id="256"/>
-            <p14:sldId id="257"/>
             <p14:sldId id="299"/>
             <p14:sldId id="283"/>
             <p14:sldId id="297"/>
@@ -143,8 +139,6 @@
             <p14:sldId id="268"/>
             <p14:sldId id="287"/>
             <p14:sldId id="300"/>
-            <p14:sldId id="298"/>
-            <p14:sldId id="293"/>
             <p14:sldId id="304"/>
             <p14:sldId id="288"/>
             <p14:sldId id="301"/>
@@ -1230,7 +1224,7 @@
   <dgm:whole/>
   <dgm:extLst>
     <a:ext uri="http://schemas.microsoft.com/office/drawing/2008/diagram">
-      <dsp:dataModelExt xmlns:dsp="http://schemas.microsoft.com/office/drawing/2008/diagram" relId="rId6" minVer="http://schemas.openxmlformats.org/drawingml/2006/diagram"/>
+      <dsp:dataModelExt xmlns:dsp="http://schemas.microsoft.com/office/drawing/2008/diagram" relId="rId7" minVer="http://schemas.openxmlformats.org/drawingml/2006/diagram"/>
     </a:ext>
   </dgm:extLst>
 </dgm:dataModel>
@@ -3159,7 +3153,7 @@
           <a:p>
             <a:fld id="{A07C3DAA-E1DE-49B6-8079-627AB3F6E0E1}" type="datetimeFigureOut">
               <a:rPr lang="en-US" smtClean="0"/>
-              <a:t>4/22/2019</a:t>
+              <a:t>4/24/2019</a:t>
             </a:fld>
             <a:endParaRPr lang="en-US"/>
           </a:p>
@@ -3424,6 +3418,312 @@
     </a:lvl9pPr>
   </p:notesStyle>
 </p:notesMaster>
+</file>
+
+<file path=ppt/notesSlides/notesSlide1.xml><?xml version="1.0" encoding="utf-8"?>
+<p:notes xmlns:a="http://schemas.openxmlformats.org/drawingml/2006/main" xmlns:r="http://schemas.openxmlformats.org/officeDocument/2006/relationships" xmlns:p="http://schemas.openxmlformats.org/presentationml/2006/main">
+  <p:cSld>
+    <p:spTree>
+      <p:nvGrpSpPr>
+        <p:cNvPr id="1" name=""/>
+        <p:cNvGrpSpPr/>
+        <p:nvPr/>
+      </p:nvGrpSpPr>
+      <p:grpSpPr>
+        <a:xfrm>
+          <a:off x="0" y="0"/>
+          <a:ext cx="0" cy="0"/>
+          <a:chOff x="0" y="0"/>
+          <a:chExt cx="0" cy="0"/>
+        </a:xfrm>
+      </p:grpSpPr>
+      <p:sp>
+        <p:nvSpPr>
+          <p:cNvPr id="2" name="Slide Image Placeholder 1"/>
+          <p:cNvSpPr>
+            <a:spLocks noGrp="1" noRot="1" noChangeAspect="1"/>
+          </p:cNvSpPr>
+          <p:nvPr>
+            <p:ph type="sldImg"/>
+          </p:nvPr>
+        </p:nvSpPr>
+        <p:spPr/>
+      </p:sp>
+      <p:sp>
+        <p:nvSpPr>
+          <p:cNvPr id="3" name="Notes Placeholder 2"/>
+          <p:cNvSpPr>
+            <a:spLocks noGrp="1"/>
+          </p:cNvSpPr>
+          <p:nvPr>
+            <p:ph type="body" idx="1"/>
+          </p:nvPr>
+        </p:nvSpPr>
+        <p:spPr/>
+        <p:txBody>
+          <a:bodyPr/>
+          <a:lstStyle/>
+          <a:p>
+            <a:r>
+              <a:rPr lang="en-US" dirty="0"/>
+              <a:t>These applications are provided by vendors.</a:t>
+            </a:r>
+          </a:p>
+          <a:p>
+            <a:endParaRPr lang="en-US" dirty="0"/>
+          </a:p>
+          <a:p>
+            <a:r>
+              <a:rPr lang="en-US" dirty="0"/>
+              <a:t>They are pre-packaged to run as containers.</a:t>
+            </a:r>
+          </a:p>
+          <a:p>
+            <a:endParaRPr lang="en-US" dirty="0"/>
+          </a:p>
+          <a:p>
+            <a:r>
+              <a:rPr lang="en-US" dirty="0"/>
+              <a:t>We deploy them manually and infrequently.</a:t>
+            </a:r>
+          </a:p>
+          <a:p>
+            <a:endParaRPr lang="en-US" dirty="0"/>
+          </a:p>
+          <a:p>
+            <a:r>
+              <a:rPr lang="en-US" dirty="0"/>
+              <a:t>Change control is slow and carefully managed.</a:t>
+            </a:r>
+          </a:p>
+        </p:txBody>
+      </p:sp>
+      <p:sp>
+        <p:nvSpPr>
+          <p:cNvPr id="4" name="Slide Number Placeholder 3"/>
+          <p:cNvSpPr>
+            <a:spLocks noGrp="1"/>
+          </p:cNvSpPr>
+          <p:nvPr>
+            <p:ph type="sldNum" sz="quarter" idx="5"/>
+          </p:nvPr>
+        </p:nvSpPr>
+        <p:spPr/>
+        <p:txBody>
+          <a:bodyPr/>
+          <a:lstStyle/>
+          <a:p>
+            <a:fld id="{7C432B12-1722-4EDC-9BBA-25A0F0A334AF}" type="slidenum">
+              <a:rPr lang="en-US" smtClean="0"/>
+              <a:t>13</a:t>
+            </a:fld>
+            <a:endParaRPr lang="en-US"/>
+          </a:p>
+        </p:txBody>
+      </p:sp>
+    </p:spTree>
+    <p:extLst>
+      <p:ext uri="{BB962C8B-B14F-4D97-AF65-F5344CB8AC3E}">
+        <p14:creationId xmlns:p14="http://schemas.microsoft.com/office/powerpoint/2010/main" val="2887644830"/>
+      </p:ext>
+    </p:extLst>
+  </p:cSld>
+  <p:clrMapOvr>
+    <a:masterClrMapping/>
+  </p:clrMapOvr>
+</p:notes>
+</file>
+
+<file path=ppt/notesSlides/notesSlide2.xml><?xml version="1.0" encoding="utf-8"?>
+<p:notes xmlns:a="http://schemas.openxmlformats.org/drawingml/2006/main" xmlns:r="http://schemas.openxmlformats.org/officeDocument/2006/relationships" xmlns:p="http://schemas.openxmlformats.org/presentationml/2006/main">
+  <p:cSld>
+    <p:spTree>
+      <p:nvGrpSpPr>
+        <p:cNvPr id="1" name=""/>
+        <p:cNvGrpSpPr/>
+        <p:nvPr/>
+      </p:nvGrpSpPr>
+      <p:grpSpPr>
+        <a:xfrm>
+          <a:off x="0" y="0"/>
+          <a:ext cx="0" cy="0"/>
+          <a:chOff x="0" y="0"/>
+          <a:chExt cx="0" cy="0"/>
+        </a:xfrm>
+      </p:grpSpPr>
+      <p:sp>
+        <p:nvSpPr>
+          <p:cNvPr id="2" name="Slide Image Placeholder 1"/>
+          <p:cNvSpPr>
+            <a:spLocks noGrp="1" noRot="1" noChangeAspect="1"/>
+          </p:cNvSpPr>
+          <p:nvPr>
+            <p:ph type="sldImg"/>
+          </p:nvPr>
+        </p:nvSpPr>
+        <p:spPr/>
+      </p:sp>
+      <p:sp>
+        <p:nvSpPr>
+          <p:cNvPr id="3" name="Notes Placeholder 2"/>
+          <p:cNvSpPr>
+            <a:spLocks noGrp="1"/>
+          </p:cNvSpPr>
+          <p:nvPr>
+            <p:ph type="body" idx="1"/>
+          </p:nvPr>
+        </p:nvSpPr>
+        <p:spPr/>
+        <p:txBody>
+          <a:bodyPr/>
+          <a:lstStyle/>
+          <a:p>
+            <a:r>
+              <a:rPr lang="en-US" dirty="0"/>
+              <a:t>There will be costs</a:t>
+            </a:r>
+          </a:p>
+          <a:p>
+            <a:endParaRPr lang="en-US" dirty="0"/>
+          </a:p>
+          <a:p>
+            <a:r>
+              <a:rPr lang="en-US" dirty="0"/>
+              <a:t>We expect to engage a vendor to do this</a:t>
+            </a:r>
+          </a:p>
+          <a:p>
+            <a:endParaRPr lang="en-US" dirty="0"/>
+          </a:p>
+          <a:p>
+            <a:r>
+              <a:rPr lang="en-US" dirty="0"/>
+              <a:t>We want to leverage vendor time</a:t>
+            </a:r>
+          </a:p>
+        </p:txBody>
+      </p:sp>
+      <p:sp>
+        <p:nvSpPr>
+          <p:cNvPr id="4" name="Slide Number Placeholder 3"/>
+          <p:cNvSpPr>
+            <a:spLocks noGrp="1"/>
+          </p:cNvSpPr>
+          <p:nvPr>
+            <p:ph type="sldNum" sz="quarter" idx="5"/>
+          </p:nvPr>
+        </p:nvSpPr>
+        <p:spPr/>
+        <p:txBody>
+          <a:bodyPr/>
+          <a:lstStyle/>
+          <a:p>
+            <a:fld id="{7C432B12-1722-4EDC-9BBA-25A0F0A334AF}" type="slidenum">
+              <a:rPr lang="en-US" smtClean="0"/>
+              <a:t>15</a:t>
+            </a:fld>
+            <a:endParaRPr lang="en-US"/>
+          </a:p>
+        </p:txBody>
+      </p:sp>
+    </p:spTree>
+    <p:extLst>
+      <p:ext uri="{BB962C8B-B14F-4D97-AF65-F5344CB8AC3E}">
+        <p14:creationId xmlns:p14="http://schemas.microsoft.com/office/powerpoint/2010/main" val="1734567867"/>
+      </p:ext>
+    </p:extLst>
+  </p:cSld>
+  <p:clrMapOvr>
+    <a:masterClrMapping/>
+  </p:clrMapOvr>
+</p:notes>
+</file>
+
+<file path=ppt/notesSlides/notesSlide3.xml><?xml version="1.0" encoding="utf-8"?>
+<p:notes xmlns:a="http://schemas.openxmlformats.org/drawingml/2006/main" xmlns:r="http://schemas.openxmlformats.org/officeDocument/2006/relationships" xmlns:p="http://schemas.openxmlformats.org/presentationml/2006/main">
+  <p:cSld>
+    <p:spTree>
+      <p:nvGrpSpPr>
+        <p:cNvPr id="1" name=""/>
+        <p:cNvGrpSpPr/>
+        <p:nvPr/>
+      </p:nvGrpSpPr>
+      <p:grpSpPr>
+        <a:xfrm>
+          <a:off x="0" y="0"/>
+          <a:ext cx="0" cy="0"/>
+          <a:chOff x="0" y="0"/>
+          <a:chExt cx="0" cy="0"/>
+        </a:xfrm>
+      </p:grpSpPr>
+      <p:sp>
+        <p:nvSpPr>
+          <p:cNvPr id="2" name="Slide Image Placeholder 1"/>
+          <p:cNvSpPr>
+            <a:spLocks noGrp="1" noRot="1" noChangeAspect="1"/>
+          </p:cNvSpPr>
+          <p:nvPr>
+            <p:ph type="sldImg"/>
+          </p:nvPr>
+        </p:nvSpPr>
+        <p:spPr/>
+      </p:sp>
+      <p:sp>
+        <p:nvSpPr>
+          <p:cNvPr id="3" name="Notes Placeholder 2"/>
+          <p:cNvSpPr>
+            <a:spLocks noGrp="1"/>
+          </p:cNvSpPr>
+          <p:nvPr>
+            <p:ph type="body" idx="1"/>
+          </p:nvPr>
+        </p:nvSpPr>
+        <p:spPr/>
+        <p:txBody>
+          <a:bodyPr/>
+          <a:lstStyle/>
+          <a:p>
+            <a:r>
+              <a:rPr lang="en-US" dirty="0"/>
+              <a:t>Add detailed notes about why this takes so long.</a:t>
+            </a:r>
+          </a:p>
+        </p:txBody>
+      </p:sp>
+      <p:sp>
+        <p:nvSpPr>
+          <p:cNvPr id="4" name="Slide Number Placeholder 3"/>
+          <p:cNvSpPr>
+            <a:spLocks noGrp="1"/>
+          </p:cNvSpPr>
+          <p:nvPr>
+            <p:ph type="sldNum" sz="quarter" idx="5"/>
+          </p:nvPr>
+        </p:nvSpPr>
+        <p:spPr/>
+        <p:txBody>
+          <a:bodyPr/>
+          <a:lstStyle/>
+          <a:p>
+            <a:fld id="{7C432B12-1722-4EDC-9BBA-25A0F0A334AF}" type="slidenum">
+              <a:rPr lang="en-US" smtClean="0"/>
+              <a:t>16</a:t>
+            </a:fld>
+            <a:endParaRPr lang="en-US"/>
+          </a:p>
+        </p:txBody>
+      </p:sp>
+    </p:spTree>
+    <p:extLst>
+      <p:ext uri="{BB962C8B-B14F-4D97-AF65-F5344CB8AC3E}">
+        <p14:creationId xmlns:p14="http://schemas.microsoft.com/office/powerpoint/2010/main" val="852317419"/>
+      </p:ext>
+    </p:extLst>
+  </p:cSld>
+  <p:clrMapOvr>
+    <a:masterClrMapping/>
+  </p:clrMapOvr>
+</p:notes>
 </file>
 
 <file path=ppt/slideLayouts/slideLayout1.xml><?xml version="1.0" encoding="utf-8"?>
@@ -4148,7 +4448,7 @@
           <a:p>
             <a:fld id="{594BF61B-F633-497E-89E6-831EB66A6863}" type="datetimeFigureOut">
               <a:rPr lang="en-US" smtClean="0"/>
-              <a:t>4/22/2019</a:t>
+              <a:t>4/24/2019</a:t>
             </a:fld>
             <a:endParaRPr lang="en-US"/>
           </a:p>
@@ -4399,7 +4699,7 @@
           <a:p>
             <a:fld id="{594BF61B-F633-497E-89E6-831EB66A6863}" type="datetimeFigureOut">
               <a:rPr lang="en-US" smtClean="0"/>
-              <a:t>4/22/2019</a:t>
+              <a:t>4/24/2019</a:t>
             </a:fld>
             <a:endParaRPr lang="en-US"/>
           </a:p>
@@ -4713,7 +5013,7 @@
           <a:p>
             <a:fld id="{594BF61B-F633-497E-89E6-831EB66A6863}" type="datetimeFigureOut">
               <a:rPr lang="en-US" smtClean="0"/>
-              <a:t>4/22/2019</a:t>
+              <a:t>4/24/2019</a:t>
             </a:fld>
             <a:endParaRPr lang="en-US"/>
           </a:p>
@@ -5054,7 +5354,7 @@
           <a:p>
             <a:fld id="{594BF61B-F633-497E-89E6-831EB66A6863}" type="datetimeFigureOut">
               <a:rPr lang="en-US" smtClean="0"/>
-              <a:t>4/22/2019</a:t>
+              <a:t>4/24/2019</a:t>
             </a:fld>
             <a:endParaRPr lang="en-US"/>
           </a:p>
@@ -5368,7 +5668,7 @@
           <a:p>
             <a:fld id="{594BF61B-F633-497E-89E6-831EB66A6863}" type="datetimeFigureOut">
               <a:rPr lang="en-US" smtClean="0"/>
-              <a:t>4/22/2019</a:t>
+              <a:t>4/24/2019</a:t>
             </a:fld>
             <a:endParaRPr lang="en-US"/>
           </a:p>
@@ -5761,7 +6061,7 @@
           <a:p>
             <a:fld id="{594BF61B-F633-497E-89E6-831EB66A6863}" type="datetimeFigureOut">
               <a:rPr lang="en-US" smtClean="0"/>
-              <a:t>4/22/2019</a:t>
+              <a:t>4/24/2019</a:t>
             </a:fld>
             <a:endParaRPr lang="en-US"/>
           </a:p>
@@ -5931,7 +6231,7 @@
           <a:p>
             <a:fld id="{594BF61B-F633-497E-89E6-831EB66A6863}" type="datetimeFigureOut">
               <a:rPr lang="en-US" smtClean="0"/>
-              <a:t>4/22/2019</a:t>
+              <a:t>4/24/2019</a:t>
             </a:fld>
             <a:endParaRPr lang="en-US"/>
           </a:p>
@@ -6111,7 +6411,7 @@
           <a:p>
             <a:fld id="{594BF61B-F633-497E-89E6-831EB66A6863}" type="datetimeFigureOut">
               <a:rPr lang="en-US" smtClean="0"/>
-              <a:t>4/22/2019</a:t>
+              <a:t>4/24/2019</a:t>
             </a:fld>
             <a:endParaRPr lang="en-US"/>
           </a:p>
@@ -6287,7 +6587,7 @@
           <a:p>
             <a:fld id="{594BF61B-F633-497E-89E6-831EB66A6863}" type="datetimeFigureOut">
               <a:rPr lang="en-US" smtClean="0"/>
-              <a:t>4/22/2019</a:t>
+              <a:t>4/24/2019</a:t>
             </a:fld>
             <a:endParaRPr lang="en-US"/>
           </a:p>
@@ -6534,7 +6834,7 @@
           <a:p>
             <a:fld id="{594BF61B-F633-497E-89E6-831EB66A6863}" type="datetimeFigureOut">
               <a:rPr lang="en-US" smtClean="0"/>
-              <a:t>4/22/2019</a:t>
+              <a:t>4/24/2019</a:t>
             </a:fld>
             <a:endParaRPr lang="en-US"/>
           </a:p>
@@ -6766,7 +7066,7 @@
           <a:p>
             <a:fld id="{594BF61B-F633-497E-89E6-831EB66A6863}" type="datetimeFigureOut">
               <a:rPr lang="en-US" smtClean="0"/>
-              <a:t>4/22/2019</a:t>
+              <a:t>4/24/2019</a:t>
             </a:fld>
             <a:endParaRPr lang="en-US"/>
           </a:p>
@@ -7140,7 +7440,7 @@
           <a:p>
             <a:fld id="{594BF61B-F633-497E-89E6-831EB66A6863}" type="datetimeFigureOut">
               <a:rPr lang="en-US" smtClean="0"/>
-              <a:t>4/22/2019</a:t>
+              <a:t>4/24/2019</a:t>
             </a:fld>
             <a:endParaRPr lang="en-US"/>
           </a:p>
@@ -7263,7 +7563,7 @@
           <a:p>
             <a:fld id="{594BF61B-F633-497E-89E6-831EB66A6863}" type="datetimeFigureOut">
               <a:rPr lang="en-US" smtClean="0"/>
-              <a:t>4/22/2019</a:t>
+              <a:t>4/24/2019</a:t>
             </a:fld>
             <a:endParaRPr lang="en-US"/>
           </a:p>
@@ -7358,7 +7658,7 @@
           <a:p>
             <a:fld id="{594BF61B-F633-497E-89E6-831EB66A6863}" type="datetimeFigureOut">
               <a:rPr lang="en-US" smtClean="0"/>
-              <a:t>4/22/2019</a:t>
+              <a:t>4/24/2019</a:t>
             </a:fld>
             <a:endParaRPr lang="en-US"/>
           </a:p>
@@ -7613,7 +7913,7 @@
           <a:p>
             <a:fld id="{594BF61B-F633-497E-89E6-831EB66A6863}" type="datetimeFigureOut">
               <a:rPr lang="en-US" smtClean="0"/>
-              <a:t>4/22/2019</a:t>
+              <a:t>4/24/2019</a:t>
             </a:fld>
             <a:endParaRPr lang="en-US"/>
           </a:p>
@@ -7876,7 +8176,7 @@
           <a:p>
             <a:fld id="{594BF61B-F633-497E-89E6-831EB66A6863}" type="datetimeFigureOut">
               <a:rPr lang="en-US" smtClean="0"/>
-              <a:t>4/22/2019</a:t>
+              <a:t>4/24/2019</a:t>
             </a:fld>
             <a:endParaRPr lang="en-US"/>
           </a:p>
@@ -8619,7 +8919,7 @@
           <a:p>
             <a:fld id="{594BF61B-F633-497E-89E6-831EB66A6863}" type="datetimeFigureOut">
               <a:rPr lang="en-US" smtClean="0"/>
-              <a:t>4/22/2019</a:t>
+              <a:t>4/24/2019</a:t>
             </a:fld>
             <a:endParaRPr lang="en-US"/>
           </a:p>
@@ -10068,7 +10368,7 @@
           <a:p>
             <a:r>
               <a:rPr lang="en-US" dirty="0"/>
-              <a:t>Other Concerns</a:t>
+              <a:t>Demo Requirements:  The Deployment</a:t>
             </a:r>
           </a:p>
         </p:txBody>
@@ -10085,61 +10385,72 @@
         </p:nvSpPr>
         <p:spPr/>
         <p:txBody>
-          <a:bodyPr/>
+          <a:bodyPr>
+            <a:normAutofit/>
+          </a:bodyPr>
           <a:lstStyle/>
           <a:p>
             <a:r>
               <a:rPr lang="en-US" dirty="0"/>
-              <a:t>Budgeting</a:t>
+              <a:t>The vendor will run the application on a desktop</a:t>
             </a:r>
           </a:p>
           <a:p>
             <a:r>
               <a:rPr lang="en-US" dirty="0"/>
-              <a:t>Change Management</a:t>
+              <a:t>The vendor will demonstrate solutions to our named concerns</a:t>
             </a:r>
           </a:p>
           <a:p>
             <a:r>
               <a:rPr lang="en-US" dirty="0"/>
-              <a:t>Desktop Host Management</a:t>
+              <a:t>The vendor will give us infrastructure requirements</a:t>
             </a:r>
           </a:p>
           <a:p>
             <a:r>
               <a:rPr lang="en-US" dirty="0"/>
-              <a:t>Image Approval and Management</a:t>
+              <a:t>We will provide the infrastructure</a:t>
             </a:r>
           </a:p>
           <a:p>
             <a:r>
               <a:rPr lang="en-US" dirty="0"/>
-              <a:t>Licensing and Compliance</a:t>
-            </a:r>
-          </a:p>
-          <a:p>
-            <a:r>
-              <a:rPr lang="en-US"/>
-              <a:t>Long-term viability</a:t>
-            </a:r>
-            <a:endParaRPr lang="en-US" dirty="0"/>
-          </a:p>
-          <a:p>
+              <a:t>The vendor will install, configure, and demonstrate their solution</a:t>
+            </a:r>
+          </a:p>
+          <a:p>
+            <a:pPr lvl="1"/>
             <a:r>
               <a:rPr lang="en-US" dirty="0"/>
-              <a:t>Resource Planning</a:t>
-            </a:r>
-          </a:p>
-          <a:p>
+              <a:t>The application will must be deployed</a:t>
+            </a:r>
+          </a:p>
+          <a:p>
+            <a:pPr lvl="1"/>
             <a:r>
               <a:rPr lang="en-US" dirty="0"/>
-              <a:t>Security Audits</a:t>
-            </a:r>
-          </a:p>
-          <a:p>
+              <a:t>The application must be reachable on our network</a:t>
+            </a:r>
+          </a:p>
+          <a:p>
+            <a:pPr lvl="1"/>
             <a:r>
               <a:rPr lang="en-US" dirty="0"/>
-              <a:t>Technical Support Quality and Availability</a:t>
+              <a:t>We want them to show us “the standard way” to do this, step by step</a:t>
+            </a:r>
+          </a:p>
+          <a:p>
+            <a:pPr lvl="1"/>
+            <a:r>
+              <a:rPr lang="en-US" dirty="0"/>
+              <a:t>Auto-scale running containers as needed</a:t>
+            </a:r>
+          </a:p>
+          <a:p>
+            <a:r>
+              <a:rPr lang="en-US" dirty="0"/>
+              <a:t>The vendor will demonstrate rolling updates</a:t>
             </a:r>
           </a:p>
         </p:txBody>
@@ -10147,7 +10458,7 @@
     </p:spTree>
     <p:extLst>
       <p:ext uri="{BB962C8B-B14F-4D97-AF65-F5344CB8AC3E}">
-        <p14:creationId xmlns:p14="http://schemas.microsoft.com/office/powerpoint/2010/main" val="647872659"/>
+        <p14:creationId xmlns:p14="http://schemas.microsoft.com/office/powerpoint/2010/main" val="551168300"/>
       </p:ext>
     </p:extLst>
   </p:cSld>
@@ -10158,7 +10469,7 @@
 </file>
 
 <file path=ppt/slides/slide11.xml><?xml version="1.0" encoding="utf-8"?>
-<p:sld xmlns:a="http://schemas.openxmlformats.org/drawingml/2006/main" xmlns:r="http://schemas.openxmlformats.org/officeDocument/2006/relationships" xmlns:p="http://schemas.openxmlformats.org/presentationml/2006/main">
+<p:sld xmlns:a="http://schemas.openxmlformats.org/drawingml/2006/main" xmlns:r="http://schemas.openxmlformats.org/officeDocument/2006/relationships" xmlns:p="http://schemas.openxmlformats.org/presentationml/2006/main" show="0">
   <p:cSld>
     <p:spTree>
       <p:nvGrpSpPr>
@@ -10176,13 +10487,7 @@
       </p:grpSpPr>
       <p:sp>
         <p:nvSpPr>
-          <p:cNvPr id="2" name="Title 1">
-            <a:extLst>
-              <a:ext uri="{FF2B5EF4-FFF2-40B4-BE49-F238E27FC236}">
-                <a16:creationId xmlns:a16="http://schemas.microsoft.com/office/drawing/2014/main" id="{02C69A9D-11E3-42B6-A78A-D426038F43C5}"/>
-              </a:ext>
-            </a:extLst>
-          </p:cNvPr>
+          <p:cNvPr id="2" name="Title 1"/>
           <p:cNvSpPr>
             <a:spLocks noGrp="1"/>
           </p:cNvSpPr>
@@ -10197,20 +10502,14 @@
           <a:p>
             <a:r>
               <a:rPr lang="en-US" dirty="0"/>
-              <a:t>Demo Requirements</a:t>
-            </a:r>
-          </a:p>
-        </p:txBody>
-      </p:sp>
-      <p:sp>
-        <p:nvSpPr>
-          <p:cNvPr id="3" name="Content Placeholder 2">
-            <a:extLst>
-              <a:ext uri="{FF2B5EF4-FFF2-40B4-BE49-F238E27FC236}">
-                <a16:creationId xmlns:a16="http://schemas.microsoft.com/office/drawing/2014/main" id="{0341BF6B-1DD5-4499-A7F3-A34FCF6500EB}"/>
-              </a:ext>
-            </a:extLst>
-          </p:cNvPr>
+              <a:t>Demo Requirements:  NOC Operations</a:t>
+            </a:r>
+          </a:p>
+        </p:txBody>
+      </p:sp>
+      <p:sp>
+        <p:nvSpPr>
+          <p:cNvPr id="3" name="Content Placeholder 2"/>
           <p:cNvSpPr>
             <a:spLocks noGrp="1"/>
           </p:cNvSpPr>
@@ -10220,38 +10519,87 @@
         </p:nvSpPr>
         <p:spPr/>
         <p:txBody>
-          <a:bodyPr/>
+          <a:bodyPr>
+            <a:normAutofit/>
+          </a:bodyPr>
           <a:lstStyle/>
           <a:p>
             <a:r>
               <a:rPr lang="en-US" dirty="0"/>
-              <a:t>We’ll provide the application</a:t>
-            </a:r>
-          </a:p>
-          <a:p>
+              <a:t>Demonstrate Monitoring</a:t>
+            </a:r>
+          </a:p>
+          <a:p>
+            <a:pPr lvl="1"/>
             <a:r>
               <a:rPr lang="en-US" dirty="0"/>
-              <a:t>Deployment</a:t>
-            </a:r>
-          </a:p>
-          <a:p>
+              <a:t>At the cluster level</a:t>
+            </a:r>
+          </a:p>
+          <a:p>
+            <a:pPr lvl="1"/>
             <a:r>
               <a:rPr lang="en-US" dirty="0"/>
-              <a:t>NOC Integration</a:t>
-            </a:r>
-          </a:p>
-          <a:p>
+              <a:t>At the host level</a:t>
+            </a:r>
+          </a:p>
+          <a:p>
+            <a:pPr lvl="1"/>
             <a:r>
               <a:rPr lang="en-US" dirty="0"/>
-              <a:t>Proposals</a:t>
-            </a:r>
+              <a:t>At the container level</a:t>
+            </a:r>
+          </a:p>
+          <a:p>
+            <a:pPr lvl="1"/>
+            <a:r>
+              <a:rPr lang="en-US" dirty="0"/>
+              <a:t>* We prefer to integrate with our current NOC products</a:t>
+            </a:r>
+          </a:p>
+          <a:p>
+            <a:r>
+              <a:rPr lang="en-US" dirty="0"/>
+              <a:t>Demonstrate Escalation Plans</a:t>
+            </a:r>
+          </a:p>
+          <a:p>
+            <a:pPr lvl="1"/>
+            <a:r>
+              <a:rPr lang="en-US" dirty="0"/>
+              <a:t>An application is down</a:t>
+            </a:r>
+          </a:p>
+          <a:p>
+            <a:pPr lvl="1"/>
+            <a:r>
+              <a:rPr lang="en-US" dirty="0"/>
+              <a:t>Scarce resources</a:t>
+            </a:r>
+          </a:p>
+          <a:p>
+            <a:r>
+              <a:rPr lang="en-US" dirty="0"/>
+              <a:t>Demonstrate Rolling Updates</a:t>
+            </a:r>
+          </a:p>
+          <a:p>
+            <a:pPr lvl="1"/>
+            <a:r>
+              <a:rPr lang="en-US" dirty="0"/>
+              <a:t>Update running containers from an old base OS image to a current one</a:t>
+            </a:r>
+          </a:p>
+          <a:p>
+            <a:pPr lvl="1"/>
+            <a:endParaRPr lang="en-US" dirty="0"/>
           </a:p>
         </p:txBody>
       </p:sp>
     </p:spTree>
     <p:extLst>
       <p:ext uri="{BB962C8B-B14F-4D97-AF65-F5344CB8AC3E}">
-        <p14:creationId xmlns:p14="http://schemas.microsoft.com/office/powerpoint/2010/main" val="3976924198"/>
+        <p14:creationId xmlns:p14="http://schemas.microsoft.com/office/powerpoint/2010/main" val="3864910711"/>
       </p:ext>
     </p:extLst>
   </p:cSld>
@@ -10295,377 +10643,6 @@
           <a:p>
             <a:r>
               <a:rPr lang="en-US" dirty="0"/>
-              <a:t>Demo Requirements:  The Application</a:t>
-            </a:r>
-          </a:p>
-        </p:txBody>
-      </p:sp>
-      <p:sp>
-        <p:nvSpPr>
-          <p:cNvPr id="3" name="Content Placeholder 2"/>
-          <p:cNvSpPr>
-            <a:spLocks noGrp="1"/>
-          </p:cNvSpPr>
-          <p:nvPr>
-            <p:ph idx="1"/>
-          </p:nvPr>
-        </p:nvSpPr>
-        <p:spPr/>
-        <p:txBody>
-          <a:bodyPr>
-            <a:normAutofit/>
-          </a:bodyPr>
-          <a:lstStyle/>
-          <a:p>
-            <a:r>
-              <a:rPr lang="en-US" dirty="0"/>
-              <a:t>We will provide a simple app to Containerize</a:t>
-            </a:r>
-          </a:p>
-          <a:p>
-            <a:r>
-              <a:rPr lang="en-US" dirty="0"/>
-              <a:t>The app will have two dependencies</a:t>
-            </a:r>
-          </a:p>
-          <a:p>
-            <a:pPr lvl="1"/>
-            <a:r>
-              <a:rPr lang="en-US" dirty="0"/>
-              <a:t>Database</a:t>
-            </a:r>
-          </a:p>
-          <a:p>
-            <a:pPr lvl="1"/>
-            <a:r>
-              <a:rPr lang="en-US" dirty="0"/>
-              <a:t>Messaging</a:t>
-            </a:r>
-          </a:p>
-        </p:txBody>
-      </p:sp>
-    </p:spTree>
-    <p:extLst>
-      <p:ext uri="{BB962C8B-B14F-4D97-AF65-F5344CB8AC3E}">
-        <p14:creationId xmlns:p14="http://schemas.microsoft.com/office/powerpoint/2010/main" val="1204616855"/>
-      </p:ext>
-    </p:extLst>
-  </p:cSld>
-  <p:clrMapOvr>
-    <a:masterClrMapping/>
-  </p:clrMapOvr>
-</p:sld>
-</file>
-
-<file path=ppt/slides/slide13.xml><?xml version="1.0" encoding="utf-8"?>
-<p:sld xmlns:a="http://schemas.openxmlformats.org/drawingml/2006/main" xmlns:r="http://schemas.openxmlformats.org/officeDocument/2006/relationships" xmlns:p="http://schemas.openxmlformats.org/presentationml/2006/main" show="0">
-  <p:cSld>
-    <p:spTree>
-      <p:nvGrpSpPr>
-        <p:cNvPr id="1" name=""/>
-        <p:cNvGrpSpPr/>
-        <p:nvPr/>
-      </p:nvGrpSpPr>
-      <p:grpSpPr>
-        <a:xfrm>
-          <a:off x="0" y="0"/>
-          <a:ext cx="0" cy="0"/>
-          <a:chOff x="0" y="0"/>
-          <a:chExt cx="0" cy="0"/>
-        </a:xfrm>
-      </p:grpSpPr>
-      <p:sp>
-        <p:nvSpPr>
-          <p:cNvPr id="2" name="Title 1"/>
-          <p:cNvSpPr>
-            <a:spLocks noGrp="1"/>
-          </p:cNvSpPr>
-          <p:nvPr>
-            <p:ph type="title"/>
-          </p:nvPr>
-        </p:nvSpPr>
-        <p:spPr/>
-        <p:txBody>
-          <a:bodyPr/>
-          <a:lstStyle/>
-          <a:p>
-            <a:r>
-              <a:rPr lang="en-US" dirty="0"/>
-              <a:t>Demo Requirements:  The Deployment</a:t>
-            </a:r>
-          </a:p>
-        </p:txBody>
-      </p:sp>
-      <p:sp>
-        <p:nvSpPr>
-          <p:cNvPr id="3" name="Content Placeholder 2"/>
-          <p:cNvSpPr>
-            <a:spLocks noGrp="1"/>
-          </p:cNvSpPr>
-          <p:nvPr>
-            <p:ph idx="1"/>
-          </p:nvPr>
-        </p:nvSpPr>
-        <p:spPr/>
-        <p:txBody>
-          <a:bodyPr>
-            <a:normAutofit/>
-          </a:bodyPr>
-          <a:lstStyle/>
-          <a:p>
-            <a:r>
-              <a:rPr lang="en-US" dirty="0"/>
-              <a:t>The vendor will run the application on a desktop</a:t>
-            </a:r>
-          </a:p>
-          <a:p>
-            <a:r>
-              <a:rPr lang="en-US" dirty="0"/>
-              <a:t>The vendor will demonstrate solutions to our named concerns</a:t>
-            </a:r>
-          </a:p>
-          <a:p>
-            <a:r>
-              <a:rPr lang="en-US" dirty="0"/>
-              <a:t>The vendor will give us infrastructure requirements</a:t>
-            </a:r>
-          </a:p>
-          <a:p>
-            <a:r>
-              <a:rPr lang="en-US" dirty="0"/>
-              <a:t>We will provide the infrastructure</a:t>
-            </a:r>
-          </a:p>
-          <a:p>
-            <a:r>
-              <a:rPr lang="en-US" dirty="0"/>
-              <a:t>The vendor will install, configure, and demonstrate their solution</a:t>
-            </a:r>
-          </a:p>
-          <a:p>
-            <a:pPr lvl="1"/>
-            <a:r>
-              <a:rPr lang="en-US" dirty="0"/>
-              <a:t>The application will must be deployed</a:t>
-            </a:r>
-          </a:p>
-          <a:p>
-            <a:pPr lvl="1"/>
-            <a:r>
-              <a:rPr lang="en-US" dirty="0"/>
-              <a:t>The application must be reachable on our network</a:t>
-            </a:r>
-          </a:p>
-          <a:p>
-            <a:pPr lvl="1"/>
-            <a:r>
-              <a:rPr lang="en-US" dirty="0"/>
-              <a:t>We want them to show us “the standard way” to do this, step by step</a:t>
-            </a:r>
-          </a:p>
-          <a:p>
-            <a:pPr lvl="1"/>
-            <a:r>
-              <a:rPr lang="en-US" dirty="0"/>
-              <a:t>Auto-scale running containers as needed</a:t>
-            </a:r>
-          </a:p>
-          <a:p>
-            <a:r>
-              <a:rPr lang="en-US" dirty="0"/>
-              <a:t>The vendor will demonstrate rolling updates</a:t>
-            </a:r>
-          </a:p>
-        </p:txBody>
-      </p:sp>
-    </p:spTree>
-    <p:extLst>
-      <p:ext uri="{BB962C8B-B14F-4D97-AF65-F5344CB8AC3E}">
-        <p14:creationId xmlns:p14="http://schemas.microsoft.com/office/powerpoint/2010/main" val="551168300"/>
-      </p:ext>
-    </p:extLst>
-  </p:cSld>
-  <p:clrMapOvr>
-    <a:masterClrMapping/>
-  </p:clrMapOvr>
-</p:sld>
-</file>
-
-<file path=ppt/slides/slide14.xml><?xml version="1.0" encoding="utf-8"?>
-<p:sld xmlns:a="http://schemas.openxmlformats.org/drawingml/2006/main" xmlns:r="http://schemas.openxmlformats.org/officeDocument/2006/relationships" xmlns:p="http://schemas.openxmlformats.org/presentationml/2006/main" show="0">
-  <p:cSld>
-    <p:spTree>
-      <p:nvGrpSpPr>
-        <p:cNvPr id="1" name=""/>
-        <p:cNvGrpSpPr/>
-        <p:nvPr/>
-      </p:nvGrpSpPr>
-      <p:grpSpPr>
-        <a:xfrm>
-          <a:off x="0" y="0"/>
-          <a:ext cx="0" cy="0"/>
-          <a:chOff x="0" y="0"/>
-          <a:chExt cx="0" cy="0"/>
-        </a:xfrm>
-      </p:grpSpPr>
-      <p:sp>
-        <p:nvSpPr>
-          <p:cNvPr id="2" name="Title 1"/>
-          <p:cNvSpPr>
-            <a:spLocks noGrp="1"/>
-          </p:cNvSpPr>
-          <p:nvPr>
-            <p:ph type="title"/>
-          </p:nvPr>
-        </p:nvSpPr>
-        <p:spPr/>
-        <p:txBody>
-          <a:bodyPr/>
-          <a:lstStyle/>
-          <a:p>
-            <a:r>
-              <a:rPr lang="en-US" dirty="0"/>
-              <a:t>Demo Requirements:  NOC Operations</a:t>
-            </a:r>
-          </a:p>
-        </p:txBody>
-      </p:sp>
-      <p:sp>
-        <p:nvSpPr>
-          <p:cNvPr id="3" name="Content Placeholder 2"/>
-          <p:cNvSpPr>
-            <a:spLocks noGrp="1"/>
-          </p:cNvSpPr>
-          <p:nvPr>
-            <p:ph idx="1"/>
-          </p:nvPr>
-        </p:nvSpPr>
-        <p:spPr/>
-        <p:txBody>
-          <a:bodyPr>
-            <a:normAutofit/>
-          </a:bodyPr>
-          <a:lstStyle/>
-          <a:p>
-            <a:r>
-              <a:rPr lang="en-US" dirty="0"/>
-              <a:t>Demonstrate Monitoring</a:t>
-            </a:r>
-          </a:p>
-          <a:p>
-            <a:pPr lvl="1"/>
-            <a:r>
-              <a:rPr lang="en-US" dirty="0"/>
-              <a:t>At the cluster level</a:t>
-            </a:r>
-          </a:p>
-          <a:p>
-            <a:pPr lvl="1"/>
-            <a:r>
-              <a:rPr lang="en-US" dirty="0"/>
-              <a:t>At the host level</a:t>
-            </a:r>
-          </a:p>
-          <a:p>
-            <a:pPr lvl="1"/>
-            <a:r>
-              <a:rPr lang="en-US" dirty="0"/>
-              <a:t>At the container level</a:t>
-            </a:r>
-          </a:p>
-          <a:p>
-            <a:pPr lvl="1"/>
-            <a:r>
-              <a:rPr lang="en-US" dirty="0"/>
-              <a:t>* We prefer to integrate with our current NOC products</a:t>
-            </a:r>
-          </a:p>
-          <a:p>
-            <a:r>
-              <a:rPr lang="en-US" dirty="0"/>
-              <a:t>Demonstrate Escalation Plans</a:t>
-            </a:r>
-          </a:p>
-          <a:p>
-            <a:pPr lvl="1"/>
-            <a:r>
-              <a:rPr lang="en-US" dirty="0"/>
-              <a:t>An application is down</a:t>
-            </a:r>
-          </a:p>
-          <a:p>
-            <a:pPr lvl="1"/>
-            <a:r>
-              <a:rPr lang="en-US" dirty="0"/>
-              <a:t>Scarce resources</a:t>
-            </a:r>
-          </a:p>
-          <a:p>
-            <a:r>
-              <a:rPr lang="en-US" dirty="0"/>
-              <a:t>Demonstrate Rolling Updates</a:t>
-            </a:r>
-          </a:p>
-          <a:p>
-            <a:pPr lvl="1"/>
-            <a:r>
-              <a:rPr lang="en-US" dirty="0"/>
-              <a:t>Update running containers from an old base OS image to a current one</a:t>
-            </a:r>
-          </a:p>
-          <a:p>
-            <a:pPr lvl="1"/>
-            <a:endParaRPr lang="en-US" dirty="0"/>
-          </a:p>
-        </p:txBody>
-      </p:sp>
-    </p:spTree>
-    <p:extLst>
-      <p:ext uri="{BB962C8B-B14F-4D97-AF65-F5344CB8AC3E}">
-        <p14:creationId xmlns:p14="http://schemas.microsoft.com/office/powerpoint/2010/main" val="3864910711"/>
-      </p:ext>
-    </p:extLst>
-  </p:cSld>
-  <p:clrMapOvr>
-    <a:masterClrMapping/>
-  </p:clrMapOvr>
-</p:sld>
-</file>
-
-<file path=ppt/slides/slide15.xml><?xml version="1.0" encoding="utf-8"?>
-<p:sld xmlns:a="http://schemas.openxmlformats.org/drawingml/2006/main" xmlns:r="http://schemas.openxmlformats.org/officeDocument/2006/relationships" xmlns:p="http://schemas.openxmlformats.org/presentationml/2006/main" show="0">
-  <p:cSld>
-    <p:spTree>
-      <p:nvGrpSpPr>
-        <p:cNvPr id="1" name=""/>
-        <p:cNvGrpSpPr/>
-        <p:nvPr/>
-      </p:nvGrpSpPr>
-      <p:grpSpPr>
-        <a:xfrm>
-          <a:off x="0" y="0"/>
-          <a:ext cx="0" cy="0"/>
-          <a:chOff x="0" y="0"/>
-          <a:chExt cx="0" cy="0"/>
-        </a:xfrm>
-      </p:grpSpPr>
-      <p:sp>
-        <p:nvSpPr>
-          <p:cNvPr id="2" name="Title 1"/>
-          <p:cNvSpPr>
-            <a:spLocks noGrp="1"/>
-          </p:cNvSpPr>
-          <p:nvPr>
-            <p:ph type="title"/>
-          </p:nvPr>
-        </p:nvSpPr>
-        <p:spPr/>
-        <p:txBody>
-          <a:bodyPr/>
-          <a:lstStyle/>
-          <a:p>
-            <a:r>
-              <a:rPr lang="en-US" dirty="0"/>
               <a:t>Demo Requirements:  The Proposal</a:t>
             </a:r>
           </a:p>
@@ -10768,7 +10745,7 @@
 </p:sld>
 </file>
 
-<file path=ppt/slides/slide16.xml><?xml version="1.0" encoding="utf-8"?>
+<file path=ppt/slides/slide13.xml><?xml version="1.0" encoding="utf-8"?>
 <p:sld xmlns:a="http://schemas.openxmlformats.org/drawingml/2006/main" xmlns:r="http://schemas.openxmlformats.org/officeDocument/2006/relationships" xmlns:p="http://schemas.openxmlformats.org/presentationml/2006/main">
   <p:cSld>
     <p:spTree>
@@ -10802,7 +10779,7 @@
           <a:p>
             <a:r>
               <a:rPr lang="en-US" dirty="0"/>
-              <a:t>Phase Two (Medium)</a:t>
+              <a:t>Phase Two (2 Months)</a:t>
             </a:r>
           </a:p>
         </p:txBody>
@@ -10842,7 +10819,7 @@
 </p:sld>
 </file>
 
-<file path=ppt/slides/slide17.xml><?xml version="1.0" encoding="utf-8"?>
+<file path=ppt/slides/slide14.xml><?xml version="1.0" encoding="utf-8"?>
 <p:sld xmlns:a="http://schemas.openxmlformats.org/drawingml/2006/main" xmlns:r="http://schemas.openxmlformats.org/officeDocument/2006/relationships" xmlns:p="http://schemas.openxmlformats.org/presentationml/2006/main">
   <p:cSld>
     <p:spTree>
@@ -10937,6 +10914,17 @@
               <a:t>NOC integration</a:t>
             </a:r>
           </a:p>
+          <a:p>
+            <a:r>
+              <a:rPr lang="en-US" dirty="0"/>
+              <a:t>Potential New Roles and </a:t>
+            </a:r>
+            <a:r>
+              <a:rPr lang="en-US" dirty="0" err="1"/>
+              <a:t>Responsibilites</a:t>
+            </a:r>
+            <a:endParaRPr lang="en-US" dirty="0"/>
+          </a:p>
         </p:txBody>
       </p:sp>
     </p:spTree>
@@ -10952,7 +10940,7 @@
 </p:sld>
 </file>
 
-<file path=ppt/slides/slide18.xml><?xml version="1.0" encoding="utf-8"?>
+<file path=ppt/slides/slide15.xml><?xml version="1.0" encoding="utf-8"?>
 <p:sld xmlns:a="http://schemas.openxmlformats.org/drawingml/2006/main" xmlns:r="http://schemas.openxmlformats.org/officeDocument/2006/relationships" xmlns:p="http://schemas.openxmlformats.org/presentationml/2006/main">
   <p:cSld>
     <p:spTree>
@@ -10986,7 +10974,7 @@
           <a:p>
             <a:r>
               <a:rPr lang="en-US" dirty="0"/>
-              <a:t>Phase Three (Large)</a:t>
+              <a:t>Phase Three (6 Months)</a:t>
             </a:r>
           </a:p>
         </p:txBody>
@@ -11026,7 +11014,7 @@
 </p:sld>
 </file>
 
-<file path=ppt/slides/slide19.xml><?xml version="1.0" encoding="utf-8"?>
+<file path=ppt/slides/slide16.xml><?xml version="1.0" encoding="utf-8"?>
 <p:sld xmlns:a="http://schemas.openxmlformats.org/drawingml/2006/main" xmlns:r="http://schemas.openxmlformats.org/officeDocument/2006/relationships" xmlns:p="http://schemas.openxmlformats.org/presentationml/2006/main">
   <p:cSld>
     <p:spTree>
@@ -11159,7 +11147,7 @@
           </p:xfrm>
           <a:graphic>
             <a:graphicData uri="http://schemas.openxmlformats.org/drawingml/2006/diagram">
-              <dgm:relIds xmlns:dgm="http://schemas.openxmlformats.org/drawingml/2006/diagram" xmlns:r="http://schemas.openxmlformats.org/officeDocument/2006/relationships" r:dm="rId2" r:lo="rId3" r:qs="rId4" r:cs="rId5"/>
+              <dgm:relIds xmlns:dgm="http://schemas.openxmlformats.org/drawingml/2006/diagram" xmlns:r="http://schemas.openxmlformats.org/officeDocument/2006/relationships" r:dm="rId3" r:lo="rId4" r:qs="rId5" r:cs="rId6"/>
             </a:graphicData>
           </a:graphic>
         </p:graphicFrame>
@@ -12660,6 +12648,118 @@
 </p:sld>
 </file>
 
+<file path=ppt/slides/slide17.xml><?xml version="1.0" encoding="utf-8"?>
+<p:sld xmlns:a="http://schemas.openxmlformats.org/drawingml/2006/main" xmlns:r="http://schemas.openxmlformats.org/officeDocument/2006/relationships" xmlns:p="http://schemas.openxmlformats.org/presentationml/2006/main">
+  <p:cSld>
+    <p:spTree>
+      <p:nvGrpSpPr>
+        <p:cNvPr id="1" name=""/>
+        <p:cNvGrpSpPr/>
+        <p:nvPr/>
+      </p:nvGrpSpPr>
+      <p:grpSpPr>
+        <a:xfrm>
+          <a:off x="0" y="0"/>
+          <a:ext cx="0" cy="0"/>
+          <a:chOff x="0" y="0"/>
+          <a:chExt cx="0" cy="0"/>
+        </a:xfrm>
+      </p:grpSpPr>
+      <p:sp>
+        <p:nvSpPr>
+          <p:cNvPr id="2" name="Title 1">
+            <a:extLst>
+              <a:ext uri="{FF2B5EF4-FFF2-40B4-BE49-F238E27FC236}">
+                <a16:creationId xmlns:a16="http://schemas.microsoft.com/office/drawing/2014/main" id="{F98DCCC2-901E-4BA8-8F13-695B7613B71C}"/>
+              </a:ext>
+            </a:extLst>
+          </p:cNvPr>
+          <p:cNvSpPr>
+            <a:spLocks noGrp="1"/>
+          </p:cNvSpPr>
+          <p:nvPr>
+            <p:ph type="title"/>
+          </p:nvPr>
+        </p:nvSpPr>
+        <p:spPr/>
+        <p:txBody>
+          <a:bodyPr/>
+          <a:lstStyle/>
+          <a:p>
+            <a:r>
+              <a:rPr lang="en-US" dirty="0"/>
+              <a:t>Next Steps</a:t>
+            </a:r>
+          </a:p>
+        </p:txBody>
+      </p:sp>
+      <p:sp>
+        <p:nvSpPr>
+          <p:cNvPr id="3" name="Content Placeholder 2">
+            <a:extLst>
+              <a:ext uri="{FF2B5EF4-FFF2-40B4-BE49-F238E27FC236}">
+                <a16:creationId xmlns:a16="http://schemas.microsoft.com/office/drawing/2014/main" id="{65972851-E12F-4953-BC40-498F40127880}"/>
+              </a:ext>
+            </a:extLst>
+          </p:cNvPr>
+          <p:cNvSpPr>
+            <a:spLocks noGrp="1"/>
+          </p:cNvSpPr>
+          <p:nvPr>
+            <p:ph idx="1"/>
+          </p:nvPr>
+        </p:nvSpPr>
+        <p:spPr/>
+        <p:txBody>
+          <a:bodyPr>
+            <a:normAutofit/>
+          </a:bodyPr>
+          <a:lstStyle/>
+          <a:p>
+            <a:r>
+              <a:rPr lang="en-US" dirty="0"/>
+              <a:t>Finalize our team</a:t>
+            </a:r>
+          </a:p>
+          <a:p>
+            <a:r>
+              <a:rPr lang="en-US" dirty="0"/>
+              <a:t>Write our RFP document</a:t>
+            </a:r>
+          </a:p>
+          <a:p>
+            <a:r>
+              <a:rPr lang="en-US" dirty="0"/>
+              <a:t>Submit RFP to vendors</a:t>
+            </a:r>
+          </a:p>
+          <a:p>
+            <a:r>
+              <a:rPr lang="en-US" dirty="0"/>
+              <a:t>Coordinate vendor presentations</a:t>
+            </a:r>
+          </a:p>
+          <a:p>
+            <a:r>
+              <a:rPr lang="en-US" dirty="0"/>
+              <a:t>Nail down estimate for phase 2</a:t>
+            </a:r>
+          </a:p>
+        </p:txBody>
+      </p:sp>
+    </p:spTree>
+    <p:extLst>
+      <p:ext uri="{BB962C8B-B14F-4D97-AF65-F5344CB8AC3E}">
+        <p14:creationId xmlns:p14="http://schemas.microsoft.com/office/powerpoint/2010/main" val="781785288"/>
+      </p:ext>
+    </p:extLst>
+  </p:cSld>
+  <p:clrMapOvr>
+    <a:masterClrMapping/>
+  </p:clrMapOvr>
+</p:sld>
+</file>
+
 <file path=ppt/slides/slide2.xml><?xml version="1.0" encoding="utf-8"?>
 <p:sld xmlns:a="http://schemas.openxmlformats.org/drawingml/2006/main" xmlns:r="http://schemas.openxmlformats.org/officeDocument/2006/relationships" xmlns:p="http://schemas.openxmlformats.org/presentationml/2006/main">
   <p:cSld>
@@ -12694,19 +12794,19 @@
           <a:p>
             <a:r>
               <a:rPr lang="en-US" dirty="0"/>
-              <a:t>Introduction</a:t>
-            </a:r>
-          </a:p>
-        </p:txBody>
-      </p:sp>
-      <p:sp>
-        <p:nvSpPr>
-          <p:cNvPr id="3" name="Text Placeholder 2"/>
+              <a:t>Why Containers Now?</a:t>
+            </a:r>
+          </a:p>
+        </p:txBody>
+      </p:sp>
+      <p:sp>
+        <p:nvSpPr>
+          <p:cNvPr id="3" name="Content Placeholder 2"/>
           <p:cNvSpPr>
             <a:spLocks noGrp="1"/>
           </p:cNvSpPr>
           <p:nvPr>
-            <p:ph type="body" idx="1"/>
+            <p:ph idx="1"/>
           </p:nvPr>
         </p:nvSpPr>
         <p:spPr/>
@@ -12716,7 +12816,46 @@
           <a:p>
             <a:r>
               <a:rPr lang="en-US" dirty="0"/>
-              <a:t>Where I Tell You What I’m Going to Tell You</a:t>
+              <a:t>We know containers are coming</a:t>
+            </a:r>
+          </a:p>
+          <a:p>
+            <a:r>
+              <a:rPr lang="en-US" dirty="0"/>
+              <a:t>People are already using them:</a:t>
+            </a:r>
+          </a:p>
+          <a:p>
+            <a:pPr lvl="1"/>
+            <a:r>
+              <a:rPr lang="en-US" dirty="0"/>
+              <a:t>Big Data</a:t>
+            </a:r>
+          </a:p>
+          <a:p>
+            <a:pPr lvl="1"/>
+            <a:r>
+              <a:rPr lang="en-US" dirty="0"/>
+              <a:t>Oracle</a:t>
+            </a:r>
+          </a:p>
+          <a:p>
+            <a:pPr lvl="1"/>
+            <a:r>
+              <a:rPr lang="en-US" dirty="0"/>
+              <a:t>?</a:t>
+            </a:r>
+          </a:p>
+          <a:p>
+            <a:r>
+              <a:rPr lang="en-US" dirty="0"/>
+              <a:t>We want to manage one consistent platform</a:t>
+            </a:r>
+          </a:p>
+          <a:p>
+            <a:r>
+              <a:rPr lang="en-US" dirty="0"/>
+              <a:t>We want a ready answer for “how do I run a container?”</a:t>
             </a:r>
           </a:p>
         </p:txBody>
@@ -12724,119 +12863,7 @@
     </p:spTree>
     <p:extLst>
       <p:ext uri="{BB962C8B-B14F-4D97-AF65-F5344CB8AC3E}">
-        <p14:creationId xmlns:p14="http://schemas.microsoft.com/office/powerpoint/2010/main" val="3292354453"/>
-      </p:ext>
-    </p:extLst>
-  </p:cSld>
-  <p:clrMapOvr>
-    <a:masterClrMapping/>
-  </p:clrMapOvr>
-</p:sld>
-</file>
-
-<file path=ppt/slides/slide20.xml><?xml version="1.0" encoding="utf-8"?>
-<p:sld xmlns:a="http://schemas.openxmlformats.org/drawingml/2006/main" xmlns:r="http://schemas.openxmlformats.org/officeDocument/2006/relationships" xmlns:p="http://schemas.openxmlformats.org/presentationml/2006/main">
-  <p:cSld>
-    <p:spTree>
-      <p:nvGrpSpPr>
-        <p:cNvPr id="1" name=""/>
-        <p:cNvGrpSpPr/>
-        <p:nvPr/>
-      </p:nvGrpSpPr>
-      <p:grpSpPr>
-        <a:xfrm>
-          <a:off x="0" y="0"/>
-          <a:ext cx="0" cy="0"/>
-          <a:chOff x="0" y="0"/>
-          <a:chExt cx="0" cy="0"/>
-        </a:xfrm>
-      </p:grpSpPr>
-      <p:sp>
-        <p:nvSpPr>
-          <p:cNvPr id="2" name="Title 1">
-            <a:extLst>
-              <a:ext uri="{FF2B5EF4-FFF2-40B4-BE49-F238E27FC236}">
-                <a16:creationId xmlns:a16="http://schemas.microsoft.com/office/drawing/2014/main" id="{F98DCCC2-901E-4BA8-8F13-695B7613B71C}"/>
-              </a:ext>
-            </a:extLst>
-          </p:cNvPr>
-          <p:cNvSpPr>
-            <a:spLocks noGrp="1"/>
-          </p:cNvSpPr>
-          <p:nvPr>
-            <p:ph type="title"/>
-          </p:nvPr>
-        </p:nvSpPr>
-        <p:spPr/>
-        <p:txBody>
-          <a:bodyPr/>
-          <a:lstStyle/>
-          <a:p>
-            <a:r>
-              <a:rPr lang="en-US" dirty="0"/>
-              <a:t>Next Steps</a:t>
-            </a:r>
-          </a:p>
-        </p:txBody>
-      </p:sp>
-      <p:sp>
-        <p:nvSpPr>
-          <p:cNvPr id="3" name="Content Placeholder 2">
-            <a:extLst>
-              <a:ext uri="{FF2B5EF4-FFF2-40B4-BE49-F238E27FC236}">
-                <a16:creationId xmlns:a16="http://schemas.microsoft.com/office/drawing/2014/main" id="{65972851-E12F-4953-BC40-498F40127880}"/>
-              </a:ext>
-            </a:extLst>
-          </p:cNvPr>
-          <p:cNvSpPr>
-            <a:spLocks noGrp="1"/>
-          </p:cNvSpPr>
-          <p:nvPr>
-            <p:ph idx="1"/>
-          </p:nvPr>
-        </p:nvSpPr>
-        <p:spPr/>
-        <p:txBody>
-          <a:bodyPr>
-            <a:normAutofit/>
-          </a:bodyPr>
-          <a:lstStyle/>
-          <a:p>
-            <a:r>
-              <a:rPr lang="en-US" dirty="0"/>
-              <a:t>Finalize our team</a:t>
-            </a:r>
-          </a:p>
-          <a:p>
-            <a:r>
-              <a:rPr lang="en-US" dirty="0"/>
-              <a:t>Write our RFP document</a:t>
-            </a:r>
-          </a:p>
-          <a:p>
-            <a:r>
-              <a:rPr lang="en-US" dirty="0"/>
-              <a:t>Submit RFP to vendors</a:t>
-            </a:r>
-          </a:p>
-          <a:p>
-            <a:r>
-              <a:rPr lang="en-US" dirty="0"/>
-              <a:t>Coordinate vendor presentations</a:t>
-            </a:r>
-          </a:p>
-          <a:p>
-            <a:r>
-              <a:rPr lang="en-US" dirty="0"/>
-              <a:t>Nail down estimate for phase 2</a:t>
-            </a:r>
-          </a:p>
-        </p:txBody>
-      </p:sp>
-    </p:spTree>
-    <p:extLst>
-      <p:ext uri="{BB962C8B-B14F-4D97-AF65-F5344CB8AC3E}">
-        <p14:creationId xmlns:p14="http://schemas.microsoft.com/office/powerpoint/2010/main" val="781785288"/>
+        <p14:creationId xmlns:p14="http://schemas.microsoft.com/office/powerpoint/2010/main" val="2911040714"/>
       </p:ext>
     </p:extLst>
   </p:cSld>
@@ -12880,7 +12907,7 @@
           <a:p>
             <a:r>
               <a:rPr lang="en-US" dirty="0"/>
-              <a:t>Why Containers?</a:t>
+              <a:t>Three Phases</a:t>
             </a:r>
           </a:p>
         </p:txBody>
@@ -12902,46 +12929,19 @@
           <a:p>
             <a:r>
               <a:rPr lang="en-US" dirty="0"/>
-              <a:t>We know containers are coming</a:t>
+              <a:t>Phase One:  Proofs of concept (This conversation)</a:t>
             </a:r>
           </a:p>
           <a:p>
             <a:r>
               <a:rPr lang="en-US" dirty="0"/>
-              <a:t>People are already using them:</a:t>
-            </a:r>
-          </a:p>
-          <a:p>
-            <a:pPr lvl="1"/>
+              <a:t>Phase Two:  Support of vendor applications</a:t>
+            </a:r>
+          </a:p>
+          <a:p>
             <a:r>
               <a:rPr lang="en-US" dirty="0"/>
-              <a:t>Big Data</a:t>
-            </a:r>
-          </a:p>
-          <a:p>
-            <a:pPr lvl="1"/>
-            <a:r>
-              <a:rPr lang="en-US" dirty="0"/>
-              <a:t>Oracle</a:t>
-            </a:r>
-          </a:p>
-          <a:p>
-            <a:pPr lvl="1"/>
-            <a:r>
-              <a:rPr lang="en-US" dirty="0"/>
-              <a:t>?</a:t>
-            </a:r>
-          </a:p>
-          <a:p>
-            <a:r>
-              <a:rPr lang="en-US" dirty="0"/>
-              <a:t>We want to manage one consistent platform</a:t>
-            </a:r>
-          </a:p>
-          <a:p>
-            <a:r>
-              <a:rPr lang="en-US" dirty="0"/>
-              <a:t>We want a consistent answer for “how do I run a container?”</a:t>
+              <a:t>Phase Three:  DevOps for our applications</a:t>
             </a:r>
           </a:p>
         </p:txBody>
@@ -12949,7 +12949,7 @@
     </p:spTree>
     <p:extLst>
       <p:ext uri="{BB962C8B-B14F-4D97-AF65-F5344CB8AC3E}">
-        <p14:creationId xmlns:p14="http://schemas.microsoft.com/office/powerpoint/2010/main" val="2911040714"/>
+        <p14:creationId xmlns:p14="http://schemas.microsoft.com/office/powerpoint/2010/main" val="3595156515"/>
       </p:ext>
     </p:extLst>
   </p:cSld>
@@ -12978,7 +12978,13 @@
       </p:grpSpPr>
       <p:sp>
         <p:nvSpPr>
-          <p:cNvPr id="2" name="Title 1"/>
+          <p:cNvPr id="2" name="Title 1">
+            <a:extLst>
+              <a:ext uri="{FF2B5EF4-FFF2-40B4-BE49-F238E27FC236}">
+                <a16:creationId xmlns:a16="http://schemas.microsoft.com/office/drawing/2014/main" id="{F98DCCC2-901E-4BA8-8F13-695B7613B71C}"/>
+              </a:ext>
+            </a:extLst>
+          </p:cNvPr>
           <p:cNvSpPr>
             <a:spLocks noGrp="1"/>
           </p:cNvSpPr>
@@ -12993,14 +12999,20 @@
           <a:p>
             <a:r>
               <a:rPr lang="en-US" dirty="0"/>
-              <a:t>Three Phases</a:t>
-            </a:r>
-          </a:p>
-        </p:txBody>
-      </p:sp>
-      <p:sp>
-        <p:nvSpPr>
-          <p:cNvPr id="3" name="Content Placeholder 2"/>
+              <a:t>The Players</a:t>
+            </a:r>
+          </a:p>
+        </p:txBody>
+      </p:sp>
+      <p:sp>
+        <p:nvSpPr>
+          <p:cNvPr id="3" name="Content Placeholder 2">
+            <a:extLst>
+              <a:ext uri="{FF2B5EF4-FFF2-40B4-BE49-F238E27FC236}">
+                <a16:creationId xmlns:a16="http://schemas.microsoft.com/office/drawing/2014/main" id="{65972851-E12F-4953-BC40-498F40127880}"/>
+              </a:ext>
+            </a:extLst>
+          </p:cNvPr>
           <p:cNvSpPr>
             <a:spLocks noGrp="1"/>
           </p:cNvSpPr>
@@ -13010,24 +13022,114 @@
         </p:nvSpPr>
         <p:spPr/>
         <p:txBody>
-          <a:bodyPr/>
+          <a:bodyPr>
+            <a:normAutofit fontScale="85000" lnSpcReduction="20000"/>
+          </a:bodyPr>
           <a:lstStyle/>
           <a:p>
+            <a:pPr marL="0" indent="0">
+              <a:buNone/>
+            </a:pPr>
+            <a:r>
+              <a:rPr lang="en-US" b="1" dirty="0"/>
+              <a:t>Owner</a:t>
+            </a:r>
             <a:r>
               <a:rPr lang="en-US" dirty="0"/>
-              <a:t>Phase One:  Proofs of concept (This talk)</a:t>
-            </a:r>
-          </a:p>
-          <a:p>
+              <a:t>:  Technical Architecture Group</a:t>
+            </a:r>
+          </a:p>
+          <a:p>
+            <a:pPr marL="0" indent="0">
+              <a:buNone/>
+            </a:pPr>
+            <a:endParaRPr lang="en-US" b="1" dirty="0"/>
+          </a:p>
+          <a:p>
+            <a:pPr marL="0" indent="0">
+              <a:buNone/>
+            </a:pPr>
+            <a:r>
+              <a:rPr lang="en-US" b="1" dirty="0"/>
+              <a:t>Driver</a:t>
+            </a:r>
             <a:r>
               <a:rPr lang="en-US" dirty="0"/>
-              <a:t>Phase Two:  Support of vendor applications</a:t>
-            </a:r>
-          </a:p>
-          <a:p>
+              <a:t>:  Eric Burcham</a:t>
+            </a:r>
+          </a:p>
+          <a:p>
+            <a:pPr marL="0" indent="0">
+              <a:buNone/>
+            </a:pPr>
+            <a:endParaRPr lang="en-US" dirty="0"/>
+          </a:p>
+          <a:p>
+            <a:pPr marL="0" indent="0">
+              <a:buNone/>
+            </a:pPr>
+            <a:r>
+              <a:rPr lang="en-US" b="1" dirty="0"/>
+              <a:t>Core Team</a:t>
+            </a:r>
             <a:r>
               <a:rPr lang="en-US" dirty="0"/>
-              <a:t>Phase Three:  DevOps for our applications</a:t>
+              <a:t>:  Eric Burcham, Dylan Clark, Mike Bollman, Lowell Roberts, Mayme Kittman, Stuart Wagner</a:t>
+            </a:r>
+          </a:p>
+          <a:p>
+            <a:pPr marL="0" indent="0">
+              <a:buNone/>
+            </a:pPr>
+            <a:endParaRPr lang="en-US" b="1" dirty="0"/>
+          </a:p>
+          <a:p>
+            <a:pPr marL="0" indent="0">
+              <a:buNone/>
+            </a:pPr>
+            <a:r>
+              <a:rPr lang="en-US" b="1" dirty="0"/>
+              <a:t>Project Manager</a:t>
+            </a:r>
+            <a:r>
+              <a:rPr lang="en-US" dirty="0"/>
+              <a:t>:  TBD.  Not needed for Phase One.</a:t>
+            </a:r>
+            <a:br>
+              <a:rPr lang="en-US" dirty="0"/>
+            </a:br>
+            <a:endParaRPr lang="en-US" b="1" dirty="0"/>
+          </a:p>
+          <a:p>
+            <a:pPr marL="0" indent="0">
+              <a:buNone/>
+            </a:pPr>
+            <a:r>
+              <a:rPr lang="en-US" b="1" dirty="0"/>
+              <a:t>Stakeholders</a:t>
+            </a:r>
+            <a:r>
+              <a:rPr lang="en-US" dirty="0"/>
+              <a:t>:  Big Data, Desktop Support, Development Managers, eBusiness, Engineering, Network Team, NOC, Oracle Team, SCADA, Security and Compliance, Server Team</a:t>
+            </a:r>
+          </a:p>
+          <a:p>
+            <a:pPr marL="0" indent="0">
+              <a:buNone/>
+            </a:pPr>
+            <a:endParaRPr lang="en-US" b="1" dirty="0"/>
+          </a:p>
+          <a:p>
+            <a:pPr marL="0" indent="0">
+              <a:buNone/>
+            </a:pPr>
+            <a:r>
+              <a:rPr lang="en-US" b="1" dirty="0"/>
+              <a:t>Vendors</a:t>
+            </a:r>
+            <a:r>
+              <a:rPr lang="en-US" dirty="0"/>
+              <a:t>:  Docker Enterprise, Red Hat OpenShift, Rancher</a:t>
             </a:r>
           </a:p>
         </p:txBody>
@@ -13035,7 +13137,7 @@
     </p:spTree>
     <p:extLst>
       <p:ext uri="{BB962C8B-B14F-4D97-AF65-F5344CB8AC3E}">
-        <p14:creationId xmlns:p14="http://schemas.microsoft.com/office/powerpoint/2010/main" val="3595156515"/>
+        <p14:creationId xmlns:p14="http://schemas.microsoft.com/office/powerpoint/2010/main" val="2747266861"/>
       </p:ext>
     </p:extLst>
   </p:cSld>
@@ -13064,13 +13166,7 @@
       </p:grpSpPr>
       <p:sp>
         <p:nvSpPr>
-          <p:cNvPr id="2" name="Title 1">
-            <a:extLst>
-              <a:ext uri="{FF2B5EF4-FFF2-40B4-BE49-F238E27FC236}">
-                <a16:creationId xmlns:a16="http://schemas.microsoft.com/office/drawing/2014/main" id="{F98DCCC2-901E-4BA8-8F13-695B7613B71C}"/>
-              </a:ext>
-            </a:extLst>
-          </p:cNvPr>
+          <p:cNvPr id="2" name="Title 1"/>
           <p:cNvSpPr>
             <a:spLocks noGrp="1"/>
           </p:cNvSpPr>
@@ -13085,137 +13181,29 @@
           <a:p>
             <a:r>
               <a:rPr lang="en-US" dirty="0"/>
-              <a:t>The Players</a:t>
-            </a:r>
-          </a:p>
-        </p:txBody>
-      </p:sp>
-      <p:sp>
-        <p:nvSpPr>
-          <p:cNvPr id="3" name="Content Placeholder 2">
-            <a:extLst>
-              <a:ext uri="{FF2B5EF4-FFF2-40B4-BE49-F238E27FC236}">
-                <a16:creationId xmlns:a16="http://schemas.microsoft.com/office/drawing/2014/main" id="{65972851-E12F-4953-BC40-498F40127880}"/>
-              </a:ext>
-            </a:extLst>
-          </p:cNvPr>
+              <a:t>Phase One (2 Months)</a:t>
+            </a:r>
+          </a:p>
+        </p:txBody>
+      </p:sp>
+      <p:sp>
+        <p:nvSpPr>
+          <p:cNvPr id="3" name="Text Placeholder 2"/>
           <p:cNvSpPr>
             <a:spLocks noGrp="1"/>
           </p:cNvSpPr>
           <p:nvPr>
-            <p:ph idx="1"/>
+            <p:ph type="body" idx="1"/>
           </p:nvPr>
         </p:nvSpPr>
         <p:spPr/>
         <p:txBody>
-          <a:bodyPr>
-            <a:normAutofit fontScale="85000" lnSpcReduction="20000"/>
-          </a:bodyPr>
+          <a:bodyPr/>
           <a:lstStyle/>
           <a:p>
-            <a:pPr marL="0" indent="0">
-              <a:buNone/>
-            </a:pPr>
-            <a:r>
-              <a:rPr lang="en-US" b="1" dirty="0"/>
-              <a:t>Owner</a:t>
-            </a:r>
             <a:r>
               <a:rPr lang="en-US" dirty="0"/>
-              <a:t>:  Technical Architecture Group</a:t>
-            </a:r>
-          </a:p>
-          <a:p>
-            <a:pPr marL="0" indent="0">
-              <a:buNone/>
-            </a:pPr>
-            <a:endParaRPr lang="en-US" b="1" dirty="0"/>
-          </a:p>
-          <a:p>
-            <a:pPr marL="0" indent="0">
-              <a:buNone/>
-            </a:pPr>
-            <a:r>
-              <a:rPr lang="en-US" b="1" dirty="0"/>
-              <a:t>Driver</a:t>
-            </a:r>
-            <a:r>
-              <a:rPr lang="en-US" dirty="0"/>
-              <a:t>:  Eric Burcham</a:t>
-            </a:r>
-          </a:p>
-          <a:p>
-            <a:pPr marL="0" indent="0">
-              <a:buNone/>
-            </a:pPr>
-            <a:endParaRPr lang="en-US" dirty="0"/>
-          </a:p>
-          <a:p>
-            <a:pPr marL="0" indent="0">
-              <a:buNone/>
-            </a:pPr>
-            <a:r>
-              <a:rPr lang="en-US" b="1" dirty="0"/>
-              <a:t>Core Team</a:t>
-            </a:r>
-            <a:r>
-              <a:rPr lang="en-US" dirty="0"/>
-              <a:t>:  Eric Burcham, Dylan Clark, Mike Bollman, Lowell Roberts, Mayme Kittman, Stuart Wagner</a:t>
-            </a:r>
-          </a:p>
-          <a:p>
-            <a:pPr marL="0" indent="0">
-              <a:buNone/>
-            </a:pPr>
-            <a:endParaRPr lang="en-US" b="1" dirty="0"/>
-          </a:p>
-          <a:p>
-            <a:pPr marL="0" indent="0">
-              <a:buNone/>
-            </a:pPr>
-            <a:r>
-              <a:rPr lang="en-US" b="1" dirty="0"/>
-              <a:t>Project Manager</a:t>
-            </a:r>
-            <a:r>
-              <a:rPr lang="en-US" dirty="0"/>
-              <a:t>:  TBD.  Not needed for Phase One.</a:t>
-            </a:r>
-            <a:br>
-              <a:rPr lang="en-US" dirty="0"/>
-            </a:br>
-            <a:endParaRPr lang="en-US" b="1" dirty="0"/>
-          </a:p>
-          <a:p>
-            <a:pPr marL="0" indent="0">
-              <a:buNone/>
-            </a:pPr>
-            <a:r>
-              <a:rPr lang="en-US" b="1" dirty="0"/>
-              <a:t>Stakeholders</a:t>
-            </a:r>
-            <a:r>
-              <a:rPr lang="en-US" dirty="0"/>
-              <a:t>:  Big Data, Desktop Support, Development Managers, eBusiness, Engineering, Network Team, NOC, Oracle Team, SCADA, Security and Compliance Server Team</a:t>
-            </a:r>
-          </a:p>
-          <a:p>
-            <a:pPr marL="0" indent="0">
-              <a:buNone/>
-            </a:pPr>
-            <a:endParaRPr lang="en-US" b="1" dirty="0"/>
-          </a:p>
-          <a:p>
-            <a:pPr marL="0" indent="0">
-              <a:buNone/>
-            </a:pPr>
-            <a:r>
-              <a:rPr lang="en-US" b="1" dirty="0"/>
-              <a:t>Vendors</a:t>
-            </a:r>
-            <a:r>
-              <a:rPr lang="en-US" dirty="0"/>
-              <a:t>:  Docker Enterprise, Red Hat OpenShift, Rancher</a:t>
+              <a:t>Proofs of Concept, Cost Analysis, and Vendor Selection</a:t>
             </a:r>
           </a:p>
         </p:txBody>
@@ -13223,7 +13211,7 @@
     </p:spTree>
     <p:extLst>
       <p:ext uri="{BB962C8B-B14F-4D97-AF65-F5344CB8AC3E}">
-        <p14:creationId xmlns:p14="http://schemas.microsoft.com/office/powerpoint/2010/main" val="2747266861"/>
+        <p14:creationId xmlns:p14="http://schemas.microsoft.com/office/powerpoint/2010/main" val="816925581"/>
       </p:ext>
     </p:extLst>
   </p:cSld>
@@ -13267,19 +13255,19 @@
           <a:p>
             <a:r>
               <a:rPr lang="en-US" dirty="0"/>
-              <a:t>Phase One (2 Months)</a:t>
-            </a:r>
-          </a:p>
-        </p:txBody>
-      </p:sp>
-      <p:sp>
-        <p:nvSpPr>
-          <p:cNvPr id="3" name="Text Placeholder 2"/>
+              <a:t>Requests for Proposals with Demo POC</a:t>
+            </a:r>
+          </a:p>
+        </p:txBody>
+      </p:sp>
+      <p:sp>
+        <p:nvSpPr>
+          <p:cNvPr id="3" name="Content Placeholder 2"/>
           <p:cNvSpPr>
             <a:spLocks noGrp="1"/>
           </p:cNvSpPr>
           <p:nvPr>
-            <p:ph type="body" idx="1"/>
+            <p:ph idx="1"/>
           </p:nvPr>
         </p:nvSpPr>
         <p:spPr/>
@@ -13289,7 +13277,31 @@
           <a:p>
             <a:r>
               <a:rPr lang="en-US" dirty="0"/>
-              <a:t>Proofs of Concept, Cost Analysis, and Vendor Selection</a:t>
+              <a:t>We’ll present identical requirements to each vendor</a:t>
+            </a:r>
+          </a:p>
+          <a:p>
+            <a:r>
+              <a:rPr lang="en-US" dirty="0"/>
+              <a:t>We want them to do the demo on our infrastructure</a:t>
+            </a:r>
+          </a:p>
+          <a:p>
+            <a:r>
+              <a:rPr lang="en-US" dirty="0"/>
+              <a:t>We want to keep the environments around for awhile</a:t>
+            </a:r>
+          </a:p>
+          <a:p>
+            <a:r>
+              <a:rPr lang="en-US" dirty="0"/>
+              <a:t>We’ll give environment access to our current container users</a:t>
+            </a:r>
+          </a:p>
+          <a:p>
+            <a:r>
+              <a:rPr lang="en-US" dirty="0"/>
+              <a:t>We’ll try to get this done for free</a:t>
             </a:r>
           </a:p>
         </p:txBody>
@@ -13297,7 +13309,7 @@
     </p:spTree>
     <p:extLst>
       <p:ext uri="{BB962C8B-B14F-4D97-AF65-F5344CB8AC3E}">
-        <p14:creationId xmlns:p14="http://schemas.microsoft.com/office/powerpoint/2010/main" val="816925581"/>
+        <p14:creationId xmlns:p14="http://schemas.microsoft.com/office/powerpoint/2010/main" val="1384123770"/>
       </p:ext>
     </p:extLst>
   </p:cSld>
@@ -13326,7 +13338,13 @@
       </p:grpSpPr>
       <p:sp>
         <p:nvSpPr>
-          <p:cNvPr id="2" name="Title 1"/>
+          <p:cNvPr id="2" name="Title 1">
+            <a:extLst>
+              <a:ext uri="{FF2B5EF4-FFF2-40B4-BE49-F238E27FC236}">
+                <a16:creationId xmlns:a16="http://schemas.microsoft.com/office/drawing/2014/main" id="{05D1E734-7289-434A-BAB5-8B27CC4D98E9}"/>
+              </a:ext>
+            </a:extLst>
+          </p:cNvPr>
           <p:cNvSpPr>
             <a:spLocks noGrp="1"/>
           </p:cNvSpPr>
@@ -13341,55 +13359,207 @@
           <a:p>
             <a:r>
               <a:rPr lang="en-US" dirty="0"/>
-              <a:t>Requests for Proposals with Demo POC</a:t>
-            </a:r>
-          </a:p>
-        </p:txBody>
-      </p:sp>
-      <p:sp>
-        <p:nvSpPr>
-          <p:cNvPr id="3" name="Content Placeholder 2"/>
+              <a:t>POC Scope</a:t>
+            </a:r>
+          </a:p>
+        </p:txBody>
+      </p:sp>
+      <p:sp>
+        <p:nvSpPr>
+          <p:cNvPr id="3" name="Content Placeholder 2">
+            <a:extLst>
+              <a:ext uri="{FF2B5EF4-FFF2-40B4-BE49-F238E27FC236}">
+                <a16:creationId xmlns:a16="http://schemas.microsoft.com/office/drawing/2014/main" id="{69D78B72-CFD0-4AE3-8CBE-2226A85F6A23}"/>
+              </a:ext>
+            </a:extLst>
+          </p:cNvPr>
           <p:cNvSpPr>
             <a:spLocks noGrp="1"/>
           </p:cNvSpPr>
           <p:nvPr>
-            <p:ph idx="1"/>
+            <p:ph sz="half" idx="1"/>
           </p:nvPr>
         </p:nvSpPr>
         <p:spPr/>
         <p:txBody>
-          <a:bodyPr/>
+          <a:bodyPr>
+            <a:normAutofit fontScale="62500" lnSpcReduction="20000"/>
+          </a:bodyPr>
           <a:lstStyle/>
           <a:p>
             <a:r>
               <a:rPr lang="en-US" dirty="0"/>
-              <a:t>We’ll present identical requirements to each vendor</a:t>
+              <a:t>Automatic Scaling</a:t>
             </a:r>
           </a:p>
           <a:p>
             <a:r>
               <a:rPr lang="en-US" dirty="0"/>
-              <a:t>We want them to do the demo on our infrastructure</a:t>
+              <a:t>Authentication / Authorization</a:t>
             </a:r>
           </a:p>
           <a:p>
             <a:r>
               <a:rPr lang="en-US" dirty="0"/>
-              <a:t>We want to keep the environments around for awhile</a:t>
+              <a:t>Clustering</a:t>
             </a:r>
           </a:p>
           <a:p>
             <a:r>
               <a:rPr lang="en-US" dirty="0"/>
-              <a:t>We’ll try to get this done for free</a:t>
-            </a:r>
+              <a:t>Copy Control</a:t>
+            </a:r>
+          </a:p>
+          <a:p>
+            <a:r>
+              <a:rPr lang="en-US" dirty="0"/>
+              <a:t>Deployment</a:t>
+            </a:r>
+          </a:p>
+          <a:p>
+            <a:r>
+              <a:rPr lang="en-US" dirty="0"/>
+              <a:t>Desktop Support</a:t>
+            </a:r>
+          </a:p>
+          <a:p>
+            <a:r>
+              <a:rPr lang="en-US" dirty="0"/>
+              <a:t>Health Monitoring</a:t>
+            </a:r>
+          </a:p>
+          <a:p>
+            <a:r>
+              <a:rPr lang="en-US" dirty="0"/>
+              <a:t>High Availability</a:t>
+            </a:r>
+          </a:p>
+          <a:p>
+            <a:r>
+              <a:rPr lang="en-US" dirty="0"/>
+              <a:t>Log Management</a:t>
+            </a:r>
+          </a:p>
+          <a:p>
+            <a:r>
+              <a:rPr lang="en-US" dirty="0"/>
+              <a:t>Management</a:t>
+            </a:r>
+          </a:p>
+          <a:p>
+            <a:r>
+              <a:rPr lang="en-US" dirty="0"/>
+              <a:t>Network Isolation for Testing</a:t>
+            </a:r>
+          </a:p>
+          <a:p>
+            <a:r>
+              <a:rPr lang="en-US" dirty="0"/>
+              <a:t>Orchestration</a:t>
+            </a:r>
+          </a:p>
+          <a:p>
+            <a:r>
+              <a:rPr lang="en-US" dirty="0"/>
+              <a:t>Resource Allocation</a:t>
+            </a:r>
+          </a:p>
+          <a:p>
+            <a:r>
+              <a:rPr lang="en-US" dirty="0"/>
+              <a:t>Security</a:t>
+            </a:r>
+          </a:p>
+          <a:p>
+            <a:endParaRPr lang="en-US" dirty="0"/>
+          </a:p>
+        </p:txBody>
+      </p:sp>
+      <p:sp>
+        <p:nvSpPr>
+          <p:cNvPr id="4" name="Content Placeholder 3">
+            <a:extLst>
+              <a:ext uri="{FF2B5EF4-FFF2-40B4-BE49-F238E27FC236}">
+                <a16:creationId xmlns:a16="http://schemas.microsoft.com/office/drawing/2014/main" id="{E733743C-EAF7-4DE6-8B8F-A916C4D2A728}"/>
+              </a:ext>
+            </a:extLst>
+          </p:cNvPr>
+          <p:cNvSpPr>
+            <a:spLocks noGrp="1"/>
+          </p:cNvSpPr>
+          <p:nvPr>
+            <p:ph sz="half" idx="2"/>
+          </p:nvPr>
+        </p:nvSpPr>
+        <p:spPr/>
+        <p:txBody>
+          <a:bodyPr>
+            <a:normAutofit fontScale="62500" lnSpcReduction="20000"/>
+          </a:bodyPr>
+          <a:lstStyle/>
+          <a:p>
+            <a:r>
+              <a:rPr lang="en-US" dirty="0"/>
+              <a:t>Budgeting</a:t>
+            </a:r>
+          </a:p>
+          <a:p>
+            <a:r>
+              <a:rPr lang="en-US" dirty="0"/>
+              <a:t>Change Management</a:t>
+            </a:r>
+          </a:p>
+          <a:p>
+            <a:r>
+              <a:rPr lang="en-US" dirty="0"/>
+              <a:t>Desktop Host Management</a:t>
+            </a:r>
+          </a:p>
+          <a:p>
+            <a:r>
+              <a:rPr lang="en-US" dirty="0"/>
+              <a:t>Image Approval and Management</a:t>
+            </a:r>
+          </a:p>
+          <a:p>
+            <a:r>
+              <a:rPr lang="en-US" dirty="0"/>
+              <a:t>Licensing and Compliance</a:t>
+            </a:r>
+          </a:p>
+          <a:p>
+            <a:r>
+              <a:rPr lang="en-US" dirty="0"/>
+              <a:t>Long-term viability</a:t>
+            </a:r>
+          </a:p>
+          <a:p>
+            <a:r>
+              <a:rPr lang="en-US" dirty="0"/>
+              <a:t>Resource Planning</a:t>
+            </a:r>
+          </a:p>
+          <a:p>
+            <a:r>
+              <a:rPr lang="en-US" dirty="0"/>
+              <a:t>Security Audits</a:t>
+            </a:r>
+          </a:p>
+          <a:p>
+            <a:r>
+              <a:rPr lang="en-US" dirty="0"/>
+              <a:t>Technical Support Quality and Availability</a:t>
+            </a:r>
+          </a:p>
+          <a:p>
+            <a:endParaRPr lang="en-US" dirty="0"/>
           </a:p>
         </p:txBody>
       </p:sp>
     </p:spTree>
     <p:extLst>
       <p:ext uri="{BB962C8B-B14F-4D97-AF65-F5344CB8AC3E}">
-        <p14:creationId xmlns:p14="http://schemas.microsoft.com/office/powerpoint/2010/main" val="1384123770"/>
+        <p14:creationId xmlns:p14="http://schemas.microsoft.com/office/powerpoint/2010/main" val="3732569273"/>
       </p:ext>
     </p:extLst>
   </p:cSld>
@@ -13421,7 +13591,7 @@
           <p:cNvPr id="2" name="Title 1">
             <a:extLst>
               <a:ext uri="{FF2B5EF4-FFF2-40B4-BE49-F238E27FC236}">
-                <a16:creationId xmlns:a16="http://schemas.microsoft.com/office/drawing/2014/main" id="{05D1E734-7289-434A-BAB5-8B27CC4D98E9}"/>
+                <a16:creationId xmlns:a16="http://schemas.microsoft.com/office/drawing/2014/main" id="{02C69A9D-11E3-42B6-A78A-D426038F43C5}"/>
               </a:ext>
             </a:extLst>
           </p:cNvPr>
@@ -13439,7 +13609,7 @@
           <a:p>
             <a:r>
               <a:rPr lang="en-US" dirty="0"/>
-              <a:t>POC Concerns</a:t>
+              <a:t>Demo Requirements</a:t>
             </a:r>
           </a:p>
         </p:txBody>
@@ -13449,7 +13619,7 @@
           <p:cNvPr id="3" name="Content Placeholder 2">
             <a:extLst>
               <a:ext uri="{FF2B5EF4-FFF2-40B4-BE49-F238E27FC236}">
-                <a16:creationId xmlns:a16="http://schemas.microsoft.com/office/drawing/2014/main" id="{69D78B72-CFD0-4AE3-8CBE-2226A85F6A23}"/>
+                <a16:creationId xmlns:a16="http://schemas.microsoft.com/office/drawing/2014/main" id="{0341BF6B-1DD5-4499-A7F3-A34FCF6500EB}"/>
               </a:ext>
             </a:extLst>
           </p:cNvPr>
@@ -13457,7 +13627,7 @@
             <a:spLocks noGrp="1"/>
           </p:cNvSpPr>
           <p:nvPr>
-            <p:ph sz="half" idx="1"/>
+            <p:ph idx="1"/>
           </p:nvPr>
         </p:nvSpPr>
         <p:spPr/>
@@ -13465,39 +13635,35 @@
           <a:bodyPr/>
           <a:lstStyle/>
           <a:p>
-            <a:endParaRPr lang="en-US"/>
-          </a:p>
-        </p:txBody>
-      </p:sp>
-      <p:sp>
-        <p:nvSpPr>
-          <p:cNvPr id="4" name="Content Placeholder 3">
-            <a:extLst>
-              <a:ext uri="{FF2B5EF4-FFF2-40B4-BE49-F238E27FC236}">
-                <a16:creationId xmlns:a16="http://schemas.microsoft.com/office/drawing/2014/main" id="{E733743C-EAF7-4DE6-8B8F-A916C4D2A728}"/>
-              </a:ext>
-            </a:extLst>
-          </p:cNvPr>
-          <p:cNvSpPr>
-            <a:spLocks noGrp="1"/>
-          </p:cNvSpPr>
-          <p:nvPr>
-            <p:ph sz="half" idx="2"/>
-          </p:nvPr>
-        </p:nvSpPr>
-        <p:spPr/>
-        <p:txBody>
-          <a:bodyPr/>
-          <a:lstStyle/>
-          <a:p>
-            <a:endParaRPr lang="en-US"/>
+            <a:r>
+              <a:rPr lang="en-US" dirty="0"/>
+              <a:t>We’ll provide the application</a:t>
+            </a:r>
+          </a:p>
+          <a:p>
+            <a:r>
+              <a:rPr lang="en-US" dirty="0"/>
+              <a:t>Deployment</a:t>
+            </a:r>
+          </a:p>
+          <a:p>
+            <a:r>
+              <a:rPr lang="en-US" dirty="0"/>
+              <a:t>NOC Integration</a:t>
+            </a:r>
+          </a:p>
+          <a:p>
+            <a:r>
+              <a:rPr lang="en-US" dirty="0"/>
+              <a:t>Proposals</a:t>
+            </a:r>
           </a:p>
         </p:txBody>
       </p:sp>
     </p:spTree>
     <p:extLst>
       <p:ext uri="{BB962C8B-B14F-4D97-AF65-F5344CB8AC3E}">
-        <p14:creationId xmlns:p14="http://schemas.microsoft.com/office/powerpoint/2010/main" val="3732569273"/>
+        <p14:creationId xmlns:p14="http://schemas.microsoft.com/office/powerpoint/2010/main" val="3976924198"/>
       </p:ext>
     </p:extLst>
   </p:cSld>
@@ -13541,7 +13707,7 @@
           <a:p>
             <a:r>
               <a:rPr lang="en-US" dirty="0"/>
-              <a:t>Functional Concerns</a:t>
+              <a:t>Demo Requirements:  The Application</a:t>
             </a:r>
           </a:p>
         </p:txBody>
@@ -13559,91 +13725,33 @@
         <p:spPr/>
         <p:txBody>
           <a:bodyPr>
-            <a:normAutofit fontScale="62500" lnSpcReduction="20000"/>
+            <a:normAutofit/>
           </a:bodyPr>
           <a:lstStyle/>
           <a:p>
             <a:r>
               <a:rPr lang="en-US" dirty="0"/>
-              <a:t>Automatic Scaling</a:t>
+              <a:t>We will provide a simple app to Containerize</a:t>
             </a:r>
           </a:p>
           <a:p>
             <a:r>
               <a:rPr lang="en-US" dirty="0"/>
-              <a:t>Authentication / Authorization</a:t>
-            </a:r>
-          </a:p>
-          <a:p>
+              <a:t>The app will have two dependencies</a:t>
+            </a:r>
+          </a:p>
+          <a:p>
+            <a:pPr lvl="1"/>
             <a:r>
               <a:rPr lang="en-US" dirty="0"/>
-              <a:t>Clustering</a:t>
-            </a:r>
-          </a:p>
-          <a:p>
+              <a:t>Database</a:t>
+            </a:r>
+          </a:p>
+          <a:p>
+            <a:pPr lvl="1"/>
             <a:r>
               <a:rPr lang="en-US" dirty="0"/>
-              <a:t>Copy Control</a:t>
-            </a:r>
-          </a:p>
-          <a:p>
-            <a:r>
-              <a:rPr lang="en-US" dirty="0"/>
-              <a:t>Deployment</a:t>
-            </a:r>
-          </a:p>
-          <a:p>
-            <a:r>
-              <a:rPr lang="en-US" dirty="0"/>
-              <a:t>Desktop Support</a:t>
-            </a:r>
-          </a:p>
-          <a:p>
-            <a:r>
-              <a:rPr lang="en-US" dirty="0"/>
-              <a:t>Health Monitoring</a:t>
-            </a:r>
-          </a:p>
-          <a:p>
-            <a:r>
-              <a:rPr lang="en-US" dirty="0"/>
-              <a:t>High Availability</a:t>
-            </a:r>
-          </a:p>
-          <a:p>
-            <a:r>
-              <a:rPr lang="en-US" dirty="0"/>
-              <a:t>Log Management</a:t>
-            </a:r>
-          </a:p>
-          <a:p>
-            <a:r>
-              <a:rPr lang="en-US" dirty="0"/>
-              <a:t>Management</a:t>
-            </a:r>
-          </a:p>
-          <a:p>
-            <a:r>
-              <a:rPr lang="en-US" dirty="0"/>
-              <a:t>Network Isolation for Testing</a:t>
-            </a:r>
-          </a:p>
-          <a:p>
-            <a:r>
-              <a:rPr lang="en-US" dirty="0"/>
-              <a:t>Orchestration</a:t>
-            </a:r>
-          </a:p>
-          <a:p>
-            <a:r>
-              <a:rPr lang="en-US" dirty="0"/>
-              <a:t>Resource Allocation</a:t>
-            </a:r>
-          </a:p>
-          <a:p>
-            <a:r>
-              <a:rPr lang="en-US" dirty="0"/>
-              <a:t>Security</a:t>
+              <a:t>Messaging</a:t>
             </a:r>
           </a:p>
         </p:txBody>
@@ -13651,7 +13759,7 @@
     </p:spTree>
     <p:extLst>
       <p:ext uri="{BB962C8B-B14F-4D97-AF65-F5344CB8AC3E}">
-        <p14:creationId xmlns:p14="http://schemas.microsoft.com/office/powerpoint/2010/main" val="2896554746"/>
+        <p14:creationId xmlns:p14="http://schemas.microsoft.com/office/powerpoint/2010/main" val="1204616855"/>
       </p:ext>
     </p:extLst>
   </p:cSld>

</xml_diff>

<commit_message>
Getting close to a final version.
</commit_message>
<xml_diff>
--- a/presentation.pptx
+++ b/presentation.pptx
@@ -5,26 +5,29 @@
     <p:sldMasterId id="2147483660" r:id="rId1"/>
   </p:sldMasterIdLst>
   <p:notesMasterIdLst>
-    <p:notesMasterId r:id="rId19"/>
+    <p:notesMasterId r:id="rId22"/>
   </p:notesMasterIdLst>
   <p:sldIdLst>
     <p:sldId id="256" r:id="rId2"/>
-    <p:sldId id="299" r:id="rId3"/>
-    <p:sldId id="283" r:id="rId4"/>
-    <p:sldId id="297" r:id="rId5"/>
-    <p:sldId id="268" r:id="rId6"/>
-    <p:sldId id="287" r:id="rId7"/>
-    <p:sldId id="300" r:id="rId8"/>
-    <p:sldId id="304" r:id="rId9"/>
-    <p:sldId id="288" r:id="rId10"/>
-    <p:sldId id="301" r:id="rId11"/>
-    <p:sldId id="302" r:id="rId12"/>
-    <p:sldId id="303" r:id="rId13"/>
-    <p:sldId id="270" r:id="rId14"/>
-    <p:sldId id="292" r:id="rId15"/>
-    <p:sldId id="285" r:id="rId16"/>
-    <p:sldId id="294" r:id="rId17"/>
-    <p:sldId id="296" r:id="rId18"/>
+    <p:sldId id="305" r:id="rId3"/>
+    <p:sldId id="299" r:id="rId4"/>
+    <p:sldId id="283" r:id="rId5"/>
+    <p:sldId id="297" r:id="rId6"/>
+    <p:sldId id="268" r:id="rId7"/>
+    <p:sldId id="287" r:id="rId8"/>
+    <p:sldId id="300" r:id="rId9"/>
+    <p:sldId id="304" r:id="rId10"/>
+    <p:sldId id="306" r:id="rId11"/>
+    <p:sldId id="288" r:id="rId12"/>
+    <p:sldId id="301" r:id="rId13"/>
+    <p:sldId id="302" r:id="rId14"/>
+    <p:sldId id="303" r:id="rId15"/>
+    <p:sldId id="270" r:id="rId16"/>
+    <p:sldId id="292" r:id="rId17"/>
+    <p:sldId id="285" r:id="rId18"/>
+    <p:sldId id="307" r:id="rId19"/>
+    <p:sldId id="294" r:id="rId20"/>
+    <p:sldId id="296" r:id="rId21"/>
   </p:sldIdLst>
   <p:sldSz cx="12192000" cy="6858000"/>
   <p:notesSz cx="7010400" cy="9296400"/>
@@ -129,6 +132,7 @@
         <p14:section name="Introduction" id="{A4A0009D-2884-49C7-B877-44806784A7E8}">
           <p14:sldIdLst>
             <p14:sldId id="256"/>
+            <p14:sldId id="305"/>
             <p14:sldId id="299"/>
             <p14:sldId id="283"/>
             <p14:sldId id="297"/>
@@ -140,6 +144,7 @@
             <p14:sldId id="287"/>
             <p14:sldId id="300"/>
             <p14:sldId id="304"/>
+            <p14:sldId id="306"/>
             <p14:sldId id="288"/>
             <p14:sldId id="301"/>
             <p14:sldId id="302"/>
@@ -155,6 +160,7 @@
         <p14:section name="Phase Three" id="{3CAB7255-7660-46F2-BE7A-D1A02E6768A0}">
           <p14:sldIdLst>
             <p14:sldId id="285"/>
+            <p14:sldId id="307"/>
             <p14:sldId id="294"/>
           </p14:sldIdLst>
         </p14:section>
@@ -3464,6 +3470,279 @@
           <a:bodyPr/>
           <a:lstStyle/>
           <a:p>
+            <a:endParaRPr lang="en-US" dirty="0"/>
+          </a:p>
+        </p:txBody>
+      </p:sp>
+      <p:sp>
+        <p:nvSpPr>
+          <p:cNvPr id="4" name="Slide Number Placeholder 3"/>
+          <p:cNvSpPr>
+            <a:spLocks noGrp="1"/>
+          </p:cNvSpPr>
+          <p:nvPr>
+            <p:ph type="sldNum" sz="quarter" idx="5"/>
+          </p:nvPr>
+        </p:nvSpPr>
+        <p:spPr/>
+        <p:txBody>
+          <a:bodyPr/>
+          <a:lstStyle/>
+          <a:p>
+            <a:fld id="{7C432B12-1722-4EDC-9BBA-25A0F0A334AF}" type="slidenum">
+              <a:rPr lang="en-US" smtClean="0"/>
+              <a:t>1</a:t>
+            </a:fld>
+            <a:endParaRPr lang="en-US"/>
+          </a:p>
+        </p:txBody>
+      </p:sp>
+    </p:spTree>
+    <p:extLst>
+      <p:ext uri="{BB962C8B-B14F-4D97-AF65-F5344CB8AC3E}">
+        <p14:creationId xmlns:p14="http://schemas.microsoft.com/office/powerpoint/2010/main" val="1062548195"/>
+      </p:ext>
+    </p:extLst>
+  </p:cSld>
+  <p:clrMapOvr>
+    <a:masterClrMapping/>
+  </p:clrMapOvr>
+</p:notes>
+</file>
+
+<file path=ppt/notesSlides/notesSlide10.xml><?xml version="1.0" encoding="utf-8"?>
+<p:notes xmlns:a="http://schemas.openxmlformats.org/drawingml/2006/main" xmlns:r="http://schemas.openxmlformats.org/officeDocument/2006/relationships" xmlns:p="http://schemas.openxmlformats.org/presentationml/2006/main">
+  <p:cSld>
+    <p:spTree>
+      <p:nvGrpSpPr>
+        <p:cNvPr id="1" name=""/>
+        <p:cNvGrpSpPr/>
+        <p:nvPr/>
+      </p:nvGrpSpPr>
+      <p:grpSpPr>
+        <a:xfrm>
+          <a:off x="0" y="0"/>
+          <a:ext cx="0" cy="0"/>
+          <a:chOff x="0" y="0"/>
+          <a:chExt cx="0" cy="0"/>
+        </a:xfrm>
+      </p:grpSpPr>
+      <p:sp>
+        <p:nvSpPr>
+          <p:cNvPr id="2" name="Slide Image Placeholder 1"/>
+          <p:cNvSpPr>
+            <a:spLocks noGrp="1" noRot="1" noChangeAspect="1"/>
+          </p:cNvSpPr>
+          <p:nvPr>
+            <p:ph type="sldImg"/>
+          </p:nvPr>
+        </p:nvSpPr>
+        <p:spPr/>
+      </p:sp>
+      <p:sp>
+        <p:nvSpPr>
+          <p:cNvPr id="3" name="Notes Placeholder 2"/>
+          <p:cNvSpPr>
+            <a:spLocks noGrp="1"/>
+          </p:cNvSpPr>
+          <p:nvPr>
+            <p:ph type="body" idx="1"/>
+          </p:nvPr>
+        </p:nvSpPr>
+        <p:spPr/>
+        <p:txBody>
+          <a:bodyPr/>
+          <a:lstStyle/>
+          <a:p>
+            <a:r>
+              <a:rPr lang="en-US" dirty="0"/>
+              <a:t>We understand how our requirements our met</a:t>
+            </a:r>
+          </a:p>
+          <a:p>
+            <a:endParaRPr lang="en-US" dirty="0"/>
+          </a:p>
+          <a:p>
+            <a:r>
+              <a:rPr lang="en-US" dirty="0"/>
+              <a:t>Our teams have had their hands on the solutions</a:t>
+            </a:r>
+          </a:p>
+          <a:p>
+            <a:endParaRPr lang="en-US" dirty="0"/>
+          </a:p>
+          <a:p>
+            <a:r>
+              <a:rPr lang="en-US" dirty="0"/>
+              <a:t>We can better estimate phases two and three</a:t>
+            </a:r>
+          </a:p>
+        </p:txBody>
+      </p:sp>
+      <p:sp>
+        <p:nvSpPr>
+          <p:cNvPr id="4" name="Slide Number Placeholder 3"/>
+          <p:cNvSpPr>
+            <a:spLocks noGrp="1"/>
+          </p:cNvSpPr>
+          <p:nvPr>
+            <p:ph type="sldNum" sz="quarter" idx="5"/>
+          </p:nvPr>
+        </p:nvSpPr>
+        <p:spPr/>
+        <p:txBody>
+          <a:bodyPr/>
+          <a:lstStyle/>
+          <a:p>
+            <a:fld id="{7C432B12-1722-4EDC-9BBA-25A0F0A334AF}" type="slidenum">
+              <a:rPr lang="en-US" smtClean="0"/>
+              <a:t>10</a:t>
+            </a:fld>
+            <a:endParaRPr lang="en-US"/>
+          </a:p>
+        </p:txBody>
+      </p:sp>
+    </p:spTree>
+    <p:extLst>
+      <p:ext uri="{BB962C8B-B14F-4D97-AF65-F5344CB8AC3E}">
+        <p14:creationId xmlns:p14="http://schemas.microsoft.com/office/powerpoint/2010/main" val="3781457553"/>
+      </p:ext>
+    </p:extLst>
+  </p:cSld>
+  <p:clrMapOvr>
+    <a:masterClrMapping/>
+  </p:clrMapOvr>
+</p:notes>
+</file>
+
+<file path=ppt/notesSlides/notesSlide11.xml><?xml version="1.0" encoding="utf-8"?>
+<p:notes xmlns:a="http://schemas.openxmlformats.org/drawingml/2006/main" xmlns:r="http://schemas.openxmlformats.org/officeDocument/2006/relationships" xmlns:p="http://schemas.openxmlformats.org/presentationml/2006/main">
+  <p:cSld>
+    <p:spTree>
+      <p:nvGrpSpPr>
+        <p:cNvPr id="1" name=""/>
+        <p:cNvGrpSpPr/>
+        <p:nvPr/>
+      </p:nvGrpSpPr>
+      <p:grpSpPr>
+        <a:xfrm>
+          <a:off x="0" y="0"/>
+          <a:ext cx="0" cy="0"/>
+          <a:chOff x="0" y="0"/>
+          <a:chExt cx="0" cy="0"/>
+        </a:xfrm>
+      </p:grpSpPr>
+      <p:sp>
+        <p:nvSpPr>
+          <p:cNvPr id="2" name="Slide Image Placeholder 1"/>
+          <p:cNvSpPr>
+            <a:spLocks noGrp="1" noRot="1" noChangeAspect="1"/>
+          </p:cNvSpPr>
+          <p:nvPr>
+            <p:ph type="sldImg"/>
+          </p:nvPr>
+        </p:nvSpPr>
+        <p:spPr/>
+      </p:sp>
+      <p:sp>
+        <p:nvSpPr>
+          <p:cNvPr id="3" name="Notes Placeholder 2"/>
+          <p:cNvSpPr>
+            <a:spLocks noGrp="1"/>
+          </p:cNvSpPr>
+          <p:nvPr>
+            <p:ph type="body" idx="1"/>
+          </p:nvPr>
+        </p:nvSpPr>
+        <p:spPr/>
+        <p:txBody>
+          <a:bodyPr/>
+          <a:lstStyle/>
+          <a:p>
+            <a:endParaRPr lang="en-US"/>
+          </a:p>
+        </p:txBody>
+      </p:sp>
+      <p:sp>
+        <p:nvSpPr>
+          <p:cNvPr id="4" name="Slide Number Placeholder 3"/>
+          <p:cNvSpPr>
+            <a:spLocks noGrp="1"/>
+          </p:cNvSpPr>
+          <p:nvPr>
+            <p:ph type="sldNum" sz="quarter" idx="5"/>
+          </p:nvPr>
+        </p:nvSpPr>
+        <p:spPr/>
+        <p:txBody>
+          <a:bodyPr/>
+          <a:lstStyle/>
+          <a:p>
+            <a:fld id="{7C432B12-1722-4EDC-9BBA-25A0F0A334AF}" type="slidenum">
+              <a:rPr lang="en-US" smtClean="0"/>
+              <a:t>11</a:t>
+            </a:fld>
+            <a:endParaRPr lang="en-US"/>
+          </a:p>
+        </p:txBody>
+      </p:sp>
+    </p:spTree>
+    <p:extLst>
+      <p:ext uri="{BB962C8B-B14F-4D97-AF65-F5344CB8AC3E}">
+        <p14:creationId xmlns:p14="http://schemas.microsoft.com/office/powerpoint/2010/main" val="561352092"/>
+      </p:ext>
+    </p:extLst>
+  </p:cSld>
+  <p:clrMapOvr>
+    <a:masterClrMapping/>
+  </p:clrMapOvr>
+</p:notes>
+</file>
+
+<file path=ppt/notesSlides/notesSlide12.xml><?xml version="1.0" encoding="utf-8"?>
+<p:notes xmlns:a="http://schemas.openxmlformats.org/drawingml/2006/main" xmlns:r="http://schemas.openxmlformats.org/officeDocument/2006/relationships" xmlns:p="http://schemas.openxmlformats.org/presentationml/2006/main">
+  <p:cSld>
+    <p:spTree>
+      <p:nvGrpSpPr>
+        <p:cNvPr id="1" name=""/>
+        <p:cNvGrpSpPr/>
+        <p:nvPr/>
+      </p:nvGrpSpPr>
+      <p:grpSpPr>
+        <a:xfrm>
+          <a:off x="0" y="0"/>
+          <a:ext cx="0" cy="0"/>
+          <a:chOff x="0" y="0"/>
+          <a:chExt cx="0" cy="0"/>
+        </a:xfrm>
+      </p:grpSpPr>
+      <p:sp>
+        <p:nvSpPr>
+          <p:cNvPr id="2" name="Slide Image Placeholder 1"/>
+          <p:cNvSpPr>
+            <a:spLocks noGrp="1" noRot="1" noChangeAspect="1"/>
+          </p:cNvSpPr>
+          <p:nvPr>
+            <p:ph type="sldImg"/>
+          </p:nvPr>
+        </p:nvSpPr>
+        <p:spPr/>
+      </p:sp>
+      <p:sp>
+        <p:nvSpPr>
+          <p:cNvPr id="3" name="Notes Placeholder 2"/>
+          <p:cNvSpPr>
+            <a:spLocks noGrp="1"/>
+          </p:cNvSpPr>
+          <p:nvPr>
+            <p:ph type="body" idx="1"/>
+          </p:nvPr>
+        </p:nvSpPr>
+        <p:spPr/>
+        <p:txBody>
+          <a:bodyPr/>
+          <a:lstStyle/>
+          <a:p>
             <a:r>
               <a:rPr lang="en-US" dirty="0"/>
               <a:t>These applications are provided by vendors.</a:t>
@@ -3515,7 +3794,7 @@
           <a:p>
             <a:fld id="{7C432B12-1722-4EDC-9BBA-25A0F0A334AF}" type="slidenum">
               <a:rPr lang="en-US" smtClean="0"/>
-              <a:t>13</a:t>
+              <a:t>15</a:t>
             </a:fld>
             <a:endParaRPr lang="en-US"/>
           </a:p>
@@ -3525,6 +3804,285 @@
     <p:extLst>
       <p:ext uri="{BB962C8B-B14F-4D97-AF65-F5344CB8AC3E}">
         <p14:creationId xmlns:p14="http://schemas.microsoft.com/office/powerpoint/2010/main" val="2887644830"/>
+      </p:ext>
+    </p:extLst>
+  </p:cSld>
+  <p:clrMapOvr>
+    <a:masterClrMapping/>
+  </p:clrMapOvr>
+</p:notes>
+</file>
+
+<file path=ppt/notesSlides/notesSlide13.xml><?xml version="1.0" encoding="utf-8"?>
+<p:notes xmlns:a="http://schemas.openxmlformats.org/drawingml/2006/main" xmlns:r="http://schemas.openxmlformats.org/officeDocument/2006/relationships" xmlns:p="http://schemas.openxmlformats.org/presentationml/2006/main">
+  <p:cSld>
+    <p:spTree>
+      <p:nvGrpSpPr>
+        <p:cNvPr id="1" name=""/>
+        <p:cNvGrpSpPr/>
+        <p:nvPr/>
+      </p:nvGrpSpPr>
+      <p:grpSpPr>
+        <a:xfrm>
+          <a:off x="0" y="0"/>
+          <a:ext cx="0" cy="0"/>
+          <a:chOff x="0" y="0"/>
+          <a:chExt cx="0" cy="0"/>
+        </a:xfrm>
+      </p:grpSpPr>
+      <p:sp>
+        <p:nvSpPr>
+          <p:cNvPr id="2" name="Slide Image Placeholder 1"/>
+          <p:cNvSpPr>
+            <a:spLocks noGrp="1" noRot="1" noChangeAspect="1"/>
+          </p:cNvSpPr>
+          <p:nvPr>
+            <p:ph type="sldImg"/>
+          </p:nvPr>
+        </p:nvSpPr>
+        <p:spPr/>
+      </p:sp>
+      <p:sp>
+        <p:nvSpPr>
+          <p:cNvPr id="3" name="Notes Placeholder 2"/>
+          <p:cNvSpPr>
+            <a:spLocks noGrp="1"/>
+          </p:cNvSpPr>
+          <p:nvPr>
+            <p:ph type="body" idx="1"/>
+          </p:nvPr>
+        </p:nvSpPr>
+        <p:spPr/>
+        <p:txBody>
+          <a:bodyPr/>
+          <a:lstStyle/>
+          <a:p>
+            <a:r>
+              <a:rPr lang="en-US" dirty="0"/>
+              <a:t>There will be costs</a:t>
+            </a:r>
+          </a:p>
+          <a:p>
+            <a:endParaRPr lang="en-US" dirty="0"/>
+          </a:p>
+          <a:p>
+            <a:r>
+              <a:rPr lang="en-US" dirty="0"/>
+              <a:t>We expect to engage a vendor to do this</a:t>
+            </a:r>
+          </a:p>
+          <a:p>
+            <a:endParaRPr lang="en-US" dirty="0"/>
+          </a:p>
+          <a:p>
+            <a:r>
+              <a:rPr lang="en-US" dirty="0"/>
+              <a:t>We want to leverage vendor time</a:t>
+            </a:r>
+          </a:p>
+        </p:txBody>
+      </p:sp>
+      <p:sp>
+        <p:nvSpPr>
+          <p:cNvPr id="4" name="Slide Number Placeholder 3"/>
+          <p:cNvSpPr>
+            <a:spLocks noGrp="1"/>
+          </p:cNvSpPr>
+          <p:nvPr>
+            <p:ph type="sldNum" sz="quarter" idx="5"/>
+          </p:nvPr>
+        </p:nvSpPr>
+        <p:spPr/>
+        <p:txBody>
+          <a:bodyPr/>
+          <a:lstStyle/>
+          <a:p>
+            <a:fld id="{7C432B12-1722-4EDC-9BBA-25A0F0A334AF}" type="slidenum">
+              <a:rPr lang="en-US" smtClean="0"/>
+              <a:t>17</a:t>
+            </a:fld>
+            <a:endParaRPr lang="en-US"/>
+          </a:p>
+        </p:txBody>
+      </p:sp>
+    </p:spTree>
+    <p:extLst>
+      <p:ext uri="{BB962C8B-B14F-4D97-AF65-F5344CB8AC3E}">
+        <p14:creationId xmlns:p14="http://schemas.microsoft.com/office/powerpoint/2010/main" val="1734567867"/>
+      </p:ext>
+    </p:extLst>
+  </p:cSld>
+  <p:clrMapOvr>
+    <a:masterClrMapping/>
+  </p:clrMapOvr>
+</p:notes>
+</file>
+
+<file path=ppt/notesSlides/notesSlide14.xml><?xml version="1.0" encoding="utf-8"?>
+<p:notes xmlns:a="http://schemas.openxmlformats.org/drawingml/2006/main" xmlns:r="http://schemas.openxmlformats.org/officeDocument/2006/relationships" xmlns:p="http://schemas.openxmlformats.org/presentationml/2006/main">
+  <p:cSld>
+    <p:spTree>
+      <p:nvGrpSpPr>
+        <p:cNvPr id="1" name=""/>
+        <p:cNvGrpSpPr/>
+        <p:nvPr/>
+      </p:nvGrpSpPr>
+      <p:grpSpPr>
+        <a:xfrm>
+          <a:off x="0" y="0"/>
+          <a:ext cx="0" cy="0"/>
+          <a:chOff x="0" y="0"/>
+          <a:chExt cx="0" cy="0"/>
+        </a:xfrm>
+      </p:grpSpPr>
+      <p:sp>
+        <p:nvSpPr>
+          <p:cNvPr id="2" name="Slide Image Placeholder 1"/>
+          <p:cNvSpPr>
+            <a:spLocks noGrp="1" noRot="1" noChangeAspect="1"/>
+          </p:cNvSpPr>
+          <p:nvPr>
+            <p:ph type="sldImg"/>
+          </p:nvPr>
+        </p:nvSpPr>
+        <p:spPr/>
+      </p:sp>
+      <p:sp>
+        <p:nvSpPr>
+          <p:cNvPr id="3" name="Notes Placeholder 2"/>
+          <p:cNvSpPr>
+            <a:spLocks noGrp="1"/>
+          </p:cNvSpPr>
+          <p:nvPr>
+            <p:ph type="body" idx="1"/>
+          </p:nvPr>
+        </p:nvSpPr>
+        <p:spPr/>
+        <p:txBody>
+          <a:bodyPr/>
+          <a:lstStyle/>
+          <a:p>
+            <a:r>
+              <a:rPr lang="en-US" dirty="0"/>
+              <a:t>Push people into the pit of success</a:t>
+            </a:r>
+          </a:p>
+        </p:txBody>
+      </p:sp>
+      <p:sp>
+        <p:nvSpPr>
+          <p:cNvPr id="4" name="Slide Number Placeholder 3"/>
+          <p:cNvSpPr>
+            <a:spLocks noGrp="1"/>
+          </p:cNvSpPr>
+          <p:nvPr>
+            <p:ph type="sldNum" sz="quarter" idx="5"/>
+          </p:nvPr>
+        </p:nvSpPr>
+        <p:spPr/>
+        <p:txBody>
+          <a:bodyPr/>
+          <a:lstStyle/>
+          <a:p>
+            <a:fld id="{7C432B12-1722-4EDC-9BBA-25A0F0A334AF}" type="slidenum">
+              <a:rPr lang="en-US" smtClean="0"/>
+              <a:t>18</a:t>
+            </a:fld>
+            <a:endParaRPr lang="en-US"/>
+          </a:p>
+        </p:txBody>
+      </p:sp>
+    </p:spTree>
+    <p:extLst>
+      <p:ext uri="{BB962C8B-B14F-4D97-AF65-F5344CB8AC3E}">
+        <p14:creationId xmlns:p14="http://schemas.microsoft.com/office/powerpoint/2010/main" val="1250559668"/>
+      </p:ext>
+    </p:extLst>
+  </p:cSld>
+  <p:clrMapOvr>
+    <a:masterClrMapping/>
+  </p:clrMapOvr>
+</p:notes>
+</file>
+
+<file path=ppt/notesSlides/notesSlide15.xml><?xml version="1.0" encoding="utf-8"?>
+<p:notes xmlns:a="http://schemas.openxmlformats.org/drawingml/2006/main" xmlns:r="http://schemas.openxmlformats.org/officeDocument/2006/relationships" xmlns:p="http://schemas.openxmlformats.org/presentationml/2006/main">
+  <p:cSld>
+    <p:spTree>
+      <p:nvGrpSpPr>
+        <p:cNvPr id="1" name=""/>
+        <p:cNvGrpSpPr/>
+        <p:nvPr/>
+      </p:nvGrpSpPr>
+      <p:grpSpPr>
+        <a:xfrm>
+          <a:off x="0" y="0"/>
+          <a:ext cx="0" cy="0"/>
+          <a:chOff x="0" y="0"/>
+          <a:chExt cx="0" cy="0"/>
+        </a:xfrm>
+      </p:grpSpPr>
+      <p:sp>
+        <p:nvSpPr>
+          <p:cNvPr id="2" name="Slide Image Placeholder 1"/>
+          <p:cNvSpPr>
+            <a:spLocks noGrp="1" noRot="1" noChangeAspect="1"/>
+          </p:cNvSpPr>
+          <p:nvPr>
+            <p:ph type="sldImg"/>
+          </p:nvPr>
+        </p:nvSpPr>
+        <p:spPr/>
+      </p:sp>
+      <p:sp>
+        <p:nvSpPr>
+          <p:cNvPr id="3" name="Notes Placeholder 2"/>
+          <p:cNvSpPr>
+            <a:spLocks noGrp="1"/>
+          </p:cNvSpPr>
+          <p:nvPr>
+            <p:ph type="body" idx="1"/>
+          </p:nvPr>
+        </p:nvSpPr>
+        <p:spPr/>
+        <p:txBody>
+          <a:bodyPr/>
+          <a:lstStyle/>
+          <a:p>
+            <a:r>
+              <a:rPr lang="en-US" dirty="0"/>
+              <a:t>Add detailed notes about why this takes so long.</a:t>
+            </a:r>
+          </a:p>
+        </p:txBody>
+      </p:sp>
+      <p:sp>
+        <p:nvSpPr>
+          <p:cNvPr id="4" name="Slide Number Placeholder 3"/>
+          <p:cNvSpPr>
+            <a:spLocks noGrp="1"/>
+          </p:cNvSpPr>
+          <p:nvPr>
+            <p:ph type="sldNum" sz="quarter" idx="5"/>
+          </p:nvPr>
+        </p:nvSpPr>
+        <p:spPr/>
+        <p:txBody>
+          <a:bodyPr/>
+          <a:lstStyle/>
+          <a:p>
+            <a:fld id="{7C432B12-1722-4EDC-9BBA-25A0F0A334AF}" type="slidenum">
+              <a:rPr lang="en-US" smtClean="0"/>
+              <a:t>19</a:t>
+            </a:fld>
+            <a:endParaRPr lang="en-US"/>
+          </a:p>
+        </p:txBody>
+      </p:sp>
+    </p:spTree>
+    <p:extLst>
+      <p:ext uri="{BB962C8B-B14F-4D97-AF65-F5344CB8AC3E}">
+        <p14:creationId xmlns:p14="http://schemas.microsoft.com/office/powerpoint/2010/main" val="852317419"/>
       </p:ext>
     </p:extLst>
   </p:cSld>
@@ -3578,28 +4136,7 @@
           <a:bodyPr/>
           <a:lstStyle/>
           <a:p>
-            <a:r>
-              <a:rPr lang="en-US" dirty="0"/>
-              <a:t>There will be costs</a:t>
-            </a:r>
-          </a:p>
-          <a:p>
             <a:endParaRPr lang="en-US" dirty="0"/>
-          </a:p>
-          <a:p>
-            <a:r>
-              <a:rPr lang="en-US" dirty="0"/>
-              <a:t>We expect to engage a vendor to do this</a:t>
-            </a:r>
-          </a:p>
-          <a:p>
-            <a:endParaRPr lang="en-US" dirty="0"/>
-          </a:p>
-          <a:p>
-            <a:r>
-              <a:rPr lang="en-US" dirty="0"/>
-              <a:t>We want to leverage vendor time</a:t>
-            </a:r>
           </a:p>
         </p:txBody>
       </p:sp>
@@ -3620,7 +4157,7 @@
           <a:p>
             <a:fld id="{7C432B12-1722-4EDC-9BBA-25A0F0A334AF}" type="slidenum">
               <a:rPr lang="en-US" smtClean="0"/>
-              <a:t>15</a:t>
+              <a:t>2</a:t>
             </a:fld>
             <a:endParaRPr lang="en-US"/>
           </a:p>
@@ -3629,7 +4166,7 @@
     </p:spTree>
     <p:extLst>
       <p:ext uri="{BB962C8B-B14F-4D97-AF65-F5344CB8AC3E}">
-        <p14:creationId xmlns:p14="http://schemas.microsoft.com/office/powerpoint/2010/main" val="1734567867"/>
+        <p14:creationId xmlns:p14="http://schemas.microsoft.com/office/powerpoint/2010/main" val="1676236295"/>
       </p:ext>
     </p:extLst>
   </p:cSld>
@@ -3685,7 +4222,7 @@
           <a:p>
             <a:r>
               <a:rPr lang="en-US" dirty="0"/>
-              <a:t>Add detailed notes about why this takes so long.</a:t>
+              <a:t>In fact, we have containers in house today, but we don’t have a long-term plan to manage them for everyone.</a:t>
             </a:r>
           </a:p>
         </p:txBody>
@@ -3707,7 +4244,7 @@
           <a:p>
             <a:fld id="{7C432B12-1722-4EDC-9BBA-25A0F0A334AF}" type="slidenum">
               <a:rPr lang="en-US" smtClean="0"/>
-              <a:t>16</a:t>
+              <a:t>3</a:t>
             </a:fld>
             <a:endParaRPr lang="en-US"/>
           </a:p>
@@ -3716,7 +4253,630 @@
     </p:spTree>
     <p:extLst>
       <p:ext uri="{BB962C8B-B14F-4D97-AF65-F5344CB8AC3E}">
-        <p14:creationId xmlns:p14="http://schemas.microsoft.com/office/powerpoint/2010/main" val="852317419"/>
+        <p14:creationId xmlns:p14="http://schemas.microsoft.com/office/powerpoint/2010/main" val="3590531765"/>
+      </p:ext>
+    </p:extLst>
+  </p:cSld>
+  <p:clrMapOvr>
+    <a:masterClrMapping/>
+  </p:clrMapOvr>
+</p:notes>
+</file>
+
+<file path=ppt/notesSlides/notesSlide4.xml><?xml version="1.0" encoding="utf-8"?>
+<p:notes xmlns:a="http://schemas.openxmlformats.org/drawingml/2006/main" xmlns:r="http://schemas.openxmlformats.org/officeDocument/2006/relationships" xmlns:p="http://schemas.openxmlformats.org/presentationml/2006/main">
+  <p:cSld>
+    <p:spTree>
+      <p:nvGrpSpPr>
+        <p:cNvPr id="1" name=""/>
+        <p:cNvGrpSpPr/>
+        <p:nvPr/>
+      </p:nvGrpSpPr>
+      <p:grpSpPr>
+        <a:xfrm>
+          <a:off x="0" y="0"/>
+          <a:ext cx="0" cy="0"/>
+          <a:chOff x="0" y="0"/>
+          <a:chExt cx="0" cy="0"/>
+        </a:xfrm>
+      </p:grpSpPr>
+      <p:sp>
+        <p:nvSpPr>
+          <p:cNvPr id="2" name="Slide Image Placeholder 1"/>
+          <p:cNvSpPr>
+            <a:spLocks noGrp="1" noRot="1" noChangeAspect="1"/>
+          </p:cNvSpPr>
+          <p:nvPr>
+            <p:ph type="sldImg"/>
+          </p:nvPr>
+        </p:nvSpPr>
+        <p:spPr/>
+      </p:sp>
+      <p:sp>
+        <p:nvSpPr>
+          <p:cNvPr id="3" name="Notes Placeholder 2"/>
+          <p:cNvSpPr>
+            <a:spLocks noGrp="1"/>
+          </p:cNvSpPr>
+          <p:nvPr>
+            <p:ph type="body" idx="1"/>
+          </p:nvPr>
+        </p:nvSpPr>
+        <p:spPr/>
+        <p:txBody>
+          <a:bodyPr/>
+          <a:lstStyle/>
+          <a:p>
+            <a:r>
+              <a:rPr lang="en-US" dirty="0"/>
+              <a:t>Talk about T-Shirt sizing.</a:t>
+            </a:r>
+          </a:p>
+        </p:txBody>
+      </p:sp>
+      <p:sp>
+        <p:nvSpPr>
+          <p:cNvPr id="4" name="Slide Number Placeholder 3"/>
+          <p:cNvSpPr>
+            <a:spLocks noGrp="1"/>
+          </p:cNvSpPr>
+          <p:nvPr>
+            <p:ph type="sldNum" sz="quarter" idx="5"/>
+          </p:nvPr>
+        </p:nvSpPr>
+        <p:spPr/>
+        <p:txBody>
+          <a:bodyPr/>
+          <a:lstStyle/>
+          <a:p>
+            <a:fld id="{7C432B12-1722-4EDC-9BBA-25A0F0A334AF}" type="slidenum">
+              <a:rPr lang="en-US" smtClean="0"/>
+              <a:t>4</a:t>
+            </a:fld>
+            <a:endParaRPr lang="en-US"/>
+          </a:p>
+        </p:txBody>
+      </p:sp>
+    </p:spTree>
+    <p:extLst>
+      <p:ext uri="{BB962C8B-B14F-4D97-AF65-F5344CB8AC3E}">
+        <p14:creationId xmlns:p14="http://schemas.microsoft.com/office/powerpoint/2010/main" val="238305557"/>
+      </p:ext>
+    </p:extLst>
+  </p:cSld>
+  <p:clrMapOvr>
+    <a:masterClrMapping/>
+  </p:clrMapOvr>
+</p:notes>
+</file>
+
+<file path=ppt/notesSlides/notesSlide5.xml><?xml version="1.0" encoding="utf-8"?>
+<p:notes xmlns:a="http://schemas.openxmlformats.org/drawingml/2006/main" xmlns:r="http://schemas.openxmlformats.org/officeDocument/2006/relationships" xmlns:p="http://schemas.openxmlformats.org/presentationml/2006/main">
+  <p:cSld>
+    <p:spTree>
+      <p:nvGrpSpPr>
+        <p:cNvPr id="1" name=""/>
+        <p:cNvGrpSpPr/>
+        <p:nvPr/>
+      </p:nvGrpSpPr>
+      <p:grpSpPr>
+        <a:xfrm>
+          <a:off x="0" y="0"/>
+          <a:ext cx="0" cy="0"/>
+          <a:chOff x="0" y="0"/>
+          <a:chExt cx="0" cy="0"/>
+        </a:xfrm>
+      </p:grpSpPr>
+      <p:sp>
+        <p:nvSpPr>
+          <p:cNvPr id="2" name="Slide Image Placeholder 1"/>
+          <p:cNvSpPr>
+            <a:spLocks noGrp="1" noRot="1" noChangeAspect="1"/>
+          </p:cNvSpPr>
+          <p:nvPr>
+            <p:ph type="sldImg"/>
+          </p:nvPr>
+        </p:nvSpPr>
+        <p:spPr/>
+      </p:sp>
+      <p:sp>
+        <p:nvSpPr>
+          <p:cNvPr id="3" name="Notes Placeholder 2"/>
+          <p:cNvSpPr>
+            <a:spLocks noGrp="1"/>
+          </p:cNvSpPr>
+          <p:nvPr>
+            <p:ph type="body" idx="1"/>
+          </p:nvPr>
+        </p:nvSpPr>
+        <p:spPr/>
+        <p:txBody>
+          <a:bodyPr/>
+          <a:lstStyle/>
+          <a:p>
+            <a:r>
+              <a:rPr lang="en-US" dirty="0"/>
+              <a:t>Core Team – Will be doing or managing the work</a:t>
+            </a:r>
+          </a:p>
+          <a:p>
+            <a:endParaRPr lang="en-US" dirty="0"/>
+          </a:p>
+          <a:p>
+            <a:r>
+              <a:rPr lang="en-US" dirty="0"/>
+              <a:t>Stakeholders – Wil be consulted during the POC planning phase for their input, and will have an opportunity to get their hands on the environments.</a:t>
+            </a:r>
+          </a:p>
+          <a:p>
+            <a:endParaRPr lang="en-US" dirty="0"/>
+          </a:p>
+          <a:p>
+            <a:r>
+              <a:rPr lang="en-US" dirty="0"/>
+              <a:t>Vendors – Of the vendors in the market, we talked to many and think these three have the most mature offerings</a:t>
+            </a:r>
+          </a:p>
+        </p:txBody>
+      </p:sp>
+      <p:sp>
+        <p:nvSpPr>
+          <p:cNvPr id="4" name="Slide Number Placeholder 3"/>
+          <p:cNvSpPr>
+            <a:spLocks noGrp="1"/>
+          </p:cNvSpPr>
+          <p:nvPr>
+            <p:ph type="sldNum" sz="quarter" idx="5"/>
+          </p:nvPr>
+        </p:nvSpPr>
+        <p:spPr/>
+        <p:txBody>
+          <a:bodyPr/>
+          <a:lstStyle/>
+          <a:p>
+            <a:fld id="{7C432B12-1722-4EDC-9BBA-25A0F0A334AF}" type="slidenum">
+              <a:rPr lang="en-US" smtClean="0"/>
+              <a:t>5</a:t>
+            </a:fld>
+            <a:endParaRPr lang="en-US"/>
+          </a:p>
+        </p:txBody>
+      </p:sp>
+    </p:spTree>
+    <p:extLst>
+      <p:ext uri="{BB962C8B-B14F-4D97-AF65-F5344CB8AC3E}">
+        <p14:creationId xmlns:p14="http://schemas.microsoft.com/office/powerpoint/2010/main" val="1161611953"/>
+      </p:ext>
+    </p:extLst>
+  </p:cSld>
+  <p:clrMapOvr>
+    <a:masterClrMapping/>
+  </p:clrMapOvr>
+</p:notes>
+</file>
+
+<file path=ppt/notesSlides/notesSlide6.xml><?xml version="1.0" encoding="utf-8"?>
+<p:notes xmlns:a="http://schemas.openxmlformats.org/drawingml/2006/main" xmlns:r="http://schemas.openxmlformats.org/officeDocument/2006/relationships" xmlns:p="http://schemas.openxmlformats.org/presentationml/2006/main">
+  <p:cSld>
+    <p:spTree>
+      <p:nvGrpSpPr>
+        <p:cNvPr id="1" name=""/>
+        <p:cNvGrpSpPr/>
+        <p:nvPr/>
+      </p:nvGrpSpPr>
+      <p:grpSpPr>
+        <a:xfrm>
+          <a:off x="0" y="0"/>
+          <a:ext cx="0" cy="0"/>
+          <a:chOff x="0" y="0"/>
+          <a:chExt cx="0" cy="0"/>
+        </a:xfrm>
+      </p:grpSpPr>
+      <p:sp>
+        <p:nvSpPr>
+          <p:cNvPr id="2" name="Slide Image Placeholder 1"/>
+          <p:cNvSpPr>
+            <a:spLocks noGrp="1" noRot="1" noChangeAspect="1"/>
+          </p:cNvSpPr>
+          <p:nvPr>
+            <p:ph type="sldImg"/>
+          </p:nvPr>
+        </p:nvSpPr>
+        <p:spPr/>
+      </p:sp>
+      <p:sp>
+        <p:nvSpPr>
+          <p:cNvPr id="3" name="Notes Placeholder 2"/>
+          <p:cNvSpPr>
+            <a:spLocks noGrp="1"/>
+          </p:cNvSpPr>
+          <p:nvPr>
+            <p:ph type="body" idx="1"/>
+          </p:nvPr>
+        </p:nvSpPr>
+        <p:spPr/>
+        <p:txBody>
+          <a:bodyPr/>
+          <a:lstStyle/>
+          <a:p>
+            <a:r>
+              <a:rPr lang="en-US" dirty="0"/>
+              <a:t>We have had demos with various vendors</a:t>
+            </a:r>
+          </a:p>
+          <a:p>
+            <a:endParaRPr lang="en-US" dirty="0"/>
+          </a:p>
+          <a:p>
+            <a:r>
+              <a:rPr lang="en-US" dirty="0"/>
+              <a:t>We have expressed concerns about security, copy control, license management, </a:t>
+            </a:r>
+            <a:r>
+              <a:rPr lang="en-US" dirty="0" err="1"/>
+              <a:t>etc</a:t>
+            </a:r>
+            <a:r>
+              <a:rPr lang="en-US" dirty="0"/>
+              <a:t>…</a:t>
+            </a:r>
+          </a:p>
+          <a:p>
+            <a:endParaRPr lang="en-US" dirty="0"/>
+          </a:p>
+          <a:p>
+            <a:r>
+              <a:rPr lang="en-US" dirty="0"/>
+              <a:t>Vendors have addressed those concerns verbally</a:t>
+            </a:r>
+          </a:p>
+          <a:p>
+            <a:endParaRPr lang="en-US" dirty="0"/>
+          </a:p>
+          <a:p>
+            <a:r>
+              <a:rPr lang="en-US" dirty="0"/>
+              <a:t>We want those solutions demonstrated</a:t>
+            </a:r>
+          </a:p>
+          <a:p>
+            <a:endParaRPr lang="en-US" dirty="0"/>
+          </a:p>
+          <a:p>
+            <a:r>
+              <a:rPr lang="en-US" dirty="0"/>
+              <a:t>We want to get our hands on the solutions</a:t>
+            </a:r>
+          </a:p>
+        </p:txBody>
+      </p:sp>
+      <p:sp>
+        <p:nvSpPr>
+          <p:cNvPr id="4" name="Slide Number Placeholder 3"/>
+          <p:cNvSpPr>
+            <a:spLocks noGrp="1"/>
+          </p:cNvSpPr>
+          <p:nvPr>
+            <p:ph type="sldNum" sz="quarter" idx="5"/>
+          </p:nvPr>
+        </p:nvSpPr>
+        <p:spPr/>
+        <p:txBody>
+          <a:bodyPr/>
+          <a:lstStyle/>
+          <a:p>
+            <a:fld id="{7C432B12-1722-4EDC-9BBA-25A0F0A334AF}" type="slidenum">
+              <a:rPr lang="en-US" smtClean="0"/>
+              <a:t>6</a:t>
+            </a:fld>
+            <a:endParaRPr lang="en-US"/>
+          </a:p>
+        </p:txBody>
+      </p:sp>
+    </p:spTree>
+    <p:extLst>
+      <p:ext uri="{BB962C8B-B14F-4D97-AF65-F5344CB8AC3E}">
+        <p14:creationId xmlns:p14="http://schemas.microsoft.com/office/powerpoint/2010/main" val="1134747464"/>
+      </p:ext>
+    </p:extLst>
+  </p:cSld>
+  <p:clrMapOvr>
+    <a:masterClrMapping/>
+  </p:clrMapOvr>
+</p:notes>
+</file>
+
+<file path=ppt/notesSlides/notesSlide7.xml><?xml version="1.0" encoding="utf-8"?>
+<p:notes xmlns:a="http://schemas.openxmlformats.org/drawingml/2006/main" xmlns:r="http://schemas.openxmlformats.org/officeDocument/2006/relationships" xmlns:p="http://schemas.openxmlformats.org/presentationml/2006/main">
+  <p:cSld>
+    <p:spTree>
+      <p:nvGrpSpPr>
+        <p:cNvPr id="1" name=""/>
+        <p:cNvGrpSpPr/>
+        <p:nvPr/>
+      </p:nvGrpSpPr>
+      <p:grpSpPr>
+        <a:xfrm>
+          <a:off x="0" y="0"/>
+          <a:ext cx="0" cy="0"/>
+          <a:chOff x="0" y="0"/>
+          <a:chExt cx="0" cy="0"/>
+        </a:xfrm>
+      </p:grpSpPr>
+      <p:sp>
+        <p:nvSpPr>
+          <p:cNvPr id="2" name="Slide Image Placeholder 1"/>
+          <p:cNvSpPr>
+            <a:spLocks noGrp="1" noRot="1" noChangeAspect="1"/>
+          </p:cNvSpPr>
+          <p:nvPr>
+            <p:ph type="sldImg"/>
+          </p:nvPr>
+        </p:nvSpPr>
+        <p:spPr/>
+      </p:sp>
+      <p:sp>
+        <p:nvSpPr>
+          <p:cNvPr id="3" name="Notes Placeholder 2"/>
+          <p:cNvSpPr>
+            <a:spLocks noGrp="1"/>
+          </p:cNvSpPr>
+          <p:nvPr>
+            <p:ph type="body" idx="1"/>
+          </p:nvPr>
+        </p:nvSpPr>
+        <p:spPr/>
+        <p:txBody>
+          <a:bodyPr/>
+          <a:lstStyle/>
+          <a:p>
+            <a:r>
+              <a:rPr lang="en-US" dirty="0"/>
+              <a:t>We’ll present identical requirements to each vendor</a:t>
+            </a:r>
+          </a:p>
+          <a:p>
+            <a:endParaRPr lang="en-US" dirty="0"/>
+          </a:p>
+          <a:p>
+            <a:r>
+              <a:rPr lang="en-US" dirty="0"/>
+              <a:t>We’ll provide the application</a:t>
+            </a:r>
+          </a:p>
+          <a:p>
+            <a:r>
+              <a:rPr lang="en-US" dirty="0"/>
+              <a:t>NOC Integration</a:t>
+            </a:r>
+          </a:p>
+          <a:p>
+            <a:endParaRPr lang="en-US" dirty="0"/>
+          </a:p>
+          <a:p>
+            <a:r>
+              <a:rPr lang="en-US" dirty="0"/>
+              <a:t>We want them to do the demo on our infrastructure</a:t>
+            </a:r>
+          </a:p>
+          <a:p>
+            <a:r>
+              <a:rPr lang="en-US" dirty="0"/>
+              <a:t>We want to keep the environments around for awhile</a:t>
+            </a:r>
+          </a:p>
+          <a:p>
+            <a:r>
+              <a:rPr lang="en-US" dirty="0"/>
+              <a:t>We’ll give environment access to our current container users</a:t>
+            </a:r>
+          </a:p>
+          <a:p>
+            <a:r>
+              <a:rPr lang="en-US" dirty="0"/>
+              <a:t>We’ll try to get this done for free</a:t>
+            </a:r>
+          </a:p>
+          <a:p>
+            <a:endParaRPr lang="en-US" dirty="0"/>
+          </a:p>
+        </p:txBody>
+      </p:sp>
+      <p:sp>
+        <p:nvSpPr>
+          <p:cNvPr id="4" name="Slide Number Placeholder 3"/>
+          <p:cNvSpPr>
+            <a:spLocks noGrp="1"/>
+          </p:cNvSpPr>
+          <p:nvPr>
+            <p:ph type="sldNum" sz="quarter" idx="5"/>
+          </p:nvPr>
+        </p:nvSpPr>
+        <p:spPr/>
+        <p:txBody>
+          <a:bodyPr/>
+          <a:lstStyle/>
+          <a:p>
+            <a:fld id="{7C432B12-1722-4EDC-9BBA-25A0F0A334AF}" type="slidenum">
+              <a:rPr lang="en-US" smtClean="0"/>
+              <a:t>7</a:t>
+            </a:fld>
+            <a:endParaRPr lang="en-US"/>
+          </a:p>
+        </p:txBody>
+      </p:sp>
+    </p:spTree>
+    <p:extLst>
+      <p:ext uri="{BB962C8B-B14F-4D97-AF65-F5344CB8AC3E}">
+        <p14:creationId xmlns:p14="http://schemas.microsoft.com/office/powerpoint/2010/main" val="848292018"/>
+      </p:ext>
+    </p:extLst>
+  </p:cSld>
+  <p:clrMapOvr>
+    <a:masterClrMapping/>
+  </p:clrMapOvr>
+</p:notes>
+</file>
+
+<file path=ppt/notesSlides/notesSlide8.xml><?xml version="1.0" encoding="utf-8"?>
+<p:notes xmlns:a="http://schemas.openxmlformats.org/drawingml/2006/main" xmlns:r="http://schemas.openxmlformats.org/officeDocument/2006/relationships" xmlns:p="http://schemas.openxmlformats.org/presentationml/2006/main">
+  <p:cSld>
+    <p:spTree>
+      <p:nvGrpSpPr>
+        <p:cNvPr id="1" name=""/>
+        <p:cNvGrpSpPr/>
+        <p:nvPr/>
+      </p:nvGrpSpPr>
+      <p:grpSpPr>
+        <a:xfrm>
+          <a:off x="0" y="0"/>
+          <a:ext cx="0" cy="0"/>
+          <a:chOff x="0" y="0"/>
+          <a:chExt cx="0" cy="0"/>
+        </a:xfrm>
+      </p:grpSpPr>
+      <p:sp>
+        <p:nvSpPr>
+          <p:cNvPr id="2" name="Slide Image Placeholder 1"/>
+          <p:cNvSpPr>
+            <a:spLocks noGrp="1" noRot="1" noChangeAspect="1"/>
+          </p:cNvSpPr>
+          <p:nvPr>
+            <p:ph type="sldImg"/>
+          </p:nvPr>
+        </p:nvSpPr>
+        <p:spPr/>
+      </p:sp>
+      <p:sp>
+        <p:nvSpPr>
+          <p:cNvPr id="3" name="Notes Placeholder 2"/>
+          <p:cNvSpPr>
+            <a:spLocks noGrp="1"/>
+          </p:cNvSpPr>
+          <p:nvPr>
+            <p:ph type="body" idx="1"/>
+          </p:nvPr>
+        </p:nvSpPr>
+        <p:spPr/>
+        <p:txBody>
+          <a:bodyPr/>
+          <a:lstStyle/>
+          <a:p>
+            <a:endParaRPr lang="en-US"/>
+          </a:p>
+        </p:txBody>
+      </p:sp>
+      <p:sp>
+        <p:nvSpPr>
+          <p:cNvPr id="4" name="Slide Number Placeholder 3"/>
+          <p:cNvSpPr>
+            <a:spLocks noGrp="1"/>
+          </p:cNvSpPr>
+          <p:nvPr>
+            <p:ph type="sldNum" sz="quarter" idx="5"/>
+          </p:nvPr>
+        </p:nvSpPr>
+        <p:spPr/>
+        <p:txBody>
+          <a:bodyPr/>
+          <a:lstStyle/>
+          <a:p>
+            <a:fld id="{7C432B12-1722-4EDC-9BBA-25A0F0A334AF}" type="slidenum">
+              <a:rPr lang="en-US" smtClean="0"/>
+              <a:t>8</a:t>
+            </a:fld>
+            <a:endParaRPr lang="en-US"/>
+          </a:p>
+        </p:txBody>
+      </p:sp>
+    </p:spTree>
+    <p:extLst>
+      <p:ext uri="{BB962C8B-B14F-4D97-AF65-F5344CB8AC3E}">
+        <p14:creationId xmlns:p14="http://schemas.microsoft.com/office/powerpoint/2010/main" val="1362973388"/>
+      </p:ext>
+    </p:extLst>
+  </p:cSld>
+  <p:clrMapOvr>
+    <a:masterClrMapping/>
+  </p:clrMapOvr>
+</p:notes>
+</file>
+
+<file path=ppt/notesSlides/notesSlide9.xml><?xml version="1.0" encoding="utf-8"?>
+<p:notes xmlns:a="http://schemas.openxmlformats.org/drawingml/2006/main" xmlns:r="http://schemas.openxmlformats.org/officeDocument/2006/relationships" xmlns:p="http://schemas.openxmlformats.org/presentationml/2006/main">
+  <p:cSld>
+    <p:spTree>
+      <p:nvGrpSpPr>
+        <p:cNvPr id="1" name=""/>
+        <p:cNvGrpSpPr/>
+        <p:nvPr/>
+      </p:nvGrpSpPr>
+      <p:grpSpPr>
+        <a:xfrm>
+          <a:off x="0" y="0"/>
+          <a:ext cx="0" cy="0"/>
+          <a:chOff x="0" y="0"/>
+          <a:chExt cx="0" cy="0"/>
+        </a:xfrm>
+      </p:grpSpPr>
+      <p:sp>
+        <p:nvSpPr>
+          <p:cNvPr id="2" name="Slide Image Placeholder 1"/>
+          <p:cNvSpPr>
+            <a:spLocks noGrp="1" noRot="1" noChangeAspect="1"/>
+          </p:cNvSpPr>
+          <p:nvPr>
+            <p:ph type="sldImg"/>
+          </p:nvPr>
+        </p:nvSpPr>
+        <p:spPr/>
+      </p:sp>
+      <p:sp>
+        <p:nvSpPr>
+          <p:cNvPr id="3" name="Notes Placeholder 2"/>
+          <p:cNvSpPr>
+            <a:spLocks noGrp="1"/>
+          </p:cNvSpPr>
+          <p:nvPr>
+            <p:ph type="body" idx="1"/>
+          </p:nvPr>
+        </p:nvSpPr>
+        <p:spPr/>
+        <p:txBody>
+          <a:bodyPr/>
+          <a:lstStyle/>
+          <a:p>
+            <a:endParaRPr lang="en-US"/>
+          </a:p>
+        </p:txBody>
+      </p:sp>
+      <p:sp>
+        <p:nvSpPr>
+          <p:cNvPr id="4" name="Slide Number Placeholder 3"/>
+          <p:cNvSpPr>
+            <a:spLocks noGrp="1"/>
+          </p:cNvSpPr>
+          <p:nvPr>
+            <p:ph type="sldNum" sz="quarter" idx="5"/>
+          </p:nvPr>
+        </p:nvSpPr>
+        <p:spPr/>
+        <p:txBody>
+          <a:bodyPr/>
+          <a:lstStyle/>
+          <a:p>
+            <a:fld id="{7C432B12-1722-4EDC-9BBA-25A0F0A334AF}" type="slidenum">
+              <a:rPr lang="en-US" smtClean="0"/>
+              <a:t>9</a:t>
+            </a:fld>
+            <a:endParaRPr lang="en-US"/>
+          </a:p>
+        </p:txBody>
+      </p:sp>
+    </p:spTree>
+    <p:extLst>
+      <p:ext uri="{BB962C8B-B14F-4D97-AF65-F5344CB8AC3E}">
+        <p14:creationId xmlns:p14="http://schemas.microsoft.com/office/powerpoint/2010/main" val="149248714"/>
       </p:ext>
     </p:extLst>
   </p:cSld>
@@ -9466,7 +10626,7 @@
           <p:nvPr/>
         </p:nvPicPr>
         <p:blipFill rotWithShape="1">
-          <a:blip r:embed="rId2">
+          <a:blip r:embed="rId3">
             <a:extLst>
               <a:ext uri="{28A0092B-C50C-407E-A947-70E740481C1C}">
                 <a14:useLocalDpi xmlns:a14="http://schemas.microsoft.com/office/drawing/2010/main" val="0"/>
@@ -10335,7 +11495,7 @@
 </file>
 
 <file path=ppt/slides/slide10.xml><?xml version="1.0" encoding="utf-8"?>
-<p:sld xmlns:a="http://schemas.openxmlformats.org/drawingml/2006/main" xmlns:r="http://schemas.openxmlformats.org/officeDocument/2006/relationships" xmlns:p="http://schemas.openxmlformats.org/presentationml/2006/main" show="0">
+<p:sld xmlns:a="http://schemas.openxmlformats.org/drawingml/2006/main" xmlns:r="http://schemas.openxmlformats.org/officeDocument/2006/relationships" xmlns:p="http://schemas.openxmlformats.org/presentationml/2006/main">
   <p:cSld>
     <p:spTree>
       <p:nvGrpSpPr>
@@ -10353,7 +11513,13 @@
       </p:grpSpPr>
       <p:sp>
         <p:nvSpPr>
-          <p:cNvPr id="2" name="Title 1"/>
+          <p:cNvPr id="2" name="Title 1">
+            <a:extLst>
+              <a:ext uri="{FF2B5EF4-FFF2-40B4-BE49-F238E27FC236}">
+                <a16:creationId xmlns:a16="http://schemas.microsoft.com/office/drawing/2014/main" id="{C088670A-7BD0-4ECB-8A2E-C1AA3E8B9350}"/>
+              </a:ext>
+            </a:extLst>
+          </p:cNvPr>
           <p:cNvSpPr>
             <a:spLocks noGrp="1"/>
           </p:cNvSpPr>
@@ -10368,14 +11534,20 @@
           <a:p>
             <a:r>
               <a:rPr lang="en-US" dirty="0"/>
-              <a:t>Demo Requirements:  The Deployment</a:t>
-            </a:r>
-          </a:p>
-        </p:txBody>
-      </p:sp>
-      <p:sp>
-        <p:nvSpPr>
-          <p:cNvPr id="3" name="Content Placeholder 2"/>
+              <a:t>Phase One Outcome</a:t>
+            </a:r>
+          </a:p>
+        </p:txBody>
+      </p:sp>
+      <p:sp>
+        <p:nvSpPr>
+          <p:cNvPr id="3" name="Content Placeholder 2">
+            <a:extLst>
+              <a:ext uri="{FF2B5EF4-FFF2-40B4-BE49-F238E27FC236}">
+                <a16:creationId xmlns:a16="http://schemas.microsoft.com/office/drawing/2014/main" id="{C89640D5-E93C-4098-B975-52AF38A748F3}"/>
+              </a:ext>
+            </a:extLst>
+          </p:cNvPr>
           <p:cNvSpPr>
             <a:spLocks noGrp="1"/>
           </p:cNvSpPr>
@@ -10385,72 +11557,24 @@
         </p:nvSpPr>
         <p:spPr/>
         <p:txBody>
-          <a:bodyPr>
-            <a:normAutofit/>
-          </a:bodyPr>
+          <a:bodyPr/>
           <a:lstStyle/>
           <a:p>
             <a:r>
               <a:rPr lang="en-US" dirty="0"/>
-              <a:t>The vendor will run the application on a desktop</a:t>
+              <a:t>We select a primary vendor</a:t>
             </a:r>
           </a:p>
           <a:p>
             <a:r>
               <a:rPr lang="en-US" dirty="0"/>
-              <a:t>The vendor will demonstrate solutions to our named concerns</a:t>
+              <a:t>We have faith in the solution</a:t>
             </a:r>
           </a:p>
           <a:p>
             <a:r>
               <a:rPr lang="en-US" dirty="0"/>
-              <a:t>The vendor will give us infrastructure requirements</a:t>
-            </a:r>
-          </a:p>
-          <a:p>
-            <a:r>
-              <a:rPr lang="en-US" dirty="0"/>
-              <a:t>We will provide the infrastructure</a:t>
-            </a:r>
-          </a:p>
-          <a:p>
-            <a:r>
-              <a:rPr lang="en-US" dirty="0"/>
-              <a:t>The vendor will install, configure, and demonstrate their solution</a:t>
-            </a:r>
-          </a:p>
-          <a:p>
-            <a:pPr lvl="1"/>
-            <a:r>
-              <a:rPr lang="en-US" dirty="0"/>
-              <a:t>The application will must be deployed</a:t>
-            </a:r>
-          </a:p>
-          <a:p>
-            <a:pPr lvl="1"/>
-            <a:r>
-              <a:rPr lang="en-US" dirty="0"/>
-              <a:t>The application must be reachable on our network</a:t>
-            </a:r>
-          </a:p>
-          <a:p>
-            <a:pPr lvl="1"/>
-            <a:r>
-              <a:rPr lang="en-US" dirty="0"/>
-              <a:t>We want them to show us “the standard way” to do this, step by step</a:t>
-            </a:r>
-          </a:p>
-          <a:p>
-            <a:pPr lvl="1"/>
-            <a:r>
-              <a:rPr lang="en-US" dirty="0"/>
-              <a:t>Auto-scale running containers as needed</a:t>
-            </a:r>
-          </a:p>
-          <a:p>
-            <a:r>
-              <a:rPr lang="en-US" dirty="0"/>
-              <a:t>The vendor will demonstrate rolling updates</a:t>
+              <a:t>We understand pricing and support</a:t>
             </a:r>
           </a:p>
         </p:txBody>
@@ -10458,7 +11582,7 @@
     </p:spTree>
     <p:extLst>
       <p:ext uri="{BB962C8B-B14F-4D97-AF65-F5344CB8AC3E}">
-        <p14:creationId xmlns:p14="http://schemas.microsoft.com/office/powerpoint/2010/main" val="551168300"/>
+        <p14:creationId xmlns:p14="http://schemas.microsoft.com/office/powerpoint/2010/main" val="824068756"/>
       </p:ext>
     </p:extLst>
   </p:cSld>
@@ -10502,7 +11626,7 @@
           <a:p>
             <a:r>
               <a:rPr lang="en-US" dirty="0"/>
-              <a:t>Demo Requirements:  NOC Operations</a:t>
+              <a:t>Demo Requirements:  The Application</a:t>
             </a:r>
           </a:p>
         </p:txBody>
@@ -10526,80 +11650,35 @@
           <a:p>
             <a:r>
               <a:rPr lang="en-US" dirty="0"/>
-              <a:t>Demonstrate Monitoring</a:t>
+              <a:t>We will provide a simple app to Containerize</a:t>
+            </a:r>
+          </a:p>
+          <a:p>
+            <a:r>
+              <a:rPr lang="en-US" dirty="0"/>
+              <a:t>The app will have two dependencies</a:t>
             </a:r>
           </a:p>
           <a:p>
             <a:pPr lvl="1"/>
             <a:r>
               <a:rPr lang="en-US" dirty="0"/>
-              <a:t>At the cluster level</a:t>
+              <a:t>Database</a:t>
             </a:r>
           </a:p>
           <a:p>
             <a:pPr lvl="1"/>
             <a:r>
               <a:rPr lang="en-US" dirty="0"/>
-              <a:t>At the host level</a:t>
-            </a:r>
-          </a:p>
-          <a:p>
-            <a:pPr lvl="1"/>
-            <a:r>
-              <a:rPr lang="en-US" dirty="0"/>
-              <a:t>At the container level</a:t>
-            </a:r>
-          </a:p>
-          <a:p>
-            <a:pPr lvl="1"/>
-            <a:r>
-              <a:rPr lang="en-US" dirty="0"/>
-              <a:t>* We prefer to integrate with our current NOC products</a:t>
-            </a:r>
-          </a:p>
-          <a:p>
-            <a:r>
-              <a:rPr lang="en-US" dirty="0"/>
-              <a:t>Demonstrate Escalation Plans</a:t>
-            </a:r>
-          </a:p>
-          <a:p>
-            <a:pPr lvl="1"/>
-            <a:r>
-              <a:rPr lang="en-US" dirty="0"/>
-              <a:t>An application is down</a:t>
-            </a:r>
-          </a:p>
-          <a:p>
-            <a:pPr lvl="1"/>
-            <a:r>
-              <a:rPr lang="en-US" dirty="0"/>
-              <a:t>Scarce resources</a:t>
-            </a:r>
-          </a:p>
-          <a:p>
-            <a:r>
-              <a:rPr lang="en-US" dirty="0"/>
-              <a:t>Demonstrate Rolling Updates</a:t>
-            </a:r>
-          </a:p>
-          <a:p>
-            <a:pPr lvl="1"/>
-            <a:r>
-              <a:rPr lang="en-US" dirty="0"/>
-              <a:t>Update running containers from an old base OS image to a current one</a:t>
-            </a:r>
-          </a:p>
-          <a:p>
-            <a:pPr lvl="1"/>
-            <a:endParaRPr lang="en-US" dirty="0"/>
+              <a:t>Messaging</a:t>
+            </a:r>
           </a:p>
         </p:txBody>
       </p:sp>
     </p:spTree>
     <p:extLst>
       <p:ext uri="{BB962C8B-B14F-4D97-AF65-F5344CB8AC3E}">
-        <p14:creationId xmlns:p14="http://schemas.microsoft.com/office/powerpoint/2010/main" val="3864910711"/>
+        <p14:creationId xmlns:p14="http://schemas.microsoft.com/office/powerpoint/2010/main" val="1204616855"/>
       </p:ext>
     </p:extLst>
   </p:cSld>
@@ -10643,7 +11722,7 @@
           <a:p>
             <a:r>
               <a:rPr lang="en-US" dirty="0"/>
-              <a:t>Demo Requirements:  The Proposal</a:t>
+              <a:t>Demo Requirements:  The Deployment</a:t>
             </a:r>
           </a:p>
         </p:txBody>
@@ -10667,67 +11746,65 @@
           <a:p>
             <a:r>
               <a:rPr lang="en-US" dirty="0"/>
-              <a:t>Basic explanation of licensing</a:t>
+              <a:t>The vendor will run the application on a desktop</a:t>
             </a:r>
           </a:p>
           <a:p>
             <a:r>
               <a:rPr lang="en-US" dirty="0"/>
-              <a:t>Formal pricing offers</a:t>
+              <a:t>The vendor will demonstrate solutions to our named concerns</a:t>
             </a:r>
           </a:p>
           <a:p>
             <a:r>
               <a:rPr lang="en-US" dirty="0"/>
-              <a:t>Support details</a:t>
+              <a:t>The vendor will give us infrastructure requirements</a:t>
+            </a:r>
+          </a:p>
+          <a:p>
+            <a:r>
+              <a:rPr lang="en-US" dirty="0"/>
+              <a:t>We will provide the infrastructure</a:t>
+            </a:r>
+          </a:p>
+          <a:p>
+            <a:r>
+              <a:rPr lang="en-US" dirty="0"/>
+              <a:t>The vendor will install, configure, and demonstrate their solution</a:t>
             </a:r>
           </a:p>
           <a:p>
             <a:pPr lvl="1"/>
             <a:r>
               <a:rPr lang="en-US" dirty="0"/>
-              <a:t>What parts of the stack are supported</a:t>
+              <a:t>The application will must be deployed</a:t>
             </a:r>
           </a:p>
           <a:p>
             <a:pPr lvl="1"/>
             <a:r>
               <a:rPr lang="en-US" dirty="0"/>
-              <a:t>SLA</a:t>
+              <a:t>The application must be reachable on our network</a:t>
             </a:r>
           </a:p>
           <a:p>
             <a:pPr lvl="1"/>
             <a:r>
               <a:rPr lang="en-US" dirty="0"/>
-              <a:t>Pricing</a:t>
-            </a:r>
-          </a:p>
-          <a:p>
+              <a:t>We want them to show us “the standard way” to do this, step by step</a:t>
+            </a:r>
+          </a:p>
+          <a:p>
+            <a:pPr lvl="1"/>
             <a:r>
               <a:rPr lang="en-US" dirty="0"/>
-              <a:t>Consulting services</a:t>
-            </a:r>
-          </a:p>
-          <a:p>
-            <a:pPr lvl="1"/>
+              <a:t>Auto-scale running containers as needed</a:t>
+            </a:r>
+          </a:p>
+          <a:p>
             <a:r>
               <a:rPr lang="en-US" dirty="0"/>
-              <a:t>Their consulting model</a:t>
-            </a:r>
-          </a:p>
-          <a:p>
-            <a:pPr lvl="1"/>
-            <a:r>
-              <a:rPr lang="en-US" dirty="0"/>
-              <a:t>Availability</a:t>
-            </a:r>
-          </a:p>
-          <a:p>
-            <a:pPr lvl="1"/>
-            <a:r>
-              <a:rPr lang="en-US" dirty="0"/>
-              <a:t>Costs</a:t>
+              <a:t>The vendor will demonstrate rolling updates</a:t>
             </a:r>
           </a:p>
         </p:txBody>
@@ -10735,7 +11812,7 @@
     </p:spTree>
     <p:extLst>
       <p:ext uri="{BB962C8B-B14F-4D97-AF65-F5344CB8AC3E}">
-        <p14:creationId xmlns:p14="http://schemas.microsoft.com/office/powerpoint/2010/main" val="282798005"/>
+        <p14:creationId xmlns:p14="http://schemas.microsoft.com/office/powerpoint/2010/main" val="551168300"/>
       </p:ext>
     </p:extLst>
   </p:cSld>
@@ -10746,7 +11823,7 @@
 </file>
 
 <file path=ppt/slides/slide13.xml><?xml version="1.0" encoding="utf-8"?>
-<p:sld xmlns:a="http://schemas.openxmlformats.org/drawingml/2006/main" xmlns:r="http://schemas.openxmlformats.org/officeDocument/2006/relationships" xmlns:p="http://schemas.openxmlformats.org/presentationml/2006/main">
+<p:sld xmlns:a="http://schemas.openxmlformats.org/drawingml/2006/main" xmlns:r="http://schemas.openxmlformats.org/officeDocument/2006/relationships" xmlns:p="http://schemas.openxmlformats.org/presentationml/2006/main" show="0">
   <p:cSld>
     <p:spTree>
       <p:nvGrpSpPr>
@@ -10779,37 +11856,104 @@
           <a:p>
             <a:r>
               <a:rPr lang="en-US" dirty="0"/>
-              <a:t>Phase Two (2 Months)</a:t>
-            </a:r>
-          </a:p>
-        </p:txBody>
-      </p:sp>
-      <p:sp>
-        <p:nvSpPr>
-          <p:cNvPr id="3" name="Text Placeholder 2"/>
-          <p:cNvSpPr>
-            <a:spLocks noGrp="1"/>
-          </p:cNvSpPr>
-          <p:nvPr>
-            <p:ph type="body" idx="1"/>
+              <a:t>Demo Requirements:  NOC Operations</a:t>
+            </a:r>
+          </a:p>
+        </p:txBody>
+      </p:sp>
+      <p:sp>
+        <p:nvSpPr>
+          <p:cNvPr id="3" name="Content Placeholder 2"/>
+          <p:cNvSpPr>
+            <a:spLocks noGrp="1"/>
+          </p:cNvSpPr>
+          <p:nvPr>
+            <p:ph idx="1"/>
           </p:nvPr>
         </p:nvSpPr>
         <p:spPr/>
         <p:txBody>
-          <a:bodyPr/>
+          <a:bodyPr>
+            <a:normAutofit/>
+          </a:bodyPr>
           <a:lstStyle/>
           <a:p>
             <a:r>
               <a:rPr lang="en-US" dirty="0"/>
-              <a:t>Off-The-Shelf Container Support</a:t>
-            </a:r>
+              <a:t>Demonstrate Monitoring</a:t>
+            </a:r>
+          </a:p>
+          <a:p>
+            <a:pPr lvl="1"/>
+            <a:r>
+              <a:rPr lang="en-US" dirty="0"/>
+              <a:t>At the cluster level</a:t>
+            </a:r>
+          </a:p>
+          <a:p>
+            <a:pPr lvl="1"/>
+            <a:r>
+              <a:rPr lang="en-US" dirty="0"/>
+              <a:t>At the host level</a:t>
+            </a:r>
+          </a:p>
+          <a:p>
+            <a:pPr lvl="1"/>
+            <a:r>
+              <a:rPr lang="en-US" dirty="0"/>
+              <a:t>At the container level</a:t>
+            </a:r>
+          </a:p>
+          <a:p>
+            <a:pPr lvl="1"/>
+            <a:r>
+              <a:rPr lang="en-US" dirty="0"/>
+              <a:t>* We prefer to integrate with our current NOC products</a:t>
+            </a:r>
+          </a:p>
+          <a:p>
+            <a:r>
+              <a:rPr lang="en-US" dirty="0"/>
+              <a:t>Demonstrate Escalation Plans</a:t>
+            </a:r>
+          </a:p>
+          <a:p>
+            <a:pPr lvl="1"/>
+            <a:r>
+              <a:rPr lang="en-US" dirty="0"/>
+              <a:t>An application is down</a:t>
+            </a:r>
+          </a:p>
+          <a:p>
+            <a:pPr lvl="1"/>
+            <a:r>
+              <a:rPr lang="en-US" dirty="0"/>
+              <a:t>Scarce resources</a:t>
+            </a:r>
+          </a:p>
+          <a:p>
+            <a:r>
+              <a:rPr lang="en-US" dirty="0"/>
+              <a:t>Demonstrate Rolling Updates</a:t>
+            </a:r>
+          </a:p>
+          <a:p>
+            <a:pPr lvl="1"/>
+            <a:r>
+              <a:rPr lang="en-US" dirty="0"/>
+              <a:t>Update running containers from an old base OS image to a current one</a:t>
+            </a:r>
+          </a:p>
+          <a:p>
+            <a:pPr lvl="1"/>
+            <a:endParaRPr lang="en-US" dirty="0"/>
           </a:p>
         </p:txBody>
       </p:sp>
     </p:spTree>
     <p:extLst>
       <p:ext uri="{BB962C8B-B14F-4D97-AF65-F5344CB8AC3E}">
-        <p14:creationId xmlns:p14="http://schemas.microsoft.com/office/powerpoint/2010/main" val="1907812105"/>
+        <p14:creationId xmlns:p14="http://schemas.microsoft.com/office/powerpoint/2010/main" val="3864910711"/>
       </p:ext>
     </p:extLst>
   </p:cSld>
@@ -10820,7 +11964,7 @@
 </file>
 
 <file path=ppt/slides/slide14.xml><?xml version="1.0" encoding="utf-8"?>
-<p:sld xmlns:a="http://schemas.openxmlformats.org/drawingml/2006/main" xmlns:r="http://schemas.openxmlformats.org/officeDocument/2006/relationships" xmlns:p="http://schemas.openxmlformats.org/presentationml/2006/main">
+<p:sld xmlns:a="http://schemas.openxmlformats.org/drawingml/2006/main" xmlns:r="http://schemas.openxmlformats.org/officeDocument/2006/relationships" xmlns:p="http://schemas.openxmlformats.org/presentationml/2006/main" show="0">
   <p:cSld>
     <p:spTree>
       <p:nvGrpSpPr>
@@ -10853,7 +11997,7 @@
           <a:p>
             <a:r>
               <a:rPr lang="en-US" dirty="0"/>
-              <a:t>Requirements</a:t>
+              <a:t>Demo Requirements:  The Proposal</a:t>
             </a:r>
           </a:p>
         </p:txBody>
@@ -10870,67 +12014,82 @@
         </p:nvSpPr>
         <p:spPr/>
         <p:txBody>
-          <a:bodyPr/>
+          <a:bodyPr>
+            <a:normAutofit/>
+          </a:bodyPr>
           <a:lstStyle/>
           <a:p>
             <a:r>
               <a:rPr lang="en-US" dirty="0"/>
-              <a:t>Pilot use case</a:t>
+              <a:t>Basic explanation of licensing</a:t>
             </a:r>
           </a:p>
           <a:p>
             <a:r>
               <a:rPr lang="en-US" dirty="0"/>
-              <a:t>Licensing and support agreements</a:t>
+              <a:t>Formal pricing offers</a:t>
             </a:r>
           </a:p>
           <a:p>
             <a:r>
               <a:rPr lang="en-US" dirty="0"/>
-              <a:t>Budget considerations</a:t>
-            </a:r>
-          </a:p>
-          <a:p>
+              <a:t>Support details</a:t>
+            </a:r>
+          </a:p>
+          <a:p>
+            <a:pPr lvl="1"/>
             <a:r>
               <a:rPr lang="en-US" dirty="0"/>
-              <a:t>Planning and training</a:t>
-            </a:r>
-          </a:p>
-          <a:p>
+              <a:t>What parts of the stack are supported</a:t>
+            </a:r>
+          </a:p>
+          <a:p>
+            <a:pPr lvl="1"/>
             <a:r>
               <a:rPr lang="en-US" dirty="0"/>
-              <a:t>Security and compliance review</a:t>
-            </a:r>
-          </a:p>
-          <a:p>
+              <a:t>SLA</a:t>
+            </a:r>
+          </a:p>
+          <a:p>
+            <a:pPr lvl="1"/>
             <a:r>
               <a:rPr lang="en-US" dirty="0"/>
-              <a:t>Physical infrastructure</a:t>
+              <a:t>Pricing</a:t>
             </a:r>
           </a:p>
           <a:p>
             <a:r>
               <a:rPr lang="en-US" dirty="0"/>
-              <a:t>NOC integration</a:t>
-            </a:r>
-          </a:p>
-          <a:p>
+              <a:t>Consulting services</a:t>
+            </a:r>
+          </a:p>
+          <a:p>
+            <a:pPr lvl="1"/>
             <a:r>
               <a:rPr lang="en-US" dirty="0"/>
-              <a:t>Potential New Roles and </a:t>
-            </a:r>
-            <a:r>
-              <a:rPr lang="en-US" dirty="0" err="1"/>
-              <a:t>Responsibilites</a:t>
-            </a:r>
-            <a:endParaRPr lang="en-US" dirty="0"/>
+              <a:t>Their consulting model</a:t>
+            </a:r>
+          </a:p>
+          <a:p>
+            <a:pPr lvl="1"/>
+            <a:r>
+              <a:rPr lang="en-US" dirty="0"/>
+              <a:t>Availability</a:t>
+            </a:r>
+          </a:p>
+          <a:p>
+            <a:pPr lvl="1"/>
+            <a:r>
+              <a:rPr lang="en-US" dirty="0"/>
+              <a:t>Costs</a:t>
+            </a:r>
           </a:p>
         </p:txBody>
       </p:sp>
     </p:spTree>
     <p:extLst>
       <p:ext uri="{BB962C8B-B14F-4D97-AF65-F5344CB8AC3E}">
-        <p14:creationId xmlns:p14="http://schemas.microsoft.com/office/powerpoint/2010/main" val="908170637"/>
+        <p14:creationId xmlns:p14="http://schemas.microsoft.com/office/powerpoint/2010/main" val="282798005"/>
       </p:ext>
     </p:extLst>
   </p:cSld>
@@ -10974,7 +12133,7 @@
           <a:p>
             <a:r>
               <a:rPr lang="en-US" dirty="0"/>
-              <a:t>Phase Three (6 Months)</a:t>
+              <a:t>Phase Two (2 Months)</a:t>
             </a:r>
           </a:p>
         </p:txBody>
@@ -10996,7 +12155,185 @@
           <a:p>
             <a:r>
               <a:rPr lang="en-US" dirty="0"/>
-              <a:t>Development Operations:  Containers as a Service</a:t>
+              <a:t>Basic Container Support</a:t>
+            </a:r>
+          </a:p>
+        </p:txBody>
+      </p:sp>
+    </p:spTree>
+    <p:extLst>
+      <p:ext uri="{BB962C8B-B14F-4D97-AF65-F5344CB8AC3E}">
+        <p14:creationId xmlns:p14="http://schemas.microsoft.com/office/powerpoint/2010/main" val="1907812105"/>
+      </p:ext>
+    </p:extLst>
+  </p:cSld>
+  <p:clrMapOvr>
+    <a:masterClrMapping/>
+  </p:clrMapOvr>
+</p:sld>
+</file>
+
+<file path=ppt/slides/slide16.xml><?xml version="1.0" encoding="utf-8"?>
+<p:sld xmlns:a="http://schemas.openxmlformats.org/drawingml/2006/main" xmlns:r="http://schemas.openxmlformats.org/officeDocument/2006/relationships" xmlns:p="http://schemas.openxmlformats.org/presentationml/2006/main">
+  <p:cSld>
+    <p:spTree>
+      <p:nvGrpSpPr>
+        <p:cNvPr id="1" name=""/>
+        <p:cNvGrpSpPr/>
+        <p:nvPr/>
+      </p:nvGrpSpPr>
+      <p:grpSpPr>
+        <a:xfrm>
+          <a:off x="0" y="0"/>
+          <a:ext cx="0" cy="0"/>
+          <a:chOff x="0" y="0"/>
+          <a:chExt cx="0" cy="0"/>
+        </a:xfrm>
+      </p:grpSpPr>
+      <p:sp>
+        <p:nvSpPr>
+          <p:cNvPr id="2" name="Title 1"/>
+          <p:cNvSpPr>
+            <a:spLocks noGrp="1"/>
+          </p:cNvSpPr>
+          <p:nvPr>
+            <p:ph type="title"/>
+          </p:nvPr>
+        </p:nvSpPr>
+        <p:spPr/>
+        <p:txBody>
+          <a:bodyPr/>
+          <a:lstStyle/>
+          <a:p>
+            <a:r>
+              <a:rPr lang="en-US" dirty="0"/>
+              <a:t>Phase Two Outcome</a:t>
+            </a:r>
+          </a:p>
+        </p:txBody>
+      </p:sp>
+      <p:sp>
+        <p:nvSpPr>
+          <p:cNvPr id="3" name="Content Placeholder 2"/>
+          <p:cNvSpPr>
+            <a:spLocks noGrp="1"/>
+          </p:cNvSpPr>
+          <p:nvPr>
+            <p:ph idx="1"/>
+          </p:nvPr>
+        </p:nvSpPr>
+        <p:spPr/>
+        <p:txBody>
+          <a:bodyPr/>
+          <a:lstStyle/>
+          <a:p>
+            <a:r>
+              <a:rPr lang="en-US" dirty="0"/>
+              <a:t>Licensing and support agreements</a:t>
+            </a:r>
+          </a:p>
+          <a:p>
+            <a:r>
+              <a:rPr lang="en-US" dirty="0"/>
+              <a:t>We know how containers are paid for</a:t>
+            </a:r>
+          </a:p>
+          <a:p>
+            <a:r>
+              <a:rPr lang="en-US" dirty="0"/>
+              <a:t>Security and compliance review</a:t>
+            </a:r>
+          </a:p>
+          <a:p>
+            <a:r>
+              <a:rPr lang="en-US" dirty="0"/>
+              <a:t>Physical infrastructure is allocated</a:t>
+            </a:r>
+          </a:p>
+          <a:p>
+            <a:r>
+              <a:rPr lang="en-US" dirty="0"/>
+              <a:t>NOC integration is complete</a:t>
+            </a:r>
+          </a:p>
+          <a:p>
+            <a:r>
+              <a:rPr lang="en-US" dirty="0"/>
+              <a:t>Personnel are ready</a:t>
+            </a:r>
+          </a:p>
+        </p:txBody>
+      </p:sp>
+    </p:spTree>
+    <p:extLst>
+      <p:ext uri="{BB962C8B-B14F-4D97-AF65-F5344CB8AC3E}">
+        <p14:creationId xmlns:p14="http://schemas.microsoft.com/office/powerpoint/2010/main" val="908170637"/>
+      </p:ext>
+    </p:extLst>
+  </p:cSld>
+  <p:clrMapOvr>
+    <a:masterClrMapping/>
+  </p:clrMapOvr>
+</p:sld>
+</file>
+
+<file path=ppt/slides/slide17.xml><?xml version="1.0" encoding="utf-8"?>
+<p:sld xmlns:a="http://schemas.openxmlformats.org/drawingml/2006/main" xmlns:r="http://schemas.openxmlformats.org/officeDocument/2006/relationships" xmlns:p="http://schemas.openxmlformats.org/presentationml/2006/main">
+  <p:cSld>
+    <p:spTree>
+      <p:nvGrpSpPr>
+        <p:cNvPr id="1" name=""/>
+        <p:cNvGrpSpPr/>
+        <p:nvPr/>
+      </p:nvGrpSpPr>
+      <p:grpSpPr>
+        <a:xfrm>
+          <a:off x="0" y="0"/>
+          <a:ext cx="0" cy="0"/>
+          <a:chOff x="0" y="0"/>
+          <a:chExt cx="0" cy="0"/>
+        </a:xfrm>
+      </p:grpSpPr>
+      <p:sp>
+        <p:nvSpPr>
+          <p:cNvPr id="2" name="Title 1"/>
+          <p:cNvSpPr>
+            <a:spLocks noGrp="1"/>
+          </p:cNvSpPr>
+          <p:nvPr>
+            <p:ph type="title"/>
+          </p:nvPr>
+        </p:nvSpPr>
+        <p:spPr/>
+        <p:txBody>
+          <a:bodyPr/>
+          <a:lstStyle/>
+          <a:p>
+            <a:r>
+              <a:rPr lang="en-US" dirty="0"/>
+              <a:t>Phase Three (6 Months)</a:t>
+            </a:r>
+          </a:p>
+        </p:txBody>
+      </p:sp>
+      <p:sp>
+        <p:nvSpPr>
+          <p:cNvPr id="3" name="Text Placeholder 2"/>
+          <p:cNvSpPr>
+            <a:spLocks noGrp="1"/>
+          </p:cNvSpPr>
+          <p:nvPr>
+            <p:ph type="body" idx="1"/>
+          </p:nvPr>
+        </p:nvSpPr>
+        <p:spPr/>
+        <p:txBody>
+          <a:bodyPr/>
+          <a:lstStyle/>
+          <a:p>
+            <a:r>
+              <a:rPr lang="en-US" dirty="0"/>
+              <a:t>DevOps Integration</a:t>
             </a:r>
           </a:p>
         </p:txBody>
@@ -11014,8 +12351,100 @@
 </p:sld>
 </file>
 
-<file path=ppt/slides/slide16.xml><?xml version="1.0" encoding="utf-8"?>
+<file path=ppt/slides/slide18.xml><?xml version="1.0" encoding="utf-8"?>
 <p:sld xmlns:a="http://schemas.openxmlformats.org/drawingml/2006/main" xmlns:r="http://schemas.openxmlformats.org/officeDocument/2006/relationships" xmlns:p="http://schemas.openxmlformats.org/presentationml/2006/main">
+  <p:cSld>
+    <p:spTree>
+      <p:nvGrpSpPr>
+        <p:cNvPr id="1" name=""/>
+        <p:cNvGrpSpPr/>
+        <p:nvPr/>
+      </p:nvGrpSpPr>
+      <p:grpSpPr>
+        <a:xfrm>
+          <a:off x="0" y="0"/>
+          <a:ext cx="0" cy="0"/>
+          <a:chOff x="0" y="0"/>
+          <a:chExt cx="0" cy="0"/>
+        </a:xfrm>
+      </p:grpSpPr>
+      <p:sp>
+        <p:nvSpPr>
+          <p:cNvPr id="2" name="Title 1"/>
+          <p:cNvSpPr>
+            <a:spLocks noGrp="1"/>
+          </p:cNvSpPr>
+          <p:nvPr>
+            <p:ph type="title"/>
+          </p:nvPr>
+        </p:nvSpPr>
+        <p:spPr/>
+        <p:txBody>
+          <a:bodyPr/>
+          <a:lstStyle/>
+          <a:p>
+            <a:r>
+              <a:rPr lang="en-US" dirty="0"/>
+              <a:t>Phase Three Outcome</a:t>
+            </a:r>
+          </a:p>
+        </p:txBody>
+      </p:sp>
+      <p:sp>
+        <p:nvSpPr>
+          <p:cNvPr id="3" name="Content Placeholder 2"/>
+          <p:cNvSpPr>
+            <a:spLocks noGrp="1"/>
+          </p:cNvSpPr>
+          <p:nvPr>
+            <p:ph idx="1"/>
+          </p:nvPr>
+        </p:nvSpPr>
+        <p:spPr/>
+        <p:txBody>
+          <a:bodyPr/>
+          <a:lstStyle/>
+          <a:p>
+            <a:r>
+              <a:rPr lang="en-US" dirty="0"/>
+              <a:t>Desktop container support</a:t>
+            </a:r>
+          </a:p>
+          <a:p>
+            <a:r>
+              <a:rPr lang="en-US" dirty="0"/>
+              <a:t>Boilerplate for common project types</a:t>
+            </a:r>
+          </a:p>
+          <a:p>
+            <a:r>
+              <a:rPr lang="en-US" dirty="0"/>
+              <a:t>Continuous integration</a:t>
+            </a:r>
+          </a:p>
+          <a:p>
+            <a:r>
+              <a:rPr lang="en-US" dirty="0"/>
+              <a:t>Automated deployments</a:t>
+            </a:r>
+          </a:p>
+        </p:txBody>
+      </p:sp>
+    </p:spTree>
+    <p:extLst>
+      <p:ext uri="{BB962C8B-B14F-4D97-AF65-F5344CB8AC3E}">
+        <p14:creationId xmlns:p14="http://schemas.microsoft.com/office/powerpoint/2010/main" val="2716104907"/>
+      </p:ext>
+    </p:extLst>
+  </p:cSld>
+  <p:clrMapOvr>
+    <a:masterClrMapping/>
+  </p:clrMapOvr>
+</p:sld>
+</file>
+
+<file path=ppt/slides/slide19.xml><?xml version="1.0" encoding="utf-8"?>
+<p:sld xmlns:a="http://schemas.openxmlformats.org/drawingml/2006/main" xmlns:r="http://schemas.openxmlformats.org/officeDocument/2006/relationships" xmlns:p="http://schemas.openxmlformats.org/presentationml/2006/main" show="0">
   <p:cSld>
     <p:spTree>
       <p:nvGrpSpPr>
@@ -12648,118 +14077,6 @@
 </p:sld>
 </file>
 
-<file path=ppt/slides/slide17.xml><?xml version="1.0" encoding="utf-8"?>
-<p:sld xmlns:a="http://schemas.openxmlformats.org/drawingml/2006/main" xmlns:r="http://schemas.openxmlformats.org/officeDocument/2006/relationships" xmlns:p="http://schemas.openxmlformats.org/presentationml/2006/main">
-  <p:cSld>
-    <p:spTree>
-      <p:nvGrpSpPr>
-        <p:cNvPr id="1" name=""/>
-        <p:cNvGrpSpPr/>
-        <p:nvPr/>
-      </p:nvGrpSpPr>
-      <p:grpSpPr>
-        <a:xfrm>
-          <a:off x="0" y="0"/>
-          <a:ext cx="0" cy="0"/>
-          <a:chOff x="0" y="0"/>
-          <a:chExt cx="0" cy="0"/>
-        </a:xfrm>
-      </p:grpSpPr>
-      <p:sp>
-        <p:nvSpPr>
-          <p:cNvPr id="2" name="Title 1">
-            <a:extLst>
-              <a:ext uri="{FF2B5EF4-FFF2-40B4-BE49-F238E27FC236}">
-                <a16:creationId xmlns:a16="http://schemas.microsoft.com/office/drawing/2014/main" id="{F98DCCC2-901E-4BA8-8F13-695B7613B71C}"/>
-              </a:ext>
-            </a:extLst>
-          </p:cNvPr>
-          <p:cNvSpPr>
-            <a:spLocks noGrp="1"/>
-          </p:cNvSpPr>
-          <p:nvPr>
-            <p:ph type="title"/>
-          </p:nvPr>
-        </p:nvSpPr>
-        <p:spPr/>
-        <p:txBody>
-          <a:bodyPr/>
-          <a:lstStyle/>
-          <a:p>
-            <a:r>
-              <a:rPr lang="en-US" dirty="0"/>
-              <a:t>Next Steps</a:t>
-            </a:r>
-          </a:p>
-        </p:txBody>
-      </p:sp>
-      <p:sp>
-        <p:nvSpPr>
-          <p:cNvPr id="3" name="Content Placeholder 2">
-            <a:extLst>
-              <a:ext uri="{FF2B5EF4-FFF2-40B4-BE49-F238E27FC236}">
-                <a16:creationId xmlns:a16="http://schemas.microsoft.com/office/drawing/2014/main" id="{65972851-E12F-4953-BC40-498F40127880}"/>
-              </a:ext>
-            </a:extLst>
-          </p:cNvPr>
-          <p:cNvSpPr>
-            <a:spLocks noGrp="1"/>
-          </p:cNvSpPr>
-          <p:nvPr>
-            <p:ph idx="1"/>
-          </p:nvPr>
-        </p:nvSpPr>
-        <p:spPr/>
-        <p:txBody>
-          <a:bodyPr>
-            <a:normAutofit/>
-          </a:bodyPr>
-          <a:lstStyle/>
-          <a:p>
-            <a:r>
-              <a:rPr lang="en-US" dirty="0"/>
-              <a:t>Finalize our team</a:t>
-            </a:r>
-          </a:p>
-          <a:p>
-            <a:r>
-              <a:rPr lang="en-US" dirty="0"/>
-              <a:t>Write our RFP document</a:t>
-            </a:r>
-          </a:p>
-          <a:p>
-            <a:r>
-              <a:rPr lang="en-US" dirty="0"/>
-              <a:t>Submit RFP to vendors</a:t>
-            </a:r>
-          </a:p>
-          <a:p>
-            <a:r>
-              <a:rPr lang="en-US" dirty="0"/>
-              <a:t>Coordinate vendor presentations</a:t>
-            </a:r>
-          </a:p>
-          <a:p>
-            <a:r>
-              <a:rPr lang="en-US" dirty="0"/>
-              <a:t>Nail down estimate for phase 2</a:t>
-            </a:r>
-          </a:p>
-        </p:txBody>
-      </p:sp>
-    </p:spTree>
-    <p:extLst>
-      <p:ext uri="{BB962C8B-B14F-4D97-AF65-F5344CB8AC3E}">
-        <p14:creationId xmlns:p14="http://schemas.microsoft.com/office/powerpoint/2010/main" val="781785288"/>
-      </p:ext>
-    </p:extLst>
-  </p:cSld>
-  <p:clrMapOvr>
-    <a:masterClrMapping/>
-  </p:clrMapOvr>
-</p:sld>
-</file>
-
 <file path=ppt/slides/slide2.xml><?xml version="1.0" encoding="utf-8"?>
 <p:sld xmlns:a="http://schemas.openxmlformats.org/drawingml/2006/main" xmlns:r="http://schemas.openxmlformats.org/officeDocument/2006/relationships" xmlns:p="http://schemas.openxmlformats.org/presentationml/2006/main">
   <p:cSld>
@@ -12779,7 +14096,13 @@
       </p:grpSpPr>
       <p:sp>
         <p:nvSpPr>
-          <p:cNvPr id="2" name="Title 1"/>
+          <p:cNvPr id="2" name="Title 1">
+            <a:extLst>
+              <a:ext uri="{FF2B5EF4-FFF2-40B4-BE49-F238E27FC236}">
+                <a16:creationId xmlns:a16="http://schemas.microsoft.com/office/drawing/2014/main" id="{A8E2D35B-50CD-4E1E-8514-CBF6829E078F}"/>
+              </a:ext>
+            </a:extLst>
+          </p:cNvPr>
           <p:cNvSpPr>
             <a:spLocks noGrp="1"/>
           </p:cNvSpPr>
@@ -12794,14 +14117,20 @@
           <a:p>
             <a:r>
               <a:rPr lang="en-US" dirty="0"/>
-              <a:t>Why Containers Now?</a:t>
-            </a:r>
-          </a:p>
-        </p:txBody>
-      </p:sp>
-      <p:sp>
-        <p:nvSpPr>
-          <p:cNvPr id="3" name="Content Placeholder 2"/>
+              <a:t>A Quick Refresher</a:t>
+            </a:r>
+          </a:p>
+        </p:txBody>
+      </p:sp>
+      <p:sp>
+        <p:nvSpPr>
+          <p:cNvPr id="3" name="Content Placeholder 2">
+            <a:extLst>
+              <a:ext uri="{FF2B5EF4-FFF2-40B4-BE49-F238E27FC236}">
+                <a16:creationId xmlns:a16="http://schemas.microsoft.com/office/drawing/2014/main" id="{4FCC3D71-3C05-486C-A1D5-C3748ED7A9E0}"/>
+              </a:ext>
+            </a:extLst>
+          </p:cNvPr>
           <p:cNvSpPr>
             <a:spLocks noGrp="1"/>
           </p:cNvSpPr>
@@ -12816,46 +14145,25 @@
           <a:p>
             <a:r>
               <a:rPr lang="en-US" dirty="0"/>
-              <a:t>We know containers are coming</a:t>
+              <a:t>More efficient usage of server resources</a:t>
             </a:r>
           </a:p>
           <a:p>
             <a:r>
               <a:rPr lang="en-US" dirty="0"/>
-              <a:t>People are already using them:</a:t>
-            </a:r>
-          </a:p>
-          <a:p>
-            <a:pPr lvl="1"/>
+              <a:t>Rapid deployments</a:t>
+            </a:r>
+          </a:p>
+          <a:p>
             <a:r>
               <a:rPr lang="en-US" dirty="0"/>
-              <a:t>Big Data</a:t>
-            </a:r>
-          </a:p>
-          <a:p>
-            <a:pPr lvl="1"/>
+              <a:t>Simplicity around security</a:t>
+            </a:r>
+          </a:p>
+          <a:p>
             <a:r>
               <a:rPr lang="en-US" dirty="0"/>
-              <a:t>Oracle</a:t>
-            </a:r>
-          </a:p>
-          <a:p>
-            <a:pPr lvl="1"/>
-            <a:r>
-              <a:rPr lang="en-US" dirty="0"/>
-              <a:t>?</a:t>
-            </a:r>
-          </a:p>
-          <a:p>
-            <a:r>
-              <a:rPr lang="en-US" dirty="0"/>
-              <a:t>We want to manage one consistent platform</a:t>
-            </a:r>
-          </a:p>
-          <a:p>
-            <a:r>
-              <a:rPr lang="en-US" dirty="0"/>
-              <a:t>We want a ready answer for “how do I run a container?”</a:t>
+              <a:t>Tight integration with DevOps</a:t>
             </a:r>
           </a:p>
         </p:txBody>
@@ -12863,7 +14171,119 @@
     </p:spTree>
     <p:extLst>
       <p:ext uri="{BB962C8B-B14F-4D97-AF65-F5344CB8AC3E}">
-        <p14:creationId xmlns:p14="http://schemas.microsoft.com/office/powerpoint/2010/main" val="2911040714"/>
+        <p14:creationId xmlns:p14="http://schemas.microsoft.com/office/powerpoint/2010/main" val="912821848"/>
+      </p:ext>
+    </p:extLst>
+  </p:cSld>
+  <p:clrMapOvr>
+    <a:masterClrMapping/>
+  </p:clrMapOvr>
+</p:sld>
+</file>
+
+<file path=ppt/slides/slide20.xml><?xml version="1.0" encoding="utf-8"?>
+<p:sld xmlns:a="http://schemas.openxmlformats.org/drawingml/2006/main" xmlns:r="http://schemas.openxmlformats.org/officeDocument/2006/relationships" xmlns:p="http://schemas.openxmlformats.org/presentationml/2006/main">
+  <p:cSld>
+    <p:spTree>
+      <p:nvGrpSpPr>
+        <p:cNvPr id="1" name=""/>
+        <p:cNvGrpSpPr/>
+        <p:nvPr/>
+      </p:nvGrpSpPr>
+      <p:grpSpPr>
+        <a:xfrm>
+          <a:off x="0" y="0"/>
+          <a:ext cx="0" cy="0"/>
+          <a:chOff x="0" y="0"/>
+          <a:chExt cx="0" cy="0"/>
+        </a:xfrm>
+      </p:grpSpPr>
+      <p:sp>
+        <p:nvSpPr>
+          <p:cNvPr id="2" name="Title 1">
+            <a:extLst>
+              <a:ext uri="{FF2B5EF4-FFF2-40B4-BE49-F238E27FC236}">
+                <a16:creationId xmlns:a16="http://schemas.microsoft.com/office/drawing/2014/main" id="{F98DCCC2-901E-4BA8-8F13-695B7613B71C}"/>
+              </a:ext>
+            </a:extLst>
+          </p:cNvPr>
+          <p:cNvSpPr>
+            <a:spLocks noGrp="1"/>
+          </p:cNvSpPr>
+          <p:nvPr>
+            <p:ph type="title"/>
+          </p:nvPr>
+        </p:nvSpPr>
+        <p:spPr/>
+        <p:txBody>
+          <a:bodyPr/>
+          <a:lstStyle/>
+          <a:p>
+            <a:r>
+              <a:rPr lang="en-US" dirty="0"/>
+              <a:t>Next Steps</a:t>
+            </a:r>
+          </a:p>
+        </p:txBody>
+      </p:sp>
+      <p:sp>
+        <p:nvSpPr>
+          <p:cNvPr id="3" name="Content Placeholder 2">
+            <a:extLst>
+              <a:ext uri="{FF2B5EF4-FFF2-40B4-BE49-F238E27FC236}">
+                <a16:creationId xmlns:a16="http://schemas.microsoft.com/office/drawing/2014/main" id="{65972851-E12F-4953-BC40-498F40127880}"/>
+              </a:ext>
+            </a:extLst>
+          </p:cNvPr>
+          <p:cNvSpPr>
+            <a:spLocks noGrp="1"/>
+          </p:cNvSpPr>
+          <p:nvPr>
+            <p:ph idx="1"/>
+          </p:nvPr>
+        </p:nvSpPr>
+        <p:spPr/>
+        <p:txBody>
+          <a:bodyPr>
+            <a:normAutofit/>
+          </a:bodyPr>
+          <a:lstStyle/>
+          <a:p>
+            <a:r>
+              <a:rPr lang="en-US" dirty="0"/>
+              <a:t>Finalize our team</a:t>
+            </a:r>
+          </a:p>
+          <a:p>
+            <a:r>
+              <a:rPr lang="en-US" dirty="0"/>
+              <a:t>Visit with all stakeholders</a:t>
+            </a:r>
+          </a:p>
+          <a:p>
+            <a:r>
+              <a:rPr lang="en-US" dirty="0"/>
+              <a:t>Write our RFP document</a:t>
+            </a:r>
+          </a:p>
+          <a:p>
+            <a:r>
+              <a:rPr lang="en-US" dirty="0"/>
+              <a:t>Submit RFP to vendors</a:t>
+            </a:r>
+          </a:p>
+          <a:p>
+            <a:r>
+              <a:rPr lang="en-US" dirty="0"/>
+              <a:t>Coordinate vendor presentations</a:t>
+            </a:r>
+          </a:p>
+        </p:txBody>
+      </p:sp>
+    </p:spTree>
+    <p:extLst>
+      <p:ext uri="{BB962C8B-B14F-4D97-AF65-F5344CB8AC3E}">
+        <p14:creationId xmlns:p14="http://schemas.microsoft.com/office/powerpoint/2010/main" val="781785288"/>
       </p:ext>
     </p:extLst>
   </p:cSld>
@@ -12907,7 +14327,7 @@
           <a:p>
             <a:r>
               <a:rPr lang="en-US" dirty="0"/>
-              <a:t>Three Phases</a:t>
+              <a:t>Why Now?</a:t>
             </a:r>
           </a:p>
         </p:txBody>
@@ -12929,19 +14349,19 @@
           <a:p>
             <a:r>
               <a:rPr lang="en-US" dirty="0"/>
-              <a:t>Phase One:  Proofs of concept (This conversation)</a:t>
+              <a:t>We know containers are coming</a:t>
             </a:r>
           </a:p>
           <a:p>
             <a:r>
               <a:rPr lang="en-US" dirty="0"/>
-              <a:t>Phase Two:  Support of vendor applications</a:t>
+              <a:t>We want to manage one consistent platform</a:t>
             </a:r>
           </a:p>
           <a:p>
             <a:r>
               <a:rPr lang="en-US" dirty="0"/>
-              <a:t>Phase Three:  DevOps for our applications</a:t>
+              <a:t>We want a ready answer for people</a:t>
             </a:r>
           </a:p>
         </p:txBody>
@@ -12949,7 +14369,7 @@
     </p:spTree>
     <p:extLst>
       <p:ext uri="{BB962C8B-B14F-4D97-AF65-F5344CB8AC3E}">
-        <p14:creationId xmlns:p14="http://schemas.microsoft.com/office/powerpoint/2010/main" val="3595156515"/>
+        <p14:creationId xmlns:p14="http://schemas.microsoft.com/office/powerpoint/2010/main" val="2911040714"/>
       </p:ext>
     </p:extLst>
   </p:cSld>
@@ -12978,13 +14398,7 @@
       </p:grpSpPr>
       <p:sp>
         <p:nvSpPr>
-          <p:cNvPr id="2" name="Title 1">
-            <a:extLst>
-              <a:ext uri="{FF2B5EF4-FFF2-40B4-BE49-F238E27FC236}">
-                <a16:creationId xmlns:a16="http://schemas.microsoft.com/office/drawing/2014/main" id="{F98DCCC2-901E-4BA8-8F13-695B7613B71C}"/>
-              </a:ext>
-            </a:extLst>
-          </p:cNvPr>
+          <p:cNvPr id="2" name="Title 1"/>
           <p:cNvSpPr>
             <a:spLocks noGrp="1"/>
           </p:cNvSpPr>
@@ -12999,20 +14413,14 @@
           <a:p>
             <a:r>
               <a:rPr lang="en-US" dirty="0"/>
-              <a:t>The Players</a:t>
-            </a:r>
-          </a:p>
-        </p:txBody>
-      </p:sp>
-      <p:sp>
-        <p:nvSpPr>
-          <p:cNvPr id="3" name="Content Placeholder 2">
-            <a:extLst>
-              <a:ext uri="{FF2B5EF4-FFF2-40B4-BE49-F238E27FC236}">
-                <a16:creationId xmlns:a16="http://schemas.microsoft.com/office/drawing/2014/main" id="{65972851-E12F-4953-BC40-498F40127880}"/>
-              </a:ext>
-            </a:extLst>
-          </p:cNvPr>
+              <a:t>Three Phases</a:t>
+            </a:r>
+          </a:p>
+        </p:txBody>
+      </p:sp>
+      <p:sp>
+        <p:nvSpPr>
+          <p:cNvPr id="3" name="Content Placeholder 2"/>
           <p:cNvSpPr>
             <a:spLocks noGrp="1"/>
           </p:cNvSpPr>
@@ -13022,114 +14430,24 @@
         </p:nvSpPr>
         <p:spPr/>
         <p:txBody>
-          <a:bodyPr>
-            <a:normAutofit fontScale="85000" lnSpcReduction="20000"/>
-          </a:bodyPr>
+          <a:bodyPr/>
           <a:lstStyle/>
           <a:p>
-            <a:pPr marL="0" indent="0">
-              <a:buNone/>
-            </a:pPr>
-            <a:r>
-              <a:rPr lang="en-US" b="1" dirty="0"/>
-              <a:t>Owner</a:t>
-            </a:r>
             <a:r>
               <a:rPr lang="en-US" dirty="0"/>
-              <a:t>:  Technical Architecture Group</a:t>
-            </a:r>
-          </a:p>
-          <a:p>
-            <a:pPr marL="0" indent="0">
-              <a:buNone/>
-            </a:pPr>
-            <a:endParaRPr lang="en-US" b="1" dirty="0"/>
-          </a:p>
-          <a:p>
-            <a:pPr marL="0" indent="0">
-              <a:buNone/>
-            </a:pPr>
-            <a:r>
-              <a:rPr lang="en-US" b="1" dirty="0"/>
-              <a:t>Driver</a:t>
-            </a:r>
+              <a:t>Phase One:  Proofs of concept (This conversation)</a:t>
+            </a:r>
+          </a:p>
+          <a:p>
             <a:r>
               <a:rPr lang="en-US" dirty="0"/>
-              <a:t>:  Eric Burcham</a:t>
-            </a:r>
-          </a:p>
-          <a:p>
-            <a:pPr marL="0" indent="0">
-              <a:buNone/>
-            </a:pPr>
-            <a:endParaRPr lang="en-US" dirty="0"/>
-          </a:p>
-          <a:p>
-            <a:pPr marL="0" indent="0">
-              <a:buNone/>
-            </a:pPr>
-            <a:r>
-              <a:rPr lang="en-US" b="1" dirty="0"/>
-              <a:t>Core Team</a:t>
-            </a:r>
+              <a:t>Phase Two:  Basic Container Support</a:t>
+            </a:r>
+          </a:p>
+          <a:p>
             <a:r>
               <a:rPr lang="en-US" dirty="0"/>
-              <a:t>:  Eric Burcham, Dylan Clark, Mike Bollman, Lowell Roberts, Mayme Kittman, Stuart Wagner</a:t>
-            </a:r>
-          </a:p>
-          <a:p>
-            <a:pPr marL="0" indent="0">
-              <a:buNone/>
-            </a:pPr>
-            <a:endParaRPr lang="en-US" b="1" dirty="0"/>
-          </a:p>
-          <a:p>
-            <a:pPr marL="0" indent="0">
-              <a:buNone/>
-            </a:pPr>
-            <a:r>
-              <a:rPr lang="en-US" b="1" dirty="0"/>
-              <a:t>Project Manager</a:t>
-            </a:r>
-            <a:r>
-              <a:rPr lang="en-US" dirty="0"/>
-              <a:t>:  TBD.  Not needed for Phase One.</a:t>
-            </a:r>
-            <a:br>
-              <a:rPr lang="en-US" dirty="0"/>
-            </a:br>
-            <a:endParaRPr lang="en-US" b="1" dirty="0"/>
-          </a:p>
-          <a:p>
-            <a:pPr marL="0" indent="0">
-              <a:buNone/>
-            </a:pPr>
-            <a:r>
-              <a:rPr lang="en-US" b="1" dirty="0"/>
-              <a:t>Stakeholders</a:t>
-            </a:r>
-            <a:r>
-              <a:rPr lang="en-US" dirty="0"/>
-              <a:t>:  Big Data, Desktop Support, Development Managers, eBusiness, Engineering, Network Team, NOC, Oracle Team, SCADA, Security and Compliance, Server Team</a:t>
-            </a:r>
-          </a:p>
-          <a:p>
-            <a:pPr marL="0" indent="0">
-              <a:buNone/>
-            </a:pPr>
-            <a:endParaRPr lang="en-US" b="1" dirty="0"/>
-          </a:p>
-          <a:p>
-            <a:pPr marL="0" indent="0">
-              <a:buNone/>
-            </a:pPr>
-            <a:r>
-              <a:rPr lang="en-US" b="1" dirty="0"/>
-              <a:t>Vendors</a:t>
-            </a:r>
-            <a:r>
-              <a:rPr lang="en-US" dirty="0"/>
-              <a:t>:  Docker Enterprise, Red Hat OpenShift, Rancher</a:t>
+              <a:t>Phase Three:  DevOps Integration</a:t>
             </a:r>
           </a:p>
         </p:txBody>
@@ -13137,7 +14455,7 @@
     </p:spTree>
     <p:extLst>
       <p:ext uri="{BB962C8B-B14F-4D97-AF65-F5344CB8AC3E}">
-        <p14:creationId xmlns:p14="http://schemas.microsoft.com/office/powerpoint/2010/main" val="2747266861"/>
+        <p14:creationId xmlns:p14="http://schemas.microsoft.com/office/powerpoint/2010/main" val="3595156515"/>
       </p:ext>
     </p:extLst>
   </p:cSld>
@@ -13166,7 +14484,13 @@
       </p:grpSpPr>
       <p:sp>
         <p:nvSpPr>
-          <p:cNvPr id="2" name="Title 1"/>
+          <p:cNvPr id="2" name="Title 1">
+            <a:extLst>
+              <a:ext uri="{FF2B5EF4-FFF2-40B4-BE49-F238E27FC236}">
+                <a16:creationId xmlns:a16="http://schemas.microsoft.com/office/drawing/2014/main" id="{F98DCCC2-901E-4BA8-8F13-695B7613B71C}"/>
+              </a:ext>
+            </a:extLst>
+          </p:cNvPr>
           <p:cNvSpPr>
             <a:spLocks noGrp="1"/>
           </p:cNvSpPr>
@@ -13181,29 +14505,120 @@
           <a:p>
             <a:r>
               <a:rPr lang="en-US" dirty="0"/>
-              <a:t>Phase One (2 Months)</a:t>
-            </a:r>
-          </a:p>
-        </p:txBody>
-      </p:sp>
-      <p:sp>
-        <p:nvSpPr>
-          <p:cNvPr id="3" name="Text Placeholder 2"/>
-          <p:cNvSpPr>
-            <a:spLocks noGrp="1"/>
-          </p:cNvSpPr>
-          <p:nvPr>
-            <p:ph type="body" idx="1"/>
+              <a:t>The Players</a:t>
+            </a:r>
+          </a:p>
+        </p:txBody>
+      </p:sp>
+      <p:sp>
+        <p:nvSpPr>
+          <p:cNvPr id="3" name="Content Placeholder 2">
+            <a:extLst>
+              <a:ext uri="{FF2B5EF4-FFF2-40B4-BE49-F238E27FC236}">
+                <a16:creationId xmlns:a16="http://schemas.microsoft.com/office/drawing/2014/main" id="{65972851-E12F-4953-BC40-498F40127880}"/>
+              </a:ext>
+            </a:extLst>
+          </p:cNvPr>
+          <p:cNvSpPr>
+            <a:spLocks noGrp="1"/>
+          </p:cNvSpPr>
+          <p:nvPr>
+            <p:ph idx="1"/>
           </p:nvPr>
         </p:nvSpPr>
         <p:spPr/>
         <p:txBody>
-          <a:bodyPr/>
+          <a:bodyPr>
+            <a:normAutofit fontScale="92500" lnSpcReduction="20000"/>
+          </a:bodyPr>
           <a:lstStyle/>
           <a:p>
+            <a:pPr marL="0" indent="0">
+              <a:buNone/>
+            </a:pPr>
+            <a:r>
+              <a:rPr lang="en-US" b="1" dirty="0"/>
+              <a:t>Owner</a:t>
+            </a:r>
             <a:r>
               <a:rPr lang="en-US" dirty="0"/>
-              <a:t>Proofs of Concept, Cost Analysis, and Vendor Selection</a:t>
+              <a:t>:  Technical Architecture Group</a:t>
+            </a:r>
+          </a:p>
+          <a:p>
+            <a:pPr marL="0" indent="0">
+              <a:buNone/>
+            </a:pPr>
+            <a:endParaRPr lang="en-US" b="1" dirty="0"/>
+          </a:p>
+          <a:p>
+            <a:pPr marL="0" indent="0">
+              <a:buNone/>
+            </a:pPr>
+            <a:r>
+              <a:rPr lang="en-US" b="1" dirty="0"/>
+              <a:t>Driver</a:t>
+            </a:r>
+            <a:r>
+              <a:rPr lang="en-US" dirty="0"/>
+              <a:t>:  Eric Burcham</a:t>
+            </a:r>
+          </a:p>
+          <a:p>
+            <a:pPr marL="0" indent="0">
+              <a:buNone/>
+            </a:pPr>
+            <a:endParaRPr lang="en-US" dirty="0"/>
+          </a:p>
+          <a:p>
+            <a:pPr marL="0" indent="0">
+              <a:buNone/>
+            </a:pPr>
+            <a:r>
+              <a:rPr lang="en-US" b="1" dirty="0"/>
+              <a:t>Core Team</a:t>
+            </a:r>
+            <a:r>
+              <a:rPr lang="en-US" dirty="0"/>
+              <a:t>:  Eric Burcham, Dylan Clark, Mike Bollman, Lowell Roberts, Mayme Kittman, Stuart Wagner</a:t>
+            </a:r>
+          </a:p>
+          <a:p>
+            <a:pPr marL="0" indent="0">
+              <a:buNone/>
+            </a:pPr>
+            <a:endParaRPr lang="en-US" b="1" dirty="0"/>
+          </a:p>
+          <a:p>
+            <a:pPr marL="0" indent="0">
+              <a:buNone/>
+            </a:pPr>
+            <a:r>
+              <a:rPr lang="en-US" b="1" dirty="0"/>
+              <a:t>Stakeholders</a:t>
+            </a:r>
+            <a:r>
+              <a:rPr lang="en-US" dirty="0"/>
+              <a:t>:  Big Data, Desktop Support, Development Managers, eBusiness, Engineering, Network Team, NOC, Oracle Team, SCADA, Security and Compliance, Server Team</a:t>
+            </a:r>
+          </a:p>
+          <a:p>
+            <a:pPr marL="0" indent="0">
+              <a:buNone/>
+            </a:pPr>
+            <a:endParaRPr lang="en-US" b="1" dirty="0"/>
+          </a:p>
+          <a:p>
+            <a:pPr marL="0" indent="0">
+              <a:buNone/>
+            </a:pPr>
+            <a:r>
+              <a:rPr lang="en-US" b="1" dirty="0"/>
+              <a:t>Vendors</a:t>
+            </a:r>
+            <a:r>
+              <a:rPr lang="en-US" dirty="0"/>
+              <a:t>:  Docker Enterprise, Red Hat OpenShift, Rancher</a:t>
             </a:r>
           </a:p>
         </p:txBody>
@@ -13211,7 +14626,7 @@
     </p:spTree>
     <p:extLst>
       <p:ext uri="{BB962C8B-B14F-4D97-AF65-F5344CB8AC3E}">
-        <p14:creationId xmlns:p14="http://schemas.microsoft.com/office/powerpoint/2010/main" val="816925581"/>
+        <p14:creationId xmlns:p14="http://schemas.microsoft.com/office/powerpoint/2010/main" val="2747266861"/>
       </p:ext>
     </p:extLst>
   </p:cSld>
@@ -13255,19 +14670,19 @@
           <a:p>
             <a:r>
               <a:rPr lang="en-US" dirty="0"/>
-              <a:t>Requests for Proposals with Demo POC</a:t>
-            </a:r>
-          </a:p>
-        </p:txBody>
-      </p:sp>
-      <p:sp>
-        <p:nvSpPr>
-          <p:cNvPr id="3" name="Content Placeholder 2"/>
-          <p:cNvSpPr>
-            <a:spLocks noGrp="1"/>
-          </p:cNvSpPr>
-          <p:nvPr>
-            <p:ph idx="1"/>
+              <a:t>Phase One (2 Months)</a:t>
+            </a:r>
+          </a:p>
+        </p:txBody>
+      </p:sp>
+      <p:sp>
+        <p:nvSpPr>
+          <p:cNvPr id="3" name="Text Placeholder 2"/>
+          <p:cNvSpPr>
+            <a:spLocks noGrp="1"/>
+          </p:cNvSpPr>
+          <p:nvPr>
+            <p:ph type="body" idx="1"/>
           </p:nvPr>
         </p:nvSpPr>
         <p:spPr/>
@@ -13277,31 +14692,7 @@
           <a:p>
             <a:r>
               <a:rPr lang="en-US" dirty="0"/>
-              <a:t>We’ll present identical requirements to each vendor</a:t>
-            </a:r>
-          </a:p>
-          <a:p>
-            <a:r>
-              <a:rPr lang="en-US" dirty="0"/>
-              <a:t>We want them to do the demo on our infrastructure</a:t>
-            </a:r>
-          </a:p>
-          <a:p>
-            <a:r>
-              <a:rPr lang="en-US" dirty="0"/>
-              <a:t>We want to keep the environments around for awhile</a:t>
-            </a:r>
-          </a:p>
-          <a:p>
-            <a:r>
-              <a:rPr lang="en-US" dirty="0"/>
-              <a:t>We’ll give environment access to our current container users</a:t>
-            </a:r>
-          </a:p>
-          <a:p>
-            <a:r>
-              <a:rPr lang="en-US" dirty="0"/>
-              <a:t>We’ll try to get this done for free</a:t>
+              <a:t>Proofs of Concept, Cost Analysis, and Vendor Selection</a:t>
             </a:r>
           </a:p>
         </p:txBody>
@@ -13309,7 +14700,7 @@
     </p:spTree>
     <p:extLst>
       <p:ext uri="{BB962C8B-B14F-4D97-AF65-F5344CB8AC3E}">
-        <p14:creationId xmlns:p14="http://schemas.microsoft.com/office/powerpoint/2010/main" val="1384123770"/>
+        <p14:creationId xmlns:p14="http://schemas.microsoft.com/office/powerpoint/2010/main" val="816925581"/>
       </p:ext>
     </p:extLst>
   </p:cSld>
@@ -13338,13 +14729,7 @@
       </p:grpSpPr>
       <p:sp>
         <p:nvSpPr>
-          <p:cNvPr id="2" name="Title 1">
-            <a:extLst>
-              <a:ext uri="{FF2B5EF4-FFF2-40B4-BE49-F238E27FC236}">
-                <a16:creationId xmlns:a16="http://schemas.microsoft.com/office/drawing/2014/main" id="{05D1E734-7289-434A-BAB5-8B27CC4D98E9}"/>
-              </a:ext>
-            </a:extLst>
-          </p:cNvPr>
+          <p:cNvPr id="2" name="Title 1"/>
           <p:cNvSpPr>
             <a:spLocks noGrp="1"/>
           </p:cNvSpPr>
@@ -13359,207 +14744,49 @@
           <a:p>
             <a:r>
               <a:rPr lang="en-US" dirty="0"/>
-              <a:t>POC Scope</a:t>
-            </a:r>
-          </a:p>
-        </p:txBody>
-      </p:sp>
-      <p:sp>
-        <p:nvSpPr>
-          <p:cNvPr id="3" name="Content Placeholder 2">
-            <a:extLst>
-              <a:ext uri="{FF2B5EF4-FFF2-40B4-BE49-F238E27FC236}">
-                <a16:creationId xmlns:a16="http://schemas.microsoft.com/office/drawing/2014/main" id="{69D78B72-CFD0-4AE3-8CBE-2226A85F6A23}"/>
-              </a:ext>
-            </a:extLst>
-          </p:cNvPr>
-          <p:cNvSpPr>
-            <a:spLocks noGrp="1"/>
-          </p:cNvSpPr>
-          <p:nvPr>
-            <p:ph sz="half" idx="1"/>
+              <a:t>Proofs of Concept</a:t>
+            </a:r>
+          </a:p>
+        </p:txBody>
+      </p:sp>
+      <p:sp>
+        <p:nvSpPr>
+          <p:cNvPr id="3" name="Content Placeholder 2"/>
+          <p:cNvSpPr>
+            <a:spLocks noGrp="1"/>
+          </p:cNvSpPr>
+          <p:nvPr>
+            <p:ph idx="1"/>
           </p:nvPr>
         </p:nvSpPr>
         <p:spPr/>
         <p:txBody>
-          <a:bodyPr>
-            <a:normAutofit fontScale="62500" lnSpcReduction="20000"/>
-          </a:bodyPr>
+          <a:bodyPr/>
           <a:lstStyle/>
           <a:p>
             <a:r>
               <a:rPr lang="en-US" dirty="0"/>
-              <a:t>Automatic Scaling</a:t>
+              <a:t>Present requirements</a:t>
             </a:r>
           </a:p>
           <a:p>
             <a:r>
               <a:rPr lang="en-US" dirty="0"/>
-              <a:t>Authentication / Authorization</a:t>
+              <a:t>Demonstrations</a:t>
             </a:r>
           </a:p>
           <a:p>
             <a:r>
               <a:rPr lang="en-US" dirty="0"/>
-              <a:t>Clustering</a:t>
-            </a:r>
-          </a:p>
-          <a:p>
-            <a:r>
-              <a:rPr lang="en-US" dirty="0"/>
-              <a:t>Copy Control</a:t>
-            </a:r>
-          </a:p>
-          <a:p>
-            <a:r>
-              <a:rPr lang="en-US" dirty="0"/>
-              <a:t>Deployment</a:t>
-            </a:r>
-          </a:p>
-          <a:p>
-            <a:r>
-              <a:rPr lang="en-US" dirty="0"/>
-              <a:t>Desktop Support</a:t>
-            </a:r>
-          </a:p>
-          <a:p>
-            <a:r>
-              <a:rPr lang="en-US" dirty="0"/>
-              <a:t>Health Monitoring</a:t>
-            </a:r>
-          </a:p>
-          <a:p>
-            <a:r>
-              <a:rPr lang="en-US" dirty="0"/>
-              <a:t>High Availability</a:t>
-            </a:r>
-          </a:p>
-          <a:p>
-            <a:r>
-              <a:rPr lang="en-US" dirty="0"/>
-              <a:t>Log Management</a:t>
-            </a:r>
-          </a:p>
-          <a:p>
-            <a:r>
-              <a:rPr lang="en-US" dirty="0"/>
-              <a:t>Management</a:t>
-            </a:r>
-          </a:p>
-          <a:p>
-            <a:r>
-              <a:rPr lang="en-US" dirty="0"/>
-              <a:t>Network Isolation for Testing</a:t>
-            </a:r>
-          </a:p>
-          <a:p>
-            <a:r>
-              <a:rPr lang="en-US" dirty="0"/>
-              <a:t>Orchestration</a:t>
-            </a:r>
-          </a:p>
-          <a:p>
-            <a:r>
-              <a:rPr lang="en-US" dirty="0"/>
-              <a:t>Resource Allocation</a:t>
-            </a:r>
-          </a:p>
-          <a:p>
-            <a:r>
-              <a:rPr lang="en-US" dirty="0"/>
-              <a:t>Security</a:t>
-            </a:r>
-          </a:p>
-          <a:p>
-            <a:endParaRPr lang="en-US" dirty="0"/>
-          </a:p>
-        </p:txBody>
-      </p:sp>
-      <p:sp>
-        <p:nvSpPr>
-          <p:cNvPr id="4" name="Content Placeholder 3">
-            <a:extLst>
-              <a:ext uri="{FF2B5EF4-FFF2-40B4-BE49-F238E27FC236}">
-                <a16:creationId xmlns:a16="http://schemas.microsoft.com/office/drawing/2014/main" id="{E733743C-EAF7-4DE6-8B8F-A916C4D2A728}"/>
-              </a:ext>
-            </a:extLst>
-          </p:cNvPr>
-          <p:cNvSpPr>
-            <a:spLocks noGrp="1"/>
-          </p:cNvSpPr>
-          <p:nvPr>
-            <p:ph sz="half" idx="2"/>
-          </p:nvPr>
-        </p:nvSpPr>
-        <p:spPr/>
-        <p:txBody>
-          <a:bodyPr>
-            <a:normAutofit fontScale="62500" lnSpcReduction="20000"/>
-          </a:bodyPr>
-          <a:lstStyle/>
-          <a:p>
-            <a:r>
-              <a:rPr lang="en-US" dirty="0"/>
-              <a:t>Budgeting</a:t>
-            </a:r>
-          </a:p>
-          <a:p>
-            <a:r>
-              <a:rPr lang="en-US" dirty="0"/>
-              <a:t>Change Management</a:t>
-            </a:r>
-          </a:p>
-          <a:p>
-            <a:r>
-              <a:rPr lang="en-US" dirty="0"/>
-              <a:t>Desktop Host Management</a:t>
-            </a:r>
-          </a:p>
-          <a:p>
-            <a:r>
-              <a:rPr lang="en-US" dirty="0"/>
-              <a:t>Image Approval and Management</a:t>
-            </a:r>
-          </a:p>
-          <a:p>
-            <a:r>
-              <a:rPr lang="en-US" dirty="0"/>
-              <a:t>Licensing and Compliance</a:t>
-            </a:r>
-          </a:p>
-          <a:p>
-            <a:r>
-              <a:rPr lang="en-US" dirty="0"/>
-              <a:t>Long-term viability</a:t>
-            </a:r>
-          </a:p>
-          <a:p>
-            <a:r>
-              <a:rPr lang="en-US" dirty="0"/>
-              <a:t>Resource Planning</a:t>
-            </a:r>
-          </a:p>
-          <a:p>
-            <a:r>
-              <a:rPr lang="en-US" dirty="0"/>
-              <a:t>Security Audits</a:t>
-            </a:r>
-          </a:p>
-          <a:p>
-            <a:r>
-              <a:rPr lang="en-US" dirty="0"/>
-              <a:t>Technical Support Quality and Availability</a:t>
-            </a:r>
-          </a:p>
-          <a:p>
-            <a:endParaRPr lang="en-US" dirty="0"/>
+              <a:t>Budget</a:t>
+            </a:r>
           </a:p>
         </p:txBody>
       </p:sp>
     </p:spTree>
     <p:extLst>
       <p:ext uri="{BB962C8B-B14F-4D97-AF65-F5344CB8AC3E}">
-        <p14:creationId xmlns:p14="http://schemas.microsoft.com/office/powerpoint/2010/main" val="3732569273"/>
+        <p14:creationId xmlns:p14="http://schemas.microsoft.com/office/powerpoint/2010/main" val="1384123770"/>
       </p:ext>
     </p:extLst>
   </p:cSld>
@@ -13591,7 +14818,7 @@
           <p:cNvPr id="2" name="Title 1">
             <a:extLst>
               <a:ext uri="{FF2B5EF4-FFF2-40B4-BE49-F238E27FC236}">
-                <a16:creationId xmlns:a16="http://schemas.microsoft.com/office/drawing/2014/main" id="{02C69A9D-11E3-42B6-A78A-D426038F43C5}"/>
+                <a16:creationId xmlns:a16="http://schemas.microsoft.com/office/drawing/2014/main" id="{05D1E734-7289-434A-BAB5-8B27CC4D98E9}"/>
               </a:ext>
             </a:extLst>
           </p:cNvPr>
@@ -13609,7 +14836,7 @@
           <a:p>
             <a:r>
               <a:rPr lang="en-US" dirty="0"/>
-              <a:t>Demo Requirements</a:t>
+              <a:t>POC Scope (Hide in Staff Meeting)</a:t>
             </a:r>
           </a:p>
         </p:txBody>
@@ -13619,7 +14846,7 @@
           <p:cNvPr id="3" name="Content Placeholder 2">
             <a:extLst>
               <a:ext uri="{FF2B5EF4-FFF2-40B4-BE49-F238E27FC236}">
-                <a16:creationId xmlns:a16="http://schemas.microsoft.com/office/drawing/2014/main" id="{0341BF6B-1DD5-4499-A7F3-A34FCF6500EB}"/>
+                <a16:creationId xmlns:a16="http://schemas.microsoft.com/office/drawing/2014/main" id="{69D78B72-CFD0-4AE3-8CBE-2226A85F6A23}"/>
               </a:ext>
             </a:extLst>
           </p:cNvPr>
@@ -13627,17 +14854,37 @@
             <a:spLocks noGrp="1"/>
           </p:cNvSpPr>
           <p:nvPr>
-            <p:ph idx="1"/>
+            <p:ph sz="half" idx="1"/>
           </p:nvPr>
         </p:nvSpPr>
         <p:spPr/>
         <p:txBody>
-          <a:bodyPr/>
+          <a:bodyPr>
+            <a:normAutofit fontScale="62500" lnSpcReduction="20000"/>
+          </a:bodyPr>
           <a:lstStyle/>
           <a:p>
             <a:r>
               <a:rPr lang="en-US" dirty="0"/>
-              <a:t>We’ll provide the application</a:t>
+              <a:t>Automatic Scaling</a:t>
+            </a:r>
+          </a:p>
+          <a:p>
+            <a:r>
+              <a:rPr lang="en-US" dirty="0"/>
+              <a:t>Authentication / Authorization</a:t>
+            </a:r>
+          </a:p>
+          <a:p>
+            <a:r>
+              <a:rPr lang="en-US" dirty="0"/>
+              <a:t>Clustering</a:t>
+            </a:r>
+          </a:p>
+          <a:p>
+            <a:r>
+              <a:rPr lang="en-US" dirty="0"/>
+              <a:t>Copy Control</a:t>
             </a:r>
           </a:p>
           <a:p>
@@ -13649,21 +14896,147 @@
           <a:p>
             <a:r>
               <a:rPr lang="en-US" dirty="0"/>
-              <a:t>NOC Integration</a:t>
+              <a:t>Desktop Support</a:t>
             </a:r>
           </a:p>
           <a:p>
             <a:r>
               <a:rPr lang="en-US" dirty="0"/>
-              <a:t>Proposals</a:t>
-            </a:r>
+              <a:t>Health Monitoring</a:t>
+            </a:r>
+          </a:p>
+          <a:p>
+            <a:r>
+              <a:rPr lang="en-US" dirty="0"/>
+              <a:t>High Availability</a:t>
+            </a:r>
+          </a:p>
+          <a:p>
+            <a:r>
+              <a:rPr lang="en-US" dirty="0"/>
+              <a:t>Log Management</a:t>
+            </a:r>
+          </a:p>
+          <a:p>
+            <a:r>
+              <a:rPr lang="en-US" dirty="0"/>
+              <a:t>Management</a:t>
+            </a:r>
+          </a:p>
+          <a:p>
+            <a:r>
+              <a:rPr lang="en-US" dirty="0"/>
+              <a:t>Network Isolation for Testing</a:t>
+            </a:r>
+          </a:p>
+          <a:p>
+            <a:r>
+              <a:rPr lang="en-US" dirty="0"/>
+              <a:t>Orchestration</a:t>
+            </a:r>
+          </a:p>
+          <a:p>
+            <a:r>
+              <a:rPr lang="en-US" dirty="0"/>
+              <a:t>Resource Allocation</a:t>
+            </a:r>
+          </a:p>
+          <a:p>
+            <a:r>
+              <a:rPr lang="en-US" dirty="0"/>
+              <a:t>Security</a:t>
+            </a:r>
+          </a:p>
+          <a:p>
+            <a:endParaRPr lang="en-US" dirty="0"/>
+          </a:p>
+        </p:txBody>
+      </p:sp>
+      <p:sp>
+        <p:nvSpPr>
+          <p:cNvPr id="4" name="Content Placeholder 3">
+            <a:extLst>
+              <a:ext uri="{FF2B5EF4-FFF2-40B4-BE49-F238E27FC236}">
+                <a16:creationId xmlns:a16="http://schemas.microsoft.com/office/drawing/2014/main" id="{E733743C-EAF7-4DE6-8B8F-A916C4D2A728}"/>
+              </a:ext>
+            </a:extLst>
+          </p:cNvPr>
+          <p:cNvSpPr>
+            <a:spLocks noGrp="1"/>
+          </p:cNvSpPr>
+          <p:nvPr>
+            <p:ph sz="half" idx="2"/>
+          </p:nvPr>
+        </p:nvSpPr>
+        <p:spPr/>
+        <p:txBody>
+          <a:bodyPr>
+            <a:normAutofit fontScale="62500" lnSpcReduction="20000"/>
+          </a:bodyPr>
+          <a:lstStyle/>
+          <a:p>
+            <a:r>
+              <a:rPr lang="en-US" dirty="0"/>
+              <a:t>Budgeting</a:t>
+            </a:r>
+          </a:p>
+          <a:p>
+            <a:r>
+              <a:rPr lang="en-US" dirty="0"/>
+              <a:t>Change Management</a:t>
+            </a:r>
+          </a:p>
+          <a:p>
+            <a:r>
+              <a:rPr lang="en-US" dirty="0"/>
+              <a:t>Desktop Host Management</a:t>
+            </a:r>
+          </a:p>
+          <a:p>
+            <a:r>
+              <a:rPr lang="en-US" dirty="0"/>
+              <a:t>Image Approval and Management</a:t>
+            </a:r>
+          </a:p>
+          <a:p>
+            <a:r>
+              <a:rPr lang="en-US" dirty="0"/>
+              <a:t>Licensing and Compliance</a:t>
+            </a:r>
+          </a:p>
+          <a:p>
+            <a:r>
+              <a:rPr lang="en-US" dirty="0"/>
+              <a:t>Long-term viability</a:t>
+            </a:r>
+          </a:p>
+          <a:p>
+            <a:r>
+              <a:rPr lang="en-US" dirty="0"/>
+              <a:t>Resource Planning</a:t>
+            </a:r>
+          </a:p>
+          <a:p>
+            <a:r>
+              <a:rPr lang="en-US" dirty="0"/>
+              <a:t>Security Audits</a:t>
+            </a:r>
+          </a:p>
+          <a:p>
+            <a:r>
+              <a:rPr lang="en-US" dirty="0"/>
+              <a:t>Technical Support Quality and Availability</a:t>
+            </a:r>
+          </a:p>
+          <a:p>
+            <a:endParaRPr lang="en-US" dirty="0"/>
           </a:p>
         </p:txBody>
       </p:sp>
     </p:spTree>
     <p:extLst>
       <p:ext uri="{BB962C8B-B14F-4D97-AF65-F5344CB8AC3E}">
-        <p14:creationId xmlns:p14="http://schemas.microsoft.com/office/powerpoint/2010/main" val="3976924198"/>
+        <p14:creationId xmlns:p14="http://schemas.microsoft.com/office/powerpoint/2010/main" val="3732569273"/>
       </p:ext>
     </p:extLst>
   </p:cSld>
@@ -13692,7 +15065,13 @@
       </p:grpSpPr>
       <p:sp>
         <p:nvSpPr>
-          <p:cNvPr id="2" name="Title 1"/>
+          <p:cNvPr id="2" name="Title 1">
+            <a:extLst>
+              <a:ext uri="{FF2B5EF4-FFF2-40B4-BE49-F238E27FC236}">
+                <a16:creationId xmlns:a16="http://schemas.microsoft.com/office/drawing/2014/main" id="{02C69A9D-11E3-42B6-A78A-D426038F43C5}"/>
+              </a:ext>
+            </a:extLst>
+          </p:cNvPr>
           <p:cNvSpPr>
             <a:spLocks noGrp="1"/>
           </p:cNvSpPr>
@@ -13707,14 +15086,20 @@
           <a:p>
             <a:r>
               <a:rPr lang="en-US" dirty="0"/>
-              <a:t>Demo Requirements:  The Application</a:t>
-            </a:r>
-          </a:p>
-        </p:txBody>
-      </p:sp>
-      <p:sp>
-        <p:nvSpPr>
-          <p:cNvPr id="3" name="Content Placeholder 2"/>
+              <a:t>Demo Requirements</a:t>
+            </a:r>
+          </a:p>
+        </p:txBody>
+      </p:sp>
+      <p:sp>
+        <p:nvSpPr>
+          <p:cNvPr id="3" name="Content Placeholder 2">
+            <a:extLst>
+              <a:ext uri="{FF2B5EF4-FFF2-40B4-BE49-F238E27FC236}">
+                <a16:creationId xmlns:a16="http://schemas.microsoft.com/office/drawing/2014/main" id="{0341BF6B-1DD5-4499-A7F3-A34FCF6500EB}"/>
+              </a:ext>
+            </a:extLst>
+          </p:cNvPr>
           <p:cNvSpPr>
             <a:spLocks noGrp="1"/>
           </p:cNvSpPr>
@@ -13724,34 +15109,30 @@
         </p:nvSpPr>
         <p:spPr/>
         <p:txBody>
-          <a:bodyPr>
-            <a:normAutofit/>
-          </a:bodyPr>
+          <a:bodyPr/>
           <a:lstStyle/>
           <a:p>
             <a:r>
               <a:rPr lang="en-US" dirty="0"/>
-              <a:t>We will provide a simple app to Containerize</a:t>
+              <a:t>We’ll provide the application</a:t>
             </a:r>
           </a:p>
           <a:p>
             <a:r>
               <a:rPr lang="en-US" dirty="0"/>
-              <a:t>The app will have two dependencies</a:t>
-            </a:r>
-          </a:p>
-          <a:p>
-            <a:pPr lvl="1"/>
+              <a:t>Deployment</a:t>
+            </a:r>
+          </a:p>
+          <a:p>
             <a:r>
               <a:rPr lang="en-US" dirty="0"/>
-              <a:t>Database</a:t>
-            </a:r>
-          </a:p>
-          <a:p>
-            <a:pPr lvl="1"/>
+              <a:t>NOC Integration</a:t>
+            </a:r>
+          </a:p>
+          <a:p>
             <a:r>
               <a:rPr lang="en-US" dirty="0"/>
-              <a:t>Messaging</a:t>
+              <a:t>Proposals</a:t>
             </a:r>
           </a:p>
         </p:txBody>
@@ -13759,7 +15140,7 @@
     </p:spTree>
     <p:extLst>
       <p:ext uri="{BB962C8B-B14F-4D97-AF65-F5344CB8AC3E}">
-        <p14:creationId xmlns:p14="http://schemas.microsoft.com/office/powerpoint/2010/main" val="1204616855"/>
+        <p14:creationId xmlns:p14="http://schemas.microsoft.com/office/powerpoint/2010/main" val="3976924198"/>
       </p:ext>
     </p:extLst>
   </p:cSld>

</xml_diff>